<commit_message>
Added loading to GUI, increased font
</commit_message>
<xml_diff>
--- a/output.pptx
+++ b/output.pptx
@@ -41,6 +41,56 @@
     <p:sldId id="289" r:id="rId39"/>
     <p:sldId id="290" r:id="rId40"/>
     <p:sldId id="291" r:id="rId41"/>
+    <p:sldId id="292" r:id="rId42"/>
+    <p:sldId id="293" r:id="rId43"/>
+    <p:sldId id="294" r:id="rId44"/>
+    <p:sldId id="295" r:id="rId45"/>
+    <p:sldId id="296" r:id="rId46"/>
+    <p:sldId id="297" r:id="rId47"/>
+    <p:sldId id="298" r:id="rId48"/>
+    <p:sldId id="299" r:id="rId49"/>
+    <p:sldId id="300" r:id="rId50"/>
+    <p:sldId id="301" r:id="rId51"/>
+    <p:sldId id="302" r:id="rId52"/>
+    <p:sldId id="303" r:id="rId53"/>
+    <p:sldId id="304" r:id="rId54"/>
+    <p:sldId id="305" r:id="rId55"/>
+    <p:sldId id="306" r:id="rId56"/>
+    <p:sldId id="307" r:id="rId57"/>
+    <p:sldId id="308" r:id="rId58"/>
+    <p:sldId id="309" r:id="rId59"/>
+    <p:sldId id="310" r:id="rId60"/>
+    <p:sldId id="311" r:id="rId61"/>
+    <p:sldId id="312" r:id="rId62"/>
+    <p:sldId id="313" r:id="rId63"/>
+    <p:sldId id="314" r:id="rId64"/>
+    <p:sldId id="315" r:id="rId65"/>
+    <p:sldId id="316" r:id="rId66"/>
+    <p:sldId id="317" r:id="rId67"/>
+    <p:sldId id="318" r:id="rId68"/>
+    <p:sldId id="319" r:id="rId69"/>
+    <p:sldId id="320" r:id="rId70"/>
+    <p:sldId id="321" r:id="rId71"/>
+    <p:sldId id="322" r:id="rId72"/>
+    <p:sldId id="323" r:id="rId73"/>
+    <p:sldId id="324" r:id="rId74"/>
+    <p:sldId id="325" r:id="rId75"/>
+    <p:sldId id="326" r:id="rId76"/>
+    <p:sldId id="327" r:id="rId77"/>
+    <p:sldId id="328" r:id="rId78"/>
+    <p:sldId id="329" r:id="rId79"/>
+    <p:sldId id="330" r:id="rId80"/>
+    <p:sldId id="331" r:id="rId81"/>
+    <p:sldId id="332" r:id="rId82"/>
+    <p:sldId id="333" r:id="rId83"/>
+    <p:sldId id="334" r:id="rId84"/>
+    <p:sldId id="335" r:id="rId85"/>
+    <p:sldId id="336" r:id="rId86"/>
+    <p:sldId id="337" r:id="rId87"/>
+    <p:sldId id="338" r:id="rId88"/>
+    <p:sldId id="339" r:id="rId89"/>
+    <p:sldId id="340" r:id="rId90"/>
+    <p:sldId id="341" r:id="rId91"/>
   </p:sldIdLst>
   <p:sldSz cx="9144000" cy="6858000" type="screen4x3"/>
   <p:notesSz cx="6858000" cy="9144000"/>
@@ -5081,7 +5131,7 @@
           <a:lstStyle/>
           <a:p>
             <a:r>
-              <a:t>Java_(programming_language)</a:t>
+              <a:t>Selena_Gomez</a:t>
             </a:r>
           </a:p>
         </p:txBody>
@@ -5102,7 +5152,7 @@
           <a:lstStyle/>
           <a:p>
             <a:r>
-              <a:t>However, Java programs' execution speed improved significantly with the introduction of just-in-time compilation in 1997/1998 for Java 1.1, the addition of language features supporting better code analysis (such as inner classes, the StringBuilder class, optional assertions, etc.</a:t>
+              <a:t>Gomez's acting credits include starring roles in the films Another Cinderella Story (2008), Princess Protection Program (2009), Wizards of Waverly Place: The Movie (2009), Ramona and Beezus (2010), Monte Carlo (2011), Spring Breakers (2012), Getaway (2013) and The Fundamentals of Caring (2016).</a:t>
             </a:r>
           </a:p>
         </p:txBody>
@@ -5162,7 +5212,7 @@
           <a:lstStyle/>
           <a:p>
             <a:r>
-              <a:t>When the source file contains multiple classes, make one class "public" and name the source file with that public class name.</a:t>
+              <a:t>Gomez later appeared in the music video for the song "Burnin' Up", which the Jonas Brothers had recorded and released, and later, she also appeared in an episode of the reality series Jonas Brothers: Living the Dream.</a:t>
             </a:r>
           </a:p>
         </p:txBody>
@@ -5222,7 +5272,7 @@
           <a:lstStyle/>
           <a:p>
             <a:r>
-              <a:t>For class file generation, anonymous classes are treated as if their name were the concatenation of the name of their enclosing class, a $, and an integer.</a:t>
+              <a:t>She contributed a cover of the song "Cruella de Vil" to the compilation album DisneyMania 6, and later recorded the original song "Fly to Your Heart" for the soundtrack of the animated film Tinker Bell.</a:t>
             </a:r>
           </a:p>
         </p:txBody>
@@ -5282,7 +5332,7 @@
           <a:lstStyle/>
           <a:p>
             <a:r>
-              <a:t>The keyword public denotes that a method can be called from code in other classes, or that a class may be used by classes outside the class hierarchy.</a:t>
+              <a:t>She had a leading role as an aspiring dancer Mary Santiago in the direct-to-video film Another Cinderella Story, a sequel to A Cinderella Story, starring Hilary Duff and Chad Michael Murray and the second installment of A Cinderella Story series.</a:t>
             </a:r>
           </a:p>
         </p:txBody>
@@ -5342,7 +5392,7 @@
           <a:lstStyle/>
           <a:p>
             <a:r>
-              <a:t>The keyword static in front of a method indicates a static method, which is associated only with the class and not with any specific instance of that class.</a:t>
+              <a:t>Gomez recorded three songs for the soundtrack, and released one of them, "Tell Me Something I Don't Know", as a promotional single.</a:t>
             </a:r>
           </a:p>
         </p:txBody>
@@ -5402,7 +5452,7 @@
           <a:lstStyle/>
           <a:p>
             <a:r>
-              <a:t>Only static methods can be invoked without a reference to an object.</a:t>
+              <a:t>She later announced a film adaptation of the novel Thirteen Reasons Why, in which she was to play a young girl who commits suicide; ultimately, neither film was made, though Gomez would later executive produce a television adaptation of Thirteen Reasons Why.</a:t>
             </a:r>
           </a:p>
         </p:txBody>
@@ -5462,7 +5512,7 @@
           <a:lstStyle/>
           <a:p>
             <a:r>
-              <a:t>Static methods cannot access any class members that are not also static.</a:t>
+              <a:t>She later made a guest appearance on the Disney series Sonny With a Chance, starring Lovato.</a:t>
             </a:r>
           </a:p>
         </p:txBody>
@@ -5522,7 +5572,7 @@
           <a:lstStyle/>
           <a:p>
             <a:r>
-              <a:t>Methods that are not designated static are instance methods and require a specific instance of a class to operate.</a:t>
+              <a:t>Gomez, along with Lovato, starred in the Disney Channel film Princess Protection Program, which aired in June 2009.</a:t>
             </a:r>
           </a:p>
         </p:txBody>
@@ -5582,7 +5632,7 @@
           <a:lstStyle/>
           <a:p>
             <a:r>
-              <a:t>Java classes that run in managed environments such as applets and Enterprise JavaBeans do not use or need a main() method.</a:t>
+              <a:t>For the film, Gomez and Lovato recorded the song "One and the Same", which was later released as a promotional single.</a:t>
             </a:r>
           </a:p>
         </p:txBody>
@@ -5642,7 +5692,7 @@
           <a:lstStyle/>
           <a:p>
             <a:r>
-              <a:t>A Java program may contain multiple classes that have main methods, which means that the VM needs to be explicitly told which class to launch from.</a:t>
+              <a:t>On August 28, 2009, Gomez starred in Wizards of Waverly Place: The Movie, a television film based on the series.</a:t>
             </a:r>
           </a:p>
         </p:txBody>
@@ -5702,7 +5752,7 @@
           <a:lstStyle/>
           <a:p>
             <a:r>
-              <a:t>The main method must accept an array of String objects.</a:t>
+              <a:t>In 2010, Gomez starred as one of the two female leads in Ramona and Beezus, a film adaption of the children's novel series by Beverly Cleary.</a:t>
             </a:r>
           </a:p>
         </p:txBody>
@@ -5784,7 +5834,7 @@
         <p:spPr>
           <a:xfrm>
             <a:off x="914400" y="1828800"/>
-            <a:ext cx="7300570" cy="3657600"/>
+            <a:ext cx="2859701" cy="3657600"/>
           </a:xfrm>
           <a:prstGeom prst="rect">
             <a:avLst/>
@@ -5846,7 +5896,7 @@
           <a:lstStyle/>
           <a:p>
             <a:r>
-              <a:t>The Java launcher launches Java by loading a given class (specified on the command line or as an attribute in a JAR) and starting its public static void main(String) method.</a:t>
+              <a:t>Gomez appeared in a cameo role in the film The Muppets and appeared in the Disney shows So Random!</a:t>
             </a:r>
           </a:p>
         </p:txBody>
@@ -5906,7 +5956,7 @@
           <a:lstStyle/>
           <a:p>
             <a:r>
-              <a:t>The out object is an instance of the PrintStream class and provides many methods for printing data to standard out, including println(String) which also appends a new line to the passed string.</a:t>
+              <a:t>Gomez hoped to focus on her film career outside Disney and starred in the animated film Hotel Transylvania (2012).</a:t>
             </a:r>
           </a:p>
         </p:txBody>
@@ -5966,7 +6016,7 @@
           <a:lstStyle/>
           <a:p>
             <a:r>
-              <a:t>For container classes, for example, this is a problem because there is no easy way to create a container that accepts only specific types of objects.</a:t>
+              <a:t>Gomez had a role in the controversial exploitation film Spring Breakers (2013), starring James Franco.</a:t>
             </a:r>
           </a:p>
         </p:txBody>
@@ -6026,7 +6076,7 @@
           <a:lstStyle/>
           <a:p>
             <a:r>
-              <a:t>Oracle Corporation is the current owner of the official implementation of the Java SE platform, following their acquisition of Sun Microsystems on January 27, 2010.</a:t>
+              <a:t>She later appeared in the film Rudderless (2014), the directorial debut of William H.</a:t>
             </a:r>
           </a:p>
         </p:txBody>
@@ -6086,7 +6136,7 @@
           <a:lstStyle/>
           <a:p>
             <a:r>
-              <a:t>The Oracle implementation is packaged into two different distributions: The Java Runtime Environment (JRE) which contains the parts of the Java SE platform required to run Java programs and is intended for end users, and the Java Development Kit (JDK), which is intended for software developers and includes development tools such as the Java compiler, Javadoc, Jar, and a debugger.</a:t>
+              <a:t>She reprised the role of Mavis in Hotel Transylvania 2, which was released on September 25; the film was met with a positive critical and commercial reception upon its release.</a:t>
             </a:r>
           </a:p>
         </p:txBody>
@@ -6146,35 +6196,11 @@
           <a:lstStyle/>
           <a:p>
             <a:r>
-              <a:t> </a:t>
-            </a:r>
-          </a:p>
-        </p:txBody>
-      </p:sp>
-      <p:pic>
-        <p:nvPicPr>
-          <p:cNvPr id="4" name="Picture 3" descr="image1.jpg"/>
-          <p:cNvPicPr>
-            <a:picLocks noChangeAspect="1"/>
-          </p:cNvPicPr>
-          <p:nvPr/>
-        </p:nvPicPr>
-        <p:blipFill>
-          <a:blip r:embed="rId2"/>
-          <a:stretch>
-            <a:fillRect/>
-          </a:stretch>
-        </p:blipFill>
-        <p:spPr>
-          <a:xfrm>
-            <a:off x="914400" y="1828800"/>
-            <a:ext cx="5621738" cy="3657600"/>
-          </a:xfrm>
-          <a:prstGeom prst="rect">
-            <a:avLst/>
-          </a:prstGeom>
-        </p:spPr>
-      </p:pic>
+              <a:t>Gomez had a cameo role in the film The Big Short, which was released on December 11 by Paramount Pictures.</a:t>
+            </a:r>
+          </a:p>
+        </p:txBody>
+      </p:sp>
     </p:spTree>
   </p:cSld>
   <p:clrMapOvr>
@@ -6209,7 +6235,7 @@
           <a:lstStyle/>
           <a:p>
             <a:r>
-              <a:t>ADVANTAGES</a:t>
+              <a:t> </a:t>
             </a:r>
           </a:p>
         </p:txBody>
@@ -6230,7 +6256,7 @@
           <a:lstStyle/>
           <a:p>
             <a:r>
-              <a:t> </a:t>
+              <a:t>Gomez and Kygo confirmed the single titled "It Ain't Me" via their social media accounts a week later, which was released on February 16.</a:t>
             </a:r>
           </a:p>
         </p:txBody>
@@ -6290,7 +6316,7 @@
           <a:lstStyle/>
           <a:p>
             <a:r>
-              <a:t>However, Java programs' execution speed improved significantly with the introduction of just-in-time compilation in 1997/1998 for Java 1.1, the addition of language features supporting better code analysis (such as inner classes, the StringBuilder class, optional assertions, etc.</a:t>
+              <a:t>In August 2017, Gomez was cast in A Rainy Day in New York, a film directed by Woody Allen for Amazon Studios.</a:t>
             </a:r>
           </a:p>
         </p:txBody>
@@ -6350,7 +6376,7 @@
           <a:lstStyle/>
           <a:p>
             <a:r>
-              <a:t>This allows the garbage collector to relocate referenced objects and ensures type safety and security.</a:t>
+              <a:t>On October 19, 2017, Gomez and EDM producer Marshmello announced that they would be collaborating on a new track titled "Wolves," which was released on October 25.</a:t>
             </a:r>
           </a:p>
         </p:txBody>
@@ -6410,7 +6436,7 @@
           <a:lstStyle/>
           <a:p>
             <a:r>
-              <a:t>As in C++ and some other object-oriented languages, variables of Java's primitive data types are either stored directly in fields (for objects) or on the stack (for methods) rather than on the heap, as is commonly true for non-primitive data types (but see escape analysis).</a:t>
+              <a:t>Gomez was featured on the Benny Blanco song "I Can't Get Enough", alongside Tainy and J Balvin, which was released in February 2019.</a:t>
             </a:r>
           </a:p>
         </p:txBody>
@@ -6530,7 +6556,7 @@
           <a:lstStyle/>
           <a:p>
             <a:r>
-              <a:t>The effect of this alternate declaration is semantically identical (to the args parameter which is still an array of String objects), but it allows an alternative syntax for creating and passing the array.</a:t>
+              <a:t>Gomez also appeared in ads for Coca-Cola's "Share a Coke" campaign, and she appeared in advertisements for the campaign and lyrics from two of her songs will be featured on packages of Coca-Cola products nationwide.</a:t>
             </a:r>
           </a:p>
         </p:txBody>
@@ -6590,35 +6616,11 @@
           <a:lstStyle/>
           <a:p>
             <a:r>
-              <a:t> </a:t>
-            </a:r>
-          </a:p>
-        </p:txBody>
-      </p:sp>
-      <p:pic>
-        <p:nvPicPr>
-          <p:cNvPr id="4" name="Picture 3" descr="image2.jpg"/>
-          <p:cNvPicPr>
-            <a:picLocks noChangeAspect="1"/>
-          </p:cNvPicPr>
-          <p:nvPr/>
-        </p:nvPicPr>
-        <p:blipFill>
-          <a:blip r:embed="rId2"/>
-          <a:stretch>
-            <a:fillRect/>
-          </a:stretch>
-        </p:blipFill>
-        <p:spPr>
-          <a:xfrm>
-            <a:off x="914400" y="1828800"/>
-            <a:ext cx="3856872" cy="3657600"/>
-          </a:xfrm>
-          <a:prstGeom prst="rect">
-            <a:avLst/>
-          </a:prstGeom>
-        </p:spPr>
-      </p:pic>
+              <a:t>Gomez later stated in 2017 that she did not like the term "religion" and that sometimes it "freaks me out", adding "I don't know if it's necessarily that I believe in religion, as much as I believe in faith and a relationship with God.</a:t>
+            </a:r>
+          </a:p>
+        </p:txBody>
+      </p:sp>
     </p:spTree>
   </p:cSld>
   <p:clrMapOvr>
@@ -6653,7 +6655,7 @@
           <a:lstStyle/>
           <a:p>
             <a:r>
-              <a:t>DISADVANTAGES</a:t>
+              <a:t> </a:t>
             </a:r>
           </a:p>
         </p:txBody>
@@ -6674,7 +6676,7 @@
           <a:lstStyle/>
           <a:p>
             <a:r>
-              <a:t> </a:t>
+              <a:t>The Weeknd released My Dear Melancholy, in March 2018, which—according to media outlets—referenced Gomez in several songs.</a:t>
             </a:r>
           </a:p>
         </p:txBody>
@@ -6734,7 +6736,7 @@
           <a:lstStyle/>
           <a:p>
             <a:r>
-              <a:t>Something similar to a memory leak may still occur if a programmer's code holds a reference to an object that is no longer needed, typically when objects that are no longer needed are stored in containers that are still in use.</a:t>
+              <a:t>As a solo artist, Gomez has released the two number-one albums Stars Dance (2013) and Revival (2015).</a:t>
             </a:r>
           </a:p>
         </p:txBody>
@@ -6794,7 +6796,7 @@
           <a:lstStyle/>
           <a:p>
             <a:r>
-              <a:t>Paradoxically, the presence of a garbage collector has faded the necessity of having an explicit destructor method in the classes, thus rendering the management of these other resources more difficult.</a:t>
+              <a:t>In 2017, Billboard reported that Gomez has sold over 7 million albums and 22 million singles worldwide.</a:t>
             </a:r>
           </a:p>
         </p:txBody>
@@ -6854,7 +6856,7 @@
           <a:lstStyle/>
           <a:p>
             <a:r>
-              <a:t>Since Java 5, the main method can also use variable arguments, in the form of public static void main(String... args), allowing the main method to be invoked with an arbitrary number of String arguments.</a:t>
+              <a:t>Gomez recorded three songs for the soundtrack, and released one of them, "Tell Me Something I Don't Know", as a promotional single.</a:t>
             </a:r>
           </a:p>
         </p:txBody>
@@ -6914,7 +6916,187 @@
           <a:lstStyle/>
           <a:p>
             <a:r>
-              <a:t>The String args parameter is an array of String objects containing any arguments passed to the class.</a:t>
+              <a:t>For the film, Gomez and Lovato recorded the song "One and the Same", which was later released as a promotional single.</a:t>
+            </a:r>
+          </a:p>
+        </p:txBody>
+      </p:sp>
+    </p:spTree>
+  </p:cSld>
+  <p:clrMapOvr>
+    <a:masterClrMapping/>
+  </p:clrMapOvr>
+</p:sld>
+</file>
+
+<file path=ppt/slides/slide37.xml><?xml version="1.0" encoding="utf-8"?>
+<p:sld xmlns:a="http://schemas.openxmlformats.org/drawingml/2006/main" xmlns:p="http://schemas.openxmlformats.org/presentationml/2006/main" xmlns:r="http://schemas.openxmlformats.org/officeDocument/2006/relationships">
+  <p:cSld>
+    <p:spTree>
+      <p:nvGrpSpPr>
+        <p:cNvPr id="1" name=""/>
+        <p:cNvGrpSpPr/>
+        <p:nvPr/>
+      </p:nvGrpSpPr>
+      <p:grpSpPr/>
+      <p:sp>
+        <p:nvSpPr>
+          <p:cNvPr id="2" name="Title 1"/>
+          <p:cNvSpPr>
+            <a:spLocks noGrp="1"/>
+          </p:cNvSpPr>
+          <p:nvPr>
+            <p:ph type="ctrTitle"/>
+          </p:nvPr>
+        </p:nvSpPr>
+        <p:spPr/>
+        <p:txBody>
+          <a:bodyPr/>
+          <a:lstStyle/>
+          <a:p>
+            <a:r>
+              <a:t> </a:t>
+            </a:r>
+          </a:p>
+        </p:txBody>
+      </p:sp>
+      <p:sp>
+        <p:nvSpPr>
+          <p:cNvPr id="3" name="Subtitle 2"/>
+          <p:cNvSpPr>
+            <a:spLocks noGrp="1"/>
+          </p:cNvSpPr>
+          <p:nvPr>
+            <p:ph type="subTitle" idx="1"/>
+          </p:nvPr>
+        </p:nvSpPr>
+        <p:spPr/>
+        <p:txBody>
+          <a:bodyPr/>
+          <a:lstStyle/>
+          <a:p>
+            <a:r>
+              <a:t>Selena Gomez &amp; the Scene released their second studio album A Year Without Rain that same year, which debuted on the US Billboard 200 at number 4 with sales of a little over 66,000.</a:t>
+            </a:r>
+          </a:p>
+        </p:txBody>
+      </p:sp>
+    </p:spTree>
+  </p:cSld>
+  <p:clrMapOvr>
+    <a:masterClrMapping/>
+  </p:clrMapOvr>
+</p:sld>
+</file>
+
+<file path=ppt/slides/slide38.xml><?xml version="1.0" encoding="utf-8"?>
+<p:sld xmlns:a="http://schemas.openxmlformats.org/drawingml/2006/main" xmlns:p="http://schemas.openxmlformats.org/presentationml/2006/main" xmlns:r="http://schemas.openxmlformats.org/officeDocument/2006/relationships">
+  <p:cSld>
+    <p:spTree>
+      <p:nvGrpSpPr>
+        <p:cNvPr id="1" name=""/>
+        <p:cNvGrpSpPr/>
+        <p:nvPr/>
+      </p:nvGrpSpPr>
+      <p:grpSpPr/>
+      <p:sp>
+        <p:nvSpPr>
+          <p:cNvPr id="2" name="Title 1"/>
+          <p:cNvSpPr>
+            <a:spLocks noGrp="1"/>
+          </p:cNvSpPr>
+          <p:nvPr>
+            <p:ph type="ctrTitle"/>
+          </p:nvPr>
+        </p:nvSpPr>
+        <p:spPr/>
+        <p:txBody>
+          <a:bodyPr/>
+          <a:lstStyle/>
+          <a:p>
+            <a:r>
+              <a:t> </a:t>
+            </a:r>
+          </a:p>
+        </p:txBody>
+      </p:sp>
+      <p:sp>
+        <p:nvSpPr>
+          <p:cNvPr id="3" name="Subtitle 2"/>
+          <p:cNvSpPr>
+            <a:spLocks noGrp="1"/>
+          </p:cNvSpPr>
+          <p:nvPr>
+            <p:ph type="subTitle" idx="1"/>
+          </p:nvPr>
+        </p:nvSpPr>
+        <p:spPr/>
+        <p:txBody>
+          <a:bodyPr/>
+          <a:lstStyle/>
+          <a:p>
+            <a:r>
+              <a:t>Selena Gomez &amp; the Scene released their third and final studio album that same year.</a:t>
+            </a:r>
+          </a:p>
+        </p:txBody>
+      </p:sp>
+    </p:spTree>
+  </p:cSld>
+  <p:clrMapOvr>
+    <a:masterClrMapping/>
+  </p:clrMapOvr>
+</p:sld>
+</file>
+
+<file path=ppt/slides/slide39.xml><?xml version="1.0" encoding="utf-8"?>
+<p:sld xmlns:a="http://schemas.openxmlformats.org/drawingml/2006/main" xmlns:p="http://schemas.openxmlformats.org/presentationml/2006/main" xmlns:r="http://schemas.openxmlformats.org/officeDocument/2006/relationships">
+  <p:cSld>
+    <p:spTree>
+      <p:nvGrpSpPr>
+        <p:cNvPr id="1" name=""/>
+        <p:cNvGrpSpPr/>
+        <p:nvPr/>
+      </p:nvGrpSpPr>
+      <p:grpSpPr/>
+      <p:sp>
+        <p:nvSpPr>
+          <p:cNvPr id="2" name="Title 1"/>
+          <p:cNvSpPr>
+            <a:spLocks noGrp="1"/>
+          </p:cNvSpPr>
+          <p:nvPr>
+            <p:ph type="ctrTitle"/>
+          </p:nvPr>
+        </p:nvSpPr>
+        <p:spPr/>
+        <p:txBody>
+          <a:bodyPr/>
+          <a:lstStyle/>
+          <a:p>
+            <a:r>
+              <a:t> </a:t>
+            </a:r>
+          </a:p>
+        </p:txBody>
+      </p:sp>
+      <p:sp>
+        <p:nvSpPr>
+          <p:cNvPr id="3" name="Subtitle 2"/>
+          <p:cNvSpPr>
+            <a:spLocks noGrp="1"/>
+          </p:cNvSpPr>
+          <p:nvPr>
+            <p:ph type="subTitle" idx="1"/>
+          </p:nvPr>
+        </p:nvSpPr>
+        <p:spPr/>
+        <p:txBody>
+          <a:bodyPr/>
+          <a:lstStyle/>
+          <a:p>
+            <a:r>
+              <a:t>The album received mixed reviews, with the album's second single receiving a 4x Platinum certification from the RIAA.</a:t>
             </a:r>
           </a:p>
         </p:txBody>
@@ -6974,7 +7156,607 @@
           <a:lstStyle/>
           <a:p>
             <a:r>
-              <a:t>Java uses an automatic garbage collector to manage memory in the object lifecycle.</a:t>
+              <a:t>Both Gomez and Lovato were later selected to appear on the series in 2002, with Gomez portraying the character of Gianna.</a:t>
+            </a:r>
+          </a:p>
+        </p:txBody>
+      </p:sp>
+    </p:spTree>
+  </p:cSld>
+  <p:clrMapOvr>
+    <a:masterClrMapping/>
+  </p:clrMapOvr>
+</p:sld>
+</file>
+
+<file path=ppt/slides/slide40.xml><?xml version="1.0" encoding="utf-8"?>
+<p:sld xmlns:a="http://schemas.openxmlformats.org/drawingml/2006/main" xmlns:p="http://schemas.openxmlformats.org/presentationml/2006/main" xmlns:r="http://schemas.openxmlformats.org/officeDocument/2006/relationships">
+  <p:cSld>
+    <p:spTree>
+      <p:nvGrpSpPr>
+        <p:cNvPr id="1" name=""/>
+        <p:cNvGrpSpPr/>
+        <p:nvPr/>
+      </p:nvGrpSpPr>
+      <p:grpSpPr/>
+      <p:sp>
+        <p:nvSpPr>
+          <p:cNvPr id="2" name="Title 1"/>
+          <p:cNvSpPr>
+            <a:spLocks noGrp="1"/>
+          </p:cNvSpPr>
+          <p:nvPr>
+            <p:ph type="ctrTitle"/>
+          </p:nvPr>
+        </p:nvSpPr>
+        <p:spPr/>
+        <p:txBody>
+          <a:bodyPr/>
+          <a:lstStyle/>
+          <a:p>
+            <a:r>
+              <a:t> </a:t>
+            </a:r>
+          </a:p>
+        </p:txBody>
+      </p:sp>
+      <p:sp>
+        <p:nvSpPr>
+          <p:cNvPr id="3" name="Subtitle 2"/>
+          <p:cNvSpPr>
+            <a:spLocks noGrp="1"/>
+          </p:cNvSpPr>
+          <p:nvPr>
+            <p:ph type="subTitle" idx="1"/>
+          </p:nvPr>
+        </p:nvSpPr>
+        <p:spPr/>
+        <p:txBody>
+          <a:bodyPr/>
+          <a:lstStyle/>
+          <a:p>
+            <a:r>
+              <a:t>Gomez released "Come &amp; Get It" as the lead single from the album.</a:t>
+            </a:r>
+          </a:p>
+        </p:txBody>
+      </p:sp>
+    </p:spTree>
+  </p:cSld>
+  <p:clrMapOvr>
+    <a:masterClrMapping/>
+  </p:clrMapOvr>
+</p:sld>
+</file>
+
+<file path=ppt/slides/slide41.xml><?xml version="1.0" encoding="utf-8"?>
+<p:sld xmlns:a="http://schemas.openxmlformats.org/drawingml/2006/main" xmlns:p="http://schemas.openxmlformats.org/presentationml/2006/main" xmlns:r="http://schemas.openxmlformats.org/officeDocument/2006/relationships">
+  <p:cSld>
+    <p:spTree>
+      <p:nvGrpSpPr>
+        <p:cNvPr id="1" name=""/>
+        <p:cNvGrpSpPr/>
+        <p:nvPr/>
+      </p:nvGrpSpPr>
+      <p:grpSpPr/>
+      <p:sp>
+        <p:nvSpPr>
+          <p:cNvPr id="2" name="Title 1"/>
+          <p:cNvSpPr>
+            <a:spLocks noGrp="1"/>
+          </p:cNvSpPr>
+          <p:nvPr>
+            <p:ph type="ctrTitle"/>
+          </p:nvPr>
+        </p:nvSpPr>
+        <p:spPr/>
+        <p:txBody>
+          <a:bodyPr/>
+          <a:lstStyle/>
+          <a:p>
+            <a:r>
+              <a:t> </a:t>
+            </a:r>
+          </a:p>
+        </p:txBody>
+      </p:sp>
+      <p:sp>
+        <p:nvSpPr>
+          <p:cNvPr id="3" name="Subtitle 2"/>
+          <p:cNvSpPr>
+            <a:spLocks noGrp="1"/>
+          </p:cNvSpPr>
+          <p:nvPr>
+            <p:ph type="subTitle" idx="1"/>
+          </p:nvPr>
+        </p:nvSpPr>
+        <p:spPr/>
+        <p:txBody>
+          <a:bodyPr/>
+          <a:lstStyle/>
+          <a:p>
+            <a:r>
+              <a:t>The single became Gomez's first top ten entry on the Billboard Hot 100.</a:t>
+            </a:r>
+          </a:p>
+        </p:txBody>
+      </p:sp>
+    </p:spTree>
+  </p:cSld>
+  <p:clrMapOvr>
+    <a:masterClrMapping/>
+  </p:clrMapOvr>
+</p:sld>
+</file>
+
+<file path=ppt/slides/slide42.xml><?xml version="1.0" encoding="utf-8"?>
+<p:sld xmlns:a="http://schemas.openxmlformats.org/drawingml/2006/main" xmlns:p="http://schemas.openxmlformats.org/presentationml/2006/main" xmlns:r="http://schemas.openxmlformats.org/officeDocument/2006/relationships">
+  <p:cSld>
+    <p:spTree>
+      <p:nvGrpSpPr>
+        <p:cNvPr id="1" name=""/>
+        <p:cNvGrpSpPr/>
+        <p:nvPr/>
+      </p:nvGrpSpPr>
+      <p:grpSpPr/>
+      <p:sp>
+        <p:nvSpPr>
+          <p:cNvPr id="2" name="Title 1"/>
+          <p:cNvSpPr>
+            <a:spLocks noGrp="1"/>
+          </p:cNvSpPr>
+          <p:nvPr>
+            <p:ph type="ctrTitle"/>
+          </p:nvPr>
+        </p:nvSpPr>
+        <p:spPr/>
+        <p:txBody>
+          <a:bodyPr/>
+          <a:lstStyle/>
+          <a:p>
+            <a:r>
+              <a:t> </a:t>
+            </a:r>
+          </a:p>
+        </p:txBody>
+      </p:sp>
+      <p:sp>
+        <p:nvSpPr>
+          <p:cNvPr id="3" name="Subtitle 2"/>
+          <p:cNvSpPr>
+            <a:spLocks noGrp="1"/>
+          </p:cNvSpPr>
+          <p:nvPr>
+            <p:ph type="subTitle" idx="1"/>
+          </p:nvPr>
+        </p:nvSpPr>
+        <p:spPr/>
+        <p:txBody>
+          <a:bodyPr/>
+          <a:lstStyle/>
+          <a:p>
+            <a:r>
+              <a:t>Another single from the album, "Slow Down", peaked at number 27 in the Billboard charts.</a:t>
+            </a:r>
+          </a:p>
+        </p:txBody>
+      </p:sp>
+    </p:spTree>
+  </p:cSld>
+  <p:clrMapOvr>
+    <a:masterClrMapping/>
+  </p:clrMapOvr>
+</p:sld>
+</file>
+
+<file path=ppt/slides/slide43.xml><?xml version="1.0" encoding="utf-8"?>
+<p:sld xmlns:a="http://schemas.openxmlformats.org/drawingml/2006/main" xmlns:p="http://schemas.openxmlformats.org/presentationml/2006/main" xmlns:r="http://schemas.openxmlformats.org/officeDocument/2006/relationships">
+  <p:cSld>
+    <p:spTree>
+      <p:nvGrpSpPr>
+        <p:cNvPr id="1" name=""/>
+        <p:cNvGrpSpPr/>
+        <p:nvPr/>
+      </p:nvGrpSpPr>
+      <p:grpSpPr/>
+      <p:sp>
+        <p:nvSpPr>
+          <p:cNvPr id="2" name="Title 1"/>
+          <p:cNvSpPr>
+            <a:spLocks noGrp="1"/>
+          </p:cNvSpPr>
+          <p:nvPr>
+            <p:ph type="ctrTitle"/>
+          </p:nvPr>
+        </p:nvSpPr>
+        <p:spPr/>
+        <p:txBody>
+          <a:bodyPr/>
+          <a:lstStyle/>
+          <a:p>
+            <a:r>
+              <a:t> </a:t>
+            </a:r>
+          </a:p>
+        </p:txBody>
+      </p:sp>
+      <p:sp>
+        <p:nvSpPr>
+          <p:cNvPr id="3" name="Subtitle 2"/>
+          <p:cNvSpPr>
+            <a:spLocks noGrp="1"/>
+          </p:cNvSpPr>
+          <p:nvPr>
+            <p:ph type="subTitle" idx="1"/>
+          </p:nvPr>
+        </p:nvSpPr>
+        <p:spPr/>
+        <p:txBody>
+          <a:bodyPr/>
+          <a:lstStyle/>
+          <a:p>
+            <a:r>
+              <a:t>It became her first album to debut at number one on the US Billboard 200 chart, where it sold 97,000 copies in its first week.</a:t>
+            </a:r>
+          </a:p>
+        </p:txBody>
+      </p:sp>
+    </p:spTree>
+  </p:cSld>
+  <p:clrMapOvr>
+    <a:masterClrMapping/>
+  </p:clrMapOvr>
+</p:sld>
+</file>
+
+<file path=ppt/slides/slide44.xml><?xml version="1.0" encoding="utf-8"?>
+<p:sld xmlns:a="http://schemas.openxmlformats.org/drawingml/2006/main" xmlns:p="http://schemas.openxmlformats.org/presentationml/2006/main" xmlns:r="http://schemas.openxmlformats.org/officeDocument/2006/relationships">
+  <p:cSld>
+    <p:spTree>
+      <p:nvGrpSpPr>
+        <p:cNvPr id="1" name=""/>
+        <p:cNvGrpSpPr/>
+        <p:nvPr/>
+      </p:nvGrpSpPr>
+      <p:grpSpPr/>
+      <p:sp>
+        <p:nvSpPr>
+          <p:cNvPr id="2" name="Title 1"/>
+          <p:cNvSpPr>
+            <a:spLocks noGrp="1"/>
+          </p:cNvSpPr>
+          <p:nvPr>
+            <p:ph type="ctrTitle"/>
+          </p:nvPr>
+        </p:nvSpPr>
+        <p:spPr/>
+        <p:txBody>
+          <a:bodyPr/>
+          <a:lstStyle/>
+          <a:p>
+            <a:r>
+              <a:t> </a:t>
+            </a:r>
+          </a:p>
+        </p:txBody>
+      </p:sp>
+      <p:sp>
+        <p:nvSpPr>
+          <p:cNvPr id="3" name="Subtitle 2"/>
+          <p:cNvSpPr>
+            <a:spLocks noGrp="1"/>
+          </p:cNvSpPr>
+          <p:nvPr>
+            <p:ph type="subTitle" idx="1"/>
+          </p:nvPr>
+        </p:nvSpPr>
+        <p:spPr/>
+        <p:txBody>
+          <a:bodyPr/>
+          <a:lstStyle/>
+          <a:p>
+            <a:r>
+              <a:t>The album remained in the top ten in its second week, though declined down the chart in the following weeks.</a:t>
+            </a:r>
+          </a:p>
+        </p:txBody>
+      </p:sp>
+    </p:spTree>
+  </p:cSld>
+  <p:clrMapOvr>
+    <a:masterClrMapping/>
+  </p:clrMapOvr>
+</p:sld>
+</file>
+
+<file path=ppt/slides/slide45.xml><?xml version="1.0" encoding="utf-8"?>
+<p:sld xmlns:a="http://schemas.openxmlformats.org/drawingml/2006/main" xmlns:p="http://schemas.openxmlformats.org/presentationml/2006/main" xmlns:r="http://schemas.openxmlformats.org/officeDocument/2006/relationships">
+  <p:cSld>
+    <p:spTree>
+      <p:nvGrpSpPr>
+        <p:cNvPr id="1" name=""/>
+        <p:cNvGrpSpPr/>
+        <p:nvPr/>
+      </p:nvGrpSpPr>
+      <p:grpSpPr/>
+      <p:sp>
+        <p:nvSpPr>
+          <p:cNvPr id="2" name="Title 1"/>
+          <p:cNvSpPr>
+            <a:spLocks noGrp="1"/>
+          </p:cNvSpPr>
+          <p:nvPr>
+            <p:ph type="ctrTitle"/>
+          </p:nvPr>
+        </p:nvSpPr>
+        <p:spPr/>
+        <p:txBody>
+          <a:bodyPr/>
+          <a:lstStyle/>
+          <a:p>
+            <a:r>
+              <a:t> </a:t>
+            </a:r>
+          </a:p>
+        </p:txBody>
+      </p:sp>
+      <p:sp>
+        <p:nvSpPr>
+          <p:cNvPr id="3" name="Subtitle 2"/>
+          <p:cNvSpPr>
+            <a:spLocks noGrp="1"/>
+          </p:cNvSpPr>
+          <p:nvPr>
+            <p:ph type="subTitle" idx="1"/>
+          </p:nvPr>
+        </p:nvSpPr>
+        <p:spPr/>
+        <p:txBody>
+          <a:bodyPr/>
+          <a:lstStyle/>
+          <a:p>
+            <a:r>
+              <a:t>Gomez surprise released her new single "The Heart Wants What It Wants" (2014) on November 6, and confirmed after months of speculation that she would be releasing a compilation album as a means of finishing out her contract with Hollywood Records.</a:t>
+            </a:r>
+          </a:p>
+        </p:txBody>
+      </p:sp>
+    </p:spTree>
+  </p:cSld>
+  <p:clrMapOvr>
+    <a:masterClrMapping/>
+  </p:clrMapOvr>
+</p:sld>
+</file>
+
+<file path=ppt/slides/slide46.xml><?xml version="1.0" encoding="utf-8"?>
+<p:sld xmlns:a="http://schemas.openxmlformats.org/drawingml/2006/main" xmlns:p="http://schemas.openxmlformats.org/presentationml/2006/main" xmlns:r="http://schemas.openxmlformats.org/officeDocument/2006/relationships">
+  <p:cSld>
+    <p:spTree>
+      <p:nvGrpSpPr>
+        <p:cNvPr id="1" name=""/>
+        <p:cNvGrpSpPr/>
+        <p:nvPr/>
+      </p:nvGrpSpPr>
+      <p:grpSpPr/>
+      <p:sp>
+        <p:nvSpPr>
+          <p:cNvPr id="2" name="Title 1"/>
+          <p:cNvSpPr>
+            <a:spLocks noGrp="1"/>
+          </p:cNvSpPr>
+          <p:nvPr>
+            <p:ph type="ctrTitle"/>
+          </p:nvPr>
+        </p:nvSpPr>
+        <p:spPr/>
+        <p:txBody>
+          <a:bodyPr/>
+          <a:lstStyle/>
+          <a:p>
+            <a:r>
+              <a:t> </a:t>
+            </a:r>
+          </a:p>
+        </p:txBody>
+      </p:sp>
+      <p:sp>
+        <p:nvSpPr>
+          <p:cNvPr id="3" name="Subtitle 2"/>
+          <p:cNvSpPr>
+            <a:spLocks noGrp="1"/>
+          </p:cNvSpPr>
+          <p:nvPr>
+            <p:ph type="subTitle" idx="1"/>
+          </p:nvPr>
+        </p:nvSpPr>
+        <p:spPr/>
+        <p:txBody>
+          <a:bodyPr/>
+          <a:lstStyle/>
+          <a:p>
+            <a:r>
+              <a:t>Gomez released her first solo compilation album, For You (2014), on November 24.</a:t>
+            </a:r>
+          </a:p>
+        </p:txBody>
+      </p:sp>
+    </p:spTree>
+  </p:cSld>
+  <p:clrMapOvr>
+    <a:masterClrMapping/>
+  </p:clrMapOvr>
+</p:sld>
+</file>
+
+<file path=ppt/slides/slide47.xml><?xml version="1.0" encoding="utf-8"?>
+<p:sld xmlns:a="http://schemas.openxmlformats.org/drawingml/2006/main" xmlns:p="http://schemas.openxmlformats.org/presentationml/2006/main" xmlns:r="http://schemas.openxmlformats.org/officeDocument/2006/relationships">
+  <p:cSld>
+    <p:spTree>
+      <p:nvGrpSpPr>
+        <p:cNvPr id="1" name=""/>
+        <p:cNvGrpSpPr/>
+        <p:nvPr/>
+      </p:nvGrpSpPr>
+      <p:grpSpPr/>
+      <p:sp>
+        <p:nvSpPr>
+          <p:cNvPr id="2" name="Title 1"/>
+          <p:cNvSpPr>
+            <a:spLocks noGrp="1"/>
+          </p:cNvSpPr>
+          <p:nvPr>
+            <p:ph type="ctrTitle"/>
+          </p:nvPr>
+        </p:nvSpPr>
+        <p:spPr/>
+        <p:txBody>
+          <a:bodyPr/>
+          <a:lstStyle/>
+          <a:p>
+            <a:r>
+              <a:t> </a:t>
+            </a:r>
+          </a:p>
+        </p:txBody>
+      </p:sp>
+      <p:sp>
+        <p:nvSpPr>
+          <p:cNvPr id="3" name="Subtitle 2"/>
+          <p:cNvSpPr>
+            <a:spLocks noGrp="1"/>
+          </p:cNvSpPr>
+          <p:nvPr>
+            <p:ph type="subTitle" idx="1"/>
+          </p:nvPr>
+        </p:nvSpPr>
+        <p:spPr/>
+        <p:txBody>
+          <a:bodyPr/>
+          <a:lstStyle/>
+          <a:p>
+            <a:r>
+              <a:t>While working on her second studio album, Gomez collaborated with Zedd for his single "I Want You to Know" (2015), released as the lead single from his second album on February 23.</a:t>
+            </a:r>
+          </a:p>
+        </p:txBody>
+      </p:sp>
+    </p:spTree>
+  </p:cSld>
+  <p:clrMapOvr>
+    <a:masterClrMapping/>
+  </p:clrMapOvr>
+</p:sld>
+</file>
+
+<file path=ppt/slides/slide48.xml><?xml version="1.0" encoding="utf-8"?>
+<p:sld xmlns:a="http://schemas.openxmlformats.org/drawingml/2006/main" xmlns:p="http://schemas.openxmlformats.org/presentationml/2006/main" xmlns:r="http://schemas.openxmlformats.org/officeDocument/2006/relationships">
+  <p:cSld>
+    <p:spTree>
+      <p:nvGrpSpPr>
+        <p:cNvPr id="1" name=""/>
+        <p:cNvGrpSpPr/>
+        <p:nvPr/>
+      </p:nvGrpSpPr>
+      <p:grpSpPr/>
+      <p:sp>
+        <p:nvSpPr>
+          <p:cNvPr id="2" name="Title 1"/>
+          <p:cNvSpPr>
+            <a:spLocks noGrp="1"/>
+          </p:cNvSpPr>
+          <p:nvPr>
+            <p:ph type="ctrTitle"/>
+          </p:nvPr>
+        </p:nvSpPr>
+        <p:spPr/>
+        <p:txBody>
+          <a:bodyPr/>
+          <a:lstStyle/>
+          <a:p>
+            <a:r>
+              <a:t> </a:t>
+            </a:r>
+          </a:p>
+        </p:txBody>
+      </p:sp>
+      <p:sp>
+        <p:nvSpPr>
+          <p:cNvPr id="3" name="Subtitle 2"/>
+          <p:cNvSpPr>
+            <a:spLocks noGrp="1"/>
+          </p:cNvSpPr>
+          <p:nvPr>
+            <p:ph type="subTitle" idx="1"/>
+          </p:nvPr>
+        </p:nvSpPr>
+        <p:spPr/>
+        <p:txBody>
+          <a:bodyPr/>
+          <a:lstStyle/>
+          <a:p>
+            <a:r>
+              <a:t>The single became Gomez's fourth top twenty entry on the Billboard Hot 100, and received a platinum certification from the Recording Industry Association of America (RIAA).</a:t>
+            </a:r>
+          </a:p>
+        </p:txBody>
+      </p:sp>
+    </p:spTree>
+  </p:cSld>
+  <p:clrMapOvr>
+    <a:masterClrMapping/>
+  </p:clrMapOvr>
+</p:sld>
+</file>
+
+<file path=ppt/slides/slide49.xml><?xml version="1.0" encoding="utf-8"?>
+<p:sld xmlns:a="http://schemas.openxmlformats.org/drawingml/2006/main" xmlns:p="http://schemas.openxmlformats.org/presentationml/2006/main" xmlns:r="http://schemas.openxmlformats.org/officeDocument/2006/relationships">
+  <p:cSld>
+    <p:spTree>
+      <p:nvGrpSpPr>
+        <p:cNvPr id="1" name=""/>
+        <p:cNvGrpSpPr/>
+        <p:nvPr/>
+      </p:nvGrpSpPr>
+      <p:grpSpPr/>
+      <p:sp>
+        <p:nvSpPr>
+          <p:cNvPr id="2" name="Title 1"/>
+          <p:cNvSpPr>
+            <a:spLocks noGrp="1"/>
+          </p:cNvSpPr>
+          <p:nvPr>
+            <p:ph type="ctrTitle"/>
+          </p:nvPr>
+        </p:nvSpPr>
+        <p:spPr/>
+        <p:txBody>
+          <a:bodyPr/>
+          <a:lstStyle/>
+          <a:p>
+            <a:r>
+              <a:t> </a:t>
+            </a:r>
+          </a:p>
+        </p:txBody>
+      </p:sp>
+      <p:sp>
+        <p:nvSpPr>
+          <p:cNvPr id="3" name="Subtitle 2"/>
+          <p:cNvSpPr>
+            <a:spLocks noGrp="1"/>
+          </p:cNvSpPr>
+          <p:nvPr>
+            <p:ph type="subTitle" idx="1"/>
+          </p:nvPr>
+        </p:nvSpPr>
+        <p:spPr/>
+        <p:txBody>
+          <a:bodyPr/>
+          <a:lstStyle/>
+          <a:p>
+            <a:r>
+              <a:t>The song sold 179,000 copies in its first week of release alone, and went on to become her first top five single on the Billboard Hot 100 in the United States.</a:t>
             </a:r>
           </a:p>
         </p:txBody>
@@ -7034,7 +7816,607 @@
           <a:lstStyle/>
           <a:p>
             <a:r>
-              <a:t>The programmer determines when objects are created, and the Java runtime is responsible for recovering the memory once objects are no longer in use.</a:t>
+              <a:t>" Gomez appeared in thirteen episodes of the show between 2002 and 2004, though the show's producers released her as she was getting "too old" for the series.</a:t>
+            </a:r>
+          </a:p>
+        </p:txBody>
+      </p:sp>
+    </p:spTree>
+  </p:cSld>
+  <p:clrMapOvr>
+    <a:masterClrMapping/>
+  </p:clrMapOvr>
+</p:sld>
+</file>
+
+<file path=ppt/slides/slide50.xml><?xml version="1.0" encoding="utf-8"?>
+<p:sld xmlns:a="http://schemas.openxmlformats.org/drawingml/2006/main" xmlns:p="http://schemas.openxmlformats.org/presentationml/2006/main" xmlns:r="http://schemas.openxmlformats.org/officeDocument/2006/relationships">
+  <p:cSld>
+    <p:spTree>
+      <p:nvGrpSpPr>
+        <p:cNvPr id="1" name=""/>
+        <p:cNvGrpSpPr/>
+        <p:nvPr/>
+      </p:nvGrpSpPr>
+      <p:grpSpPr/>
+      <p:sp>
+        <p:nvSpPr>
+          <p:cNvPr id="2" name="Title 1"/>
+          <p:cNvSpPr>
+            <a:spLocks noGrp="1"/>
+          </p:cNvSpPr>
+          <p:nvPr>
+            <p:ph type="ctrTitle"/>
+          </p:nvPr>
+        </p:nvSpPr>
+        <p:spPr/>
+        <p:txBody>
+          <a:bodyPr/>
+          <a:lstStyle/>
+          <a:p>
+            <a:r>
+              <a:t> </a:t>
+            </a:r>
+          </a:p>
+        </p:txBody>
+      </p:sp>
+      <p:sp>
+        <p:nvSpPr>
+          <p:cNvPr id="3" name="Subtitle 2"/>
+          <p:cNvSpPr>
+            <a:spLocks noGrp="1"/>
+          </p:cNvSpPr>
+          <p:nvPr>
+            <p:ph type="subTitle" idx="1"/>
+          </p:nvPr>
+        </p:nvSpPr>
+        <p:spPr/>
+        <p:txBody>
+          <a:bodyPr/>
+          <a:lstStyle/>
+          <a:p>
+            <a:r>
+              <a:t>Gomez released her second studio album, Revival (2015), on October 9, 2015.</a:t>
+            </a:r>
+          </a:p>
+        </p:txBody>
+      </p:sp>
+    </p:spTree>
+  </p:cSld>
+  <p:clrMapOvr>
+    <a:masterClrMapping/>
+  </p:clrMapOvr>
+</p:sld>
+</file>
+
+<file path=ppt/slides/slide51.xml><?xml version="1.0" encoding="utf-8"?>
+<p:sld xmlns:a="http://schemas.openxmlformats.org/drawingml/2006/main" xmlns:p="http://schemas.openxmlformats.org/presentationml/2006/main" xmlns:r="http://schemas.openxmlformats.org/officeDocument/2006/relationships">
+  <p:cSld>
+    <p:spTree>
+      <p:nvGrpSpPr>
+        <p:cNvPr id="1" name=""/>
+        <p:cNvGrpSpPr/>
+        <p:nvPr/>
+      </p:nvGrpSpPr>
+      <p:grpSpPr/>
+      <p:sp>
+        <p:nvSpPr>
+          <p:cNvPr id="2" name="Title 1"/>
+          <p:cNvSpPr>
+            <a:spLocks noGrp="1"/>
+          </p:cNvSpPr>
+          <p:nvPr>
+            <p:ph type="ctrTitle"/>
+          </p:nvPr>
+        </p:nvSpPr>
+        <p:spPr/>
+        <p:txBody>
+          <a:bodyPr/>
+          <a:lstStyle/>
+          <a:p>
+            <a:r>
+              <a:t> </a:t>
+            </a:r>
+          </a:p>
+        </p:txBody>
+      </p:sp>
+      <p:sp>
+        <p:nvSpPr>
+          <p:cNvPr id="3" name="Subtitle 2"/>
+          <p:cNvSpPr>
+            <a:spLocks noGrp="1"/>
+          </p:cNvSpPr>
+          <p:nvPr>
+            <p:ph type="subTitle" idx="1"/>
+          </p:nvPr>
+        </p:nvSpPr>
+        <p:spPr/>
+        <p:txBody>
+          <a:bodyPr/>
+          <a:lstStyle/>
+          <a:p>
+            <a:r>
+              <a:t>"Hands to Myself" was the album's third single, which became her third consecutive number one on the Mainstream Top 40 chart.</a:t>
+            </a:r>
+          </a:p>
+        </p:txBody>
+      </p:sp>
+    </p:spTree>
+  </p:cSld>
+  <p:clrMapOvr>
+    <a:masterClrMapping/>
+  </p:clrMapOvr>
+</p:sld>
+</file>
+
+<file path=ppt/slides/slide52.xml><?xml version="1.0" encoding="utf-8"?>
+<p:sld xmlns:a="http://schemas.openxmlformats.org/drawingml/2006/main" xmlns:p="http://schemas.openxmlformats.org/presentationml/2006/main" xmlns:r="http://schemas.openxmlformats.org/officeDocument/2006/relationships">
+  <p:cSld>
+    <p:spTree>
+      <p:nvGrpSpPr>
+        <p:cNvPr id="1" name=""/>
+        <p:cNvGrpSpPr/>
+        <p:nvPr/>
+      </p:nvGrpSpPr>
+      <p:grpSpPr/>
+      <p:sp>
+        <p:nvSpPr>
+          <p:cNvPr id="2" name="Title 1"/>
+          <p:cNvSpPr>
+            <a:spLocks noGrp="1"/>
+          </p:cNvSpPr>
+          <p:nvPr>
+            <p:ph type="ctrTitle"/>
+          </p:nvPr>
+        </p:nvSpPr>
+        <p:spPr/>
+        <p:txBody>
+          <a:bodyPr/>
+          <a:lstStyle/>
+          <a:p>
+            <a:r>
+              <a:t> </a:t>
+            </a:r>
+          </a:p>
+        </p:txBody>
+      </p:sp>
+      <p:sp>
+        <p:nvSpPr>
+          <p:cNvPr id="3" name="Subtitle 2"/>
+          <p:cNvSpPr>
+            <a:spLocks noGrp="1"/>
+          </p:cNvSpPr>
+          <p:nvPr>
+            <p:ph type="subTitle" idx="1"/>
+          </p:nvPr>
+        </p:nvSpPr>
+        <p:spPr/>
+        <p:txBody>
+          <a:bodyPr/>
+          <a:lstStyle/>
+          <a:p>
+            <a:r>
+              <a:t>This made Gomez one of only six female artists to have three singles from the same album top the chart.</a:t>
+            </a:r>
+          </a:p>
+        </p:txBody>
+      </p:sp>
+    </p:spTree>
+  </p:cSld>
+  <p:clrMapOvr>
+    <a:masterClrMapping/>
+  </p:clrMapOvr>
+</p:sld>
+</file>
+
+<file path=ppt/slides/slide53.xml><?xml version="1.0" encoding="utf-8"?>
+<p:sld xmlns:a="http://schemas.openxmlformats.org/drawingml/2006/main" xmlns:p="http://schemas.openxmlformats.org/presentationml/2006/main" xmlns:r="http://schemas.openxmlformats.org/officeDocument/2006/relationships">
+  <p:cSld>
+    <p:spTree>
+      <p:nvGrpSpPr>
+        <p:cNvPr id="1" name=""/>
+        <p:cNvGrpSpPr/>
+        <p:nvPr/>
+      </p:nvGrpSpPr>
+      <p:grpSpPr/>
+      <p:sp>
+        <p:nvSpPr>
+          <p:cNvPr id="2" name="Title 1"/>
+          <p:cNvSpPr>
+            <a:spLocks noGrp="1"/>
+          </p:cNvSpPr>
+          <p:nvPr>
+            <p:ph type="ctrTitle"/>
+          </p:nvPr>
+        </p:nvSpPr>
+        <p:spPr/>
+        <p:txBody>
+          <a:bodyPr/>
+          <a:lstStyle/>
+          <a:p>
+            <a:r>
+              <a:t> </a:t>
+            </a:r>
+          </a:p>
+        </p:txBody>
+      </p:sp>
+      <p:sp>
+        <p:nvSpPr>
+          <p:cNvPr id="3" name="Subtitle 2"/>
+          <p:cNvSpPr>
+            <a:spLocks noGrp="1"/>
+          </p:cNvSpPr>
+          <p:nvPr>
+            <p:ph type="subTitle" idx="1"/>
+          </p:nvPr>
+        </p:nvSpPr>
+        <p:spPr/>
+        <p:txBody>
+          <a:bodyPr/>
+          <a:lstStyle/>
+          <a:p>
+            <a:r>
+              <a:t>Gomez has begun working on her third studio album while touring, and added a new song titled "Feel Me" to the setlist of her Revival Tour.</a:t>
+            </a:r>
+          </a:p>
+        </p:txBody>
+      </p:sp>
+    </p:spTree>
+  </p:cSld>
+  <p:clrMapOvr>
+    <a:masterClrMapping/>
+  </p:clrMapOvr>
+</p:sld>
+</file>
+
+<file path=ppt/slides/slide54.xml><?xml version="1.0" encoding="utf-8"?>
+<p:sld xmlns:a="http://schemas.openxmlformats.org/drawingml/2006/main" xmlns:p="http://schemas.openxmlformats.org/presentationml/2006/main" xmlns:r="http://schemas.openxmlformats.org/officeDocument/2006/relationships">
+  <p:cSld>
+    <p:spTree>
+      <p:nvGrpSpPr>
+        <p:cNvPr id="1" name=""/>
+        <p:cNvGrpSpPr/>
+        <p:nvPr/>
+      </p:nvGrpSpPr>
+      <p:grpSpPr/>
+      <p:sp>
+        <p:nvSpPr>
+          <p:cNvPr id="2" name="Title 1"/>
+          <p:cNvSpPr>
+            <a:spLocks noGrp="1"/>
+          </p:cNvSpPr>
+          <p:nvPr>
+            <p:ph type="ctrTitle"/>
+          </p:nvPr>
+        </p:nvSpPr>
+        <p:spPr/>
+        <p:txBody>
+          <a:bodyPr/>
+          <a:lstStyle/>
+          <a:p>
+            <a:r>
+              <a:t> </a:t>
+            </a:r>
+          </a:p>
+        </p:txBody>
+      </p:sp>
+      <p:sp>
+        <p:nvSpPr>
+          <p:cNvPr id="3" name="Subtitle 2"/>
+          <p:cNvSpPr>
+            <a:spLocks noGrp="1"/>
+          </p:cNvSpPr>
+          <p:nvPr>
+            <p:ph type="subTitle" idx="1"/>
+          </p:nvPr>
+        </p:nvSpPr>
+        <p:spPr/>
+        <p:txBody>
+          <a:bodyPr/>
+          <a:lstStyle/>
+          <a:p>
+            <a:r>
+              <a:t>Gomez and Kygo confirmed the single titled "It Ain't Me" via their social media accounts a week later, which was released on February 16.</a:t>
+            </a:r>
+          </a:p>
+        </p:txBody>
+      </p:sp>
+    </p:spTree>
+  </p:cSld>
+  <p:clrMapOvr>
+    <a:masterClrMapping/>
+  </p:clrMapOvr>
+</p:sld>
+</file>
+
+<file path=ppt/slides/slide55.xml><?xml version="1.0" encoding="utf-8"?>
+<p:sld xmlns:a="http://schemas.openxmlformats.org/drawingml/2006/main" xmlns:p="http://schemas.openxmlformats.org/presentationml/2006/main" xmlns:r="http://schemas.openxmlformats.org/officeDocument/2006/relationships">
+  <p:cSld>
+    <p:spTree>
+      <p:nvGrpSpPr>
+        <p:cNvPr id="1" name=""/>
+        <p:cNvGrpSpPr/>
+        <p:nvPr/>
+      </p:nvGrpSpPr>
+      <p:grpSpPr/>
+      <p:sp>
+        <p:nvSpPr>
+          <p:cNvPr id="2" name="Title 1"/>
+          <p:cNvSpPr>
+            <a:spLocks noGrp="1"/>
+          </p:cNvSpPr>
+          <p:nvPr>
+            <p:ph type="ctrTitle"/>
+          </p:nvPr>
+        </p:nvSpPr>
+        <p:spPr/>
+        <p:txBody>
+          <a:bodyPr/>
+          <a:lstStyle/>
+          <a:p>
+            <a:r>
+              <a:t> </a:t>
+            </a:r>
+          </a:p>
+        </p:txBody>
+      </p:sp>
+      <p:sp>
+        <p:nvSpPr>
+          <p:cNvPr id="3" name="Subtitle 2"/>
+          <p:cNvSpPr>
+            <a:spLocks noGrp="1"/>
+          </p:cNvSpPr>
+          <p:nvPr>
+            <p:ph type="subTitle" idx="1"/>
+          </p:nvPr>
+        </p:nvSpPr>
+        <p:spPr/>
+        <p:txBody>
+          <a:bodyPr/>
+          <a:lstStyle/>
+          <a:p>
+            <a:r>
+              <a:t>The song reached the top 10 of the Billboard Hot 100 chart.</a:t>
+            </a:r>
+          </a:p>
+        </p:txBody>
+      </p:sp>
+    </p:spTree>
+  </p:cSld>
+  <p:clrMapOvr>
+    <a:masterClrMapping/>
+  </p:clrMapOvr>
+</p:sld>
+</file>
+
+<file path=ppt/slides/slide56.xml><?xml version="1.0" encoding="utf-8"?>
+<p:sld xmlns:a="http://schemas.openxmlformats.org/drawingml/2006/main" xmlns:p="http://schemas.openxmlformats.org/presentationml/2006/main" xmlns:r="http://schemas.openxmlformats.org/officeDocument/2006/relationships">
+  <p:cSld>
+    <p:spTree>
+      <p:nvGrpSpPr>
+        <p:cNvPr id="1" name=""/>
+        <p:cNvGrpSpPr/>
+        <p:nvPr/>
+      </p:nvGrpSpPr>
+      <p:grpSpPr/>
+      <p:sp>
+        <p:nvSpPr>
+          <p:cNvPr id="2" name="Title 1"/>
+          <p:cNvSpPr>
+            <a:spLocks noGrp="1"/>
+          </p:cNvSpPr>
+          <p:nvPr>
+            <p:ph type="ctrTitle"/>
+          </p:nvPr>
+        </p:nvSpPr>
+        <p:spPr/>
+        <p:txBody>
+          <a:bodyPr/>
+          <a:lstStyle/>
+          <a:p>
+            <a:r>
+              <a:t> </a:t>
+            </a:r>
+          </a:p>
+        </p:txBody>
+      </p:sp>
+      <p:sp>
+        <p:nvSpPr>
+          <p:cNvPr id="3" name="Subtitle 2"/>
+          <p:cNvSpPr>
+            <a:spLocks noGrp="1"/>
+          </p:cNvSpPr>
+          <p:nvPr>
+            <p:ph type="subTitle" idx="1"/>
+          </p:nvPr>
+        </p:nvSpPr>
+        <p:spPr/>
+        <p:txBody>
+          <a:bodyPr/>
+          <a:lstStyle/>
+          <a:p>
+            <a:r>
+              <a:t>A second music video was released on YouTube the next month which also teased the follow-up single "Fetish", released on July 13, 2017.</a:t>
+            </a:r>
+          </a:p>
+        </p:txBody>
+      </p:sp>
+    </p:spTree>
+  </p:cSld>
+  <p:clrMapOvr>
+    <a:masterClrMapping/>
+  </p:clrMapOvr>
+</p:sld>
+</file>
+
+<file path=ppt/slides/slide57.xml><?xml version="1.0" encoding="utf-8"?>
+<p:sld xmlns:a="http://schemas.openxmlformats.org/drawingml/2006/main" xmlns:p="http://schemas.openxmlformats.org/presentationml/2006/main" xmlns:r="http://schemas.openxmlformats.org/officeDocument/2006/relationships">
+  <p:cSld>
+    <p:spTree>
+      <p:nvGrpSpPr>
+        <p:cNvPr id="1" name=""/>
+        <p:cNvGrpSpPr/>
+        <p:nvPr/>
+      </p:nvGrpSpPr>
+      <p:grpSpPr/>
+      <p:sp>
+        <p:nvSpPr>
+          <p:cNvPr id="2" name="Title 1"/>
+          <p:cNvSpPr>
+            <a:spLocks noGrp="1"/>
+          </p:cNvSpPr>
+          <p:nvPr>
+            <p:ph type="ctrTitle"/>
+          </p:nvPr>
+        </p:nvSpPr>
+        <p:spPr/>
+        <p:txBody>
+          <a:bodyPr/>
+          <a:lstStyle/>
+          <a:p>
+            <a:r>
+              <a:t> </a:t>
+            </a:r>
+          </a:p>
+        </p:txBody>
+      </p:sp>
+      <p:sp>
+        <p:nvSpPr>
+          <p:cNvPr id="3" name="Subtitle 2"/>
+          <p:cNvSpPr>
+            <a:spLocks noGrp="1"/>
+          </p:cNvSpPr>
+          <p:nvPr>
+            <p:ph type="subTitle" idx="1"/>
+          </p:nvPr>
+        </p:nvSpPr>
+        <p:spPr/>
+        <p:txBody>
+          <a:bodyPr/>
+          <a:lstStyle/>
+          <a:p>
+            <a:r>
+              <a:t>On May 10, 2018, Gomez released a new single from the 13 Reasons Why Season 2 Soundtrack, titled "Back To You".</a:t>
+            </a:r>
+          </a:p>
+        </p:txBody>
+      </p:sp>
+    </p:spTree>
+  </p:cSld>
+  <p:clrMapOvr>
+    <a:masterClrMapping/>
+  </p:clrMapOvr>
+</p:sld>
+</file>
+
+<file path=ppt/slides/slide58.xml><?xml version="1.0" encoding="utf-8"?>
+<p:sld xmlns:a="http://schemas.openxmlformats.org/drawingml/2006/main" xmlns:p="http://schemas.openxmlformats.org/presentationml/2006/main" xmlns:r="http://schemas.openxmlformats.org/officeDocument/2006/relationships">
+  <p:cSld>
+    <p:spTree>
+      <p:nvGrpSpPr>
+        <p:cNvPr id="1" name=""/>
+        <p:cNvGrpSpPr/>
+        <p:nvPr/>
+      </p:nvGrpSpPr>
+      <p:grpSpPr/>
+      <p:sp>
+        <p:nvSpPr>
+          <p:cNvPr id="2" name="Title 1"/>
+          <p:cNvSpPr>
+            <a:spLocks noGrp="1"/>
+          </p:cNvSpPr>
+          <p:nvPr>
+            <p:ph type="ctrTitle"/>
+          </p:nvPr>
+        </p:nvSpPr>
+        <p:spPr/>
+        <p:txBody>
+          <a:bodyPr/>
+          <a:lstStyle/>
+          <a:p>
+            <a:r>
+              <a:t> </a:t>
+            </a:r>
+          </a:p>
+        </p:txBody>
+      </p:sp>
+      <p:sp>
+        <p:nvSpPr>
+          <p:cNvPr id="3" name="Subtitle 2"/>
+          <p:cNvSpPr>
+            <a:spLocks noGrp="1"/>
+          </p:cNvSpPr>
+          <p:nvPr>
+            <p:ph type="subTitle" idx="1"/>
+          </p:nvPr>
+        </p:nvSpPr>
+        <p:spPr/>
+        <p:txBody>
+          <a:bodyPr/>
+          <a:lstStyle/>
+          <a:p>
+            <a:r>
+              <a:t>In 2013, she released her second fragrance, Vivamore by Selena Gomez.</a:t>
+            </a:r>
+          </a:p>
+        </p:txBody>
+      </p:sp>
+    </p:spTree>
+  </p:cSld>
+  <p:clrMapOvr>
+    <a:masterClrMapping/>
+  </p:clrMapOvr>
+</p:sld>
+</file>
+
+<file path=ppt/slides/slide59.xml><?xml version="1.0" encoding="utf-8"?>
+<p:sld xmlns:a="http://schemas.openxmlformats.org/drawingml/2006/main" xmlns:p="http://schemas.openxmlformats.org/presentationml/2006/main" xmlns:r="http://schemas.openxmlformats.org/officeDocument/2006/relationships">
+  <p:cSld>
+    <p:spTree>
+      <p:nvGrpSpPr>
+        <p:cNvPr id="1" name=""/>
+        <p:cNvGrpSpPr/>
+        <p:nvPr/>
+      </p:nvGrpSpPr>
+      <p:grpSpPr/>
+      <p:sp>
+        <p:nvSpPr>
+          <p:cNvPr id="2" name="Title 1"/>
+          <p:cNvSpPr>
+            <a:spLocks noGrp="1"/>
+          </p:cNvSpPr>
+          <p:nvPr>
+            <p:ph type="ctrTitle"/>
+          </p:nvPr>
+        </p:nvSpPr>
+        <p:spPr/>
+        <p:txBody>
+          <a:bodyPr/>
+          <a:lstStyle/>
+          <a:p>
+            <a:r>
+              <a:t> </a:t>
+            </a:r>
+          </a:p>
+        </p:txBody>
+      </p:sp>
+      <p:sp>
+        <p:nvSpPr>
+          <p:cNvPr id="3" name="Subtitle 2"/>
+          <p:cNvSpPr>
+            <a:spLocks noGrp="1"/>
+          </p:cNvSpPr>
+          <p:nvPr>
+            <p:ph type="subTitle" idx="1"/>
+          </p:nvPr>
+        </p:nvSpPr>
+        <p:spPr/>
+        <p:txBody>
+          <a:bodyPr/>
+          <a:lstStyle/>
+          <a:p>
+            <a:r>
+              <a:t>It debuted on the Billboard Hot 100 at No.</a:t>
             </a:r>
           </a:p>
         </p:txBody>
@@ -7094,7 +8476,631 @@
           <a:lstStyle/>
           <a:p>
             <a:r>
-              <a:t>Once no references to an object remain, the unreachable memory becomes eligible to be freed automatically by the garbage collector.</a:t>
+              <a:t>While working on the series, Gomez had a cameo role in the film Spy Kids 3-D: Game Over (2003) and the made-for-television film Walker, Texas Ranger: Trial by Fire (2005).</a:t>
+            </a:r>
+          </a:p>
+        </p:txBody>
+      </p:sp>
+    </p:spTree>
+  </p:cSld>
+  <p:clrMapOvr>
+    <a:masterClrMapping/>
+  </p:clrMapOvr>
+</p:sld>
+</file>
+
+<file path=ppt/slides/slide60.xml><?xml version="1.0" encoding="utf-8"?>
+<p:sld xmlns:a="http://schemas.openxmlformats.org/drawingml/2006/main" xmlns:p="http://schemas.openxmlformats.org/presentationml/2006/main" xmlns:r="http://schemas.openxmlformats.org/officeDocument/2006/relationships">
+  <p:cSld>
+    <p:spTree>
+      <p:nvGrpSpPr>
+        <p:cNvPr id="1" name=""/>
+        <p:cNvGrpSpPr/>
+        <p:nvPr/>
+      </p:nvGrpSpPr>
+      <p:grpSpPr/>
+      <p:sp>
+        <p:nvSpPr>
+          <p:cNvPr id="2" name="Title 1"/>
+          <p:cNvSpPr>
+            <a:spLocks noGrp="1"/>
+          </p:cNvSpPr>
+          <p:nvPr>
+            <p:ph type="ctrTitle"/>
+          </p:nvPr>
+        </p:nvSpPr>
+        <p:spPr/>
+        <p:txBody>
+          <a:bodyPr/>
+          <a:lstStyle/>
+          <a:p>
+            <a:r>
+              <a:t> </a:t>
+            </a:r>
+          </a:p>
+        </p:txBody>
+      </p:sp>
+      <p:sp>
+        <p:nvSpPr>
+          <p:cNvPr id="3" name="Subtitle 2"/>
+          <p:cNvSpPr>
+            <a:spLocks noGrp="1"/>
+          </p:cNvSpPr>
+          <p:nvPr>
+            <p:ph type="subTitle" idx="1"/>
+          </p:nvPr>
+        </p:nvSpPr>
+        <p:spPr/>
+        <p:txBody>
+          <a:bodyPr/>
+          <a:lstStyle/>
+          <a:p>
+            <a:r>
+              <a:t>Gomez has released two studio albums, one EP, and one compilation album in her solo career.</a:t>
+            </a:r>
+          </a:p>
+        </p:txBody>
+      </p:sp>
+    </p:spTree>
+  </p:cSld>
+  <p:clrMapOvr>
+    <a:masterClrMapping/>
+  </p:clrMapOvr>
+</p:sld>
+</file>
+
+<file path=ppt/slides/slide61.xml><?xml version="1.0" encoding="utf-8"?>
+<p:sld xmlns:a="http://schemas.openxmlformats.org/drawingml/2006/main" xmlns:p="http://schemas.openxmlformats.org/presentationml/2006/main" xmlns:r="http://schemas.openxmlformats.org/officeDocument/2006/relationships">
+  <p:cSld>
+    <p:spTree>
+      <p:nvGrpSpPr>
+        <p:cNvPr id="1" name=""/>
+        <p:cNvGrpSpPr/>
+        <p:nvPr/>
+      </p:nvGrpSpPr>
+      <p:grpSpPr/>
+      <p:sp>
+        <p:nvSpPr>
+          <p:cNvPr id="2" name="Title 1"/>
+          <p:cNvSpPr>
+            <a:spLocks noGrp="1"/>
+          </p:cNvSpPr>
+          <p:nvPr>
+            <p:ph type="ctrTitle"/>
+          </p:nvPr>
+        </p:nvSpPr>
+        <p:spPr/>
+        <p:txBody>
+          <a:bodyPr/>
+          <a:lstStyle/>
+          <a:p>
+            <a:r>
+              <a:t> </a:t>
+            </a:r>
+          </a:p>
+        </p:txBody>
+      </p:sp>
+      <p:sp>
+        <p:nvSpPr>
+          <p:cNvPr id="3" name="Subtitle 2"/>
+          <p:cNvSpPr>
+            <a:spLocks noGrp="1"/>
+          </p:cNvSpPr>
+          <p:nvPr>
+            <p:ph type="subTitle" idx="1"/>
+          </p:nvPr>
+        </p:nvSpPr>
+        <p:spPr/>
+        <p:txBody>
+          <a:bodyPr/>
+          <a:lstStyle/>
+          <a:p>
+            <a:r>
+              <a:t>Gomez also the lead singer of the former band Selena Gomez &amp; the Scene, releasing three studio albums and one remix album.</a:t>
+            </a:r>
+          </a:p>
+        </p:txBody>
+      </p:sp>
+    </p:spTree>
+  </p:cSld>
+  <p:clrMapOvr>
+    <a:masterClrMapping/>
+  </p:clrMapOvr>
+</p:sld>
+</file>
+
+<file path=ppt/slides/slide62.xml><?xml version="1.0" encoding="utf-8"?>
+<p:sld xmlns:a="http://schemas.openxmlformats.org/drawingml/2006/main" xmlns:p="http://schemas.openxmlformats.org/presentationml/2006/main" xmlns:r="http://schemas.openxmlformats.org/officeDocument/2006/relationships">
+  <p:cSld>
+    <p:spTree>
+      <p:nvGrpSpPr>
+        <p:cNvPr id="1" name=""/>
+        <p:cNvGrpSpPr/>
+        <p:nvPr/>
+      </p:nvGrpSpPr>
+      <p:grpSpPr/>
+      <p:sp>
+        <p:nvSpPr>
+          <p:cNvPr id="2" name="Title 1"/>
+          <p:cNvSpPr>
+            <a:spLocks noGrp="1"/>
+          </p:cNvSpPr>
+          <p:nvPr>
+            <p:ph type="ctrTitle"/>
+          </p:nvPr>
+        </p:nvSpPr>
+        <p:spPr/>
+        <p:txBody>
+          <a:bodyPr/>
+          <a:lstStyle/>
+          <a:p>
+            <a:r>
+              <a:t> </a:t>
+            </a:r>
+          </a:p>
+        </p:txBody>
+      </p:sp>
+      <p:sp>
+        <p:nvSpPr>
+          <p:cNvPr id="3" name="Subtitle 2"/>
+          <p:cNvSpPr>
+            <a:spLocks noGrp="1"/>
+          </p:cNvSpPr>
+          <p:nvPr>
+            <p:ph type="subTitle" idx="1"/>
+          </p:nvPr>
+        </p:nvSpPr>
+        <p:spPr/>
+        <p:txBody>
+          <a:bodyPr/>
+          <a:lstStyle/>
+          <a:p>
+            <a:r>
+              <a:t> </a:t>
+            </a:r>
+          </a:p>
+        </p:txBody>
+      </p:sp>
+      <p:pic>
+        <p:nvPicPr>
+          <p:cNvPr id="4" name="Picture 3" descr="image1.jpg"/>
+          <p:cNvPicPr>
+            <a:picLocks noChangeAspect="1"/>
+          </p:cNvPicPr>
+          <p:nvPr/>
+        </p:nvPicPr>
+        <p:blipFill>
+          <a:blip r:embed="rId2"/>
+          <a:stretch>
+            <a:fillRect/>
+          </a:stretch>
+        </p:blipFill>
+        <p:spPr>
+          <a:xfrm>
+            <a:off x="914400" y="1828800"/>
+            <a:ext cx="6502916" cy="3657600"/>
+          </a:xfrm>
+          <a:prstGeom prst="rect">
+            <a:avLst/>
+          </a:prstGeom>
+        </p:spPr>
+      </p:pic>
+    </p:spTree>
+  </p:cSld>
+  <p:clrMapOvr>
+    <a:masterClrMapping/>
+  </p:clrMapOvr>
+</p:sld>
+</file>
+
+<file path=ppt/slides/slide63.xml><?xml version="1.0" encoding="utf-8"?>
+<p:sld xmlns:a="http://schemas.openxmlformats.org/drawingml/2006/main" xmlns:p="http://schemas.openxmlformats.org/presentationml/2006/main" xmlns:r="http://schemas.openxmlformats.org/officeDocument/2006/relationships">
+  <p:cSld>
+    <p:spTree>
+      <p:nvGrpSpPr>
+        <p:cNvPr id="1" name=""/>
+        <p:cNvGrpSpPr/>
+        <p:nvPr/>
+      </p:nvGrpSpPr>
+      <p:grpSpPr/>
+      <p:sp>
+        <p:nvSpPr>
+          <p:cNvPr id="2" name="Title 1"/>
+          <p:cNvSpPr>
+            <a:spLocks noGrp="1"/>
+          </p:cNvSpPr>
+          <p:nvPr>
+            <p:ph type="ctrTitle"/>
+          </p:nvPr>
+        </p:nvSpPr>
+        <p:spPr/>
+        <p:txBody>
+          <a:bodyPr/>
+          <a:lstStyle/>
+          <a:p>
+            <a:r>
+              <a:t>ADVANTAGES</a:t>
+            </a:r>
+          </a:p>
+        </p:txBody>
+      </p:sp>
+      <p:sp>
+        <p:nvSpPr>
+          <p:cNvPr id="3" name="Subtitle 2"/>
+          <p:cNvSpPr>
+            <a:spLocks noGrp="1"/>
+          </p:cNvSpPr>
+          <p:nvPr>
+            <p:ph type="subTitle" idx="1"/>
+          </p:nvPr>
+        </p:nvSpPr>
+        <p:spPr/>
+        <p:txBody>
+          <a:bodyPr/>
+          <a:lstStyle/>
+          <a:p>
+            <a:r>
+              <a:t> </a:t>
+            </a:r>
+          </a:p>
+        </p:txBody>
+      </p:sp>
+    </p:spTree>
+  </p:cSld>
+  <p:clrMapOvr>
+    <a:masterClrMapping/>
+  </p:clrMapOvr>
+</p:sld>
+</file>
+
+<file path=ppt/slides/slide64.xml><?xml version="1.0" encoding="utf-8"?>
+<p:sld xmlns:a="http://schemas.openxmlformats.org/drawingml/2006/main" xmlns:p="http://schemas.openxmlformats.org/presentationml/2006/main" xmlns:r="http://schemas.openxmlformats.org/officeDocument/2006/relationships">
+  <p:cSld>
+    <p:spTree>
+      <p:nvGrpSpPr>
+        <p:cNvPr id="1" name=""/>
+        <p:cNvGrpSpPr/>
+        <p:nvPr/>
+      </p:nvGrpSpPr>
+      <p:grpSpPr/>
+      <p:sp>
+        <p:nvSpPr>
+          <p:cNvPr id="2" name="Title 1"/>
+          <p:cNvSpPr>
+            <a:spLocks noGrp="1"/>
+          </p:cNvSpPr>
+          <p:nvPr>
+            <p:ph type="ctrTitle"/>
+          </p:nvPr>
+        </p:nvSpPr>
+        <p:spPr/>
+        <p:txBody>
+          <a:bodyPr/>
+          <a:lstStyle/>
+          <a:p>
+            <a:r>
+              <a:t> </a:t>
+            </a:r>
+          </a:p>
+        </p:txBody>
+      </p:sp>
+      <p:sp>
+        <p:nvSpPr>
+          <p:cNvPr id="3" name="Subtitle 2"/>
+          <p:cNvSpPr>
+            <a:spLocks noGrp="1"/>
+          </p:cNvSpPr>
+          <p:nvPr>
+            <p:ph type="subTitle" idx="1"/>
+          </p:nvPr>
+        </p:nvSpPr>
+        <p:spPr/>
+        <p:txBody>
+          <a:bodyPr/>
+          <a:lstStyle/>
+          <a:p>
+            <a:r>
+              <a:t>Gomez's acting credits include starring roles in the films Another Cinderella Story (2008), Princess Protection Program (2009), Wizards of Waverly Place: The Movie (2009), Ramona and Beezus (2010), Monte Carlo (2011), Spring Breakers (2012), Getaway (2013) and The Fundamentals of Caring (2016).</a:t>
+            </a:r>
+          </a:p>
+        </p:txBody>
+      </p:sp>
+    </p:spTree>
+  </p:cSld>
+  <p:clrMapOvr>
+    <a:masterClrMapping/>
+  </p:clrMapOvr>
+</p:sld>
+</file>
+
+<file path=ppt/slides/slide65.xml><?xml version="1.0" encoding="utf-8"?>
+<p:sld xmlns:a="http://schemas.openxmlformats.org/drawingml/2006/main" xmlns:p="http://schemas.openxmlformats.org/presentationml/2006/main" xmlns:r="http://schemas.openxmlformats.org/officeDocument/2006/relationships">
+  <p:cSld>
+    <p:spTree>
+      <p:nvGrpSpPr>
+        <p:cNvPr id="1" name=""/>
+        <p:cNvGrpSpPr/>
+        <p:nvPr/>
+      </p:nvGrpSpPr>
+      <p:grpSpPr/>
+      <p:sp>
+        <p:nvSpPr>
+          <p:cNvPr id="2" name="Title 1"/>
+          <p:cNvSpPr>
+            <a:spLocks noGrp="1"/>
+          </p:cNvSpPr>
+          <p:nvPr>
+            <p:ph type="ctrTitle"/>
+          </p:nvPr>
+        </p:nvSpPr>
+        <p:spPr/>
+        <p:txBody>
+          <a:bodyPr/>
+          <a:lstStyle/>
+          <a:p>
+            <a:r>
+              <a:t> </a:t>
+            </a:r>
+          </a:p>
+        </p:txBody>
+      </p:sp>
+      <p:sp>
+        <p:nvSpPr>
+          <p:cNvPr id="3" name="Subtitle 2"/>
+          <p:cNvSpPr>
+            <a:spLocks noGrp="1"/>
+          </p:cNvSpPr>
+          <p:nvPr>
+            <p:ph type="subTitle" idx="1"/>
+          </p:nvPr>
+        </p:nvSpPr>
+        <p:spPr/>
+        <p:txBody>
+          <a:bodyPr/>
+          <a:lstStyle/>
+          <a:p>
+            <a:r>
+              <a:t>Gomez was given a recurring role on the popular Disney Channel series Hannah Montana in 2007, portraying pop star Mikayla.</a:t>
+            </a:r>
+          </a:p>
+        </p:txBody>
+      </p:sp>
+    </p:spTree>
+  </p:cSld>
+  <p:clrMapOvr>
+    <a:masterClrMapping/>
+  </p:clrMapOvr>
+</p:sld>
+</file>
+
+<file path=ppt/slides/slide66.xml><?xml version="1.0" encoding="utf-8"?>
+<p:sld xmlns:a="http://schemas.openxmlformats.org/drawingml/2006/main" xmlns:p="http://schemas.openxmlformats.org/presentationml/2006/main" xmlns:r="http://schemas.openxmlformats.org/officeDocument/2006/relationships">
+  <p:cSld>
+    <p:spTree>
+      <p:nvGrpSpPr>
+        <p:cNvPr id="1" name=""/>
+        <p:cNvGrpSpPr/>
+        <p:nvPr/>
+      </p:nvGrpSpPr>
+      <p:grpSpPr/>
+      <p:sp>
+        <p:nvSpPr>
+          <p:cNvPr id="2" name="Title 1"/>
+          <p:cNvSpPr>
+            <a:spLocks noGrp="1"/>
+          </p:cNvSpPr>
+          <p:nvPr>
+            <p:ph type="ctrTitle"/>
+          </p:nvPr>
+        </p:nvSpPr>
+        <p:spPr/>
+        <p:txBody>
+          <a:bodyPr/>
+          <a:lstStyle/>
+          <a:p>
+            <a:r>
+              <a:t> </a:t>
+            </a:r>
+          </a:p>
+        </p:txBody>
+      </p:sp>
+      <p:sp>
+        <p:nvSpPr>
+          <p:cNvPr id="3" name="Subtitle 2"/>
+          <p:cNvSpPr>
+            <a:spLocks noGrp="1"/>
+          </p:cNvSpPr>
+          <p:nvPr>
+            <p:ph type="subTitle" idx="1"/>
+          </p:nvPr>
+        </p:nvSpPr>
+        <p:spPr/>
+        <p:txBody>
+          <a:bodyPr/>
+          <a:lstStyle/>
+          <a:p>
+            <a:r>
+              <a:t>She later auditioned for a role in the Disney series Wizards of Waverly Place, ultimately winning the lead role of Alex Russo.</a:t>
+            </a:r>
+          </a:p>
+        </p:txBody>
+      </p:sp>
+    </p:spTree>
+  </p:cSld>
+  <p:clrMapOvr>
+    <a:masterClrMapping/>
+  </p:clrMapOvr>
+</p:sld>
+</file>
+
+<file path=ppt/slides/slide67.xml><?xml version="1.0" encoding="utf-8"?>
+<p:sld xmlns:a="http://schemas.openxmlformats.org/drawingml/2006/main" xmlns:p="http://schemas.openxmlformats.org/presentationml/2006/main" xmlns:r="http://schemas.openxmlformats.org/officeDocument/2006/relationships">
+  <p:cSld>
+    <p:spTree>
+      <p:nvGrpSpPr>
+        <p:cNvPr id="1" name=""/>
+        <p:cNvGrpSpPr/>
+        <p:nvPr/>
+      </p:nvGrpSpPr>
+      <p:grpSpPr/>
+      <p:sp>
+        <p:nvSpPr>
+          <p:cNvPr id="2" name="Title 1"/>
+          <p:cNvSpPr>
+            <a:spLocks noGrp="1"/>
+          </p:cNvSpPr>
+          <p:nvPr>
+            <p:ph type="ctrTitle"/>
+          </p:nvPr>
+        </p:nvSpPr>
+        <p:spPr/>
+        <p:txBody>
+          <a:bodyPr/>
+          <a:lstStyle/>
+          <a:p>
+            <a:r>
+              <a:t> </a:t>
+            </a:r>
+          </a:p>
+        </p:txBody>
+      </p:sp>
+      <p:sp>
+        <p:nvSpPr>
+          <p:cNvPr id="3" name="Subtitle 2"/>
+          <p:cNvSpPr>
+            <a:spLocks noGrp="1"/>
+          </p:cNvSpPr>
+          <p:nvPr>
+            <p:ph type="subTitle" idx="1"/>
+          </p:nvPr>
+        </p:nvSpPr>
+        <p:spPr/>
+        <p:txBody>
+          <a:bodyPr/>
+          <a:lstStyle/>
+          <a:p>
+            <a:r>
+              <a:t>While working on the second season of Wizards of Waverly Place, Gomez appeared on the Disney Channel special Studio DC: Almost Live alongside various other Disney stars.</a:t>
+            </a:r>
+          </a:p>
+        </p:txBody>
+      </p:sp>
+    </p:spTree>
+  </p:cSld>
+  <p:clrMapOvr>
+    <a:masterClrMapping/>
+  </p:clrMapOvr>
+</p:sld>
+</file>
+
+<file path=ppt/slides/slide68.xml><?xml version="1.0" encoding="utf-8"?>
+<p:sld xmlns:a="http://schemas.openxmlformats.org/drawingml/2006/main" xmlns:p="http://schemas.openxmlformats.org/presentationml/2006/main" xmlns:r="http://schemas.openxmlformats.org/officeDocument/2006/relationships">
+  <p:cSld>
+    <p:spTree>
+      <p:nvGrpSpPr>
+        <p:cNvPr id="1" name=""/>
+        <p:cNvGrpSpPr/>
+        <p:nvPr/>
+      </p:nvGrpSpPr>
+      <p:grpSpPr/>
+      <p:sp>
+        <p:nvSpPr>
+          <p:cNvPr id="2" name="Title 1"/>
+          <p:cNvSpPr>
+            <a:spLocks noGrp="1"/>
+          </p:cNvSpPr>
+          <p:nvPr>
+            <p:ph type="ctrTitle"/>
+          </p:nvPr>
+        </p:nvSpPr>
+        <p:spPr/>
+        <p:txBody>
+          <a:bodyPr/>
+          <a:lstStyle/>
+          <a:p>
+            <a:r>
+              <a:t> </a:t>
+            </a:r>
+          </a:p>
+        </p:txBody>
+      </p:sp>
+      <p:sp>
+        <p:nvSpPr>
+          <p:cNvPr id="3" name="Subtitle 2"/>
+          <p:cNvSpPr>
+            <a:spLocks noGrp="1"/>
+          </p:cNvSpPr>
+          <p:nvPr>
+            <p:ph type="subTitle" idx="1"/>
+          </p:nvPr>
+        </p:nvSpPr>
+        <p:spPr/>
+        <p:txBody>
+          <a:bodyPr/>
+          <a:lstStyle/>
+          <a:p>
+            <a:r>
+              <a:t>Later that year, Gomez had the supporting role of Helga in the animated film Horton Hears a Who!</a:t>
+            </a:r>
+          </a:p>
+        </p:txBody>
+      </p:sp>
+    </p:spTree>
+  </p:cSld>
+  <p:clrMapOvr>
+    <a:masterClrMapping/>
+  </p:clrMapOvr>
+</p:sld>
+</file>
+
+<file path=ppt/slides/slide69.xml><?xml version="1.0" encoding="utf-8"?>
+<p:sld xmlns:a="http://schemas.openxmlformats.org/drawingml/2006/main" xmlns:p="http://schemas.openxmlformats.org/presentationml/2006/main" xmlns:r="http://schemas.openxmlformats.org/officeDocument/2006/relationships">
+  <p:cSld>
+    <p:spTree>
+      <p:nvGrpSpPr>
+        <p:cNvPr id="1" name=""/>
+        <p:cNvGrpSpPr/>
+        <p:nvPr/>
+      </p:nvGrpSpPr>
+      <p:grpSpPr/>
+      <p:sp>
+        <p:nvSpPr>
+          <p:cNvPr id="2" name="Title 1"/>
+          <p:cNvSpPr>
+            <a:spLocks noGrp="1"/>
+          </p:cNvSpPr>
+          <p:nvPr>
+            <p:ph type="ctrTitle"/>
+          </p:nvPr>
+        </p:nvSpPr>
+        <p:spPr/>
+        <p:txBody>
+          <a:bodyPr/>
+          <a:lstStyle/>
+          <a:p>
+            <a:r>
+              <a:t> </a:t>
+            </a:r>
+          </a:p>
+        </p:txBody>
+      </p:sp>
+      <p:sp>
+        <p:nvSpPr>
+          <p:cNvPr id="3" name="Subtitle 2"/>
+          <p:cNvSpPr>
+            <a:spLocks noGrp="1"/>
+          </p:cNvSpPr>
+          <p:nvPr>
+            <p:ph type="subTitle" idx="1"/>
+          </p:nvPr>
+        </p:nvSpPr>
+        <p:spPr/>
+        <p:txBody>
+          <a:bodyPr/>
+          <a:lstStyle/>
+          <a:p>
+            <a:r>
+              <a:t>Gomez continued to have mainstream success throughout the following year, appearing as Alex Russo in a crossover episode of the Disney series The Suite Life on Deck.</a:t>
             </a:r>
           </a:p>
         </p:txBody>
@@ -7154,7 +9160,607 @@
           <a:lstStyle/>
           <a:p>
             <a:r>
-              <a:t>In some languages, memory for the creation of objects is implicitly allocated on the stack or explicitly allocated and deallocated from the heap.</a:t>
+              <a:t>Gomez made a guest appearance in a 2006 episode of the Disney series The Suite Life of Zack &amp; Cody.</a:t>
+            </a:r>
+          </a:p>
+        </p:txBody>
+      </p:sp>
+    </p:spTree>
+  </p:cSld>
+  <p:clrMapOvr>
+    <a:masterClrMapping/>
+  </p:clrMapOvr>
+</p:sld>
+</file>
+
+<file path=ppt/slides/slide70.xml><?xml version="1.0" encoding="utf-8"?>
+<p:sld xmlns:a="http://schemas.openxmlformats.org/drawingml/2006/main" xmlns:p="http://schemas.openxmlformats.org/presentationml/2006/main" xmlns:r="http://schemas.openxmlformats.org/officeDocument/2006/relationships">
+  <p:cSld>
+    <p:spTree>
+      <p:nvGrpSpPr>
+        <p:cNvPr id="1" name=""/>
+        <p:cNvGrpSpPr/>
+        <p:nvPr/>
+      </p:nvGrpSpPr>
+      <p:grpSpPr/>
+      <p:sp>
+        <p:nvSpPr>
+          <p:cNvPr id="2" name="Title 1"/>
+          <p:cNvSpPr>
+            <a:spLocks noGrp="1"/>
+          </p:cNvSpPr>
+          <p:nvPr>
+            <p:ph type="ctrTitle"/>
+          </p:nvPr>
+        </p:nvSpPr>
+        <p:spPr/>
+        <p:txBody>
+          <a:bodyPr/>
+          <a:lstStyle/>
+          <a:p>
+            <a:r>
+              <a:t> </a:t>
+            </a:r>
+          </a:p>
+        </p:txBody>
+      </p:sp>
+      <p:sp>
+        <p:nvSpPr>
+          <p:cNvPr id="3" name="Subtitle 2"/>
+          <p:cNvSpPr>
+            <a:spLocks noGrp="1"/>
+          </p:cNvSpPr>
+          <p:nvPr>
+            <p:ph type="subTitle" idx="1"/>
+          </p:nvPr>
+        </p:nvSpPr>
+        <p:spPr/>
+        <p:txBody>
+          <a:bodyPr/>
+          <a:lstStyle/>
+          <a:p>
+            <a:r>
+              <a:t>The film saw Gomez in a more mature role than her previous works, and reportedly led to Gomez having a "bit of a meltdown on set.</a:t>
+            </a:r>
+          </a:p>
+        </p:txBody>
+      </p:sp>
+    </p:spTree>
+  </p:cSld>
+  <p:clrMapOvr>
+    <a:masterClrMapping/>
+  </p:clrMapOvr>
+</p:sld>
+</file>
+
+<file path=ppt/slides/slide71.xml><?xml version="1.0" encoding="utf-8"?>
+<p:sld xmlns:a="http://schemas.openxmlformats.org/drawingml/2006/main" xmlns:p="http://schemas.openxmlformats.org/presentationml/2006/main" xmlns:r="http://schemas.openxmlformats.org/officeDocument/2006/relationships">
+  <p:cSld>
+    <p:spTree>
+      <p:nvGrpSpPr>
+        <p:cNvPr id="1" name=""/>
+        <p:cNvGrpSpPr/>
+        <p:nvPr/>
+      </p:nvGrpSpPr>
+      <p:grpSpPr/>
+      <p:sp>
+        <p:nvSpPr>
+          <p:cNvPr id="2" name="Title 1"/>
+          <p:cNvSpPr>
+            <a:spLocks noGrp="1"/>
+          </p:cNvSpPr>
+          <p:nvPr>
+            <p:ph type="ctrTitle"/>
+          </p:nvPr>
+        </p:nvSpPr>
+        <p:spPr/>
+        <p:txBody>
+          <a:bodyPr/>
+          <a:lstStyle/>
+          <a:p>
+            <a:r>
+              <a:t> </a:t>
+            </a:r>
+          </a:p>
+        </p:txBody>
+      </p:sp>
+      <p:sp>
+        <p:nvSpPr>
+          <p:cNvPr id="3" name="Subtitle 2"/>
+          <p:cNvSpPr>
+            <a:spLocks noGrp="1"/>
+          </p:cNvSpPr>
+          <p:nvPr>
+            <p:ph type="subTitle" idx="1"/>
+          </p:nvPr>
+        </p:nvSpPr>
+        <p:spPr/>
+        <p:txBody>
+          <a:bodyPr/>
+          <a:lstStyle/>
+          <a:p>
+            <a:r>
+              <a:t>Gomez had a supporting role in the comedy film Neighbors 2: Sorority Rising; she portrayed the president of a Phi Lambda sorority.</a:t>
+            </a:r>
+          </a:p>
+        </p:txBody>
+      </p:sp>
+    </p:spTree>
+  </p:cSld>
+  <p:clrMapOvr>
+    <a:masterClrMapping/>
+  </p:clrMapOvr>
+</p:sld>
+</file>
+
+<file path=ppt/slides/slide72.xml><?xml version="1.0" encoding="utf-8"?>
+<p:sld xmlns:a="http://schemas.openxmlformats.org/drawingml/2006/main" xmlns:p="http://schemas.openxmlformats.org/presentationml/2006/main" xmlns:r="http://schemas.openxmlformats.org/officeDocument/2006/relationships">
+  <p:cSld>
+    <p:spTree>
+      <p:nvGrpSpPr>
+        <p:cNvPr id="1" name=""/>
+        <p:cNvGrpSpPr/>
+        <p:nvPr/>
+      </p:nvGrpSpPr>
+      <p:grpSpPr/>
+      <p:sp>
+        <p:nvSpPr>
+          <p:cNvPr id="2" name="Title 1"/>
+          <p:cNvSpPr>
+            <a:spLocks noGrp="1"/>
+          </p:cNvSpPr>
+          <p:nvPr>
+            <p:ph type="ctrTitle"/>
+          </p:nvPr>
+        </p:nvSpPr>
+        <p:spPr/>
+        <p:txBody>
+          <a:bodyPr/>
+          <a:lstStyle/>
+          <a:p>
+            <a:r>
+              <a:t> </a:t>
+            </a:r>
+          </a:p>
+        </p:txBody>
+      </p:sp>
+      <p:sp>
+        <p:nvSpPr>
+          <p:cNvPr id="3" name="Subtitle 2"/>
+          <p:cNvSpPr>
+            <a:spLocks noGrp="1"/>
+          </p:cNvSpPr>
+          <p:nvPr>
+            <p:ph type="subTitle" idx="1"/>
+          </p:nvPr>
+        </p:nvSpPr>
+        <p:spPr/>
+        <p:txBody>
+          <a:bodyPr/>
+          <a:lstStyle/>
+          <a:p>
+            <a:r>
+              <a:t>From 2009 to 2012, Gomez was involved in "Disney's Friends for Change", an organization which promoted "environmentally-friendly behavior", and she appeared in its public service announcements.</a:t>
+            </a:r>
+          </a:p>
+        </p:txBody>
+      </p:sp>
+    </p:spTree>
+  </p:cSld>
+  <p:clrMapOvr>
+    <a:masterClrMapping/>
+  </p:clrMapOvr>
+</p:sld>
+</file>
+
+<file path=ppt/slides/slide73.xml><?xml version="1.0" encoding="utf-8"?>
+<p:sld xmlns:a="http://schemas.openxmlformats.org/drawingml/2006/main" xmlns:p="http://schemas.openxmlformats.org/presentationml/2006/main" xmlns:r="http://schemas.openxmlformats.org/officeDocument/2006/relationships">
+  <p:cSld>
+    <p:spTree>
+      <p:nvGrpSpPr>
+        <p:cNvPr id="1" name=""/>
+        <p:cNvGrpSpPr/>
+        <p:nvPr/>
+      </p:nvGrpSpPr>
+      <p:grpSpPr/>
+      <p:sp>
+        <p:nvSpPr>
+          <p:cNvPr id="2" name="Title 1"/>
+          <p:cNvSpPr>
+            <a:spLocks noGrp="1"/>
+          </p:cNvSpPr>
+          <p:nvPr>
+            <p:ph type="ctrTitle"/>
+          </p:nvPr>
+        </p:nvSpPr>
+        <p:spPr/>
+        <p:txBody>
+          <a:bodyPr/>
+          <a:lstStyle/>
+          <a:p>
+            <a:r>
+              <a:t> </a:t>
+            </a:r>
+          </a:p>
+        </p:txBody>
+      </p:sp>
+      <p:sp>
+        <p:nvSpPr>
+          <p:cNvPr id="3" name="Subtitle 2"/>
+          <p:cNvSpPr>
+            <a:spLocks noGrp="1"/>
+          </p:cNvSpPr>
+          <p:nvPr>
+            <p:ph type="subTitle" idx="1"/>
+          </p:nvPr>
+        </p:nvSpPr>
+        <p:spPr/>
+        <p:txBody>
+          <a:bodyPr/>
+          <a:lstStyle/>
+          <a:p>
+            <a:r>
+              <a:t>With her former band Selena Gomez &amp; the Scene, she attained the top-ten albums Kiss &amp; Tell (2009), A Year Without Rain (2010) and When the Sun Goes Down (2011) on the US Billboard 200.</a:t>
+            </a:r>
+          </a:p>
+        </p:txBody>
+      </p:sp>
+    </p:spTree>
+  </p:cSld>
+  <p:clrMapOvr>
+    <a:masterClrMapping/>
+  </p:clrMapOvr>
+</p:sld>
+</file>
+
+<file path=ppt/slides/slide74.xml><?xml version="1.0" encoding="utf-8"?>
+<p:sld xmlns:a="http://schemas.openxmlformats.org/drawingml/2006/main" xmlns:p="http://schemas.openxmlformats.org/presentationml/2006/main" xmlns:r="http://schemas.openxmlformats.org/officeDocument/2006/relationships">
+  <p:cSld>
+    <p:spTree>
+      <p:nvGrpSpPr>
+        <p:cNvPr id="1" name=""/>
+        <p:cNvGrpSpPr/>
+        <p:nvPr/>
+      </p:nvGrpSpPr>
+      <p:grpSpPr/>
+      <p:sp>
+        <p:nvSpPr>
+          <p:cNvPr id="2" name="Title 1"/>
+          <p:cNvSpPr>
+            <a:spLocks noGrp="1"/>
+          </p:cNvSpPr>
+          <p:nvPr>
+            <p:ph type="ctrTitle"/>
+          </p:nvPr>
+        </p:nvSpPr>
+        <p:spPr/>
+        <p:txBody>
+          <a:bodyPr/>
+          <a:lstStyle/>
+          <a:p>
+            <a:r>
+              <a:t> </a:t>
+            </a:r>
+          </a:p>
+        </p:txBody>
+      </p:sp>
+      <p:sp>
+        <p:nvSpPr>
+          <p:cNvPr id="3" name="Subtitle 2"/>
+          <p:cNvSpPr>
+            <a:spLocks noGrp="1"/>
+          </p:cNvSpPr>
+          <p:nvPr>
+            <p:ph type="subTitle" idx="1"/>
+          </p:nvPr>
+        </p:nvSpPr>
+        <p:spPr/>
+        <p:txBody>
+          <a:bodyPr/>
+          <a:lstStyle/>
+          <a:p>
+            <a:r>
+              <a:t>She has also earned seven top-ten entries on the US Billboard Hot 100: "Come &amp; Get It", "The Heart Wants What It Wants", "Good for You" with ASAP Rocky, "Same Old Love", "Hands to Myself", "We Don't Talk Anymore" and "It Ain't Me" with Kygo.</a:t>
+            </a:r>
+          </a:p>
+        </p:txBody>
+      </p:sp>
+    </p:spTree>
+  </p:cSld>
+  <p:clrMapOvr>
+    <a:masterClrMapping/>
+  </p:clrMapOvr>
+</p:sld>
+</file>
+
+<file path=ppt/slides/slide75.xml><?xml version="1.0" encoding="utf-8"?>
+<p:sld xmlns:a="http://schemas.openxmlformats.org/drawingml/2006/main" xmlns:p="http://schemas.openxmlformats.org/presentationml/2006/main" xmlns:r="http://schemas.openxmlformats.org/officeDocument/2006/relationships">
+  <p:cSld>
+    <p:spTree>
+      <p:nvGrpSpPr>
+        <p:cNvPr id="1" name=""/>
+        <p:cNvGrpSpPr/>
+        <p:nvPr/>
+      </p:nvGrpSpPr>
+      <p:grpSpPr/>
+      <p:sp>
+        <p:nvSpPr>
+          <p:cNvPr id="2" name="Title 1"/>
+          <p:cNvSpPr>
+            <a:spLocks noGrp="1"/>
+          </p:cNvSpPr>
+          <p:nvPr>
+            <p:ph type="ctrTitle"/>
+          </p:nvPr>
+        </p:nvSpPr>
+        <p:spPr/>
+        <p:txBody>
+          <a:bodyPr/>
+          <a:lstStyle/>
+          <a:p>
+            <a:r>
+              <a:t> </a:t>
+            </a:r>
+          </a:p>
+        </p:txBody>
+      </p:sp>
+      <p:sp>
+        <p:nvSpPr>
+          <p:cNvPr id="3" name="Subtitle 2"/>
+          <p:cNvSpPr>
+            <a:spLocks noGrp="1"/>
+          </p:cNvSpPr>
+          <p:nvPr>
+            <p:ph type="subTitle" idx="1"/>
+          </p:nvPr>
+        </p:nvSpPr>
+        <p:spPr/>
+        <p:txBody>
+          <a:bodyPr/>
+          <a:lstStyle/>
+          <a:p>
+            <a:r>
+              <a:t>While working on the second season of Wizards of Waverly Place, Gomez appeared on the Disney Channel special Studio DC: Almost Live alongside various other Disney stars.</a:t>
+            </a:r>
+          </a:p>
+        </p:txBody>
+      </p:sp>
+    </p:spTree>
+  </p:cSld>
+  <p:clrMapOvr>
+    <a:masterClrMapping/>
+  </p:clrMapOvr>
+</p:sld>
+</file>
+
+<file path=ppt/slides/slide76.xml><?xml version="1.0" encoding="utf-8"?>
+<p:sld xmlns:a="http://schemas.openxmlformats.org/drawingml/2006/main" xmlns:p="http://schemas.openxmlformats.org/presentationml/2006/main" xmlns:r="http://schemas.openxmlformats.org/officeDocument/2006/relationships">
+  <p:cSld>
+    <p:spTree>
+      <p:nvGrpSpPr>
+        <p:cNvPr id="1" name=""/>
+        <p:cNvGrpSpPr/>
+        <p:nvPr/>
+      </p:nvGrpSpPr>
+      <p:grpSpPr/>
+      <p:sp>
+        <p:nvSpPr>
+          <p:cNvPr id="2" name="Title 1"/>
+          <p:cNvSpPr>
+            <a:spLocks noGrp="1"/>
+          </p:cNvSpPr>
+          <p:nvPr>
+            <p:ph type="ctrTitle"/>
+          </p:nvPr>
+        </p:nvSpPr>
+        <p:spPr/>
+        <p:txBody>
+          <a:bodyPr/>
+          <a:lstStyle/>
+          <a:p>
+            <a:r>
+              <a:t> </a:t>
+            </a:r>
+          </a:p>
+        </p:txBody>
+      </p:sp>
+      <p:sp>
+        <p:nvSpPr>
+          <p:cNvPr id="3" name="Subtitle 2"/>
+          <p:cNvSpPr>
+            <a:spLocks noGrp="1"/>
+          </p:cNvSpPr>
+          <p:nvPr>
+            <p:ph type="subTitle" idx="1"/>
+          </p:nvPr>
+        </p:nvSpPr>
+        <p:spPr/>
+        <p:txBody>
+          <a:bodyPr/>
+          <a:lstStyle/>
+          <a:p>
+            <a:r>
+              <a:t>" The group released their debut studio album in August 2009, which debuted at number nine on the Billboard 200 albums chart in the United States, with first-week sales of 66,000 copies.</a:t>
+            </a:r>
+          </a:p>
+        </p:txBody>
+      </p:sp>
+    </p:spTree>
+  </p:cSld>
+  <p:clrMapOvr>
+    <a:masterClrMapping/>
+  </p:clrMapOvr>
+</p:sld>
+</file>
+
+<file path=ppt/slides/slide77.xml><?xml version="1.0" encoding="utf-8"?>
+<p:sld xmlns:a="http://schemas.openxmlformats.org/drawingml/2006/main" xmlns:p="http://schemas.openxmlformats.org/presentationml/2006/main" xmlns:r="http://schemas.openxmlformats.org/officeDocument/2006/relationships">
+  <p:cSld>
+    <p:spTree>
+      <p:nvGrpSpPr>
+        <p:cNvPr id="1" name=""/>
+        <p:cNvGrpSpPr/>
+        <p:nvPr/>
+      </p:nvGrpSpPr>
+      <p:grpSpPr/>
+      <p:sp>
+        <p:nvSpPr>
+          <p:cNvPr id="2" name="Title 1"/>
+          <p:cNvSpPr>
+            <a:spLocks noGrp="1"/>
+          </p:cNvSpPr>
+          <p:nvPr>
+            <p:ph type="ctrTitle"/>
+          </p:nvPr>
+        </p:nvSpPr>
+        <p:spPr/>
+        <p:txBody>
+          <a:bodyPr/>
+          <a:lstStyle/>
+          <a:p>
+            <a:r>
+              <a:t> </a:t>
+            </a:r>
+          </a:p>
+        </p:txBody>
+      </p:sp>
+      <p:sp>
+        <p:nvSpPr>
+          <p:cNvPr id="3" name="Subtitle 2"/>
+          <p:cNvSpPr>
+            <a:spLocks noGrp="1"/>
+          </p:cNvSpPr>
+          <p:nvPr>
+            <p:ph type="subTitle" idx="1"/>
+          </p:nvPr>
+        </p:nvSpPr>
+        <p:spPr/>
+        <p:txBody>
+          <a:bodyPr/>
+          <a:lstStyle/>
+          <a:p>
+            <a:r>
+              <a:t>The single went on to become her second top ten hit on the Billboard Hot 100 chart, and sold over one million copies in the United States.</a:t>
+            </a:r>
+          </a:p>
+        </p:txBody>
+      </p:sp>
+    </p:spTree>
+  </p:cSld>
+  <p:clrMapOvr>
+    <a:masterClrMapping/>
+  </p:clrMapOvr>
+</p:sld>
+</file>
+
+<file path=ppt/slides/slide78.xml><?xml version="1.0" encoding="utf-8"?>
+<p:sld xmlns:a="http://schemas.openxmlformats.org/drawingml/2006/main" xmlns:p="http://schemas.openxmlformats.org/presentationml/2006/main" xmlns:r="http://schemas.openxmlformats.org/officeDocument/2006/relationships">
+  <p:cSld>
+    <p:spTree>
+      <p:nvGrpSpPr>
+        <p:cNvPr id="1" name=""/>
+        <p:cNvGrpSpPr/>
+        <p:nvPr/>
+      </p:nvGrpSpPr>
+      <p:grpSpPr/>
+      <p:sp>
+        <p:nvSpPr>
+          <p:cNvPr id="2" name="Title 1"/>
+          <p:cNvSpPr>
+            <a:spLocks noGrp="1"/>
+          </p:cNvSpPr>
+          <p:nvPr>
+            <p:ph type="ctrTitle"/>
+          </p:nvPr>
+        </p:nvSpPr>
+        <p:spPr/>
+        <p:txBody>
+          <a:bodyPr/>
+          <a:lstStyle/>
+          <a:p>
+            <a:r>
+              <a:t> </a:t>
+            </a:r>
+          </a:p>
+        </p:txBody>
+      </p:sp>
+      <p:sp>
+        <p:nvSpPr>
+          <p:cNvPr id="3" name="Subtitle 2"/>
+          <p:cNvSpPr>
+            <a:spLocks noGrp="1"/>
+          </p:cNvSpPr>
+          <p:nvPr>
+            <p:ph type="subTitle" idx="1"/>
+          </p:nvPr>
+        </p:nvSpPr>
+        <p:spPr/>
+        <p:txBody>
+          <a:bodyPr/>
+          <a:lstStyle/>
+          <a:p>
+            <a:r>
+              <a:t>Gomez released "Good for You" (2015) as the lead single from her second studio album on June 22, 2015; the single features rapper ASAP Rocky.</a:t>
+            </a:r>
+          </a:p>
+        </p:txBody>
+      </p:sp>
+    </p:spTree>
+  </p:cSld>
+  <p:clrMapOvr>
+    <a:masterClrMapping/>
+  </p:clrMapOvr>
+</p:sld>
+</file>
+
+<file path=ppt/slides/slide79.xml><?xml version="1.0" encoding="utf-8"?>
+<p:sld xmlns:a="http://schemas.openxmlformats.org/drawingml/2006/main" xmlns:p="http://schemas.openxmlformats.org/presentationml/2006/main" xmlns:r="http://schemas.openxmlformats.org/officeDocument/2006/relationships">
+  <p:cSld>
+    <p:spTree>
+      <p:nvGrpSpPr>
+        <p:cNvPr id="1" name=""/>
+        <p:cNvGrpSpPr/>
+        <p:nvPr/>
+      </p:nvGrpSpPr>
+      <p:grpSpPr/>
+      <p:sp>
+        <p:nvSpPr>
+          <p:cNvPr id="2" name="Title 1"/>
+          <p:cNvSpPr>
+            <a:spLocks noGrp="1"/>
+          </p:cNvSpPr>
+          <p:nvPr>
+            <p:ph type="ctrTitle"/>
+          </p:nvPr>
+        </p:nvSpPr>
+        <p:spPr/>
+        <p:txBody>
+          <a:bodyPr/>
+          <a:lstStyle/>
+          <a:p>
+            <a:r>
+              <a:t> </a:t>
+            </a:r>
+          </a:p>
+        </p:txBody>
+      </p:sp>
+      <p:sp>
+        <p:nvSpPr>
+          <p:cNvPr id="3" name="Subtitle 2"/>
+          <p:cNvSpPr>
+            <a:spLocks noGrp="1"/>
+          </p:cNvSpPr>
+          <p:nvPr>
+            <p:ph type="subTitle" idx="1"/>
+          </p:nvPr>
+        </p:nvSpPr>
+        <p:spPr/>
+        <p:txBody>
+          <a:bodyPr/>
+          <a:lstStyle/>
+          <a:p>
+            <a:r>
+              <a:t>"Same Old Love" (2015) was released as the album's second single, and went on to top the Mainstream Top 40 chart.</a:t>
             </a:r>
           </a:p>
         </p:txBody>
@@ -7214,7 +9820,451 @@
           <a:lstStyle/>
           <a:p>
             <a:r>
-              <a:t>All code is written inside classes, and every data item is an object, with the exception of the primitive data types, (i.e.</a:t>
+              <a:t>During this time, Gomez filmed pilot episodes for two potential Disney Channel series; the first, titled Arwin!, a spin-off of the Suite Life series, while the second titled Stevie Sanchez was a spin-off of the series Lizzie McGuire.</a:t>
+            </a:r>
+          </a:p>
+        </p:txBody>
+      </p:sp>
+    </p:spTree>
+  </p:cSld>
+  <p:clrMapOvr>
+    <a:masterClrMapping/>
+  </p:clrMapOvr>
+</p:sld>
+</file>
+
+<file path=ppt/slides/slide80.xml><?xml version="1.0" encoding="utf-8"?>
+<p:sld xmlns:a="http://schemas.openxmlformats.org/drawingml/2006/main" xmlns:p="http://schemas.openxmlformats.org/presentationml/2006/main" xmlns:r="http://schemas.openxmlformats.org/officeDocument/2006/relationships">
+  <p:cSld>
+    <p:spTree>
+      <p:nvGrpSpPr>
+        <p:cNvPr id="1" name=""/>
+        <p:cNvGrpSpPr/>
+        <p:nvPr/>
+      </p:nvGrpSpPr>
+      <p:grpSpPr/>
+      <p:sp>
+        <p:nvSpPr>
+          <p:cNvPr id="2" name="Title 1"/>
+          <p:cNvSpPr>
+            <a:spLocks noGrp="1"/>
+          </p:cNvSpPr>
+          <p:nvPr>
+            <p:ph type="ctrTitle"/>
+          </p:nvPr>
+        </p:nvSpPr>
+        <p:spPr/>
+        <p:txBody>
+          <a:bodyPr/>
+          <a:lstStyle/>
+          <a:p>
+            <a:r>
+              <a:t> </a:t>
+            </a:r>
+          </a:p>
+        </p:txBody>
+      </p:sp>
+      <p:sp>
+        <p:nvSpPr>
+          <p:cNvPr id="3" name="Subtitle 2"/>
+          <p:cNvSpPr>
+            <a:spLocks noGrp="1"/>
+          </p:cNvSpPr>
+          <p:nvPr>
+            <p:ph type="subTitle" idx="1"/>
+          </p:nvPr>
+        </p:nvSpPr>
+        <p:spPr/>
+        <p:txBody>
+          <a:bodyPr/>
+          <a:lstStyle/>
+          <a:p>
+            <a:r>
+              <a:t>The single peaked at number five on the Billboard Hot 100, tying with "Good for You" as her highest charting effort.</a:t>
+            </a:r>
+          </a:p>
+        </p:txBody>
+      </p:sp>
+    </p:spTree>
+  </p:cSld>
+  <p:clrMapOvr>
+    <a:masterClrMapping/>
+  </p:clrMapOvr>
+</p:sld>
+</file>
+
+<file path=ppt/slides/slide81.xml><?xml version="1.0" encoding="utf-8"?>
+<p:sld xmlns:a="http://schemas.openxmlformats.org/drawingml/2006/main" xmlns:p="http://schemas.openxmlformats.org/presentationml/2006/main" xmlns:r="http://schemas.openxmlformats.org/officeDocument/2006/relationships">
+  <p:cSld>
+    <p:spTree>
+      <p:nvGrpSpPr>
+        <p:cNvPr id="1" name=""/>
+        <p:cNvGrpSpPr/>
+        <p:nvPr/>
+      </p:nvGrpSpPr>
+      <p:grpSpPr/>
+      <p:sp>
+        <p:nvSpPr>
+          <p:cNvPr id="2" name="Title 1"/>
+          <p:cNvSpPr>
+            <a:spLocks noGrp="1"/>
+          </p:cNvSpPr>
+          <p:nvPr>
+            <p:ph type="ctrTitle"/>
+          </p:nvPr>
+        </p:nvSpPr>
+        <p:spPr/>
+        <p:txBody>
+          <a:bodyPr/>
+          <a:lstStyle/>
+          <a:p>
+            <a:r>
+              <a:t> </a:t>
+            </a:r>
+          </a:p>
+        </p:txBody>
+      </p:sp>
+      <p:sp>
+        <p:nvSpPr>
+          <p:cNvPr id="3" name="Subtitle 2"/>
+          <p:cNvSpPr>
+            <a:spLocks noGrp="1"/>
+          </p:cNvSpPr>
+          <p:nvPr>
+            <p:ph type="subTitle" idx="1"/>
+          </p:nvPr>
+        </p:nvSpPr>
+        <p:spPr/>
+        <p:txBody>
+          <a:bodyPr/>
+          <a:lstStyle/>
+          <a:p>
+            <a:r>
+              <a:t>Gomez and Canadian singer Tory Lanez were featured on "Trust Nobody", the second single from Norwegian DJ Cashmere Cat debut studio album 9.</a:t>
+            </a:r>
+          </a:p>
+        </p:txBody>
+      </p:sp>
+    </p:spTree>
+  </p:cSld>
+  <p:clrMapOvr>
+    <a:masterClrMapping/>
+  </p:clrMapOvr>
+</p:sld>
+</file>
+
+<file path=ppt/slides/slide82.xml><?xml version="1.0" encoding="utf-8"?>
+<p:sld xmlns:a="http://schemas.openxmlformats.org/drawingml/2006/main" xmlns:p="http://schemas.openxmlformats.org/presentationml/2006/main" xmlns:r="http://schemas.openxmlformats.org/officeDocument/2006/relationships">
+  <p:cSld>
+    <p:spTree>
+      <p:nvGrpSpPr>
+        <p:cNvPr id="1" name=""/>
+        <p:cNvGrpSpPr/>
+        <p:nvPr/>
+      </p:nvGrpSpPr>
+      <p:grpSpPr/>
+      <p:sp>
+        <p:nvSpPr>
+          <p:cNvPr id="2" name="Title 1"/>
+          <p:cNvSpPr>
+            <a:spLocks noGrp="1"/>
+          </p:cNvSpPr>
+          <p:nvPr>
+            <p:ph type="ctrTitle"/>
+          </p:nvPr>
+        </p:nvSpPr>
+        <p:spPr/>
+        <p:txBody>
+          <a:bodyPr/>
+          <a:lstStyle/>
+          <a:p>
+            <a:r>
+              <a:t> </a:t>
+            </a:r>
+          </a:p>
+        </p:txBody>
+      </p:sp>
+      <p:sp>
+        <p:nvSpPr>
+          <p:cNvPr id="3" name="Subtitle 2"/>
+          <p:cNvSpPr>
+            <a:spLocks noGrp="1"/>
+          </p:cNvSpPr>
+          <p:nvPr>
+            <p:ph type="subTitle" idx="1"/>
+          </p:nvPr>
+        </p:nvSpPr>
+        <p:spPr/>
+        <p:txBody>
+          <a:bodyPr/>
+          <a:lstStyle/>
+          <a:p>
+            <a:r>
+              <a:t>She has a limited-edition collection of handbags called the "Selena Grace" that she designed in collaboration with luxury brand Coach, Inc. On March 29, 2018, Gomez released photos from her partnership with Coach on her Instagram account.</a:t>
+            </a:r>
+          </a:p>
+        </p:txBody>
+      </p:sp>
+    </p:spTree>
+  </p:cSld>
+  <p:clrMapOvr>
+    <a:masterClrMapping/>
+  </p:clrMapOvr>
+</p:sld>
+</file>
+
+<file path=ppt/slides/slide83.xml><?xml version="1.0" encoding="utf-8"?>
+<p:sld xmlns:a="http://schemas.openxmlformats.org/drawingml/2006/main" xmlns:p="http://schemas.openxmlformats.org/presentationml/2006/main" xmlns:r="http://schemas.openxmlformats.org/officeDocument/2006/relationships">
+  <p:cSld>
+    <p:spTree>
+      <p:nvGrpSpPr>
+        <p:cNvPr id="1" name=""/>
+        <p:cNvGrpSpPr/>
+        <p:nvPr/>
+      </p:nvGrpSpPr>
+      <p:grpSpPr/>
+      <p:sp>
+        <p:nvSpPr>
+          <p:cNvPr id="2" name="Title 1"/>
+          <p:cNvSpPr>
+            <a:spLocks noGrp="1"/>
+          </p:cNvSpPr>
+          <p:nvPr>
+            <p:ph type="ctrTitle"/>
+          </p:nvPr>
+        </p:nvSpPr>
+        <p:spPr/>
+        <p:txBody>
+          <a:bodyPr/>
+          <a:lstStyle/>
+          <a:p>
+            <a:r>
+              <a:t> </a:t>
+            </a:r>
+          </a:p>
+        </p:txBody>
+      </p:sp>
+      <p:sp>
+        <p:nvSpPr>
+          <p:cNvPr id="3" name="Subtitle 2"/>
+          <p:cNvSpPr>
+            <a:spLocks noGrp="1"/>
+          </p:cNvSpPr>
+          <p:nvPr>
+            <p:ph type="subTitle" idx="1"/>
+          </p:nvPr>
+        </p:nvSpPr>
+        <p:spPr/>
+        <p:txBody>
+          <a:bodyPr/>
+          <a:lstStyle/>
+          <a:p>
+            <a:r>
+              <a:t> </a:t>
+            </a:r>
+          </a:p>
+        </p:txBody>
+      </p:sp>
+      <p:pic>
+        <p:nvPicPr>
+          <p:cNvPr id="4" name="Picture 3" descr="image2.jpg"/>
+          <p:cNvPicPr>
+            <a:picLocks noChangeAspect="1"/>
+          </p:cNvPicPr>
+          <p:nvPr/>
+        </p:nvPicPr>
+        <p:blipFill>
+          <a:blip r:embed="rId2"/>
+          <a:stretch>
+            <a:fillRect/>
+          </a:stretch>
+        </p:blipFill>
+        <p:spPr>
+          <a:xfrm>
+            <a:off x="914400" y="1828800"/>
+            <a:ext cx="6502400" cy="3657600"/>
+          </a:xfrm>
+          <a:prstGeom prst="rect">
+            <a:avLst/>
+          </a:prstGeom>
+        </p:spPr>
+      </p:pic>
+    </p:spTree>
+  </p:cSld>
+  <p:clrMapOvr>
+    <a:masterClrMapping/>
+  </p:clrMapOvr>
+</p:sld>
+</file>
+
+<file path=ppt/slides/slide84.xml><?xml version="1.0" encoding="utf-8"?>
+<p:sld xmlns:a="http://schemas.openxmlformats.org/drawingml/2006/main" xmlns:p="http://schemas.openxmlformats.org/presentationml/2006/main" xmlns:r="http://schemas.openxmlformats.org/officeDocument/2006/relationships">
+  <p:cSld>
+    <p:spTree>
+      <p:nvGrpSpPr>
+        <p:cNvPr id="1" name=""/>
+        <p:cNvGrpSpPr/>
+        <p:nvPr/>
+      </p:nvGrpSpPr>
+      <p:grpSpPr/>
+      <p:sp>
+        <p:nvSpPr>
+          <p:cNvPr id="2" name="Title 1"/>
+          <p:cNvSpPr>
+            <a:spLocks noGrp="1"/>
+          </p:cNvSpPr>
+          <p:nvPr>
+            <p:ph type="ctrTitle"/>
+          </p:nvPr>
+        </p:nvSpPr>
+        <p:spPr/>
+        <p:txBody>
+          <a:bodyPr/>
+          <a:lstStyle/>
+          <a:p>
+            <a:r>
+              <a:t>DISADVANTAGES</a:t>
+            </a:r>
+          </a:p>
+        </p:txBody>
+      </p:sp>
+      <p:sp>
+        <p:nvSpPr>
+          <p:cNvPr id="3" name="Subtitle 2"/>
+          <p:cNvSpPr>
+            <a:spLocks noGrp="1"/>
+          </p:cNvSpPr>
+          <p:nvPr>
+            <p:ph type="subTitle" idx="1"/>
+          </p:nvPr>
+        </p:nvSpPr>
+        <p:spPr/>
+        <p:txBody>
+          <a:bodyPr/>
+          <a:lstStyle/>
+          <a:p>
+            <a:r>
+              <a:t> </a:t>
+            </a:r>
+          </a:p>
+        </p:txBody>
+      </p:sp>
+    </p:spTree>
+  </p:cSld>
+  <p:clrMapOvr>
+    <a:masterClrMapping/>
+  </p:clrMapOvr>
+</p:sld>
+</file>
+
+<file path=ppt/slides/slide85.xml><?xml version="1.0" encoding="utf-8"?>
+<p:sld xmlns:a="http://schemas.openxmlformats.org/drawingml/2006/main" xmlns:p="http://schemas.openxmlformats.org/presentationml/2006/main" xmlns:r="http://schemas.openxmlformats.org/officeDocument/2006/relationships">
+  <p:cSld>
+    <p:spTree>
+      <p:nvGrpSpPr>
+        <p:cNvPr id="1" name=""/>
+        <p:cNvGrpSpPr/>
+        <p:nvPr/>
+      </p:nvGrpSpPr>
+      <p:grpSpPr/>
+      <p:sp>
+        <p:nvSpPr>
+          <p:cNvPr id="2" name="Title 1"/>
+          <p:cNvSpPr>
+            <a:spLocks noGrp="1"/>
+          </p:cNvSpPr>
+          <p:nvPr>
+            <p:ph type="ctrTitle"/>
+          </p:nvPr>
+        </p:nvSpPr>
+        <p:spPr/>
+        <p:txBody>
+          <a:bodyPr/>
+          <a:lstStyle/>
+          <a:p>
+            <a:r>
+              <a:t> </a:t>
+            </a:r>
+          </a:p>
+        </p:txBody>
+      </p:sp>
+      <p:sp>
+        <p:nvSpPr>
+          <p:cNvPr id="3" name="Subtitle 2"/>
+          <p:cNvSpPr>
+            <a:spLocks noGrp="1"/>
+          </p:cNvSpPr>
+          <p:nvPr>
+            <p:ph type="subTitle" idx="1"/>
+          </p:nvPr>
+        </p:nvSpPr>
+        <p:spPr/>
+        <p:txBody>
+          <a:bodyPr/>
+          <a:lstStyle/>
+          <a:p>
+            <a:r>
+              <a:t>Gomez appeared in the film Behaving Badly (2014) with Dylan McDermott and Nat Wolff.</a:t>
+            </a:r>
+          </a:p>
+        </p:txBody>
+      </p:sp>
+    </p:spTree>
+  </p:cSld>
+  <p:clrMapOvr>
+    <a:masterClrMapping/>
+  </p:clrMapOvr>
+</p:sld>
+</file>
+
+<file path=ppt/slides/slide86.xml><?xml version="1.0" encoding="utf-8"?>
+<p:sld xmlns:a="http://schemas.openxmlformats.org/drawingml/2006/main" xmlns:p="http://schemas.openxmlformats.org/presentationml/2006/main" xmlns:r="http://schemas.openxmlformats.org/officeDocument/2006/relationships">
+  <p:cSld>
+    <p:spTree>
+      <p:nvGrpSpPr>
+        <p:cNvPr id="1" name=""/>
+        <p:cNvGrpSpPr/>
+        <p:nvPr/>
+      </p:nvGrpSpPr>
+      <p:grpSpPr/>
+      <p:sp>
+        <p:nvSpPr>
+          <p:cNvPr id="2" name="Title 1"/>
+          <p:cNvSpPr>
+            <a:spLocks noGrp="1"/>
+          </p:cNvSpPr>
+          <p:nvPr>
+            <p:ph type="ctrTitle"/>
+          </p:nvPr>
+        </p:nvSpPr>
+        <p:spPr/>
+        <p:txBody>
+          <a:bodyPr/>
+          <a:lstStyle/>
+          <a:p>
+            <a:r>
+              <a:t> </a:t>
+            </a:r>
+          </a:p>
+        </p:txBody>
+      </p:sp>
+      <p:sp>
+        <p:nvSpPr>
+          <p:cNvPr id="3" name="Subtitle 2"/>
+          <p:cNvSpPr>
+            <a:spLocks noGrp="1"/>
+          </p:cNvSpPr>
+          <p:nvPr>
+            <p:ph type="subTitle" idx="1"/>
+          </p:nvPr>
+        </p:nvSpPr>
+        <p:spPr/>
+        <p:txBody>
+          <a:bodyPr/>
+          <a:lstStyle/>
+          <a:p>
+            <a:r>
+              <a:t>The project, filmed prior to Gomez's stint in rehab, was released in August 2014 to a generally negative critical and commercial reception.</a:t>
             </a:r>
           </a:p>
         </p:txBody>
@@ -7274,7 +10324,7 @@
           <a:lstStyle/>
           <a:p>
             <a:r>
-              <a:t>The Java source file may only contain one public class, but it can contain multiple classes with other than public access modifier and any number of public inner classes.</a:t>
+              <a:t>Gomez recorded the theme song for the series, titled "Everything is Not What It Seems".</a:t>
             </a:r>
           </a:p>
         </p:txBody>

</xml_diff>

<commit_message>
fix some ANR problems
</commit_message>
<xml_diff>
--- a/output.pptx
+++ b/output.pptx
@@ -91,6 +91,36 @@
     <p:sldId id="339" r:id="rId89"/>
     <p:sldId id="340" r:id="rId90"/>
     <p:sldId id="341" r:id="rId91"/>
+    <p:sldId id="342" r:id="rId92"/>
+    <p:sldId id="343" r:id="rId93"/>
+    <p:sldId id="344" r:id="rId94"/>
+    <p:sldId id="345" r:id="rId95"/>
+    <p:sldId id="346" r:id="rId96"/>
+    <p:sldId id="347" r:id="rId97"/>
+    <p:sldId id="348" r:id="rId98"/>
+    <p:sldId id="349" r:id="rId99"/>
+    <p:sldId id="350" r:id="rId100"/>
+    <p:sldId id="351" r:id="rId101"/>
+    <p:sldId id="352" r:id="rId102"/>
+    <p:sldId id="353" r:id="rId103"/>
+    <p:sldId id="354" r:id="rId104"/>
+    <p:sldId id="355" r:id="rId105"/>
+    <p:sldId id="356" r:id="rId106"/>
+    <p:sldId id="357" r:id="rId107"/>
+    <p:sldId id="358" r:id="rId108"/>
+    <p:sldId id="359" r:id="rId109"/>
+    <p:sldId id="360" r:id="rId110"/>
+    <p:sldId id="361" r:id="rId111"/>
+    <p:sldId id="362" r:id="rId112"/>
+    <p:sldId id="363" r:id="rId113"/>
+    <p:sldId id="364" r:id="rId114"/>
+    <p:sldId id="365" r:id="rId115"/>
+    <p:sldId id="366" r:id="rId116"/>
+    <p:sldId id="367" r:id="rId117"/>
+    <p:sldId id="368" r:id="rId118"/>
+    <p:sldId id="369" r:id="rId119"/>
+    <p:sldId id="370" r:id="rId120"/>
+    <p:sldId id="371" r:id="rId121"/>
   </p:sldIdLst>
   <p:sldSz cx="9144000" cy="6858000" type="screen4x3"/>
   <p:notesSz cx="6858000" cy="9144000"/>
@@ -5131,7 +5161,7 @@
           <a:lstStyle/>
           <a:p>
             <a:r>
-              <a:t>Selena_Gomez</a:t>
+              <a:t>Taylor_Swift</a:t>
             </a:r>
           </a:p>
         </p:txBody>
@@ -5152,7 +5182,7 @@
           <a:lstStyle/>
           <a:p>
             <a:r>
-              <a:t>Gomez's acting credits include starring roles in the films Another Cinderella Story (2008), Princess Protection Program (2009), Wizards of Waverly Place: The Movie (2009), Ramona and Beezus (2010), Monte Carlo (2011), Spring Breakers (2012), Getaway (2013) and The Fundamentals of Caring (2016).</a:t>
+              <a:t>Born and raised in Pennsylvania, Swift moved to Nashville, Tennessee, at the age of 14 to pursue a career in country music.</a:t>
             </a:r>
           </a:p>
         </p:txBody>
@@ -5212,7 +5242,607 @@
           <a:lstStyle/>
           <a:p>
             <a:r>
-              <a:t>Gomez later appeared in the music video for the song "Burnin' Up", which the Jonas Brothers had recorded and released, and later, she also appeared in an episode of the reality series Jonas Brothers: Living the Dream.</a:t>
+              <a:t>In a June 2015 open letter, Swift criticized Apple Music for not offering royalties to artists during the streaming service's free three-month trial period and stated that she would pull 1989 from the catalog.</a:t>
+            </a:r>
+          </a:p>
+        </p:txBody>
+      </p:sp>
+    </p:spTree>
+  </p:cSld>
+  <p:clrMapOvr>
+    <a:masterClrMapping/>
+  </p:clrMapOvr>
+</p:sld>
+</file>
+
+<file path=ppt/slides/slide100.xml><?xml version="1.0" encoding="utf-8"?>
+<p:sld xmlns:a="http://schemas.openxmlformats.org/drawingml/2006/main" xmlns:p="http://schemas.openxmlformats.org/presentationml/2006/main" xmlns:r="http://schemas.openxmlformats.org/officeDocument/2006/relationships">
+  <p:cSld>
+    <p:spTree>
+      <p:nvGrpSpPr>
+        <p:cNvPr id="1" name=""/>
+        <p:cNvGrpSpPr/>
+        <p:nvPr/>
+      </p:nvGrpSpPr>
+      <p:grpSpPr/>
+      <p:sp>
+        <p:nvSpPr>
+          <p:cNvPr id="2" name="Title 1"/>
+          <p:cNvSpPr>
+            <a:spLocks noGrp="1"/>
+          </p:cNvSpPr>
+          <p:nvPr>
+            <p:ph type="ctrTitle"/>
+          </p:nvPr>
+        </p:nvSpPr>
+        <p:spPr/>
+        <p:txBody>
+          <a:bodyPr/>
+          <a:lstStyle/>
+          <a:p>
+            <a:r>
+              <a:t> </a:t>
+            </a:r>
+          </a:p>
+        </p:txBody>
+      </p:sp>
+      <p:sp>
+        <p:nvSpPr>
+          <p:cNvPr id="3" name="Subtitle 2"/>
+          <p:cNvSpPr>
+            <a:spLocks noGrp="1"/>
+          </p:cNvSpPr>
+          <p:nvPr>
+            <p:ph type="subTitle" idx="1"/>
+          </p:nvPr>
+        </p:nvSpPr>
+        <p:spPr/>
+        <p:txBody>
+          <a:bodyPr/>
+          <a:lstStyle/>
+          <a:p>
+            <a:r>
+              <a:t>It entered the United States at number three, making Swift the second female artist in the history of the Hot 100 (after Mariah Carey) to debut multiple tracks in the top five in one year; the other was "Today Was a Fairytale" at number two.</a:t>
+            </a:r>
+          </a:p>
+        </p:txBody>
+      </p:sp>
+    </p:spTree>
+  </p:cSld>
+  <p:clrMapOvr>
+    <a:masterClrMapping/>
+  </p:clrMapOvr>
+</p:sld>
+</file>
+
+<file path=ppt/slides/slide101.xml><?xml version="1.0" encoding="utf-8"?>
+<p:sld xmlns:a="http://schemas.openxmlformats.org/drawingml/2006/main" xmlns:p="http://schemas.openxmlformats.org/presentationml/2006/main" xmlns:r="http://schemas.openxmlformats.org/officeDocument/2006/relationships">
+  <p:cSld>
+    <p:spTree>
+      <p:nvGrpSpPr>
+        <p:cNvPr id="1" name=""/>
+        <p:cNvGrpSpPr/>
+        <p:nvPr/>
+      </p:nvGrpSpPr>
+      <p:grpSpPr/>
+      <p:sp>
+        <p:nvSpPr>
+          <p:cNvPr id="2" name="Title 1"/>
+          <p:cNvSpPr>
+            <a:spLocks noGrp="1"/>
+          </p:cNvSpPr>
+          <p:nvPr>
+            <p:ph type="ctrTitle"/>
+          </p:nvPr>
+        </p:nvSpPr>
+        <p:spPr/>
+        <p:txBody>
+          <a:bodyPr/>
+          <a:lstStyle/>
+          <a:p>
+            <a:r>
+              <a:t> </a:t>
+            </a:r>
+          </a:p>
+        </p:txBody>
+      </p:sp>
+      <p:sp>
+        <p:nvSpPr>
+          <p:cNvPr id="3" name="Subtitle 2"/>
+          <p:cNvSpPr>
+            <a:spLocks noGrp="1"/>
+          </p:cNvSpPr>
+          <p:nvPr>
+            <p:ph type="subTitle" idx="1"/>
+          </p:nvPr>
+        </p:nvSpPr>
+        <p:spPr/>
+        <p:txBody>
+          <a:bodyPr/>
+          <a:lstStyle/>
+          <a:p>
+            <a:r>
+              <a:t>Speak Now, released on October 25, 2010, was a commercial success, debuting at number one on the Billboard 200, and becoming the 16th album to achieve opening week sales of one million copies.</a:t>
+            </a:r>
+          </a:p>
+        </p:txBody>
+      </p:sp>
+    </p:spTree>
+  </p:cSld>
+  <p:clrMapOvr>
+    <a:masterClrMapping/>
+  </p:clrMapOvr>
+</p:sld>
+</file>
+
+<file path=ppt/slides/slide102.xml><?xml version="1.0" encoding="utf-8"?>
+<p:sld xmlns:a="http://schemas.openxmlformats.org/drawingml/2006/main" xmlns:p="http://schemas.openxmlformats.org/presentationml/2006/main" xmlns:r="http://schemas.openxmlformats.org/officeDocument/2006/relationships">
+  <p:cSld>
+    <p:spTree>
+      <p:nvGrpSpPr>
+        <p:cNvPr id="1" name=""/>
+        <p:cNvGrpSpPr/>
+        <p:nvPr/>
+      </p:nvGrpSpPr>
+      <p:grpSpPr/>
+      <p:sp>
+        <p:nvSpPr>
+          <p:cNvPr id="2" name="Title 1"/>
+          <p:cNvSpPr>
+            <a:spLocks noGrp="1"/>
+          </p:cNvSpPr>
+          <p:nvPr>
+            <p:ph type="ctrTitle"/>
+          </p:nvPr>
+        </p:nvSpPr>
+        <p:spPr/>
+        <p:txBody>
+          <a:bodyPr/>
+          <a:lstStyle/>
+          <a:p>
+            <a:r>
+              <a:t> </a:t>
+            </a:r>
+          </a:p>
+        </p:txBody>
+      </p:sp>
+      <p:sp>
+        <p:nvSpPr>
+          <p:cNvPr id="3" name="Subtitle 2"/>
+          <p:cNvSpPr>
+            <a:spLocks noGrp="1"/>
+          </p:cNvSpPr>
+          <p:nvPr>
+            <p:ph type="subTitle" idx="1"/>
+          </p:nvPr>
+        </p:nvSpPr>
+        <p:spPr/>
+        <p:txBody>
+          <a:bodyPr/>
+          <a:lstStyle/>
+          <a:p>
+            <a:r>
+              <a:t>"I Knew You Were Trouble" was a major commercial success, peaking at number two in the United States.</a:t>
+            </a:r>
+          </a:p>
+        </p:txBody>
+      </p:sp>
+    </p:spTree>
+  </p:cSld>
+  <p:clrMapOvr>
+    <a:masterClrMapping/>
+  </p:clrMapOvr>
+</p:sld>
+</file>
+
+<file path=ppt/slides/slide103.xml><?xml version="1.0" encoding="utf-8"?>
+<p:sld xmlns:a="http://schemas.openxmlformats.org/drawingml/2006/main" xmlns:p="http://schemas.openxmlformats.org/presentationml/2006/main" xmlns:r="http://schemas.openxmlformats.org/officeDocument/2006/relationships">
+  <p:cSld>
+    <p:spTree>
+      <p:nvGrpSpPr>
+        <p:cNvPr id="1" name=""/>
+        <p:cNvGrpSpPr/>
+        <p:nvPr/>
+      </p:nvGrpSpPr>
+      <p:grpSpPr/>
+      <p:sp>
+        <p:nvSpPr>
+          <p:cNvPr id="2" name="Title 1"/>
+          <p:cNvSpPr>
+            <a:spLocks noGrp="1"/>
+          </p:cNvSpPr>
+          <p:nvPr>
+            <p:ph type="ctrTitle"/>
+          </p:nvPr>
+        </p:nvSpPr>
+        <p:spPr/>
+        <p:txBody>
+          <a:bodyPr/>
+          <a:lstStyle/>
+          <a:p>
+            <a:r>
+              <a:t> </a:t>
+            </a:r>
+          </a:p>
+        </p:txBody>
+      </p:sp>
+      <p:sp>
+        <p:nvSpPr>
+          <p:cNvPr id="3" name="Subtitle 2"/>
+          <p:cNvSpPr>
+            <a:spLocks noGrp="1"/>
+          </p:cNvSpPr>
+          <p:nvPr>
+            <p:ph type="subTitle" idx="1"/>
+          </p:nvPr>
+        </p:nvSpPr>
+        <p:spPr/>
+        <p:txBody>
+          <a:bodyPr/>
+          <a:lstStyle/>
+          <a:p>
+            <a:r>
+              <a:t>The album was a critical and commercial success, and debuted at number one on the Billboard 200 with first-week sales of 1.21 million copies.</a:t>
+            </a:r>
+          </a:p>
+        </p:txBody>
+      </p:sp>
+    </p:spTree>
+  </p:cSld>
+  <p:clrMapOvr>
+    <a:masterClrMapping/>
+  </p:clrMapOvr>
+</p:sld>
+</file>
+
+<file path=ppt/slides/slide104.xml><?xml version="1.0" encoding="utf-8"?>
+<p:sld xmlns:a="http://schemas.openxmlformats.org/drawingml/2006/main" xmlns:p="http://schemas.openxmlformats.org/presentationml/2006/main" xmlns:r="http://schemas.openxmlformats.org/officeDocument/2006/relationships">
+  <p:cSld>
+    <p:spTree>
+      <p:nvGrpSpPr>
+        <p:cNvPr id="1" name=""/>
+        <p:cNvGrpSpPr/>
+        <p:nvPr/>
+      </p:nvGrpSpPr>
+      <p:grpSpPr/>
+      <p:sp>
+        <p:nvSpPr>
+          <p:cNvPr id="2" name="Title 1"/>
+          <p:cNvSpPr>
+            <a:spLocks noGrp="1"/>
+          </p:cNvSpPr>
+          <p:nvPr>
+            <p:ph type="ctrTitle"/>
+          </p:nvPr>
+        </p:nvSpPr>
+        <p:spPr/>
+        <p:txBody>
+          <a:bodyPr/>
+          <a:lstStyle/>
+          <a:p>
+            <a:r>
+              <a:t> </a:t>
+            </a:r>
+          </a:p>
+        </p:txBody>
+      </p:sp>
+      <p:sp>
+        <p:nvSpPr>
+          <p:cNvPr id="3" name="Subtitle 2"/>
+          <p:cNvSpPr>
+            <a:spLocks noGrp="1"/>
+          </p:cNvSpPr>
+          <p:nvPr>
+            <p:ph type="subTitle" idx="1"/>
+          </p:nvPr>
+        </p:nvSpPr>
+        <p:spPr/>
+        <p:txBody>
+          <a:bodyPr/>
+          <a:lstStyle/>
+          <a:p>
+            <a:r>
+              <a:t>This marked the highest opening sales in a decade in the United States, and made Swift the first female to have two million-selling album openings, a record recognized by the Guinness Book of World Records.</a:t>
+            </a:r>
+          </a:p>
+        </p:txBody>
+      </p:sp>
+    </p:spTree>
+  </p:cSld>
+  <p:clrMapOvr>
+    <a:masterClrMapping/>
+  </p:clrMapOvr>
+</p:sld>
+</file>
+
+<file path=ppt/slides/slide105.xml><?xml version="1.0" encoding="utf-8"?>
+<p:sld xmlns:a="http://schemas.openxmlformats.org/drawingml/2006/main" xmlns:p="http://schemas.openxmlformats.org/presentationml/2006/main" xmlns:r="http://schemas.openxmlformats.org/officeDocument/2006/relationships">
+  <p:cSld>
+    <p:spTree>
+      <p:nvGrpSpPr>
+        <p:cNvPr id="1" name=""/>
+        <p:cNvGrpSpPr/>
+        <p:nvPr/>
+      </p:nvGrpSpPr>
+      <p:grpSpPr/>
+      <p:sp>
+        <p:nvSpPr>
+          <p:cNvPr id="2" name="Title 1"/>
+          <p:cNvSpPr>
+            <a:spLocks noGrp="1"/>
+          </p:cNvSpPr>
+          <p:nvPr>
+            <p:ph type="ctrTitle"/>
+          </p:nvPr>
+        </p:nvSpPr>
+        <p:spPr/>
+        <p:txBody>
+          <a:bodyPr/>
+          <a:lstStyle/>
+          <a:p>
+            <a:r>
+              <a:t> </a:t>
+            </a:r>
+          </a:p>
+        </p:txBody>
+      </p:sp>
+      <p:sp>
+        <p:nvSpPr>
+          <p:cNvPr id="3" name="Subtitle 2"/>
+          <p:cNvSpPr>
+            <a:spLocks noGrp="1"/>
+          </p:cNvSpPr>
+          <p:nvPr>
+            <p:ph type="subTitle" idx="1"/>
+          </p:nvPr>
+        </p:nvSpPr>
+        <p:spPr/>
+        <p:txBody>
+          <a:bodyPr/>
+          <a:lstStyle/>
+          <a:p>
+            <a:r>
+              <a:t>The song reached number one in Sweden and peaked at number two in the United States.</a:t>
+            </a:r>
+          </a:p>
+        </p:txBody>
+      </p:sp>
+    </p:spTree>
+  </p:cSld>
+  <p:clrMapOvr>
+    <a:masterClrMapping/>
+  </p:clrMapOvr>
+</p:sld>
+</file>
+
+<file path=ppt/slides/slide106.xml><?xml version="1.0" encoding="utf-8"?>
+<p:sld xmlns:a="http://schemas.openxmlformats.org/drawingml/2006/main" xmlns:p="http://schemas.openxmlformats.org/presentationml/2006/main" xmlns:r="http://schemas.openxmlformats.org/officeDocument/2006/relationships">
+  <p:cSld>
+    <p:spTree>
+      <p:nvGrpSpPr>
+        <p:cNvPr id="1" name=""/>
+        <p:cNvGrpSpPr/>
+        <p:nvPr/>
+      </p:nvGrpSpPr>
+      <p:grpSpPr/>
+      <p:sp>
+        <p:nvSpPr>
+          <p:cNvPr id="2" name="Title 1"/>
+          <p:cNvSpPr>
+            <a:spLocks noGrp="1"/>
+          </p:cNvSpPr>
+          <p:nvPr>
+            <p:ph type="ctrTitle"/>
+          </p:nvPr>
+        </p:nvSpPr>
+        <p:spPr/>
+        <p:txBody>
+          <a:bodyPr/>
+          <a:lstStyle/>
+          <a:p>
+            <a:r>
+              <a:t> </a:t>
+            </a:r>
+          </a:p>
+        </p:txBody>
+      </p:sp>
+      <p:sp>
+        <p:nvSpPr>
+          <p:cNvPr id="3" name="Subtitle 2"/>
+          <p:cNvSpPr>
+            <a:spLocks noGrp="1"/>
+          </p:cNvSpPr>
+          <p:nvPr>
+            <p:ph type="subTitle" idx="1"/>
+          </p:nvPr>
+        </p:nvSpPr>
+        <p:spPr/>
+        <p:txBody>
+          <a:bodyPr/>
+          <a:lstStyle/>
+          <a:p>
+            <a:r>
+              <a:t>", which charted at number three in Australia and at number four in the United States.</a:t>
+            </a:r>
+          </a:p>
+        </p:txBody>
+      </p:sp>
+    </p:spTree>
+  </p:cSld>
+  <p:clrMapOvr>
+    <a:masterClrMapping/>
+  </p:clrMapOvr>
+</p:sld>
+</file>
+
+<file path=ppt/slides/slide107.xml><?xml version="1.0" encoding="utf-8"?>
+<p:sld xmlns:a="http://schemas.openxmlformats.org/drawingml/2006/main" xmlns:p="http://schemas.openxmlformats.org/presentationml/2006/main" xmlns:r="http://schemas.openxmlformats.org/officeDocument/2006/relationships">
+  <p:cSld>
+    <p:spTree>
+      <p:nvGrpSpPr>
+        <p:cNvPr id="1" name=""/>
+        <p:cNvGrpSpPr/>
+        <p:nvPr/>
+      </p:nvGrpSpPr>
+      <p:grpSpPr/>
+      <p:sp>
+        <p:nvSpPr>
+          <p:cNvPr id="2" name="Title 1"/>
+          <p:cNvSpPr>
+            <a:spLocks noGrp="1"/>
+          </p:cNvSpPr>
+          <p:nvPr>
+            <p:ph type="ctrTitle"/>
+          </p:nvPr>
+        </p:nvSpPr>
+        <p:spPr/>
+        <p:txBody>
+          <a:bodyPr/>
+          <a:lstStyle/>
+          <a:p>
+            <a:r>
+              <a:t> </a:t>
+            </a:r>
+          </a:p>
+        </p:txBody>
+      </p:sp>
+      <p:sp>
+        <p:nvSpPr>
+          <p:cNvPr id="3" name="Subtitle 2"/>
+          <p:cNvSpPr>
+            <a:spLocks noGrp="1"/>
+          </p:cNvSpPr>
+          <p:nvPr>
+            <p:ph type="subTitle" idx="1"/>
+          </p:nvPr>
+        </p:nvSpPr>
+        <p:spPr/>
+        <p:txBody>
+          <a:bodyPr/>
+          <a:lstStyle/>
+          <a:p>
+            <a:r>
+              <a:t>The album was released on November 10 and sold 1.216 million copies in the United States—becoming 2017's top-selling album (pure sales only) in the country—and 2 million copies worldwide during its first week.</a:t>
+            </a:r>
+          </a:p>
+        </p:txBody>
+      </p:sp>
+    </p:spTree>
+  </p:cSld>
+  <p:clrMapOvr>
+    <a:masterClrMapping/>
+  </p:clrMapOvr>
+</p:sld>
+</file>
+
+<file path=ppt/slides/slide108.xml><?xml version="1.0" encoding="utf-8"?>
+<p:sld xmlns:a="http://schemas.openxmlformats.org/drawingml/2006/main" xmlns:p="http://schemas.openxmlformats.org/presentationml/2006/main" xmlns:r="http://schemas.openxmlformats.org/officeDocument/2006/relationships">
+  <p:cSld>
+    <p:spTree>
+      <p:nvGrpSpPr>
+        <p:cNvPr id="1" name=""/>
+        <p:cNvGrpSpPr/>
+        <p:nvPr/>
+      </p:nvGrpSpPr>
+      <p:grpSpPr/>
+      <p:sp>
+        <p:nvSpPr>
+          <p:cNvPr id="2" name="Title 1"/>
+          <p:cNvSpPr>
+            <a:spLocks noGrp="1"/>
+          </p:cNvSpPr>
+          <p:nvPr>
+            <p:ph type="ctrTitle"/>
+          </p:nvPr>
+        </p:nvSpPr>
+        <p:spPr/>
+        <p:txBody>
+          <a:bodyPr/>
+          <a:lstStyle/>
+          <a:p>
+            <a:r>
+              <a:t> </a:t>
+            </a:r>
+          </a:p>
+        </p:txBody>
+      </p:sp>
+      <p:sp>
+        <p:nvSpPr>
+          <p:cNvPr id="3" name="Subtitle 2"/>
+          <p:cNvSpPr>
+            <a:spLocks noGrp="1"/>
+          </p:cNvSpPr>
+          <p:nvPr>
+            <p:ph type="subTitle" idx="1"/>
+          </p:nvPr>
+        </p:nvSpPr>
+        <p:spPr/>
+        <p:txBody>
+          <a:bodyPr/>
+          <a:lstStyle/>
+          <a:p>
+            <a:r>
+              <a:t>In early November, Swift released a compilation album titled reputation Stadium Tour Surprise Song Playlist for digital streaming only on all streaming platforms.</a:t>
+            </a:r>
+          </a:p>
+        </p:txBody>
+      </p:sp>
+    </p:spTree>
+  </p:cSld>
+  <p:clrMapOvr>
+    <a:masterClrMapping/>
+  </p:clrMapOvr>
+</p:sld>
+</file>
+
+<file path=ppt/slides/slide109.xml><?xml version="1.0" encoding="utf-8"?>
+<p:sld xmlns:a="http://schemas.openxmlformats.org/drawingml/2006/main" xmlns:p="http://schemas.openxmlformats.org/presentationml/2006/main" xmlns:r="http://schemas.openxmlformats.org/officeDocument/2006/relationships">
+  <p:cSld>
+    <p:spTree>
+      <p:nvGrpSpPr>
+        <p:cNvPr id="1" name=""/>
+        <p:cNvGrpSpPr/>
+        <p:nvPr/>
+      </p:nvGrpSpPr>
+      <p:grpSpPr/>
+      <p:sp>
+        <p:nvSpPr>
+          <p:cNvPr id="2" name="Title 1"/>
+          <p:cNvSpPr>
+            <a:spLocks noGrp="1"/>
+          </p:cNvSpPr>
+          <p:nvPr>
+            <p:ph type="ctrTitle"/>
+          </p:nvPr>
+        </p:nvSpPr>
+        <p:spPr/>
+        <p:txBody>
+          <a:bodyPr/>
+          <a:lstStyle/>
+          <a:p>
+            <a:r>
+              <a:t> </a:t>
+            </a:r>
+          </a:p>
+        </p:txBody>
+      </p:sp>
+      <p:sp>
+        <p:nvSpPr>
+          <p:cNvPr id="3" name="Subtitle 2"/>
+          <p:cNvSpPr>
+            <a:spLocks noGrp="1"/>
+          </p:cNvSpPr>
+          <p:nvPr>
+            <p:ph type="subTitle" idx="1"/>
+          </p:nvPr>
+        </p:nvSpPr>
+        <p:spPr/>
+        <p:txBody>
+          <a:bodyPr/>
+          <a:lstStyle/>
+          <a:p>
+            <a:r>
+              <a:t>In November 2018, Swift signed a new multi-album deal with Big Machine's distributor Universal Music Group; in the United States, her future releases will be promoted under the Republic Records imprint.</a:t>
             </a:r>
           </a:p>
         </p:txBody>
@@ -5272,7 +5902,451 @@
           <a:lstStyle/>
           <a:p>
             <a:r>
-              <a:t>She contributed a cover of the song "Cruella de Vil" to the compilation album DisneyMania 6, and later recorded the original song "Fly to Your Heart" for the soundtrack of the animated film Tinker Bell.</a:t>
+              <a:t>Other singles from the album include "New Year's Day" and "Delicate", the former of which was released exclusively to country radio.</a:t>
+            </a:r>
+          </a:p>
+        </p:txBody>
+      </p:sp>
+    </p:spTree>
+  </p:cSld>
+  <p:clrMapOvr>
+    <a:masterClrMapping/>
+  </p:clrMapOvr>
+</p:sld>
+</file>
+
+<file path=ppt/slides/slide110.xml><?xml version="1.0" encoding="utf-8"?>
+<p:sld xmlns:a="http://schemas.openxmlformats.org/drawingml/2006/main" xmlns:p="http://schemas.openxmlformats.org/presentationml/2006/main" xmlns:r="http://schemas.openxmlformats.org/officeDocument/2006/relationships">
+  <p:cSld>
+    <p:spTree>
+      <p:nvGrpSpPr>
+        <p:cNvPr id="1" name=""/>
+        <p:cNvGrpSpPr/>
+        <p:nvPr/>
+      </p:nvGrpSpPr>
+      <p:grpSpPr/>
+      <p:sp>
+        <p:nvSpPr>
+          <p:cNvPr id="2" name="Title 1"/>
+          <p:cNvSpPr>
+            <a:spLocks noGrp="1"/>
+          </p:cNvSpPr>
+          <p:nvPr>
+            <p:ph type="ctrTitle"/>
+          </p:nvPr>
+        </p:nvSpPr>
+        <p:spPr/>
+        <p:txBody>
+          <a:bodyPr/>
+          <a:lstStyle/>
+          <a:p>
+            <a:r>
+              <a:t> </a:t>
+            </a:r>
+          </a:p>
+        </p:txBody>
+      </p:sp>
+      <p:sp>
+        <p:nvSpPr>
+          <p:cNvPr id="3" name="Subtitle 2"/>
+          <p:cNvSpPr>
+            <a:spLocks noGrp="1"/>
+          </p:cNvSpPr>
+          <p:nvPr>
+            <p:ph type="subTitle" idx="1"/>
+          </p:nvPr>
+        </p:nvSpPr>
+        <p:spPr/>
+        <p:txBody>
+          <a:bodyPr/>
+          <a:lstStyle/>
+          <a:p>
+            <a:r>
+              <a:t>In 2011, Swift used a dress rehearsal of her Speak Now tour as a benefit concert for victims of recent tornadoes in the United States, raising more than $750,000.</a:t>
+            </a:r>
+          </a:p>
+        </p:txBody>
+      </p:sp>
+    </p:spTree>
+  </p:cSld>
+  <p:clrMapOvr>
+    <a:masterClrMapping/>
+  </p:clrMapOvr>
+</p:sld>
+</file>
+
+<file path=ppt/slides/slide111.xml><?xml version="1.0" encoding="utf-8"?>
+<p:sld xmlns:a="http://schemas.openxmlformats.org/drawingml/2006/main" xmlns:p="http://schemas.openxmlformats.org/presentationml/2006/main" xmlns:r="http://schemas.openxmlformats.org/officeDocument/2006/relationships">
+  <p:cSld>
+    <p:spTree>
+      <p:nvGrpSpPr>
+        <p:cNvPr id="1" name=""/>
+        <p:cNvGrpSpPr/>
+        <p:nvPr/>
+      </p:nvGrpSpPr>
+      <p:grpSpPr/>
+      <p:sp>
+        <p:nvSpPr>
+          <p:cNvPr id="2" name="Title 1"/>
+          <p:cNvSpPr>
+            <a:spLocks noGrp="1"/>
+          </p:cNvSpPr>
+          <p:nvPr>
+            <p:ph type="ctrTitle"/>
+          </p:nvPr>
+        </p:nvSpPr>
+        <p:spPr/>
+        <p:txBody>
+          <a:bodyPr/>
+          <a:lstStyle/>
+          <a:p>
+            <a:r>
+              <a:t> </a:t>
+            </a:r>
+          </a:p>
+        </p:txBody>
+      </p:sp>
+      <p:sp>
+        <p:nvSpPr>
+          <p:cNvPr id="3" name="Subtitle 2"/>
+          <p:cNvSpPr>
+            <a:spLocks noGrp="1"/>
+          </p:cNvSpPr>
+          <p:nvPr>
+            <p:ph type="subTitle" idx="1"/>
+          </p:nvPr>
+        </p:nvSpPr>
+        <p:spPr/>
+        <p:txBody>
+          <a:bodyPr/>
+          <a:lstStyle/>
+          <a:p>
+            <a:r>
+              <a:t>While promoting Reputation, Swift released a series of behind the scenes videos showing the album recording process through DirecTV.</a:t>
+            </a:r>
+          </a:p>
+        </p:txBody>
+      </p:sp>
+    </p:spTree>
+  </p:cSld>
+  <p:clrMapOvr>
+    <a:masterClrMapping/>
+  </p:clrMapOvr>
+</p:sld>
+</file>
+
+<file path=ppt/slides/slide112.xml><?xml version="1.0" encoding="utf-8"?>
+<p:sld xmlns:a="http://schemas.openxmlformats.org/drawingml/2006/main" xmlns:p="http://schemas.openxmlformats.org/presentationml/2006/main" xmlns:r="http://schemas.openxmlformats.org/officeDocument/2006/relationships">
+  <p:cSld>
+    <p:spTree>
+      <p:nvGrpSpPr>
+        <p:cNvPr id="1" name=""/>
+        <p:cNvGrpSpPr/>
+        <p:nvPr/>
+      </p:nvGrpSpPr>
+      <p:grpSpPr/>
+      <p:sp>
+        <p:nvSpPr>
+          <p:cNvPr id="2" name="Title 1"/>
+          <p:cNvSpPr>
+            <a:spLocks noGrp="1"/>
+          </p:cNvSpPr>
+          <p:nvPr>
+            <p:ph type="ctrTitle"/>
+          </p:nvPr>
+        </p:nvSpPr>
+        <p:spPr/>
+        <p:txBody>
+          <a:bodyPr/>
+          <a:lstStyle/>
+          <a:p>
+            <a:r>
+              <a:t> </a:t>
+            </a:r>
+          </a:p>
+        </p:txBody>
+      </p:sp>
+      <p:sp>
+        <p:nvSpPr>
+          <p:cNvPr id="3" name="Subtitle 2"/>
+          <p:cNvSpPr>
+            <a:spLocks noGrp="1"/>
+          </p:cNvSpPr>
+          <p:nvPr>
+            <p:ph type="subTitle" idx="1"/>
+          </p:nvPr>
+        </p:nvSpPr>
+        <p:spPr/>
+        <p:txBody>
+          <a:bodyPr/>
+          <a:lstStyle/>
+          <a:p>
+            <a:r>
+              <a:t>Swift's studio albums Taylor Swift, Fearless, Speak Now, Red, and 1989 have all sold over 4 million copies in the US.</a:t>
+            </a:r>
+          </a:p>
+        </p:txBody>
+      </p:sp>
+    </p:spTree>
+  </p:cSld>
+  <p:clrMapOvr>
+    <a:masterClrMapping/>
+  </p:clrMapOvr>
+</p:sld>
+</file>
+
+<file path=ppt/slides/slide113.xml><?xml version="1.0" encoding="utf-8"?>
+<p:sld xmlns:a="http://schemas.openxmlformats.org/drawingml/2006/main" xmlns:p="http://schemas.openxmlformats.org/presentationml/2006/main" xmlns:r="http://schemas.openxmlformats.org/officeDocument/2006/relationships">
+  <p:cSld>
+    <p:spTree>
+      <p:nvGrpSpPr>
+        <p:cNvPr id="1" name=""/>
+        <p:cNvGrpSpPr/>
+        <p:nvPr/>
+      </p:nvGrpSpPr>
+      <p:grpSpPr/>
+      <p:sp>
+        <p:nvSpPr>
+          <p:cNvPr id="2" name="Title 1"/>
+          <p:cNvSpPr>
+            <a:spLocks noGrp="1"/>
+          </p:cNvSpPr>
+          <p:nvPr>
+            <p:ph type="ctrTitle"/>
+          </p:nvPr>
+        </p:nvSpPr>
+        <p:spPr/>
+        <p:txBody>
+          <a:bodyPr/>
+          <a:lstStyle/>
+          <a:p>
+            <a:r>
+              <a:t> </a:t>
+            </a:r>
+          </a:p>
+        </p:txBody>
+      </p:sp>
+      <p:sp>
+        <p:nvSpPr>
+          <p:cNvPr id="3" name="Subtitle 2"/>
+          <p:cNvSpPr>
+            <a:spLocks noGrp="1"/>
+          </p:cNvSpPr>
+          <p:nvPr>
+            <p:ph type="subTitle" idx="1"/>
+          </p:nvPr>
+        </p:nvSpPr>
+        <p:spPr/>
+        <p:txBody>
+          <a:bodyPr/>
+          <a:lstStyle/>
+          <a:p>
+            <a:r>
+              <a:t> </a:t>
+            </a:r>
+          </a:p>
+        </p:txBody>
+      </p:sp>
+      <p:pic>
+        <p:nvPicPr>
+          <p:cNvPr id="4" name="Picture 3" descr="image2.jpg"/>
+          <p:cNvPicPr>
+            <a:picLocks noChangeAspect="1"/>
+          </p:cNvPicPr>
+          <p:nvPr/>
+        </p:nvPicPr>
+        <p:blipFill>
+          <a:blip r:embed="rId2"/>
+          <a:stretch>
+            <a:fillRect/>
+          </a:stretch>
+        </p:blipFill>
+        <p:spPr>
+          <a:xfrm>
+            <a:off x="914400" y="1828800"/>
+            <a:ext cx="3657600" cy="3657600"/>
+          </a:xfrm>
+          <a:prstGeom prst="rect">
+            <a:avLst/>
+          </a:prstGeom>
+        </p:spPr>
+      </p:pic>
+    </p:spTree>
+  </p:cSld>
+  <p:clrMapOvr>
+    <a:masterClrMapping/>
+  </p:clrMapOvr>
+</p:sld>
+</file>
+
+<file path=ppt/slides/slide114.xml><?xml version="1.0" encoding="utf-8"?>
+<p:sld xmlns:a="http://schemas.openxmlformats.org/drawingml/2006/main" xmlns:p="http://schemas.openxmlformats.org/presentationml/2006/main" xmlns:r="http://schemas.openxmlformats.org/officeDocument/2006/relationships">
+  <p:cSld>
+    <p:spTree>
+      <p:nvGrpSpPr>
+        <p:cNvPr id="1" name=""/>
+        <p:cNvGrpSpPr/>
+        <p:nvPr/>
+      </p:nvGrpSpPr>
+      <p:grpSpPr/>
+      <p:sp>
+        <p:nvSpPr>
+          <p:cNvPr id="2" name="Title 1"/>
+          <p:cNvSpPr>
+            <a:spLocks noGrp="1"/>
+          </p:cNvSpPr>
+          <p:nvPr>
+            <p:ph type="ctrTitle"/>
+          </p:nvPr>
+        </p:nvSpPr>
+        <p:spPr/>
+        <p:txBody>
+          <a:bodyPr/>
+          <a:lstStyle/>
+          <a:p>
+            <a:r>
+              <a:t>DISADVANTAGES</a:t>
+            </a:r>
+          </a:p>
+        </p:txBody>
+      </p:sp>
+      <p:sp>
+        <p:nvSpPr>
+          <p:cNvPr id="3" name="Subtitle 2"/>
+          <p:cNvSpPr>
+            <a:spLocks noGrp="1"/>
+          </p:cNvSpPr>
+          <p:nvPr>
+            <p:ph type="subTitle" idx="1"/>
+          </p:nvPr>
+        </p:nvSpPr>
+        <p:spPr/>
+        <p:txBody>
+          <a:bodyPr/>
+          <a:lstStyle/>
+          <a:p>
+            <a:r>
+              <a:t> </a:t>
+            </a:r>
+          </a:p>
+        </p:txBody>
+      </p:sp>
+    </p:spTree>
+  </p:cSld>
+  <p:clrMapOvr>
+    <a:masterClrMapping/>
+  </p:clrMapOvr>
+</p:sld>
+</file>
+
+<file path=ppt/slides/slide115.xml><?xml version="1.0" encoding="utf-8"?>
+<p:sld xmlns:a="http://schemas.openxmlformats.org/drawingml/2006/main" xmlns:p="http://schemas.openxmlformats.org/presentationml/2006/main" xmlns:r="http://schemas.openxmlformats.org/officeDocument/2006/relationships">
+  <p:cSld>
+    <p:spTree>
+      <p:nvGrpSpPr>
+        <p:cNvPr id="1" name=""/>
+        <p:cNvGrpSpPr/>
+        <p:nvPr/>
+      </p:nvGrpSpPr>
+      <p:grpSpPr/>
+      <p:sp>
+        <p:nvSpPr>
+          <p:cNvPr id="2" name="Title 1"/>
+          <p:cNvSpPr>
+            <a:spLocks noGrp="1"/>
+          </p:cNvSpPr>
+          <p:nvPr>
+            <p:ph type="ctrTitle"/>
+          </p:nvPr>
+        </p:nvSpPr>
+        <p:spPr/>
+        <p:txBody>
+          <a:bodyPr/>
+          <a:lstStyle/>
+          <a:p>
+            <a:r>
+              <a:t> </a:t>
+            </a:r>
+          </a:p>
+        </p:txBody>
+      </p:sp>
+      <p:sp>
+        <p:nvSpPr>
+          <p:cNvPr id="3" name="Subtitle 2"/>
+          <p:cNvSpPr>
+            <a:spLocks noGrp="1"/>
+          </p:cNvSpPr>
+          <p:nvPr>
+            <p:ph type="subTitle" idx="1"/>
+          </p:nvPr>
+        </p:nvSpPr>
+        <p:spPr/>
+        <p:txBody>
+          <a:bodyPr/>
+          <a:lstStyle/>
+          <a:p>
+            <a:r>
+              <a:t>Swift's music to indicate country—a few banjo strums, a pair of cowboy boots worn onstage, a bedazzled guitar—but there's something in her winsome, vulnerable delivery that's unique to Nashville".</a:t>
+            </a:r>
+          </a:p>
+        </p:txBody>
+      </p:sp>
+    </p:spTree>
+  </p:cSld>
+  <p:clrMapOvr>
+    <a:masterClrMapping/>
+  </p:clrMapOvr>
+</p:sld>
+</file>
+
+<file path=ppt/slides/slide116.xml><?xml version="1.0" encoding="utf-8"?>
+<p:sld xmlns:a="http://schemas.openxmlformats.org/drawingml/2006/main" xmlns:p="http://schemas.openxmlformats.org/presentationml/2006/main" xmlns:r="http://schemas.openxmlformats.org/officeDocument/2006/relationships">
+  <p:cSld>
+    <p:spTree>
+      <p:nvGrpSpPr>
+        <p:cNvPr id="1" name=""/>
+        <p:cNvGrpSpPr/>
+        <p:nvPr/>
+      </p:nvGrpSpPr>
+      <p:grpSpPr/>
+      <p:sp>
+        <p:nvSpPr>
+          <p:cNvPr id="2" name="Title 1"/>
+          <p:cNvSpPr>
+            <a:spLocks noGrp="1"/>
+          </p:cNvSpPr>
+          <p:nvPr>
+            <p:ph type="ctrTitle"/>
+          </p:nvPr>
+        </p:nvSpPr>
+        <p:spPr/>
+        <p:txBody>
+          <a:bodyPr/>
+          <a:lstStyle/>
+          <a:p>
+            <a:r>
+              <a:t> </a:t>
+            </a:r>
+          </a:p>
+        </p:txBody>
+      </p:sp>
+      <p:sp>
+        <p:nvSpPr>
+          <p:cNvPr id="3" name="Subtitle 2"/>
+          <p:cNvSpPr>
+            <a:spLocks noGrp="1"/>
+          </p:cNvSpPr>
+          <p:nvPr>
+            <p:ph type="subTitle" idx="1"/>
+          </p:nvPr>
+        </p:nvSpPr>
+        <p:spPr/>
+        <p:txBody>
+          <a:bodyPr/>
+          <a:lstStyle/>
+          <a:p>
+            <a:r>
+              <a:t>Its singles "Shake It Off", "Blank Space", and "Bad Blood" reached number one in the US, Australia, and Canada.</a:t>
             </a:r>
           </a:p>
         </p:txBody>
@@ -5332,7 +6406,7 @@
           <a:lstStyle/>
           <a:p>
             <a:r>
-              <a:t>She had a leading role as an aspiring dancer Mary Santiago in the direct-to-video film Another Cinderella Story, a sequel to A Cinderella Story, starring Hilary Duff and Chad Michael Murray and the second installment of A Cinderella Story series.</a:t>
+              <a:t>Swift also explored the music of older country stars, including Patsy Cline, Loretta Lynn, Dolly Parton, and Tammy Wynette.</a:t>
             </a:r>
           </a:p>
         </p:txBody>
@@ -5392,7 +6466,7 @@
           <a:lstStyle/>
           <a:p>
             <a:r>
-              <a:t>Gomez recorded three songs for the soundtrack, and released one of them, "Tell Me Something I Don't Know", as a promotional single.</a:t>
+              <a:t>Swift has also been influenced by many artists outside the country genre.</a:t>
             </a:r>
           </a:p>
         </p:txBody>
@@ -5452,7 +6526,7 @@
           <a:lstStyle/>
           <a:p>
             <a:r>
-              <a:t>She later announced a film adaptation of the novel Thirteen Reasons Why, in which she was to play a young girl who commits suicide; ultimately, neither film was made, though Gomez would later executive produce a television adaptation of Thirteen Reasons Why.</a:t>
+              <a:t>Swift's music contains elements of pop, pop rock, and country.</a:t>
             </a:r>
           </a:p>
         </p:txBody>
@@ -5512,7 +6586,7 @@
           <a:lstStyle/>
           <a:p>
             <a:r>
-              <a:t>She later made a guest appearance on the Disney series Sonny With a Chance, starring Lovato.</a:t>
+              <a:t>While presenting Swift an award for her humanitarian endeavors in 2012, Michelle Obama described her as a singer who "has rocketed to the top of the music industry but still keeps her feet on the ground, someone who has shattered every expectation of what a 22-year-old can accomplish".</a:t>
             </a:r>
           </a:p>
         </p:txBody>
@@ -5572,7 +6646,7 @@
           <a:lstStyle/>
           <a:p>
             <a:r>
-              <a:t>Gomez, along with Lovato, starred in the Disney Channel film Princess Protection Program, which aired in June 2009.</a:t>
+              <a:t>Swift's philanthropic efforts have been recognized by the Do Something Awards and the Tennessee Disaster Services.</a:t>
             </a:r>
           </a:p>
         </p:txBody>
@@ -5632,7 +6706,7 @@
           <a:lstStyle/>
           <a:p>
             <a:r>
-              <a:t>For the film, Gomez and Lovato recorded the song "One and the Same", which was later released as a promotional single.</a:t>
+              <a:t>Swift has sold more than 50 million albums, 150 million single downloads, and was one of the top five music artists with the highest worldwide digital sales.</a:t>
             </a:r>
           </a:p>
         </p:txBody>
@@ -5692,7 +6766,7 @@
           <a:lstStyle/>
           <a:p>
             <a:r>
-              <a:t>On August 28, 2009, Gomez starred in Wizards of Waverly Place: The Movie, a television film based on the series.</a:t>
+              <a:t>Her 2006 self-titled debut album peaked at number five on the Billboard 200 and spent the most weeks on the chart in the 2000s.</a:t>
             </a:r>
           </a:p>
         </p:txBody>
@@ -5752,7 +6826,7 @@
           <a:lstStyle/>
           <a:p>
             <a:r>
-              <a:t>In 2010, Gomez starred as one of the two female leads in Ramona and Beezus, a film adaption of the children's novel series by Beverly Cleary.</a:t>
+              <a:t>The album's third single, "Our Song", made her the youngest person to single-handedly write and perform a number-one song on the Hot Country Songs chart.</a:t>
             </a:r>
           </a:p>
         </p:txBody>
@@ -5834,7 +6908,7 @@
         <p:spPr>
           <a:xfrm>
             <a:off x="914400" y="1828800"/>
-            <a:ext cx="2859701" cy="3657600"/>
+            <a:ext cx="2057400" cy="3657600"/>
           </a:xfrm>
           <a:prstGeom prst="rect">
             <a:avLst/>
@@ -5896,7 +6970,7 @@
           <a:lstStyle/>
           <a:p>
             <a:r>
-              <a:t>Gomez appeared in a cameo role in the film The Muppets and appeared in the Disney shows So Random!</a:t>
+              <a:t>Swift's sixth album, Reputation (2017) and its lead single "Look What You Made Me Do" topped the UK and US charts; with the former, she became the first act to have four albums sell one million copies within one week in the US.</a:t>
             </a:r>
           </a:p>
         </p:txBody>
@@ -5956,7 +7030,7 @@
           <a:lstStyle/>
           <a:p>
             <a:r>
-              <a:t>Gomez hoped to focus on her film career outside Disney and starred in the animated film Hotel Transylvania (2012).</a:t>
+              <a:t>Swift is one of the best-selling music artists of all time, having sold more than 50 million albums—including 27.8 million in the US—and 150 million single downloads.</a:t>
             </a:r>
           </a:p>
         </p:txBody>
@@ -6016,7 +7090,7 @@
           <a:lstStyle/>
           <a:p>
             <a:r>
-              <a:t>Gomez had a role in the controversial exploitation film Spring Breakers (2013), starring James Franco.</a:t>
+              <a:t>Big Machine Records was still in its infancy during the June 2006 release of the lead single, "Tim McGraw", and Swift and her mother helped "stuff the CD singles into envelopes to send to radio".</a:t>
             </a:r>
           </a:p>
         </p:txBody>
@@ -6076,7 +7150,7 @@
           <a:lstStyle/>
           <a:p>
             <a:r>
-              <a:t>She later appeared in the film Rudderless (2014), the directorial debut of William H.</a:t>
+              <a:t>Following "Tim McGraw", four more singles were released throughout 2007 and 2008: "Teardrops on My Guitar", "Our Song", "Picture to Burn" and "Should've Said No".</a:t>
             </a:r>
           </a:p>
         </p:txBody>
@@ -6136,7 +7210,7 @@
           <a:lstStyle/>
           <a:p>
             <a:r>
-              <a:t>She reprised the role of Mavis in Hotel Transylvania 2, which was released on September 25; the film was met with a positive critical and commercial reception upon its release.</a:t>
+              <a:t>For the former, Swift became the youngest person to single-handedly write and perform a number-one song on the chart.</a:t>
             </a:r>
           </a:p>
         </p:txBody>
@@ -6196,7 +7270,7 @@
           <a:lstStyle/>
           <a:p>
             <a:r>
-              <a:t>Gomez had a cameo role in the film The Big Short, which was released on December 11 by Paramount Pictures.</a:t>
+              <a:t>Four more singles were released throughout 2008 and 2009: "White Horse", "You Belong with Me", "Fifteen" and "Fearless".</a:t>
             </a:r>
           </a:p>
         </p:txBody>
@@ -6256,7 +7330,7 @@
           <a:lstStyle/>
           <a:p>
             <a:r>
-              <a:t>Gomez and Kygo confirmed the single titled "It Ain't Me" via their social media accounts a week later, which was released on February 16.</a:t>
+              <a:t>"You Belong with Me" was the album's highest-charting single on the Billboard Hot 100, peaking at number two.</a:t>
             </a:r>
           </a:p>
         </p:txBody>
@@ -6316,7 +7390,7 @@
           <a:lstStyle/>
           <a:p>
             <a:r>
-              <a:t>In August 2017, Gomez was cast in A Rainy Day in New York, a film directed by Woody Allen for Amazon Studios.</a:t>
+              <a:t>The album received promotion from Swift's first concert tour, the Fearless Tour, which grossed over $63 million.</a:t>
             </a:r>
           </a:p>
         </p:txBody>
@@ -6376,7 +7450,7 @@
           <a:lstStyle/>
           <a:p>
             <a:r>
-              <a:t>On October 19, 2017, Gomez and EDM producer Marshmello announced that they would be collaborating on a new track titled "Wolves," which was released on October 25.</a:t>
+              <a:t>Swift contributed backing vocals to John Mayer's "Half of My Heart", a single featured on his fourth album, Battle Studies (2009).</a:t>
             </a:r>
           </a:p>
         </p:txBody>
@@ -6436,7 +7510,7 @@
           <a:lstStyle/>
           <a:p>
             <a:r>
-              <a:t>Gomez was featured on the Benny Blanco song "I Can't Get Enough", alongside Tainy and J Balvin, which was released in February 2019.</a:t>
+              <a:t>In August 2010, Swift released "Mine", the lead single from her third studio album, Speak Now.</a:t>
             </a:r>
           </a:p>
         </p:txBody>
@@ -6556,7 +7630,7 @@
           <a:lstStyle/>
           <a:p>
             <a:r>
-              <a:t>Gomez also appeared in ads for Coca-Cola's "Share a Coke" campaign, and she appeared in advertisements for the campaign and lyrics from two of her songs will be featured on packages of Coca-Cola products nationwide.</a:t>
+              <a:t>Three of the album's singles, "Mine", "Back to December", and "Mean", peaked in the top ten in Canada.</a:t>
             </a:r>
           </a:p>
         </p:txBody>
@@ -6616,7 +7690,7 @@
           <a:lstStyle/>
           <a:p>
             <a:r>
-              <a:t>Gomez later stated in 2017 that she did not like the term "religion" and that sometimes it "freaks me out", adding "I don't know if it's necessarily that I believe in religion, as much as I believe in faith and a relationship with God.</a:t>
+              <a:t>In November 2011, Swift released her first live album, Speak Now World Tour: Live.</a:t>
             </a:r>
           </a:p>
         </p:txBody>
@@ -6676,7 +7750,7 @@
           <a:lstStyle/>
           <a:p>
             <a:r>
-              <a:t>The Weeknd released My Dear Melancholy, in March 2018, which—according to media outlets—referenced Gomez in several songs.</a:t>
+              <a:t>In August, Swift released "We Are Never Ever Getting Back Together", the lead single from her fourth studio album, Red.</a:t>
             </a:r>
           </a:p>
         </p:txBody>
@@ -6736,7 +7810,7 @@
           <a:lstStyle/>
           <a:p>
             <a:r>
-              <a:t>As a solo artist, Gomez has released the two number-one albums Stars Dance (2013) and Revival (2015).</a:t>
+              <a:t>Swift released the album's second single, "Begin Again", in October.</a:t>
             </a:r>
           </a:p>
         </p:txBody>
@@ -6796,7 +7870,7 @@
           <a:lstStyle/>
           <a:p>
             <a:r>
-              <a:t>In 2017, Billboard reported that Gomez has sold over 7 million albums and 22 million singles worldwide.</a:t>
+              <a:t>Other singles released from the album include "I Knew You Were Trouble", "22", "Everything Has Changed", "The Last Time", and "Red".</a:t>
             </a:r>
           </a:p>
         </p:txBody>
@@ -6856,7 +7930,7 @@
           <a:lstStyle/>
           <a:p>
             <a:r>
-              <a:t>Gomez recorded three songs for the soundtrack, and released one of them, "Tell Me Something I Don't Know", as a promotional single.</a:t>
+              <a:t>1989 sold 1.28 million copies in the US during the first week of release and debuted atop the Billboard 200—this made Swift the first act to have three albums sell more than one million copies in their opening release week, for which she earned a Guinness World Record.</a:t>
             </a:r>
           </a:p>
         </p:txBody>
@@ -6916,7 +7990,7 @@
           <a:lstStyle/>
           <a:p>
             <a:r>
-              <a:t>For the film, Gomez and Lovato recorded the song "One and the Same", which was later released as a promotional single.</a:t>
+              <a:t>The album's lead single, "Shake It Off", was released in August 2014 and debuted at number one on the Billboard Hot 100.</a:t>
             </a:r>
           </a:p>
         </p:txBody>
@@ -6976,7 +8050,7 @@
           <a:lstStyle/>
           <a:p>
             <a:r>
-              <a:t>Selena Gomez &amp; the Scene released their second studio album A Year Without Rain that same year, which debuted on the US Billboard 200 at number 4 with sales of a little over 66,000.</a:t>
+              <a:t>The album also generated two additional number-one singles—"Blank Space" and "Bad Blood" (featuring Kendrick Lamar)—as well as the top-ten entries "Style" and "Wildest Dreams", and other singles "Out of the Woods" and "New Romantics".</a:t>
             </a:r>
           </a:p>
         </p:txBody>
@@ -7036,7 +8110,7 @@
           <a:lstStyle/>
           <a:p>
             <a:r>
-              <a:t>Selena Gomez &amp; the Scene released their third and final studio album that same year.</a:t>
+              <a:t>Two months later, Swift and British singer Zayn Malik released a single together called "I Don't Wanna Live Forever", for the soundtrack of the film Fifty Shades Darker (2017).</a:t>
             </a:r>
           </a:p>
         </p:txBody>
@@ -7096,7 +8170,7 @@
           <a:lstStyle/>
           <a:p>
             <a:r>
-              <a:t>The album received mixed reviews, with the album's second single receiving a 4x Platinum certification from the RIAA.</a:t>
+              <a:t>Swift thereafter cleared her social media accounts and released "Look What You Made Me Do" as the lead single from her sixth album, Reputation (stylized as reputation).</a:t>
             </a:r>
           </a:p>
         </p:txBody>
@@ -7156,7 +8230,7 @@
           <a:lstStyle/>
           <a:p>
             <a:r>
-              <a:t>Both Gomez and Lovato were later selected to appear on the series in 2002, with Gomez portraying the character of Gianna.</a:t>
+              <a:t>Born and raised in Pennsylvania, Swift moved to Nashville, Tennessee, at the age of 14 to pursue a career in country music.</a:t>
             </a:r>
           </a:p>
         </p:txBody>
@@ -7216,7 +8290,7 @@
           <a:lstStyle/>
           <a:p>
             <a:r>
-              <a:t>Gomez released "Come &amp; Get It" as the lead single from the album.</a:t>
+              <a:t>In October, Swift released the album's second single, "...Ready for It?</a:t>
             </a:r>
           </a:p>
         </p:txBody>
@@ -7276,7 +8350,7 @@
           <a:lstStyle/>
           <a:p>
             <a:r>
-              <a:t>The single became Gomez's first top ten entry on the Billboard Hot 100.</a:t>
+              <a:t>Two promotional singles were released from Reputation, "Gorgeous" and "Call It What You Want"; the former later became the album's fifth single, however only being released as such in Europe.</a:t>
             </a:r>
           </a:p>
         </p:txBody>
@@ -7336,7 +8410,7 @@
           <a:lstStyle/>
           <a:p>
             <a:r>
-              <a:t>Another single from the album, "Slow Down", peaked at number 27 in the Billboard charts.</a:t>
+              <a:t>Other singles from the album include "New Year's Day" and "Delicate", the former of which was released exclusively to country radio.</a:t>
             </a:r>
           </a:p>
         </p:txBody>
@@ -7396,7 +8470,7 @@
           <a:lstStyle/>
           <a:p>
             <a:r>
-              <a:t>It became her first album to debut at number one on the US Billboard 200 chart, where it sold 97,000 copies in its first week.</a:t>
+              <a:t>The tour broke multiple venue attendance and grossing records in the United States, earning $266.1 million and selling more than two million tickets.</a:t>
             </a:r>
           </a:p>
         </p:txBody>
@@ -7456,7 +8530,7 @@
           <a:lstStyle/>
           <a:p>
             <a:r>
-              <a:t>The album remained in the top ten in its second week, though declined down the chart in the following weeks.</a:t>
+              <a:t>The lead single from Swift's seventh studio album, "Me!"</a:t>
             </a:r>
           </a:p>
         </p:txBody>
@@ -7516,7 +8590,7 @@
           <a:lstStyle/>
           <a:p>
             <a:r>
-              <a:t>Gomez surprise released her new single "The Heart Wants What It Wants" (2014) on November 6, and confirmed after months of speculation that she would be releasing a compilation album as a means of finishing out her contract with Hollywood Records.</a:t>
+              <a:t>Swift has sold more than 50 million albums, 150 million single downloads, and was one of the top five music artists with the highest worldwide digital sales.</a:t>
             </a:r>
           </a:p>
         </p:txBody>
@@ -7576,7 +8650,7 @@
           <a:lstStyle/>
           <a:p>
             <a:r>
-              <a:t>Gomez released her first solo compilation album, For You (2014), on November 24.</a:t>
+              <a:t>She is the third best-selling digital singles artist in the US with a total of 106.5 million equivalent units certified according to Recording Industry Association of America.</a:t>
             </a:r>
           </a:p>
         </p:txBody>
@@ -7590,1026 +8664,6 @@
 </file>
 
 <file path=ppt/slides/slide47.xml><?xml version="1.0" encoding="utf-8"?>
-<p:sld xmlns:a="http://schemas.openxmlformats.org/drawingml/2006/main" xmlns:p="http://schemas.openxmlformats.org/presentationml/2006/main" xmlns:r="http://schemas.openxmlformats.org/officeDocument/2006/relationships">
-  <p:cSld>
-    <p:spTree>
-      <p:nvGrpSpPr>
-        <p:cNvPr id="1" name=""/>
-        <p:cNvGrpSpPr/>
-        <p:nvPr/>
-      </p:nvGrpSpPr>
-      <p:grpSpPr/>
-      <p:sp>
-        <p:nvSpPr>
-          <p:cNvPr id="2" name="Title 1"/>
-          <p:cNvSpPr>
-            <a:spLocks noGrp="1"/>
-          </p:cNvSpPr>
-          <p:nvPr>
-            <p:ph type="ctrTitle"/>
-          </p:nvPr>
-        </p:nvSpPr>
-        <p:spPr/>
-        <p:txBody>
-          <a:bodyPr/>
-          <a:lstStyle/>
-          <a:p>
-            <a:r>
-              <a:t> </a:t>
-            </a:r>
-          </a:p>
-        </p:txBody>
-      </p:sp>
-      <p:sp>
-        <p:nvSpPr>
-          <p:cNvPr id="3" name="Subtitle 2"/>
-          <p:cNvSpPr>
-            <a:spLocks noGrp="1"/>
-          </p:cNvSpPr>
-          <p:nvPr>
-            <p:ph type="subTitle" idx="1"/>
-          </p:nvPr>
-        </p:nvSpPr>
-        <p:spPr/>
-        <p:txBody>
-          <a:bodyPr/>
-          <a:lstStyle/>
-          <a:p>
-            <a:r>
-              <a:t>While working on her second studio album, Gomez collaborated with Zedd for his single "I Want You to Know" (2015), released as the lead single from his second album on February 23.</a:t>
-            </a:r>
-          </a:p>
-        </p:txBody>
-      </p:sp>
-    </p:spTree>
-  </p:cSld>
-  <p:clrMapOvr>
-    <a:masterClrMapping/>
-  </p:clrMapOvr>
-</p:sld>
-</file>
-
-<file path=ppt/slides/slide48.xml><?xml version="1.0" encoding="utf-8"?>
-<p:sld xmlns:a="http://schemas.openxmlformats.org/drawingml/2006/main" xmlns:p="http://schemas.openxmlformats.org/presentationml/2006/main" xmlns:r="http://schemas.openxmlformats.org/officeDocument/2006/relationships">
-  <p:cSld>
-    <p:spTree>
-      <p:nvGrpSpPr>
-        <p:cNvPr id="1" name=""/>
-        <p:cNvGrpSpPr/>
-        <p:nvPr/>
-      </p:nvGrpSpPr>
-      <p:grpSpPr/>
-      <p:sp>
-        <p:nvSpPr>
-          <p:cNvPr id="2" name="Title 1"/>
-          <p:cNvSpPr>
-            <a:spLocks noGrp="1"/>
-          </p:cNvSpPr>
-          <p:nvPr>
-            <p:ph type="ctrTitle"/>
-          </p:nvPr>
-        </p:nvSpPr>
-        <p:spPr/>
-        <p:txBody>
-          <a:bodyPr/>
-          <a:lstStyle/>
-          <a:p>
-            <a:r>
-              <a:t> </a:t>
-            </a:r>
-          </a:p>
-        </p:txBody>
-      </p:sp>
-      <p:sp>
-        <p:nvSpPr>
-          <p:cNvPr id="3" name="Subtitle 2"/>
-          <p:cNvSpPr>
-            <a:spLocks noGrp="1"/>
-          </p:cNvSpPr>
-          <p:nvPr>
-            <p:ph type="subTitle" idx="1"/>
-          </p:nvPr>
-        </p:nvSpPr>
-        <p:spPr/>
-        <p:txBody>
-          <a:bodyPr/>
-          <a:lstStyle/>
-          <a:p>
-            <a:r>
-              <a:t>The single became Gomez's fourth top twenty entry on the Billboard Hot 100, and received a platinum certification from the Recording Industry Association of America (RIAA).</a:t>
-            </a:r>
-          </a:p>
-        </p:txBody>
-      </p:sp>
-    </p:spTree>
-  </p:cSld>
-  <p:clrMapOvr>
-    <a:masterClrMapping/>
-  </p:clrMapOvr>
-</p:sld>
-</file>
-
-<file path=ppt/slides/slide49.xml><?xml version="1.0" encoding="utf-8"?>
-<p:sld xmlns:a="http://schemas.openxmlformats.org/drawingml/2006/main" xmlns:p="http://schemas.openxmlformats.org/presentationml/2006/main" xmlns:r="http://schemas.openxmlformats.org/officeDocument/2006/relationships">
-  <p:cSld>
-    <p:spTree>
-      <p:nvGrpSpPr>
-        <p:cNvPr id="1" name=""/>
-        <p:cNvGrpSpPr/>
-        <p:nvPr/>
-      </p:nvGrpSpPr>
-      <p:grpSpPr/>
-      <p:sp>
-        <p:nvSpPr>
-          <p:cNvPr id="2" name="Title 1"/>
-          <p:cNvSpPr>
-            <a:spLocks noGrp="1"/>
-          </p:cNvSpPr>
-          <p:nvPr>
-            <p:ph type="ctrTitle"/>
-          </p:nvPr>
-        </p:nvSpPr>
-        <p:spPr/>
-        <p:txBody>
-          <a:bodyPr/>
-          <a:lstStyle/>
-          <a:p>
-            <a:r>
-              <a:t> </a:t>
-            </a:r>
-          </a:p>
-        </p:txBody>
-      </p:sp>
-      <p:sp>
-        <p:nvSpPr>
-          <p:cNvPr id="3" name="Subtitle 2"/>
-          <p:cNvSpPr>
-            <a:spLocks noGrp="1"/>
-          </p:cNvSpPr>
-          <p:nvPr>
-            <p:ph type="subTitle" idx="1"/>
-          </p:nvPr>
-        </p:nvSpPr>
-        <p:spPr/>
-        <p:txBody>
-          <a:bodyPr/>
-          <a:lstStyle/>
-          <a:p>
-            <a:r>
-              <a:t>The song sold 179,000 copies in its first week of release alone, and went on to become her first top five single on the Billboard Hot 100 in the United States.</a:t>
-            </a:r>
-          </a:p>
-        </p:txBody>
-      </p:sp>
-    </p:spTree>
-  </p:cSld>
-  <p:clrMapOvr>
-    <a:masterClrMapping/>
-  </p:clrMapOvr>
-</p:sld>
-</file>
-
-<file path=ppt/slides/slide5.xml><?xml version="1.0" encoding="utf-8"?>
-<p:sld xmlns:a="http://schemas.openxmlformats.org/drawingml/2006/main" xmlns:p="http://schemas.openxmlformats.org/presentationml/2006/main" xmlns:r="http://schemas.openxmlformats.org/officeDocument/2006/relationships">
-  <p:cSld>
-    <p:spTree>
-      <p:nvGrpSpPr>
-        <p:cNvPr id="1" name=""/>
-        <p:cNvGrpSpPr/>
-        <p:nvPr/>
-      </p:nvGrpSpPr>
-      <p:grpSpPr/>
-      <p:sp>
-        <p:nvSpPr>
-          <p:cNvPr id="2" name="Title 1"/>
-          <p:cNvSpPr>
-            <a:spLocks noGrp="1"/>
-          </p:cNvSpPr>
-          <p:nvPr>
-            <p:ph type="ctrTitle"/>
-          </p:nvPr>
-        </p:nvSpPr>
-        <p:spPr/>
-        <p:txBody>
-          <a:bodyPr/>
-          <a:lstStyle/>
-          <a:p>
-            <a:r>
-              <a:t> </a:t>
-            </a:r>
-          </a:p>
-        </p:txBody>
-      </p:sp>
-      <p:sp>
-        <p:nvSpPr>
-          <p:cNvPr id="3" name="Subtitle 2"/>
-          <p:cNvSpPr>
-            <a:spLocks noGrp="1"/>
-          </p:cNvSpPr>
-          <p:nvPr>
-            <p:ph type="subTitle" idx="1"/>
-          </p:nvPr>
-        </p:nvSpPr>
-        <p:spPr/>
-        <p:txBody>
-          <a:bodyPr/>
-          <a:lstStyle/>
-          <a:p>
-            <a:r>
-              <a:t>" Gomez appeared in thirteen episodes of the show between 2002 and 2004, though the show's producers released her as she was getting "too old" for the series.</a:t>
-            </a:r>
-          </a:p>
-        </p:txBody>
-      </p:sp>
-    </p:spTree>
-  </p:cSld>
-  <p:clrMapOvr>
-    <a:masterClrMapping/>
-  </p:clrMapOvr>
-</p:sld>
-</file>
-
-<file path=ppt/slides/slide50.xml><?xml version="1.0" encoding="utf-8"?>
-<p:sld xmlns:a="http://schemas.openxmlformats.org/drawingml/2006/main" xmlns:p="http://schemas.openxmlformats.org/presentationml/2006/main" xmlns:r="http://schemas.openxmlformats.org/officeDocument/2006/relationships">
-  <p:cSld>
-    <p:spTree>
-      <p:nvGrpSpPr>
-        <p:cNvPr id="1" name=""/>
-        <p:cNvGrpSpPr/>
-        <p:nvPr/>
-      </p:nvGrpSpPr>
-      <p:grpSpPr/>
-      <p:sp>
-        <p:nvSpPr>
-          <p:cNvPr id="2" name="Title 1"/>
-          <p:cNvSpPr>
-            <a:spLocks noGrp="1"/>
-          </p:cNvSpPr>
-          <p:nvPr>
-            <p:ph type="ctrTitle"/>
-          </p:nvPr>
-        </p:nvSpPr>
-        <p:spPr/>
-        <p:txBody>
-          <a:bodyPr/>
-          <a:lstStyle/>
-          <a:p>
-            <a:r>
-              <a:t> </a:t>
-            </a:r>
-          </a:p>
-        </p:txBody>
-      </p:sp>
-      <p:sp>
-        <p:nvSpPr>
-          <p:cNvPr id="3" name="Subtitle 2"/>
-          <p:cNvSpPr>
-            <a:spLocks noGrp="1"/>
-          </p:cNvSpPr>
-          <p:nvPr>
-            <p:ph type="subTitle" idx="1"/>
-          </p:nvPr>
-        </p:nvSpPr>
-        <p:spPr/>
-        <p:txBody>
-          <a:bodyPr/>
-          <a:lstStyle/>
-          <a:p>
-            <a:r>
-              <a:t>Gomez released her second studio album, Revival (2015), on October 9, 2015.</a:t>
-            </a:r>
-          </a:p>
-        </p:txBody>
-      </p:sp>
-    </p:spTree>
-  </p:cSld>
-  <p:clrMapOvr>
-    <a:masterClrMapping/>
-  </p:clrMapOvr>
-</p:sld>
-</file>
-
-<file path=ppt/slides/slide51.xml><?xml version="1.0" encoding="utf-8"?>
-<p:sld xmlns:a="http://schemas.openxmlformats.org/drawingml/2006/main" xmlns:p="http://schemas.openxmlformats.org/presentationml/2006/main" xmlns:r="http://schemas.openxmlformats.org/officeDocument/2006/relationships">
-  <p:cSld>
-    <p:spTree>
-      <p:nvGrpSpPr>
-        <p:cNvPr id="1" name=""/>
-        <p:cNvGrpSpPr/>
-        <p:nvPr/>
-      </p:nvGrpSpPr>
-      <p:grpSpPr/>
-      <p:sp>
-        <p:nvSpPr>
-          <p:cNvPr id="2" name="Title 1"/>
-          <p:cNvSpPr>
-            <a:spLocks noGrp="1"/>
-          </p:cNvSpPr>
-          <p:nvPr>
-            <p:ph type="ctrTitle"/>
-          </p:nvPr>
-        </p:nvSpPr>
-        <p:spPr/>
-        <p:txBody>
-          <a:bodyPr/>
-          <a:lstStyle/>
-          <a:p>
-            <a:r>
-              <a:t> </a:t>
-            </a:r>
-          </a:p>
-        </p:txBody>
-      </p:sp>
-      <p:sp>
-        <p:nvSpPr>
-          <p:cNvPr id="3" name="Subtitle 2"/>
-          <p:cNvSpPr>
-            <a:spLocks noGrp="1"/>
-          </p:cNvSpPr>
-          <p:nvPr>
-            <p:ph type="subTitle" idx="1"/>
-          </p:nvPr>
-        </p:nvSpPr>
-        <p:spPr/>
-        <p:txBody>
-          <a:bodyPr/>
-          <a:lstStyle/>
-          <a:p>
-            <a:r>
-              <a:t>"Hands to Myself" was the album's third single, which became her third consecutive number one on the Mainstream Top 40 chart.</a:t>
-            </a:r>
-          </a:p>
-        </p:txBody>
-      </p:sp>
-    </p:spTree>
-  </p:cSld>
-  <p:clrMapOvr>
-    <a:masterClrMapping/>
-  </p:clrMapOvr>
-</p:sld>
-</file>
-
-<file path=ppt/slides/slide52.xml><?xml version="1.0" encoding="utf-8"?>
-<p:sld xmlns:a="http://schemas.openxmlformats.org/drawingml/2006/main" xmlns:p="http://schemas.openxmlformats.org/presentationml/2006/main" xmlns:r="http://schemas.openxmlformats.org/officeDocument/2006/relationships">
-  <p:cSld>
-    <p:spTree>
-      <p:nvGrpSpPr>
-        <p:cNvPr id="1" name=""/>
-        <p:cNvGrpSpPr/>
-        <p:nvPr/>
-      </p:nvGrpSpPr>
-      <p:grpSpPr/>
-      <p:sp>
-        <p:nvSpPr>
-          <p:cNvPr id="2" name="Title 1"/>
-          <p:cNvSpPr>
-            <a:spLocks noGrp="1"/>
-          </p:cNvSpPr>
-          <p:nvPr>
-            <p:ph type="ctrTitle"/>
-          </p:nvPr>
-        </p:nvSpPr>
-        <p:spPr/>
-        <p:txBody>
-          <a:bodyPr/>
-          <a:lstStyle/>
-          <a:p>
-            <a:r>
-              <a:t> </a:t>
-            </a:r>
-          </a:p>
-        </p:txBody>
-      </p:sp>
-      <p:sp>
-        <p:nvSpPr>
-          <p:cNvPr id="3" name="Subtitle 2"/>
-          <p:cNvSpPr>
-            <a:spLocks noGrp="1"/>
-          </p:cNvSpPr>
-          <p:nvPr>
-            <p:ph type="subTitle" idx="1"/>
-          </p:nvPr>
-        </p:nvSpPr>
-        <p:spPr/>
-        <p:txBody>
-          <a:bodyPr/>
-          <a:lstStyle/>
-          <a:p>
-            <a:r>
-              <a:t>This made Gomez one of only six female artists to have three singles from the same album top the chart.</a:t>
-            </a:r>
-          </a:p>
-        </p:txBody>
-      </p:sp>
-    </p:spTree>
-  </p:cSld>
-  <p:clrMapOvr>
-    <a:masterClrMapping/>
-  </p:clrMapOvr>
-</p:sld>
-</file>
-
-<file path=ppt/slides/slide53.xml><?xml version="1.0" encoding="utf-8"?>
-<p:sld xmlns:a="http://schemas.openxmlformats.org/drawingml/2006/main" xmlns:p="http://schemas.openxmlformats.org/presentationml/2006/main" xmlns:r="http://schemas.openxmlformats.org/officeDocument/2006/relationships">
-  <p:cSld>
-    <p:spTree>
-      <p:nvGrpSpPr>
-        <p:cNvPr id="1" name=""/>
-        <p:cNvGrpSpPr/>
-        <p:nvPr/>
-      </p:nvGrpSpPr>
-      <p:grpSpPr/>
-      <p:sp>
-        <p:nvSpPr>
-          <p:cNvPr id="2" name="Title 1"/>
-          <p:cNvSpPr>
-            <a:spLocks noGrp="1"/>
-          </p:cNvSpPr>
-          <p:nvPr>
-            <p:ph type="ctrTitle"/>
-          </p:nvPr>
-        </p:nvSpPr>
-        <p:spPr/>
-        <p:txBody>
-          <a:bodyPr/>
-          <a:lstStyle/>
-          <a:p>
-            <a:r>
-              <a:t> </a:t>
-            </a:r>
-          </a:p>
-        </p:txBody>
-      </p:sp>
-      <p:sp>
-        <p:nvSpPr>
-          <p:cNvPr id="3" name="Subtitle 2"/>
-          <p:cNvSpPr>
-            <a:spLocks noGrp="1"/>
-          </p:cNvSpPr>
-          <p:nvPr>
-            <p:ph type="subTitle" idx="1"/>
-          </p:nvPr>
-        </p:nvSpPr>
-        <p:spPr/>
-        <p:txBody>
-          <a:bodyPr/>
-          <a:lstStyle/>
-          <a:p>
-            <a:r>
-              <a:t>Gomez has begun working on her third studio album while touring, and added a new song titled "Feel Me" to the setlist of her Revival Tour.</a:t>
-            </a:r>
-          </a:p>
-        </p:txBody>
-      </p:sp>
-    </p:spTree>
-  </p:cSld>
-  <p:clrMapOvr>
-    <a:masterClrMapping/>
-  </p:clrMapOvr>
-</p:sld>
-</file>
-
-<file path=ppt/slides/slide54.xml><?xml version="1.0" encoding="utf-8"?>
-<p:sld xmlns:a="http://schemas.openxmlformats.org/drawingml/2006/main" xmlns:p="http://schemas.openxmlformats.org/presentationml/2006/main" xmlns:r="http://schemas.openxmlformats.org/officeDocument/2006/relationships">
-  <p:cSld>
-    <p:spTree>
-      <p:nvGrpSpPr>
-        <p:cNvPr id="1" name=""/>
-        <p:cNvGrpSpPr/>
-        <p:nvPr/>
-      </p:nvGrpSpPr>
-      <p:grpSpPr/>
-      <p:sp>
-        <p:nvSpPr>
-          <p:cNvPr id="2" name="Title 1"/>
-          <p:cNvSpPr>
-            <a:spLocks noGrp="1"/>
-          </p:cNvSpPr>
-          <p:nvPr>
-            <p:ph type="ctrTitle"/>
-          </p:nvPr>
-        </p:nvSpPr>
-        <p:spPr/>
-        <p:txBody>
-          <a:bodyPr/>
-          <a:lstStyle/>
-          <a:p>
-            <a:r>
-              <a:t> </a:t>
-            </a:r>
-          </a:p>
-        </p:txBody>
-      </p:sp>
-      <p:sp>
-        <p:nvSpPr>
-          <p:cNvPr id="3" name="Subtitle 2"/>
-          <p:cNvSpPr>
-            <a:spLocks noGrp="1"/>
-          </p:cNvSpPr>
-          <p:nvPr>
-            <p:ph type="subTitle" idx="1"/>
-          </p:nvPr>
-        </p:nvSpPr>
-        <p:spPr/>
-        <p:txBody>
-          <a:bodyPr/>
-          <a:lstStyle/>
-          <a:p>
-            <a:r>
-              <a:t>Gomez and Kygo confirmed the single titled "It Ain't Me" via their social media accounts a week later, which was released on February 16.</a:t>
-            </a:r>
-          </a:p>
-        </p:txBody>
-      </p:sp>
-    </p:spTree>
-  </p:cSld>
-  <p:clrMapOvr>
-    <a:masterClrMapping/>
-  </p:clrMapOvr>
-</p:sld>
-</file>
-
-<file path=ppt/slides/slide55.xml><?xml version="1.0" encoding="utf-8"?>
-<p:sld xmlns:a="http://schemas.openxmlformats.org/drawingml/2006/main" xmlns:p="http://schemas.openxmlformats.org/presentationml/2006/main" xmlns:r="http://schemas.openxmlformats.org/officeDocument/2006/relationships">
-  <p:cSld>
-    <p:spTree>
-      <p:nvGrpSpPr>
-        <p:cNvPr id="1" name=""/>
-        <p:cNvGrpSpPr/>
-        <p:nvPr/>
-      </p:nvGrpSpPr>
-      <p:grpSpPr/>
-      <p:sp>
-        <p:nvSpPr>
-          <p:cNvPr id="2" name="Title 1"/>
-          <p:cNvSpPr>
-            <a:spLocks noGrp="1"/>
-          </p:cNvSpPr>
-          <p:nvPr>
-            <p:ph type="ctrTitle"/>
-          </p:nvPr>
-        </p:nvSpPr>
-        <p:spPr/>
-        <p:txBody>
-          <a:bodyPr/>
-          <a:lstStyle/>
-          <a:p>
-            <a:r>
-              <a:t> </a:t>
-            </a:r>
-          </a:p>
-        </p:txBody>
-      </p:sp>
-      <p:sp>
-        <p:nvSpPr>
-          <p:cNvPr id="3" name="Subtitle 2"/>
-          <p:cNvSpPr>
-            <a:spLocks noGrp="1"/>
-          </p:cNvSpPr>
-          <p:nvPr>
-            <p:ph type="subTitle" idx="1"/>
-          </p:nvPr>
-        </p:nvSpPr>
-        <p:spPr/>
-        <p:txBody>
-          <a:bodyPr/>
-          <a:lstStyle/>
-          <a:p>
-            <a:r>
-              <a:t>The song reached the top 10 of the Billboard Hot 100 chart.</a:t>
-            </a:r>
-          </a:p>
-        </p:txBody>
-      </p:sp>
-    </p:spTree>
-  </p:cSld>
-  <p:clrMapOvr>
-    <a:masterClrMapping/>
-  </p:clrMapOvr>
-</p:sld>
-</file>
-
-<file path=ppt/slides/slide56.xml><?xml version="1.0" encoding="utf-8"?>
-<p:sld xmlns:a="http://schemas.openxmlformats.org/drawingml/2006/main" xmlns:p="http://schemas.openxmlformats.org/presentationml/2006/main" xmlns:r="http://schemas.openxmlformats.org/officeDocument/2006/relationships">
-  <p:cSld>
-    <p:spTree>
-      <p:nvGrpSpPr>
-        <p:cNvPr id="1" name=""/>
-        <p:cNvGrpSpPr/>
-        <p:nvPr/>
-      </p:nvGrpSpPr>
-      <p:grpSpPr/>
-      <p:sp>
-        <p:nvSpPr>
-          <p:cNvPr id="2" name="Title 1"/>
-          <p:cNvSpPr>
-            <a:spLocks noGrp="1"/>
-          </p:cNvSpPr>
-          <p:nvPr>
-            <p:ph type="ctrTitle"/>
-          </p:nvPr>
-        </p:nvSpPr>
-        <p:spPr/>
-        <p:txBody>
-          <a:bodyPr/>
-          <a:lstStyle/>
-          <a:p>
-            <a:r>
-              <a:t> </a:t>
-            </a:r>
-          </a:p>
-        </p:txBody>
-      </p:sp>
-      <p:sp>
-        <p:nvSpPr>
-          <p:cNvPr id="3" name="Subtitle 2"/>
-          <p:cNvSpPr>
-            <a:spLocks noGrp="1"/>
-          </p:cNvSpPr>
-          <p:nvPr>
-            <p:ph type="subTitle" idx="1"/>
-          </p:nvPr>
-        </p:nvSpPr>
-        <p:spPr/>
-        <p:txBody>
-          <a:bodyPr/>
-          <a:lstStyle/>
-          <a:p>
-            <a:r>
-              <a:t>A second music video was released on YouTube the next month which also teased the follow-up single "Fetish", released on July 13, 2017.</a:t>
-            </a:r>
-          </a:p>
-        </p:txBody>
-      </p:sp>
-    </p:spTree>
-  </p:cSld>
-  <p:clrMapOvr>
-    <a:masterClrMapping/>
-  </p:clrMapOvr>
-</p:sld>
-</file>
-
-<file path=ppt/slides/slide57.xml><?xml version="1.0" encoding="utf-8"?>
-<p:sld xmlns:a="http://schemas.openxmlformats.org/drawingml/2006/main" xmlns:p="http://schemas.openxmlformats.org/presentationml/2006/main" xmlns:r="http://schemas.openxmlformats.org/officeDocument/2006/relationships">
-  <p:cSld>
-    <p:spTree>
-      <p:nvGrpSpPr>
-        <p:cNvPr id="1" name=""/>
-        <p:cNvGrpSpPr/>
-        <p:nvPr/>
-      </p:nvGrpSpPr>
-      <p:grpSpPr/>
-      <p:sp>
-        <p:nvSpPr>
-          <p:cNvPr id="2" name="Title 1"/>
-          <p:cNvSpPr>
-            <a:spLocks noGrp="1"/>
-          </p:cNvSpPr>
-          <p:nvPr>
-            <p:ph type="ctrTitle"/>
-          </p:nvPr>
-        </p:nvSpPr>
-        <p:spPr/>
-        <p:txBody>
-          <a:bodyPr/>
-          <a:lstStyle/>
-          <a:p>
-            <a:r>
-              <a:t> </a:t>
-            </a:r>
-          </a:p>
-        </p:txBody>
-      </p:sp>
-      <p:sp>
-        <p:nvSpPr>
-          <p:cNvPr id="3" name="Subtitle 2"/>
-          <p:cNvSpPr>
-            <a:spLocks noGrp="1"/>
-          </p:cNvSpPr>
-          <p:nvPr>
-            <p:ph type="subTitle" idx="1"/>
-          </p:nvPr>
-        </p:nvSpPr>
-        <p:spPr/>
-        <p:txBody>
-          <a:bodyPr/>
-          <a:lstStyle/>
-          <a:p>
-            <a:r>
-              <a:t>On May 10, 2018, Gomez released a new single from the 13 Reasons Why Season 2 Soundtrack, titled "Back To You".</a:t>
-            </a:r>
-          </a:p>
-        </p:txBody>
-      </p:sp>
-    </p:spTree>
-  </p:cSld>
-  <p:clrMapOvr>
-    <a:masterClrMapping/>
-  </p:clrMapOvr>
-</p:sld>
-</file>
-
-<file path=ppt/slides/slide58.xml><?xml version="1.0" encoding="utf-8"?>
-<p:sld xmlns:a="http://schemas.openxmlformats.org/drawingml/2006/main" xmlns:p="http://schemas.openxmlformats.org/presentationml/2006/main" xmlns:r="http://schemas.openxmlformats.org/officeDocument/2006/relationships">
-  <p:cSld>
-    <p:spTree>
-      <p:nvGrpSpPr>
-        <p:cNvPr id="1" name=""/>
-        <p:cNvGrpSpPr/>
-        <p:nvPr/>
-      </p:nvGrpSpPr>
-      <p:grpSpPr/>
-      <p:sp>
-        <p:nvSpPr>
-          <p:cNvPr id="2" name="Title 1"/>
-          <p:cNvSpPr>
-            <a:spLocks noGrp="1"/>
-          </p:cNvSpPr>
-          <p:nvPr>
-            <p:ph type="ctrTitle"/>
-          </p:nvPr>
-        </p:nvSpPr>
-        <p:spPr/>
-        <p:txBody>
-          <a:bodyPr/>
-          <a:lstStyle/>
-          <a:p>
-            <a:r>
-              <a:t> </a:t>
-            </a:r>
-          </a:p>
-        </p:txBody>
-      </p:sp>
-      <p:sp>
-        <p:nvSpPr>
-          <p:cNvPr id="3" name="Subtitle 2"/>
-          <p:cNvSpPr>
-            <a:spLocks noGrp="1"/>
-          </p:cNvSpPr>
-          <p:nvPr>
-            <p:ph type="subTitle" idx="1"/>
-          </p:nvPr>
-        </p:nvSpPr>
-        <p:spPr/>
-        <p:txBody>
-          <a:bodyPr/>
-          <a:lstStyle/>
-          <a:p>
-            <a:r>
-              <a:t>In 2013, she released her second fragrance, Vivamore by Selena Gomez.</a:t>
-            </a:r>
-          </a:p>
-        </p:txBody>
-      </p:sp>
-    </p:spTree>
-  </p:cSld>
-  <p:clrMapOvr>
-    <a:masterClrMapping/>
-  </p:clrMapOvr>
-</p:sld>
-</file>
-
-<file path=ppt/slides/slide59.xml><?xml version="1.0" encoding="utf-8"?>
-<p:sld xmlns:a="http://schemas.openxmlformats.org/drawingml/2006/main" xmlns:p="http://schemas.openxmlformats.org/presentationml/2006/main" xmlns:r="http://schemas.openxmlformats.org/officeDocument/2006/relationships">
-  <p:cSld>
-    <p:spTree>
-      <p:nvGrpSpPr>
-        <p:cNvPr id="1" name=""/>
-        <p:cNvGrpSpPr/>
-        <p:nvPr/>
-      </p:nvGrpSpPr>
-      <p:grpSpPr/>
-      <p:sp>
-        <p:nvSpPr>
-          <p:cNvPr id="2" name="Title 1"/>
-          <p:cNvSpPr>
-            <a:spLocks noGrp="1"/>
-          </p:cNvSpPr>
-          <p:nvPr>
-            <p:ph type="ctrTitle"/>
-          </p:nvPr>
-        </p:nvSpPr>
-        <p:spPr/>
-        <p:txBody>
-          <a:bodyPr/>
-          <a:lstStyle/>
-          <a:p>
-            <a:r>
-              <a:t> </a:t>
-            </a:r>
-          </a:p>
-        </p:txBody>
-      </p:sp>
-      <p:sp>
-        <p:nvSpPr>
-          <p:cNvPr id="3" name="Subtitle 2"/>
-          <p:cNvSpPr>
-            <a:spLocks noGrp="1"/>
-          </p:cNvSpPr>
-          <p:nvPr>
-            <p:ph type="subTitle" idx="1"/>
-          </p:nvPr>
-        </p:nvSpPr>
-        <p:spPr/>
-        <p:txBody>
-          <a:bodyPr/>
-          <a:lstStyle/>
-          <a:p>
-            <a:r>
-              <a:t>It debuted on the Billboard Hot 100 at No.</a:t>
-            </a:r>
-          </a:p>
-        </p:txBody>
-      </p:sp>
-    </p:spTree>
-  </p:cSld>
-  <p:clrMapOvr>
-    <a:masterClrMapping/>
-  </p:clrMapOvr>
-</p:sld>
-</file>
-
-<file path=ppt/slides/slide6.xml><?xml version="1.0" encoding="utf-8"?>
-<p:sld xmlns:a="http://schemas.openxmlformats.org/drawingml/2006/main" xmlns:p="http://schemas.openxmlformats.org/presentationml/2006/main" xmlns:r="http://schemas.openxmlformats.org/officeDocument/2006/relationships">
-  <p:cSld>
-    <p:spTree>
-      <p:nvGrpSpPr>
-        <p:cNvPr id="1" name=""/>
-        <p:cNvGrpSpPr/>
-        <p:nvPr/>
-      </p:nvGrpSpPr>
-      <p:grpSpPr/>
-      <p:sp>
-        <p:nvSpPr>
-          <p:cNvPr id="2" name="Title 1"/>
-          <p:cNvSpPr>
-            <a:spLocks noGrp="1"/>
-          </p:cNvSpPr>
-          <p:nvPr>
-            <p:ph type="ctrTitle"/>
-          </p:nvPr>
-        </p:nvSpPr>
-        <p:spPr/>
-        <p:txBody>
-          <a:bodyPr/>
-          <a:lstStyle/>
-          <a:p>
-            <a:r>
-              <a:t> </a:t>
-            </a:r>
-          </a:p>
-        </p:txBody>
-      </p:sp>
-      <p:sp>
-        <p:nvSpPr>
-          <p:cNvPr id="3" name="Subtitle 2"/>
-          <p:cNvSpPr>
-            <a:spLocks noGrp="1"/>
-          </p:cNvSpPr>
-          <p:nvPr>
-            <p:ph type="subTitle" idx="1"/>
-          </p:nvPr>
-        </p:nvSpPr>
-        <p:spPr/>
-        <p:txBody>
-          <a:bodyPr/>
-          <a:lstStyle/>
-          <a:p>
-            <a:r>
-              <a:t>While working on the series, Gomez had a cameo role in the film Spy Kids 3-D: Game Over (2003) and the made-for-television film Walker, Texas Ranger: Trial by Fire (2005).</a:t>
-            </a:r>
-          </a:p>
-        </p:txBody>
-      </p:sp>
-    </p:spTree>
-  </p:cSld>
-  <p:clrMapOvr>
-    <a:masterClrMapping/>
-  </p:clrMapOvr>
-</p:sld>
-</file>
-
-<file path=ppt/slides/slide60.xml><?xml version="1.0" encoding="utf-8"?>
-<p:sld xmlns:a="http://schemas.openxmlformats.org/drawingml/2006/main" xmlns:p="http://schemas.openxmlformats.org/presentationml/2006/main" xmlns:r="http://schemas.openxmlformats.org/officeDocument/2006/relationships">
-  <p:cSld>
-    <p:spTree>
-      <p:nvGrpSpPr>
-        <p:cNvPr id="1" name=""/>
-        <p:cNvGrpSpPr/>
-        <p:nvPr/>
-      </p:nvGrpSpPr>
-      <p:grpSpPr/>
-      <p:sp>
-        <p:nvSpPr>
-          <p:cNvPr id="2" name="Title 1"/>
-          <p:cNvSpPr>
-            <a:spLocks noGrp="1"/>
-          </p:cNvSpPr>
-          <p:nvPr>
-            <p:ph type="ctrTitle"/>
-          </p:nvPr>
-        </p:nvSpPr>
-        <p:spPr/>
-        <p:txBody>
-          <a:bodyPr/>
-          <a:lstStyle/>
-          <a:p>
-            <a:r>
-              <a:t> </a:t>
-            </a:r>
-          </a:p>
-        </p:txBody>
-      </p:sp>
-      <p:sp>
-        <p:nvSpPr>
-          <p:cNvPr id="3" name="Subtitle 2"/>
-          <p:cNvSpPr>
-            <a:spLocks noGrp="1"/>
-          </p:cNvSpPr>
-          <p:nvPr>
-            <p:ph type="subTitle" idx="1"/>
-          </p:nvPr>
-        </p:nvSpPr>
-        <p:spPr/>
-        <p:txBody>
-          <a:bodyPr/>
-          <a:lstStyle/>
-          <a:p>
-            <a:r>
-              <a:t>Gomez has released two studio albums, one EP, and one compilation album in her solo career.</a:t>
-            </a:r>
-          </a:p>
-        </p:txBody>
-      </p:sp>
-    </p:spTree>
-  </p:cSld>
-  <p:clrMapOvr>
-    <a:masterClrMapping/>
-  </p:clrMapOvr>
-</p:sld>
-</file>
-
-<file path=ppt/slides/slide61.xml><?xml version="1.0" encoding="utf-8"?>
-<p:sld xmlns:a="http://schemas.openxmlformats.org/drawingml/2006/main" xmlns:p="http://schemas.openxmlformats.org/presentationml/2006/main" xmlns:r="http://schemas.openxmlformats.org/officeDocument/2006/relationships">
-  <p:cSld>
-    <p:spTree>
-      <p:nvGrpSpPr>
-        <p:cNvPr id="1" name=""/>
-        <p:cNvGrpSpPr/>
-        <p:nvPr/>
-      </p:nvGrpSpPr>
-      <p:grpSpPr/>
-      <p:sp>
-        <p:nvSpPr>
-          <p:cNvPr id="2" name="Title 1"/>
-          <p:cNvSpPr>
-            <a:spLocks noGrp="1"/>
-          </p:cNvSpPr>
-          <p:nvPr>
-            <p:ph type="ctrTitle"/>
-          </p:nvPr>
-        </p:nvSpPr>
-        <p:spPr/>
-        <p:txBody>
-          <a:bodyPr/>
-          <a:lstStyle/>
-          <a:p>
-            <a:r>
-              <a:t> </a:t>
-            </a:r>
-          </a:p>
-        </p:txBody>
-      </p:sp>
-      <p:sp>
-        <p:nvSpPr>
-          <p:cNvPr id="3" name="Subtitle 2"/>
-          <p:cNvSpPr>
-            <a:spLocks noGrp="1"/>
-          </p:cNvSpPr>
-          <p:nvPr>
-            <p:ph type="subTitle" idx="1"/>
-          </p:nvPr>
-        </p:nvSpPr>
-        <p:spPr/>
-        <p:txBody>
-          <a:bodyPr/>
-          <a:lstStyle/>
-          <a:p>
-            <a:r>
-              <a:t>Gomez also the lead singer of the former band Selena Gomez &amp; the Scene, releasing three studio albums and one remix album.</a:t>
-            </a:r>
-          </a:p>
-        </p:txBody>
-      </p:sp>
-    </p:spTree>
-  </p:cSld>
-  <p:clrMapOvr>
-    <a:masterClrMapping/>
-  </p:clrMapOvr>
-</p:sld>
-</file>
-
-<file path=ppt/slides/slide62.xml><?xml version="1.0" encoding="utf-8"?>
 <p:sld xmlns:a="http://schemas.openxmlformats.org/drawingml/2006/main" xmlns:p="http://schemas.openxmlformats.org/presentationml/2006/main" xmlns:r="http://schemas.openxmlformats.org/officeDocument/2006/relationships">
   <p:cSld>
     <p:spTree>
@@ -8678,7 +8732,7 @@
         <p:spPr>
           <a:xfrm>
             <a:off x="914400" y="1828800"/>
-            <a:ext cx="6502916" cy="3657600"/>
+            <a:ext cx="3657600" cy="3657600"/>
           </a:xfrm>
           <a:prstGeom prst="rect">
             <a:avLst/>
@@ -8693,6 +8747,1026 @@
 </p:sld>
 </file>
 
+<file path=ppt/slides/slide48.xml><?xml version="1.0" encoding="utf-8"?>
+<p:sld xmlns:a="http://schemas.openxmlformats.org/drawingml/2006/main" xmlns:p="http://schemas.openxmlformats.org/presentationml/2006/main" xmlns:r="http://schemas.openxmlformats.org/officeDocument/2006/relationships">
+  <p:cSld>
+    <p:spTree>
+      <p:nvGrpSpPr>
+        <p:cNvPr id="1" name=""/>
+        <p:cNvGrpSpPr/>
+        <p:nvPr/>
+      </p:nvGrpSpPr>
+      <p:grpSpPr/>
+      <p:sp>
+        <p:nvSpPr>
+          <p:cNvPr id="2" name="Title 1"/>
+          <p:cNvSpPr>
+            <a:spLocks noGrp="1"/>
+          </p:cNvSpPr>
+          <p:nvPr>
+            <p:ph type="ctrTitle"/>
+          </p:nvPr>
+        </p:nvSpPr>
+        <p:spPr/>
+        <p:txBody>
+          <a:bodyPr/>
+          <a:lstStyle/>
+          <a:p>
+            <a:r>
+              <a:t>ADVANTAGES</a:t>
+            </a:r>
+          </a:p>
+        </p:txBody>
+      </p:sp>
+      <p:sp>
+        <p:nvSpPr>
+          <p:cNvPr id="3" name="Subtitle 2"/>
+          <p:cNvSpPr>
+            <a:spLocks noGrp="1"/>
+          </p:cNvSpPr>
+          <p:nvPr>
+            <p:ph type="subTitle" idx="1"/>
+          </p:nvPr>
+        </p:nvSpPr>
+        <p:spPr/>
+        <p:txBody>
+          <a:bodyPr/>
+          <a:lstStyle/>
+          <a:p>
+            <a:r>
+              <a:t> </a:t>
+            </a:r>
+          </a:p>
+        </p:txBody>
+      </p:sp>
+    </p:spTree>
+  </p:cSld>
+  <p:clrMapOvr>
+    <a:masterClrMapping/>
+  </p:clrMapOvr>
+</p:sld>
+</file>
+
+<file path=ppt/slides/slide49.xml><?xml version="1.0" encoding="utf-8"?>
+<p:sld xmlns:a="http://schemas.openxmlformats.org/drawingml/2006/main" xmlns:p="http://schemas.openxmlformats.org/presentationml/2006/main" xmlns:r="http://schemas.openxmlformats.org/officeDocument/2006/relationships">
+  <p:cSld>
+    <p:spTree>
+      <p:nvGrpSpPr>
+        <p:cNvPr id="1" name=""/>
+        <p:cNvGrpSpPr/>
+        <p:nvPr/>
+      </p:nvGrpSpPr>
+      <p:grpSpPr/>
+      <p:sp>
+        <p:nvSpPr>
+          <p:cNvPr id="2" name="Title 1"/>
+          <p:cNvSpPr>
+            <a:spLocks noGrp="1"/>
+          </p:cNvSpPr>
+          <p:nvPr>
+            <p:ph type="ctrTitle"/>
+          </p:nvPr>
+        </p:nvSpPr>
+        <p:spPr/>
+        <p:txBody>
+          <a:bodyPr/>
+          <a:lstStyle/>
+          <a:p>
+            <a:r>
+              <a:t> </a:t>
+            </a:r>
+          </a:p>
+        </p:txBody>
+      </p:sp>
+      <p:sp>
+        <p:nvSpPr>
+          <p:cNvPr id="3" name="Subtitle 2"/>
+          <p:cNvSpPr>
+            <a:spLocks noGrp="1"/>
+          </p:cNvSpPr>
+          <p:nvPr>
+            <p:ph type="subTitle" idx="1"/>
+          </p:nvPr>
+        </p:nvSpPr>
+        <p:spPr/>
+        <p:txBody>
+          <a:bodyPr/>
+          <a:lstStyle/>
+          <a:p>
+            <a:r>
+              <a:t>The album won four Grammy Awards, with Swift becoming the youngest Album of the Year winner.</a:t>
+            </a:r>
+          </a:p>
+        </p:txBody>
+      </p:sp>
+    </p:spTree>
+  </p:cSld>
+  <p:clrMapOvr>
+    <a:masterClrMapping/>
+  </p:clrMapOvr>
+</p:sld>
+</file>
+
+<file path=ppt/slides/slide5.xml><?xml version="1.0" encoding="utf-8"?>
+<p:sld xmlns:a="http://schemas.openxmlformats.org/drawingml/2006/main" xmlns:p="http://schemas.openxmlformats.org/presentationml/2006/main" xmlns:r="http://schemas.openxmlformats.org/officeDocument/2006/relationships">
+  <p:cSld>
+    <p:spTree>
+      <p:nvGrpSpPr>
+        <p:cNvPr id="1" name=""/>
+        <p:cNvGrpSpPr/>
+        <p:nvPr/>
+      </p:nvGrpSpPr>
+      <p:grpSpPr/>
+      <p:sp>
+        <p:nvSpPr>
+          <p:cNvPr id="2" name="Title 1"/>
+          <p:cNvSpPr>
+            <a:spLocks noGrp="1"/>
+          </p:cNvSpPr>
+          <p:nvPr>
+            <p:ph type="ctrTitle"/>
+          </p:nvPr>
+        </p:nvSpPr>
+        <p:spPr/>
+        <p:txBody>
+          <a:bodyPr/>
+          <a:lstStyle/>
+          <a:p>
+            <a:r>
+              <a:t> </a:t>
+            </a:r>
+          </a:p>
+        </p:txBody>
+      </p:sp>
+      <p:sp>
+        <p:nvSpPr>
+          <p:cNvPr id="3" name="Subtitle 2"/>
+          <p:cNvSpPr>
+            <a:spLocks noGrp="1"/>
+          </p:cNvSpPr>
+          <p:nvPr>
+            <p:ph type="subTitle" idx="1"/>
+          </p:nvPr>
+        </p:nvSpPr>
+        <p:spPr/>
+        <p:txBody>
+          <a:bodyPr/>
+          <a:lstStyle/>
+          <a:p>
+            <a:r>
+              <a:t>Swift is one of the best-selling music artists of all time, having sold more than 50 million albums—including 27.8 million in the US—and 150 million single downloads.</a:t>
+            </a:r>
+          </a:p>
+        </p:txBody>
+      </p:sp>
+    </p:spTree>
+  </p:cSld>
+  <p:clrMapOvr>
+    <a:masterClrMapping/>
+  </p:clrMapOvr>
+</p:sld>
+</file>
+
+<file path=ppt/slides/slide50.xml><?xml version="1.0" encoding="utf-8"?>
+<p:sld xmlns:a="http://schemas.openxmlformats.org/drawingml/2006/main" xmlns:p="http://schemas.openxmlformats.org/presentationml/2006/main" xmlns:r="http://schemas.openxmlformats.org/officeDocument/2006/relationships">
+  <p:cSld>
+    <p:spTree>
+      <p:nvGrpSpPr>
+        <p:cNvPr id="1" name=""/>
+        <p:cNvGrpSpPr/>
+        <p:nvPr/>
+      </p:nvGrpSpPr>
+      <p:grpSpPr/>
+      <p:sp>
+        <p:nvSpPr>
+          <p:cNvPr id="2" name="Title 1"/>
+          <p:cNvSpPr>
+            <a:spLocks noGrp="1"/>
+          </p:cNvSpPr>
+          <p:nvPr>
+            <p:ph type="ctrTitle"/>
+          </p:nvPr>
+        </p:nvSpPr>
+        <p:spPr/>
+        <p:txBody>
+          <a:bodyPr/>
+          <a:lstStyle/>
+          <a:p>
+            <a:r>
+              <a:t> </a:t>
+            </a:r>
+          </a:p>
+        </p:txBody>
+      </p:sp>
+      <p:sp>
+        <p:nvSpPr>
+          <p:cNvPr id="3" name="Subtitle 2"/>
+          <p:cNvSpPr>
+            <a:spLocks noGrp="1"/>
+          </p:cNvSpPr>
+          <p:nvPr>
+            <p:ph type="subTitle" idx="1"/>
+          </p:nvPr>
+        </p:nvSpPr>
+        <p:spPr/>
+        <p:txBody>
+          <a:bodyPr/>
+          <a:lstStyle/>
+          <a:p>
+            <a:r>
+              <a:t>She is also the recipient of 10 Grammys, one Emmy, 23 Billboard Music Awards, and 12 Country Music Association Awards, and she holds six Guinness World Records.</a:t>
+            </a:r>
+          </a:p>
+        </p:txBody>
+      </p:sp>
+    </p:spTree>
+  </p:cSld>
+  <p:clrMapOvr>
+    <a:masterClrMapping/>
+  </p:clrMapOvr>
+</p:sld>
+</file>
+
+<file path=ppt/slides/slide51.xml><?xml version="1.0" encoding="utf-8"?>
+<p:sld xmlns:a="http://schemas.openxmlformats.org/drawingml/2006/main" xmlns:p="http://schemas.openxmlformats.org/presentationml/2006/main" xmlns:r="http://schemas.openxmlformats.org/officeDocument/2006/relationships">
+  <p:cSld>
+    <p:spTree>
+      <p:nvGrpSpPr>
+        <p:cNvPr id="1" name=""/>
+        <p:cNvGrpSpPr/>
+        <p:nvPr/>
+      </p:nvGrpSpPr>
+      <p:grpSpPr/>
+      <p:sp>
+        <p:nvSpPr>
+          <p:cNvPr id="2" name="Title 1"/>
+          <p:cNvSpPr>
+            <a:spLocks noGrp="1"/>
+          </p:cNvSpPr>
+          <p:nvPr>
+            <p:ph type="ctrTitle"/>
+          </p:nvPr>
+        </p:nvSpPr>
+        <p:spPr/>
+        <p:txBody>
+          <a:bodyPr/>
+          <a:lstStyle/>
+          <a:p>
+            <a:r>
+              <a:t> </a:t>
+            </a:r>
+          </a:p>
+        </p:txBody>
+      </p:sp>
+      <p:sp>
+        <p:nvSpPr>
+          <p:cNvPr id="3" name="Subtitle 2"/>
+          <p:cNvSpPr>
+            <a:spLocks noGrp="1"/>
+          </p:cNvSpPr>
+          <p:nvPr>
+            <p:ph type="subTitle" idx="1"/>
+          </p:nvPr>
+        </p:nvSpPr>
+        <p:spPr/>
+        <p:txBody>
+          <a:bodyPr/>
+          <a:lstStyle/>
+          <a:p>
+            <a:r>
+              <a:t>When Swift was about 12 years old, computer repairman and local musician Ronnie Cremer taught her how to play guitar and helped with her first efforts as a songwriter, leading to her writing "Lucky You".</a:t>
+            </a:r>
+          </a:p>
+        </p:txBody>
+      </p:sp>
+    </p:spTree>
+  </p:cSld>
+  <p:clrMapOvr>
+    <a:masterClrMapping/>
+  </p:clrMapOvr>
+</p:sld>
+</file>
+
+<file path=ppt/slides/slide52.xml><?xml version="1.0" encoding="utf-8"?>
+<p:sld xmlns:a="http://schemas.openxmlformats.org/drawingml/2006/main" xmlns:p="http://schemas.openxmlformats.org/presentationml/2006/main" xmlns:r="http://schemas.openxmlformats.org/officeDocument/2006/relationships">
+  <p:cSld>
+    <p:spTree>
+      <p:nvGrpSpPr>
+        <p:cNvPr id="1" name=""/>
+        <p:cNvGrpSpPr/>
+        <p:nvPr/>
+      </p:nvGrpSpPr>
+      <p:grpSpPr/>
+      <p:sp>
+        <p:nvSpPr>
+          <p:cNvPr id="2" name="Title 1"/>
+          <p:cNvSpPr>
+            <a:spLocks noGrp="1"/>
+          </p:cNvSpPr>
+          <p:nvPr>
+            <p:ph type="ctrTitle"/>
+          </p:nvPr>
+        </p:nvSpPr>
+        <p:spPr/>
+        <p:txBody>
+          <a:bodyPr/>
+          <a:lstStyle/>
+          <a:p>
+            <a:r>
+              <a:t> </a:t>
+            </a:r>
+          </a:p>
+        </p:txBody>
+      </p:sp>
+      <p:sp>
+        <p:nvSpPr>
+          <p:cNvPr id="3" name="Subtitle 2"/>
+          <p:cNvSpPr>
+            <a:spLocks noGrp="1"/>
+          </p:cNvSpPr>
+          <p:nvPr>
+            <p:ph type="subTitle" idx="1"/>
+          </p:nvPr>
+        </p:nvSpPr>
+        <p:spPr/>
+        <p:txBody>
+          <a:bodyPr/>
+          <a:lstStyle/>
+          <a:p>
+            <a:r>
+              <a:t>To help Swift break into country music, her father transferred to the Nashville office of Merrill Lynch when she was 14, and the family relocated to a lakefront house in Hendersonville, Tennessee.</a:t>
+            </a:r>
+          </a:p>
+        </p:txBody>
+      </p:sp>
+    </p:spTree>
+  </p:cSld>
+  <p:clrMapOvr>
+    <a:masterClrMapping/>
+  </p:clrMapOvr>
+</p:sld>
+</file>
+
+<file path=ppt/slides/slide53.xml><?xml version="1.0" encoding="utf-8"?>
+<p:sld xmlns:a="http://schemas.openxmlformats.org/drawingml/2006/main" xmlns:p="http://schemas.openxmlformats.org/presentationml/2006/main" xmlns:r="http://schemas.openxmlformats.org/officeDocument/2006/relationships">
+  <p:cSld>
+    <p:spTree>
+      <p:nvGrpSpPr>
+        <p:cNvPr id="1" name=""/>
+        <p:cNvGrpSpPr/>
+        <p:nvPr/>
+      </p:nvGrpSpPr>
+      <p:grpSpPr/>
+      <p:sp>
+        <p:nvSpPr>
+          <p:cNvPr id="2" name="Title 1"/>
+          <p:cNvSpPr>
+            <a:spLocks noGrp="1"/>
+          </p:cNvSpPr>
+          <p:nvPr>
+            <p:ph type="ctrTitle"/>
+          </p:nvPr>
+        </p:nvSpPr>
+        <p:spPr/>
+        <p:txBody>
+          <a:bodyPr/>
+          <a:lstStyle/>
+          <a:p>
+            <a:r>
+              <a:t> </a:t>
+            </a:r>
+          </a:p>
+        </p:txBody>
+      </p:sp>
+      <p:sp>
+        <p:nvSpPr>
+          <p:cNvPr id="3" name="Subtitle 2"/>
+          <p:cNvSpPr>
+            <a:spLocks noGrp="1"/>
+          </p:cNvSpPr>
+          <p:nvPr>
+            <p:ph type="subTitle" idx="1"/>
+          </p:nvPr>
+        </p:nvSpPr>
+        <p:spPr/>
+        <p:txBody>
+          <a:bodyPr/>
+          <a:lstStyle/>
+          <a:p>
+            <a:r>
+              <a:t>She also won the Country Music Association's Horizon Award for Best New Artist, the Academy of Country Music Awards' Top New Female Vocalist, and the American Music Awards' Favorite Country Female Artist honor.</a:t>
+            </a:r>
+          </a:p>
+        </p:txBody>
+      </p:sp>
+    </p:spTree>
+  </p:cSld>
+  <p:clrMapOvr>
+    <a:masterClrMapping/>
+  </p:clrMapOvr>
+</p:sld>
+</file>
+
+<file path=ppt/slides/slide54.xml><?xml version="1.0" encoding="utf-8"?>
+<p:sld xmlns:a="http://schemas.openxmlformats.org/drawingml/2006/main" xmlns:p="http://schemas.openxmlformats.org/presentationml/2006/main" xmlns:r="http://schemas.openxmlformats.org/officeDocument/2006/relationships">
+  <p:cSld>
+    <p:spTree>
+      <p:nvGrpSpPr>
+        <p:cNvPr id="1" name=""/>
+        <p:cNvGrpSpPr/>
+        <p:nvPr/>
+      </p:nvGrpSpPr>
+      <p:grpSpPr/>
+      <p:sp>
+        <p:nvSpPr>
+          <p:cNvPr id="2" name="Title 1"/>
+          <p:cNvSpPr>
+            <a:spLocks noGrp="1"/>
+          </p:cNvSpPr>
+          <p:nvPr>
+            <p:ph type="ctrTitle"/>
+          </p:nvPr>
+        </p:nvSpPr>
+        <p:spPr/>
+        <p:txBody>
+          <a:bodyPr/>
+          <a:lstStyle/>
+          <a:p>
+            <a:r>
+              <a:t> </a:t>
+            </a:r>
+          </a:p>
+        </p:txBody>
+      </p:sp>
+      <p:sp>
+        <p:nvSpPr>
+          <p:cNvPr id="3" name="Subtitle 2"/>
+          <p:cNvSpPr>
+            <a:spLocks noGrp="1"/>
+          </p:cNvSpPr>
+          <p:nvPr>
+            <p:ph type="subTitle" idx="1"/>
+          </p:nvPr>
+        </p:nvSpPr>
+        <p:spPr/>
+        <p:txBody>
+          <a:bodyPr/>
+          <a:lstStyle/>
+          <a:p>
+            <a:r>
+              <a:t>She was also nominated for Best New Artist at the 2008 Grammy Awards.</a:t>
+            </a:r>
+          </a:p>
+        </p:txBody>
+      </p:sp>
+    </p:spTree>
+  </p:cSld>
+  <p:clrMapOvr>
+    <a:masterClrMapping/>
+  </p:clrMapOvr>
+</p:sld>
+</file>
+
+<file path=ppt/slides/slide55.xml><?xml version="1.0" encoding="utf-8"?>
+<p:sld xmlns:a="http://schemas.openxmlformats.org/drawingml/2006/main" xmlns:p="http://schemas.openxmlformats.org/presentationml/2006/main" xmlns:r="http://schemas.openxmlformats.org/officeDocument/2006/relationships">
+  <p:cSld>
+    <p:spTree>
+      <p:nvGrpSpPr>
+        <p:cNvPr id="1" name=""/>
+        <p:cNvGrpSpPr/>
+        <p:nvPr/>
+      </p:nvGrpSpPr>
+      <p:grpSpPr/>
+      <p:sp>
+        <p:nvSpPr>
+          <p:cNvPr id="2" name="Title 1"/>
+          <p:cNvSpPr>
+            <a:spLocks noGrp="1"/>
+          </p:cNvSpPr>
+          <p:nvPr>
+            <p:ph type="ctrTitle"/>
+          </p:nvPr>
+        </p:nvSpPr>
+        <p:spPr/>
+        <p:txBody>
+          <a:bodyPr/>
+          <a:lstStyle/>
+          <a:p>
+            <a:r>
+              <a:t> </a:t>
+            </a:r>
+          </a:p>
+        </p:txBody>
+      </p:sp>
+      <p:sp>
+        <p:nvSpPr>
+          <p:cNvPr id="3" name="Subtitle 2"/>
+          <p:cNvSpPr>
+            <a:spLocks noGrp="1"/>
+          </p:cNvSpPr>
+          <p:nvPr>
+            <p:ph type="subTitle" idx="1"/>
+          </p:nvPr>
+        </p:nvSpPr>
+        <p:spPr/>
+        <p:txBody>
+          <a:bodyPr/>
+          <a:lstStyle/>
+          <a:p>
+            <a:r>
+              <a:t>In 2009, the music video for "You Belong with Me" was named MTV Video Music Award for Best Female Video.</a:t>
+            </a:r>
+          </a:p>
+        </p:txBody>
+      </p:sp>
+    </p:spTree>
+  </p:cSld>
+  <p:clrMapOvr>
+    <a:masterClrMapping/>
+  </p:clrMapOvr>
+</p:sld>
+</file>
+
+<file path=ppt/slides/slide56.xml><?xml version="1.0" encoding="utf-8"?>
+<p:sld xmlns:a="http://schemas.openxmlformats.org/drawingml/2006/main" xmlns:p="http://schemas.openxmlformats.org/presentationml/2006/main" xmlns:r="http://schemas.openxmlformats.org/officeDocument/2006/relationships">
+  <p:cSld>
+    <p:spTree>
+      <p:nvGrpSpPr>
+        <p:cNvPr id="1" name=""/>
+        <p:cNvGrpSpPr/>
+        <p:nvPr/>
+      </p:nvGrpSpPr>
+      <p:grpSpPr/>
+      <p:sp>
+        <p:nvSpPr>
+          <p:cNvPr id="2" name="Title 1"/>
+          <p:cNvSpPr>
+            <a:spLocks noGrp="1"/>
+          </p:cNvSpPr>
+          <p:nvPr>
+            <p:ph type="ctrTitle"/>
+          </p:nvPr>
+        </p:nvSpPr>
+        <p:spPr/>
+        <p:txBody>
+          <a:bodyPr/>
+          <a:lstStyle/>
+          <a:p>
+            <a:r>
+              <a:t> </a:t>
+            </a:r>
+          </a:p>
+        </p:txBody>
+      </p:sp>
+      <p:sp>
+        <p:nvSpPr>
+          <p:cNvPr id="3" name="Subtitle 2"/>
+          <p:cNvSpPr>
+            <a:spLocks noGrp="1"/>
+          </p:cNvSpPr>
+          <p:nvPr>
+            <p:ph type="subTitle" idx="1"/>
+          </p:nvPr>
+        </p:nvSpPr>
+        <p:spPr/>
+        <p:txBody>
+          <a:bodyPr/>
+          <a:lstStyle/>
+          <a:p>
+            <a:r>
+              <a:t>Also that year, she won five American Music Awards, including Artist of the Year and Favorite Country Album.</a:t>
+            </a:r>
+          </a:p>
+        </p:txBody>
+      </p:sp>
+    </p:spTree>
+  </p:cSld>
+  <p:clrMapOvr>
+    <a:masterClrMapping/>
+  </p:clrMapOvr>
+</p:sld>
+</file>
+
+<file path=ppt/slides/slide57.xml><?xml version="1.0" encoding="utf-8"?>
+<p:sld xmlns:a="http://schemas.openxmlformats.org/drawingml/2006/main" xmlns:p="http://schemas.openxmlformats.org/presentationml/2006/main" xmlns:r="http://schemas.openxmlformats.org/officeDocument/2006/relationships">
+  <p:cSld>
+    <p:spTree>
+      <p:nvGrpSpPr>
+        <p:cNvPr id="1" name=""/>
+        <p:cNvGrpSpPr/>
+        <p:nvPr/>
+      </p:nvGrpSpPr>
+      <p:grpSpPr/>
+      <p:sp>
+        <p:nvSpPr>
+          <p:cNvPr id="2" name="Title 1"/>
+          <p:cNvSpPr>
+            <a:spLocks noGrp="1"/>
+          </p:cNvSpPr>
+          <p:nvPr>
+            <p:ph type="ctrTitle"/>
+          </p:nvPr>
+        </p:nvSpPr>
+        <p:spPr/>
+        <p:txBody>
+          <a:bodyPr/>
+          <a:lstStyle/>
+          <a:p>
+            <a:r>
+              <a:t> </a:t>
+            </a:r>
+          </a:p>
+        </p:txBody>
+      </p:sp>
+      <p:sp>
+        <p:nvSpPr>
+          <p:cNvPr id="3" name="Subtitle 2"/>
+          <p:cNvSpPr>
+            <a:spLocks noGrp="1"/>
+          </p:cNvSpPr>
+          <p:nvPr>
+            <p:ph type="subTitle" idx="1"/>
+          </p:nvPr>
+        </p:nvSpPr>
+        <p:spPr/>
+        <p:txBody>
+          <a:bodyPr/>
+          <a:lstStyle/>
+          <a:p>
+            <a:r>
+              <a:t>At the 52nd Grammy Awards, Fearless was named Album of the Year and Best Country Album, and "White Horse" was named Best Country Song and Best Female Country Vocal Performance.</a:t>
+            </a:r>
+          </a:p>
+        </p:txBody>
+      </p:sp>
+    </p:spTree>
+  </p:cSld>
+  <p:clrMapOvr>
+    <a:masterClrMapping/>
+  </p:clrMapOvr>
+</p:sld>
+</file>
+
+<file path=ppt/slides/slide58.xml><?xml version="1.0" encoding="utf-8"?>
+<p:sld xmlns:a="http://schemas.openxmlformats.org/drawingml/2006/main" xmlns:p="http://schemas.openxmlformats.org/presentationml/2006/main" xmlns:r="http://schemas.openxmlformats.org/officeDocument/2006/relationships">
+  <p:cSld>
+    <p:spTree>
+      <p:nvGrpSpPr>
+        <p:cNvPr id="1" name=""/>
+        <p:cNvGrpSpPr/>
+        <p:nvPr/>
+      </p:nvGrpSpPr>
+      <p:grpSpPr/>
+      <p:sp>
+        <p:nvSpPr>
+          <p:cNvPr id="2" name="Title 1"/>
+          <p:cNvSpPr>
+            <a:spLocks noGrp="1"/>
+          </p:cNvSpPr>
+          <p:nvPr>
+            <p:ph type="ctrTitle"/>
+          </p:nvPr>
+        </p:nvSpPr>
+        <p:spPr/>
+        <p:txBody>
+          <a:bodyPr/>
+          <a:lstStyle/>
+          <a:p>
+            <a:r>
+              <a:t> </a:t>
+            </a:r>
+          </a:p>
+        </p:txBody>
+      </p:sp>
+      <p:sp>
+        <p:nvSpPr>
+          <p:cNvPr id="3" name="Subtitle 2"/>
+          <p:cNvSpPr>
+            <a:spLocks noGrp="1"/>
+          </p:cNvSpPr>
+          <p:nvPr>
+            <p:ph type="subTitle" idx="1"/>
+          </p:nvPr>
+        </p:nvSpPr>
+        <p:spPr/>
+        <p:txBody>
+          <a:bodyPr/>
+          <a:lstStyle/>
+          <a:p>
+            <a:r>
+              <a:t>Swift was the youngest artist ever to win Album of the Year.</a:t>
+            </a:r>
+          </a:p>
+        </p:txBody>
+      </p:sp>
+    </p:spTree>
+  </p:cSld>
+  <p:clrMapOvr>
+    <a:masterClrMapping/>
+  </p:clrMapOvr>
+</p:sld>
+</file>
+
+<file path=ppt/slides/slide59.xml><?xml version="1.0" encoding="utf-8"?>
+<p:sld xmlns:a="http://schemas.openxmlformats.org/drawingml/2006/main" xmlns:p="http://schemas.openxmlformats.org/presentationml/2006/main" xmlns:r="http://schemas.openxmlformats.org/officeDocument/2006/relationships">
+  <p:cSld>
+    <p:spTree>
+      <p:nvGrpSpPr>
+        <p:cNvPr id="1" name=""/>
+        <p:cNvGrpSpPr/>
+        <p:nvPr/>
+      </p:nvGrpSpPr>
+      <p:grpSpPr/>
+      <p:sp>
+        <p:nvSpPr>
+          <p:cNvPr id="2" name="Title 1"/>
+          <p:cNvSpPr>
+            <a:spLocks noGrp="1"/>
+          </p:cNvSpPr>
+          <p:nvPr>
+            <p:ph type="ctrTitle"/>
+          </p:nvPr>
+        </p:nvSpPr>
+        <p:spPr/>
+        <p:txBody>
+          <a:bodyPr/>
+          <a:lstStyle/>
+          <a:p>
+            <a:r>
+              <a:t> </a:t>
+            </a:r>
+          </a:p>
+        </p:txBody>
+      </p:sp>
+      <p:sp>
+        <p:nvSpPr>
+          <p:cNvPr id="3" name="Subtitle 2"/>
+          <p:cNvSpPr>
+            <a:spLocks noGrp="1"/>
+          </p:cNvSpPr>
+          <p:nvPr>
+            <p:ph type="subTitle" idx="1"/>
+          </p:nvPr>
+        </p:nvSpPr>
+        <p:spPr/>
+        <p:txBody>
+          <a:bodyPr/>
+          <a:lstStyle/>
+          <a:p>
+            <a:r>
+              <a:t>Jon Caramanica of The New York Times found it "refreshing to see someone so gifted make the occasional flub" and described Swift as "the most important new pop star of the past few years".</a:t>
+            </a:r>
+          </a:p>
+        </p:txBody>
+      </p:sp>
+    </p:spTree>
+  </p:cSld>
+  <p:clrMapOvr>
+    <a:masterClrMapping/>
+  </p:clrMapOvr>
+</p:sld>
+</file>
+
+<file path=ppt/slides/slide6.xml><?xml version="1.0" encoding="utf-8"?>
+<p:sld xmlns:a="http://schemas.openxmlformats.org/drawingml/2006/main" xmlns:p="http://schemas.openxmlformats.org/presentationml/2006/main" xmlns:r="http://schemas.openxmlformats.org/officeDocument/2006/relationships">
+  <p:cSld>
+    <p:spTree>
+      <p:nvGrpSpPr>
+        <p:cNvPr id="1" name=""/>
+        <p:cNvGrpSpPr/>
+        <p:nvPr/>
+      </p:nvGrpSpPr>
+      <p:grpSpPr/>
+      <p:sp>
+        <p:nvSpPr>
+          <p:cNvPr id="2" name="Title 1"/>
+          <p:cNvSpPr>
+            <a:spLocks noGrp="1"/>
+          </p:cNvSpPr>
+          <p:nvPr>
+            <p:ph type="ctrTitle"/>
+          </p:nvPr>
+        </p:nvSpPr>
+        <p:spPr/>
+        <p:txBody>
+          <a:bodyPr/>
+          <a:lstStyle/>
+          <a:p>
+            <a:r>
+              <a:t> </a:t>
+            </a:r>
+          </a:p>
+        </p:txBody>
+      </p:sp>
+      <p:sp>
+        <p:nvSpPr>
+          <p:cNvPr id="3" name="Subtitle 2"/>
+          <p:cNvSpPr>
+            <a:spLocks noGrp="1"/>
+          </p:cNvSpPr>
+          <p:nvPr>
+            <p:ph type="subTitle" idx="1"/>
+          </p:nvPr>
+        </p:nvSpPr>
+        <p:spPr/>
+        <p:txBody>
+          <a:bodyPr/>
+          <a:lstStyle/>
+          <a:p>
+            <a:r>
+              <a:t>Swift later shifted her focus toward country music inspired by Shania Twain's songs, which made her "want to just run around the block four times and daydream about everything".</a:t>
+            </a:r>
+          </a:p>
+        </p:txBody>
+      </p:sp>
+    </p:spTree>
+  </p:cSld>
+  <p:clrMapOvr>
+    <a:masterClrMapping/>
+  </p:clrMapOvr>
+</p:sld>
+</file>
+
+<file path=ppt/slides/slide60.xml><?xml version="1.0" encoding="utf-8"?>
+<p:sld xmlns:a="http://schemas.openxmlformats.org/drawingml/2006/main" xmlns:p="http://schemas.openxmlformats.org/presentationml/2006/main" xmlns:r="http://schemas.openxmlformats.org/officeDocument/2006/relationships">
+  <p:cSld>
+    <p:spTree>
+      <p:nvGrpSpPr>
+        <p:cNvPr id="1" name=""/>
+        <p:cNvGrpSpPr/>
+        <p:nvPr/>
+      </p:nvGrpSpPr>
+      <p:grpSpPr/>
+      <p:sp>
+        <p:nvSpPr>
+          <p:cNvPr id="2" name="Title 1"/>
+          <p:cNvSpPr>
+            <a:spLocks noGrp="1"/>
+          </p:cNvSpPr>
+          <p:nvPr>
+            <p:ph type="ctrTitle"/>
+          </p:nvPr>
+        </p:nvSpPr>
+        <p:spPr/>
+        <p:txBody>
+          <a:bodyPr/>
+          <a:lstStyle/>
+          <a:p>
+            <a:r>
+              <a:t> </a:t>
+            </a:r>
+          </a:p>
+        </p:txBody>
+      </p:sp>
+      <p:sp>
+        <p:nvSpPr>
+          <p:cNvPr id="3" name="Subtitle 2"/>
+          <p:cNvSpPr>
+            <a:spLocks noGrp="1"/>
+          </p:cNvSpPr>
+          <p:nvPr>
+            <p:ph type="subTitle" idx="1"/>
+          </p:nvPr>
+        </p:nvSpPr>
+        <p:spPr/>
+        <p:txBody>
+          <a:bodyPr/>
+          <a:lstStyle/>
+          <a:p>
+            <a:r>
+              <a:t>Swift became the youngest ever artist to be named Entertainer of the Year by the Country Music Association.</a:t>
+            </a:r>
+          </a:p>
+        </p:txBody>
+      </p:sp>
+    </p:spTree>
+  </p:cSld>
+  <p:clrMapOvr>
+    <a:masterClrMapping/>
+  </p:clrMapOvr>
+</p:sld>
+</file>
+
+<file path=ppt/slides/slide61.xml><?xml version="1.0" encoding="utf-8"?>
+<p:sld xmlns:a="http://schemas.openxmlformats.org/drawingml/2006/main" xmlns:p="http://schemas.openxmlformats.org/presentationml/2006/main" xmlns:r="http://schemas.openxmlformats.org/officeDocument/2006/relationships">
+  <p:cSld>
+    <p:spTree>
+      <p:nvGrpSpPr>
+        <p:cNvPr id="1" name=""/>
+        <p:cNvGrpSpPr/>
+        <p:nvPr/>
+      </p:nvGrpSpPr>
+      <p:grpSpPr/>
+      <p:sp>
+        <p:nvSpPr>
+          <p:cNvPr id="2" name="Title 1"/>
+          <p:cNvSpPr>
+            <a:spLocks noGrp="1"/>
+          </p:cNvSpPr>
+          <p:nvPr>
+            <p:ph type="ctrTitle"/>
+          </p:nvPr>
+        </p:nvSpPr>
+        <p:spPr/>
+        <p:txBody>
+          <a:bodyPr/>
+          <a:lstStyle/>
+          <a:p>
+            <a:r>
+              <a:t> </a:t>
+            </a:r>
+          </a:p>
+        </p:txBody>
+      </p:sp>
+      <p:sp>
+        <p:nvSpPr>
+          <p:cNvPr id="3" name="Subtitle 2"/>
+          <p:cNvSpPr>
+            <a:spLocks noGrp="1"/>
+          </p:cNvSpPr>
+          <p:nvPr>
+            <p:ph type="subTitle" idx="1"/>
+          </p:nvPr>
+        </p:nvSpPr>
+        <p:spPr/>
+        <p:txBody>
+          <a:bodyPr/>
+          <a:lstStyle/>
+          <a:p>
+            <a:r>
+              <a:t>It entered the United States at number three, making Swift the second female artist in the history of the Hot 100 (after Mariah Carey) to debut multiple tracks in the top five in one year; the other was "Today Was a Fairytale" at number two.</a:t>
+            </a:r>
+          </a:p>
+        </p:txBody>
+      </p:sp>
+    </p:spTree>
+  </p:cSld>
+  <p:clrMapOvr>
+    <a:masterClrMapping/>
+  </p:clrMapOvr>
+</p:sld>
+</file>
+
+<file path=ppt/slides/slide62.xml><?xml version="1.0" encoding="utf-8"?>
+<p:sld xmlns:a="http://schemas.openxmlformats.org/drawingml/2006/main" xmlns:p="http://schemas.openxmlformats.org/presentationml/2006/main" xmlns:r="http://schemas.openxmlformats.org/officeDocument/2006/relationships">
+  <p:cSld>
+    <p:spTree>
+      <p:nvGrpSpPr>
+        <p:cNvPr id="1" name=""/>
+        <p:cNvGrpSpPr/>
+        <p:nvPr/>
+      </p:nvGrpSpPr>
+      <p:grpSpPr/>
+      <p:sp>
+        <p:nvSpPr>
+          <p:cNvPr id="2" name="Title 1"/>
+          <p:cNvSpPr>
+            <a:spLocks noGrp="1"/>
+          </p:cNvSpPr>
+          <p:nvPr>
+            <p:ph type="ctrTitle"/>
+          </p:nvPr>
+        </p:nvSpPr>
+        <p:spPr/>
+        <p:txBody>
+          <a:bodyPr/>
+          <a:lstStyle/>
+          <a:p>
+            <a:r>
+              <a:t> </a:t>
+            </a:r>
+          </a:p>
+        </p:txBody>
+      </p:sp>
+      <p:sp>
+        <p:nvSpPr>
+          <p:cNvPr id="3" name="Subtitle 2"/>
+          <p:cNvSpPr>
+            <a:spLocks noGrp="1"/>
+          </p:cNvSpPr>
+          <p:nvPr>
+            <p:ph type="subTitle" idx="1"/>
+          </p:nvPr>
+        </p:nvSpPr>
+        <p:spPr/>
+        <p:txBody>
+          <a:bodyPr/>
+          <a:lstStyle/>
+          <a:p>
+            <a:r>
+              <a:t>"Mean" won Best Country Song and Best Country Solo Performance at the 54th Annual Grammy Awards.</a:t>
+            </a:r>
+          </a:p>
+        </p:txBody>
+      </p:sp>
+    </p:spTree>
+  </p:cSld>
+  <p:clrMapOvr>
+    <a:masterClrMapping/>
+  </p:clrMapOvr>
+</p:sld>
+</file>
+
 <file path=ppt/slides/slide63.xml><?xml version="1.0" encoding="utf-8"?>
 <p:sld xmlns:a="http://schemas.openxmlformats.org/drawingml/2006/main" xmlns:p="http://schemas.openxmlformats.org/presentationml/2006/main" xmlns:r="http://schemas.openxmlformats.org/officeDocument/2006/relationships">
   <p:cSld>
@@ -8719,7 +9793,7 @@
           <a:lstStyle/>
           <a:p>
             <a:r>
-              <a:t>ADVANTAGES</a:t>
+              <a:t> </a:t>
             </a:r>
           </a:p>
         </p:txBody>
@@ -8740,7 +9814,7 @@
           <a:lstStyle/>
           <a:p>
             <a:r>
-              <a:t> </a:t>
+              <a:t>Swift won various other awards for Speak Now, including Songwriter/Artist of the Year by the Nashville Songwriters Association (2010 and 2011), Woman of the Year by Billboard (2011), and Entertainer of the Year by the Academy of Country Music (2011 and 2012) and the Country Music Association in 2011.</a:t>
             </a:r>
           </a:p>
         </p:txBody>
@@ -8800,7 +9874,7 @@
           <a:lstStyle/>
           <a:p>
             <a:r>
-              <a:t>Gomez's acting credits include starring roles in the films Another Cinderella Story (2008), Princess Protection Program (2009), Wizards of Waverly Place: The Movie (2009), Ramona and Beezus (2010), Monte Carlo (2011), Spring Breakers (2012), Getaway (2013) and The Fundamentals of Caring (2016).</a:t>
+              <a:t>At the American Music Awards of 2011, Swift won Artist of the Year and Favorite Country Album.</a:t>
             </a:r>
           </a:p>
         </p:txBody>
@@ -8860,7 +9934,7 @@
           <a:lstStyle/>
           <a:p>
             <a:r>
-              <a:t>Gomez was given a recurring role on the popular Disney Channel series Hannah Montana in 2007, portraying pop star Mikayla.</a:t>
+              <a:t>Its single "I Knew You Were Trouble" won Best Female Video at the 2013 MTV Video Music Awards.</a:t>
             </a:r>
           </a:p>
         </p:txBody>
@@ -8920,7 +9994,7 @@
           <a:lstStyle/>
           <a:p>
             <a:r>
-              <a:t>She later auditioned for a role in the Disney series Wizards of Waverly Place, ultimately winning the lead role of Alex Russo.</a:t>
+              <a:t>Swift was named Best Female Country Artist at the 2012 American Music Awards and Artist of the Year at the 2013 ceremony.</a:t>
             </a:r>
           </a:p>
         </p:txBody>
@@ -8980,7 +10054,7 @@
           <a:lstStyle/>
           <a:p>
             <a:r>
-              <a:t>While working on the second season of Wizards of Waverly Place, Gomez appeared on the Disney Channel special Studio DC: Almost Live alongside various other Disney stars.</a:t>
+              <a:t>She received the Nashville Songwriters Association's Songwriter/Artist Award for the fifth and sixth consecutive years in 2012 and 2013 respectively.</a:t>
             </a:r>
           </a:p>
         </p:txBody>
@@ -9040,7 +10114,7 @@
           <a:lstStyle/>
           <a:p>
             <a:r>
-              <a:t>Later that year, Gomez had the supporting role of Helga in the animated film Horton Hears a Who!</a:t>
+              <a:t>In 2013, Swift co-wrote and co-produced "Sweeter than Fiction" with Jack Antonoff for the One Chance soundtrack, and received a Best Original Song nomination at the 71st Golden Globe Awards.</a:t>
             </a:r>
           </a:p>
         </p:txBody>
@@ -9100,7 +10174,7 @@
           <a:lstStyle/>
           <a:p>
             <a:r>
-              <a:t>Gomez continued to have mainstream success throughout the following year, appearing as Alex Russo in a crossover episode of the Disney series The Suite Life on Deck.</a:t>
+              <a:t>Outside music, Swift voiced Audrey, a tree lover, in the animated film The Lorax (2012), made a cameo in the sitcom New Girl (2013), and had a supporting role in the film adaptation of The Giver (2014).</a:t>
             </a:r>
           </a:p>
         </p:txBody>
@@ -9160,7 +10234,7 @@
           <a:lstStyle/>
           <a:p>
             <a:r>
-              <a:t>Gomez made a guest appearance in a 2006 episode of the Disney series The Suite Life of Zack &amp; Cody.</a:t>
+              <a:t>In 2003, Swift and her parents started working with New York-based music manager Dan Dymtrow.</a:t>
             </a:r>
           </a:p>
         </p:txBody>
@@ -9220,7 +10294,7 @@
           <a:lstStyle/>
           <a:p>
             <a:r>
-              <a:t>The film saw Gomez in a more mature role than her previous works, and reportedly led to Gomez having a "bit of a meltdown on set.</a:t>
+              <a:t>The videos for "Blank Space" and "Bad Blood" won four accolades at the 2015 MTV Video Music Awards, with the latter winning for Video of the Year and Best Collaboration.</a:t>
             </a:r>
           </a:p>
         </p:txBody>
@@ -9280,7 +10354,7 @@
           <a:lstStyle/>
           <a:p>
             <a:r>
-              <a:t>Gomez had a supporting role in the comedy film Neighbors 2: Sorority Rising; she portrayed the president of a Phi Lambda sorority.</a:t>
+              <a:t>Swift was named Billboard's Woman of the Year in 2014, becoming the first artist to win the award twice.</a:t>
             </a:r>
           </a:p>
         </p:txBody>
@@ -9340,7 +10414,7 @@
           <a:lstStyle/>
           <a:p>
             <a:r>
-              <a:t>From 2009 to 2012, Gomez was involved in "Disney's Friends for Change", an organization which promoted "environmentally-friendly behavior", and she appeared in its public service announcements.</a:t>
+              <a:t>Also that year, she received the Dick Clark Award for Excellence at the American Music Awards.</a:t>
             </a:r>
           </a:p>
         </p:txBody>
@@ -9400,7 +10474,7 @@
           <a:lstStyle/>
           <a:p>
             <a:r>
-              <a:t>With her former band Selena Gomez &amp; the Scene, she attained the top-ten albums Kiss &amp; Tell (2009), A Year Without Rain (2010) and When the Sun Goes Down (2011) on the US Billboard 200.</a:t>
+              <a:t>In 2015, "Shake It Off" was nominated for three Grammy Awards, including Record of the Year and Song of the Year and Swift won the Brit Award for International Female Solo Artist.</a:t>
             </a:r>
           </a:p>
         </p:txBody>
@@ -9460,7 +10534,7 @@
           <a:lstStyle/>
           <a:p>
             <a:r>
-              <a:t>She has also earned seven top-ten entries on the US Billboard Hot 100: "Come &amp; Get It", "The Heart Wants What It Wants", "Good for You" with ASAP Rocky, "Same Old Love", "Hands to Myself", "We Don't Talk Anymore" and "It Ain't Me" with Kygo.</a:t>
+              <a:t>Swift was one of eight artists to receive a 50th Anniversary Milestone Award at the 2015 Academy of Country Music Awards.</a:t>
             </a:r>
           </a:p>
         </p:txBody>
@@ -9520,7 +10594,7 @@
           <a:lstStyle/>
           <a:p>
             <a:r>
-              <a:t>While working on the second season of Wizards of Waverly Place, Gomez appeared on the Disney Channel special Studio DC: Almost Live alongside various other Disney stars.</a:t>
+              <a:t>In 2016, Swift won three Grammy Awards for 1989—Album of the Year, Best Pop Vocal Album, and Best Music Video for "Bad Blood".</a:t>
             </a:r>
           </a:p>
         </p:txBody>
@@ -9580,7 +10654,7 @@
           <a:lstStyle/>
           <a:p>
             <a:r>
-              <a:t>" The group released their debut studio album in August 2009, which debuted at number nine on the Billboard 200 albums chart in the United States, with first-week sales of 66,000 copies.</a:t>
+              <a:t>The song earned Swift an award for Song of the Year at the 51st CMA Awards.</a:t>
             </a:r>
           </a:p>
         </p:txBody>
@@ -9640,7 +10714,7 @@
           <a:lstStyle/>
           <a:p>
             <a:r>
-              <a:t>The single went on to become her second top ten hit on the Billboard Hot 100 chart, and sold over one million copies in the United States.</a:t>
+              <a:t>At the 2017 MTV Video Music Awards, the duo won the award for Best Collaboration for the song's music video.</a:t>
             </a:r>
           </a:p>
         </p:txBody>
@@ -9700,7 +10774,7 @@
           <a:lstStyle/>
           <a:p>
             <a:r>
-              <a:t>Gomez released "Good for You" (2015) as the lead single from her second studio album on June 22, 2015; the single features rapper ASAP Rocky.</a:t>
+              <a:t>At the American Music Awards of 2018, Swift won Tour of the Year for the tour, Artist of the Year, Favorite Pop/Rock Female Artist, and Favorite Pop/Rock Album for Reputation.</a:t>
             </a:r>
           </a:p>
         </p:txBody>
@@ -9760,7 +10834,7 @@
           <a:lstStyle/>
           <a:p>
             <a:r>
-              <a:t>"Same Old Love" (2015) was released as the album's second single, and went on to top the Mainstream Top 40 chart.</a:t>
+              <a:t>In November 2018, Swift signed a new multi-album deal with Big Machine's distributor Universal Music Group; in the United States, her future releases will be promoted under the Republic Records imprint.</a:t>
             </a:r>
           </a:p>
         </p:txBody>
@@ -9820,7 +10894,7 @@
           <a:lstStyle/>
           <a:p>
             <a:r>
-              <a:t>During this time, Gomez filmed pilot episodes for two potential Disney Channel series; the first, titled Arwin!, a spin-off of the Suite Life series, while the second titled Stevie Sanchez was a spin-off of the series Lizzie McGuire.</a:t>
+              <a:t>Borchetta has said that record industry peers disliked his signing of a 16-year-old singer-songwriter at first, but that Swift tapped into a previously unknown market—teenage girls who listen to country music.</a:t>
             </a:r>
           </a:p>
         </p:txBody>
@@ -9880,7 +10954,7 @@
           <a:lstStyle/>
           <a:p>
             <a:r>
-              <a:t>The single peaked at number five on the Billboard Hot 100, tying with "Good for You" as her highest charting effort.</a:t>
+              <a:t>Swift was drawn to the storytelling of country music, and was introduced to the genre by "the great female country artists of the '90s"—Shania Twain, Faith Hill, and the Dixie Chicks.</a:t>
             </a:r>
           </a:p>
         </p:txBody>
@@ -9940,7 +11014,7 @@
           <a:lstStyle/>
           <a:p>
             <a:r>
-              <a:t>Gomez and Canadian singer Tory Lanez were featured on "Trust Nobody", the second single from Norwegian DJ Cashmere Cat debut studio album 9.</a:t>
+              <a:t>Alt-country artists such as Ryan Adams, Patty Griffin and Lori McKenna have inspired Swift.</a:t>
             </a:r>
           </a:p>
         </p:txBody>
@@ -10000,7 +11074,7 @@
           <a:lstStyle/>
           <a:p>
             <a:r>
-              <a:t>She has a limited-edition collection of handbags called the "Selena Grace" that she designed in collaboration with luxury brand Coach, Inc. On March 29, 2018, Gomez released photos from her partnership with Coach on her Instagram account.</a:t>
+              <a:t>McCartney, both as a Beatle and a solo artist, makes Swift feel "as if I've been let into his heart and his mind ... Any musician could only dream of a legacy like that".</a:t>
             </a:r>
           </a:p>
         </p:txBody>
@@ -10060,35 +11134,11 @@
           <a:lstStyle/>
           <a:p>
             <a:r>
-              <a:t> </a:t>
-            </a:r>
-          </a:p>
-        </p:txBody>
-      </p:sp>
-      <p:pic>
-        <p:nvPicPr>
-          <p:cNvPr id="4" name="Picture 3" descr="image2.jpg"/>
-          <p:cNvPicPr>
-            <a:picLocks noChangeAspect="1"/>
-          </p:cNvPicPr>
-          <p:nvPr/>
-        </p:nvPicPr>
-        <p:blipFill>
-          <a:blip r:embed="rId2"/>
-          <a:stretch>
-            <a:fillRect/>
-          </a:stretch>
-        </p:blipFill>
-        <p:spPr>
-          <a:xfrm>
-            <a:off x="914400" y="1828800"/>
-            <a:ext cx="6502400" cy="3657600"/>
-          </a:xfrm>
-          <a:prstGeom prst="rect">
-            <a:avLst/>
-          </a:prstGeom>
-        </p:spPr>
-      </p:pic>
+              <a:t>In 2015, she was named Woman of the Year at the Elle Style Awards, and ranked first in Maxim's Hot 100 list.</a:t>
+            </a:r>
+          </a:p>
+        </p:txBody>
+      </p:sp>
     </p:spTree>
   </p:cSld>
   <p:clrMapOvr>
@@ -10123,7 +11173,7 @@
           <a:lstStyle/>
           <a:p>
             <a:r>
-              <a:t>DISADVANTAGES</a:t>
+              <a:t> </a:t>
             </a:r>
           </a:p>
         </p:txBody>
@@ -10144,7 +11194,7 @@
           <a:lstStyle/>
           <a:p>
             <a:r>
-              <a:t> </a:t>
+              <a:t>In 2012, she pledged $4 million to fund the building of a new education center at the Country Music Hall of Fame and Museum in Nashville.</a:t>
             </a:r>
           </a:p>
         </p:txBody>
@@ -10204,7 +11254,7 @@
           <a:lstStyle/>
           <a:p>
             <a:r>
-              <a:t>Gomez appeared in the film Behaving Badly (2014) with Dylan McDermott and Nat Wolff.</a:t>
+              <a:t>As a recipient of the Academy of Country Music's Entertainer of the Year in 2011, Swift donated $25,000 to St. Jude Children's Research Hospital, Tennessee.</a:t>
             </a:r>
           </a:p>
         </p:txBody>
@@ -10264,7 +11314,187 @@
           <a:lstStyle/>
           <a:p>
             <a:r>
-              <a:t>The project, filmed prior to Gomez's stint in rehab, was released in August 2014 to a generally negative critical and commercial reception.</a:t>
+              <a:t>Later that year, Swift made a surprise appearance at a benefit concert in New York City raising money for LGBT equality.</a:t>
+            </a:r>
+          </a:p>
+        </p:txBody>
+      </p:sp>
+    </p:spTree>
+  </p:cSld>
+  <p:clrMapOvr>
+    <a:masterClrMapping/>
+  </p:clrMapOvr>
+</p:sld>
+</file>
+
+<file path=ppt/slides/slide87.xml><?xml version="1.0" encoding="utf-8"?>
+<p:sld xmlns:a="http://schemas.openxmlformats.org/drawingml/2006/main" xmlns:p="http://schemas.openxmlformats.org/presentationml/2006/main" xmlns:r="http://schemas.openxmlformats.org/officeDocument/2006/relationships">
+  <p:cSld>
+    <p:spTree>
+      <p:nvGrpSpPr>
+        <p:cNvPr id="1" name=""/>
+        <p:cNvGrpSpPr/>
+        <p:nvPr/>
+      </p:nvGrpSpPr>
+      <p:grpSpPr/>
+      <p:sp>
+        <p:nvSpPr>
+          <p:cNvPr id="2" name="Title 1"/>
+          <p:cNvSpPr>
+            <a:spLocks noGrp="1"/>
+          </p:cNvSpPr>
+          <p:nvPr>
+            <p:ph type="ctrTitle"/>
+          </p:nvPr>
+        </p:nvSpPr>
+        <p:spPr/>
+        <p:txBody>
+          <a:bodyPr/>
+          <a:lstStyle/>
+          <a:p>
+            <a:r>
+              <a:t> </a:t>
+            </a:r>
+          </a:p>
+        </p:txBody>
+      </p:sp>
+      <p:sp>
+        <p:nvSpPr>
+          <p:cNvPr id="3" name="Subtitle 2"/>
+          <p:cNvSpPr>
+            <a:spLocks noGrp="1"/>
+          </p:cNvSpPr>
+          <p:nvPr>
+            <p:ph type="subTitle" idx="1"/>
+          </p:nvPr>
+        </p:nvSpPr>
+        <p:spPr/>
+        <p:txBody>
+          <a:bodyPr/>
+          <a:lstStyle/>
+          <a:p>
+            <a:r>
+              <a:t>The music video for Swift's anti-bullying song "Mean" deals in part with homophobia in high schools; the video was nominated for an MTV VMA social activism award in 2011.</a:t>
+            </a:r>
+          </a:p>
+        </p:txBody>
+      </p:sp>
+    </p:spTree>
+  </p:cSld>
+  <p:clrMapOvr>
+    <a:masterClrMapping/>
+  </p:clrMapOvr>
+</p:sld>
+</file>
+
+<file path=ppt/slides/slide88.xml><?xml version="1.0" encoding="utf-8"?>
+<p:sld xmlns:a="http://schemas.openxmlformats.org/drawingml/2006/main" xmlns:p="http://schemas.openxmlformats.org/presentationml/2006/main" xmlns:r="http://schemas.openxmlformats.org/officeDocument/2006/relationships">
+  <p:cSld>
+    <p:spTree>
+      <p:nvGrpSpPr>
+        <p:cNvPr id="1" name=""/>
+        <p:cNvGrpSpPr/>
+        <p:nvPr/>
+      </p:nvGrpSpPr>
+      <p:grpSpPr/>
+      <p:sp>
+        <p:nvSpPr>
+          <p:cNvPr id="2" name="Title 1"/>
+          <p:cNvSpPr>
+            <a:spLocks noGrp="1"/>
+          </p:cNvSpPr>
+          <p:nvPr>
+            <p:ph type="ctrTitle"/>
+          </p:nvPr>
+        </p:nvSpPr>
+        <p:spPr/>
+        <p:txBody>
+          <a:bodyPr/>
+          <a:lstStyle/>
+          <a:p>
+            <a:r>
+              <a:t> </a:t>
+            </a:r>
+          </a:p>
+        </p:txBody>
+      </p:sp>
+      <p:sp>
+        <p:nvSpPr>
+          <p:cNvPr id="3" name="Subtitle 2"/>
+          <p:cNvSpPr>
+            <a:spLocks noGrp="1"/>
+          </p:cNvSpPr>
+          <p:nvPr>
+            <p:ph type="subTitle" idx="1"/>
+          </p:nvPr>
+        </p:nvSpPr>
+        <p:spPr/>
+        <p:txBody>
+          <a:bodyPr/>
+          <a:lstStyle/>
+          <a:p>
+            <a:r>
+              <a:t>During Swift's acceptance speech for Artist of the Year at the American Music Awards of 2018, she encouraged her fans to vote in the 2018 midterm elections.</a:t>
+            </a:r>
+          </a:p>
+        </p:txBody>
+      </p:sp>
+    </p:spTree>
+  </p:cSld>
+  <p:clrMapOvr>
+    <a:masterClrMapping/>
+  </p:clrMapOvr>
+</p:sld>
+</file>
+
+<file path=ppt/slides/slide89.xml><?xml version="1.0" encoding="utf-8"?>
+<p:sld xmlns:a="http://schemas.openxmlformats.org/drawingml/2006/main" xmlns:p="http://schemas.openxmlformats.org/presentationml/2006/main" xmlns:r="http://schemas.openxmlformats.org/officeDocument/2006/relationships">
+  <p:cSld>
+    <p:spTree>
+      <p:nvGrpSpPr>
+        <p:cNvPr id="1" name=""/>
+        <p:cNvGrpSpPr/>
+        <p:nvPr/>
+      </p:nvGrpSpPr>
+      <p:grpSpPr/>
+      <p:sp>
+        <p:nvSpPr>
+          <p:cNvPr id="2" name="Title 1"/>
+          <p:cNvSpPr>
+            <a:spLocks noGrp="1"/>
+          </p:cNvSpPr>
+          <p:nvPr>
+            <p:ph type="ctrTitle"/>
+          </p:nvPr>
+        </p:nvSpPr>
+        <p:spPr/>
+        <p:txBody>
+          <a:bodyPr/>
+          <a:lstStyle/>
+          <a:p>
+            <a:r>
+              <a:t> </a:t>
+            </a:r>
+          </a:p>
+        </p:txBody>
+      </p:sp>
+      <p:sp>
+        <p:nvSpPr>
+          <p:cNvPr id="3" name="Subtitle 2"/>
+          <p:cNvSpPr>
+            <a:spLocks noGrp="1"/>
+          </p:cNvSpPr>
+          <p:nvPr>
+            <p:ph type="subTitle" idx="1"/>
+          </p:nvPr>
+        </p:nvSpPr>
+        <p:spPr/>
+        <p:txBody>
+          <a:bodyPr/>
+          <a:lstStyle/>
+          <a:p>
+            <a:r>
+              <a:t>Swift has received many awards and honors, including 10 Grammy Awards, 23 American Music Awards (most wins by a female artist), 23 Billboard Music Awards (the most wins by an act), 12 Country Music Association Awards, 8 Academy of Country Music Awards, one Brit Award, and one Emmy Award.</a:t>
             </a:r>
           </a:p>
         </p:txBody>
@@ -10324,7 +11554,607 @@
           <a:lstStyle/>
           <a:p>
             <a:r>
-              <a:t>Gomez recorded the theme song for the series, titled "Everything is Not What It Seems".</a:t>
+              <a:t>Later that year, Swift both hosted and performed as the musical guest for an episode of Saturday Night Live.</a:t>
+            </a:r>
+          </a:p>
+        </p:txBody>
+      </p:sp>
+    </p:spTree>
+  </p:cSld>
+  <p:clrMapOvr>
+    <a:masterClrMapping/>
+  </p:clrMapOvr>
+</p:sld>
+</file>
+
+<file path=ppt/slides/slide90.xml><?xml version="1.0" encoding="utf-8"?>
+<p:sld xmlns:a="http://schemas.openxmlformats.org/drawingml/2006/main" xmlns:p="http://schemas.openxmlformats.org/presentationml/2006/main" xmlns:r="http://schemas.openxmlformats.org/officeDocument/2006/relationships">
+  <p:cSld>
+    <p:spTree>
+      <p:nvGrpSpPr>
+        <p:cNvPr id="1" name=""/>
+        <p:cNvGrpSpPr/>
+        <p:nvPr/>
+      </p:nvGrpSpPr>
+      <p:grpSpPr/>
+      <p:sp>
+        <p:nvSpPr>
+          <p:cNvPr id="2" name="Title 1"/>
+          <p:cNvSpPr>
+            <a:spLocks noGrp="1"/>
+          </p:cNvSpPr>
+          <p:nvPr>
+            <p:ph type="ctrTitle"/>
+          </p:nvPr>
+        </p:nvSpPr>
+        <p:spPr/>
+        <p:txBody>
+          <a:bodyPr/>
+          <a:lstStyle/>
+          <a:p>
+            <a:r>
+              <a:t> </a:t>
+            </a:r>
+          </a:p>
+        </p:txBody>
+      </p:sp>
+      <p:sp>
+        <p:nvSpPr>
+          <p:cNvPr id="3" name="Subtitle 2"/>
+          <p:cNvSpPr>
+            <a:spLocks noGrp="1"/>
+          </p:cNvSpPr>
+          <p:nvPr>
+            <p:ph type="subTitle" idx="1"/>
+          </p:nvPr>
+        </p:nvSpPr>
+        <p:spPr/>
+        <p:txBody>
+          <a:bodyPr/>
+          <a:lstStyle/>
+          <a:p>
+            <a:r>
+              <a:t>Swift's second album, Fearless, was released in 2008.</a:t>
+            </a:r>
+          </a:p>
+        </p:txBody>
+      </p:sp>
+    </p:spTree>
+  </p:cSld>
+  <p:clrMapOvr>
+    <a:masterClrMapping/>
+  </p:clrMapOvr>
+</p:sld>
+</file>
+
+<file path=ppt/slides/slide91.xml><?xml version="1.0" encoding="utf-8"?>
+<p:sld xmlns:a="http://schemas.openxmlformats.org/drawingml/2006/main" xmlns:p="http://schemas.openxmlformats.org/presentationml/2006/main" xmlns:r="http://schemas.openxmlformats.org/officeDocument/2006/relationships">
+  <p:cSld>
+    <p:spTree>
+      <p:nvGrpSpPr>
+        <p:cNvPr id="1" name=""/>
+        <p:cNvGrpSpPr/>
+        <p:nvPr/>
+      </p:nvGrpSpPr>
+      <p:grpSpPr/>
+      <p:sp>
+        <p:nvSpPr>
+          <p:cNvPr id="2" name="Title 1"/>
+          <p:cNvSpPr>
+            <a:spLocks noGrp="1"/>
+          </p:cNvSpPr>
+          <p:nvPr>
+            <p:ph type="ctrTitle"/>
+          </p:nvPr>
+        </p:nvSpPr>
+        <p:spPr/>
+        <p:txBody>
+          <a:bodyPr/>
+          <a:lstStyle/>
+          <a:p>
+            <a:r>
+              <a:t> </a:t>
+            </a:r>
+          </a:p>
+        </p:txBody>
+      </p:sp>
+      <p:sp>
+        <p:nvSpPr>
+          <p:cNvPr id="3" name="Subtitle 2"/>
+          <p:cNvSpPr>
+            <a:spLocks noGrp="1"/>
+          </p:cNvSpPr>
+          <p:nvPr>
+            <p:ph type="subTitle" idx="1"/>
+          </p:nvPr>
+        </p:nvSpPr>
+        <p:spPr/>
+        <p:txBody>
+          <a:bodyPr/>
+          <a:lstStyle/>
+          <a:p>
+            <a:r>
+              <a:t>Buoyed by the success of pop crossover singles "Love Story" and "You Belong with Me", Fearless became the best-selling album of 2009 in the US.</a:t>
+            </a:r>
+          </a:p>
+        </p:txBody>
+      </p:sp>
+    </p:spTree>
+  </p:cSld>
+  <p:clrMapOvr>
+    <a:masterClrMapping/>
+  </p:clrMapOvr>
+</p:sld>
+</file>
+
+<file path=ppt/slides/slide92.xml><?xml version="1.0" encoding="utf-8"?>
+<p:sld xmlns:a="http://schemas.openxmlformats.org/drawingml/2006/main" xmlns:p="http://schemas.openxmlformats.org/presentationml/2006/main" xmlns:r="http://schemas.openxmlformats.org/officeDocument/2006/relationships">
+  <p:cSld>
+    <p:spTree>
+      <p:nvGrpSpPr>
+        <p:cNvPr id="1" name=""/>
+        <p:cNvGrpSpPr/>
+        <p:nvPr/>
+      </p:nvGrpSpPr>
+      <p:grpSpPr/>
+      <p:sp>
+        <p:nvSpPr>
+          <p:cNvPr id="2" name="Title 1"/>
+          <p:cNvSpPr>
+            <a:spLocks noGrp="1"/>
+          </p:cNvSpPr>
+          <p:nvPr>
+            <p:ph type="ctrTitle"/>
+          </p:nvPr>
+        </p:nvSpPr>
+        <p:spPr/>
+        <p:txBody>
+          <a:bodyPr/>
+          <a:lstStyle/>
+          <a:p>
+            <a:r>
+              <a:t> </a:t>
+            </a:r>
+          </a:p>
+        </p:txBody>
+      </p:sp>
+      <p:sp>
+        <p:nvSpPr>
+          <p:cNvPr id="3" name="Subtitle 2"/>
+          <p:cNvSpPr>
+            <a:spLocks noGrp="1"/>
+          </p:cNvSpPr>
+          <p:nvPr>
+            <p:ph type="subTitle" idx="1"/>
+          </p:nvPr>
+        </p:nvSpPr>
+        <p:spPr/>
+        <p:txBody>
+          <a:bodyPr/>
+          <a:lstStyle/>
+          <a:p>
+            <a:r>
+              <a:t>It debuted at number one in the United States and the single "Mean" won two Grammy Awards.</a:t>
+            </a:r>
+          </a:p>
+        </p:txBody>
+      </p:sp>
+    </p:spTree>
+  </p:cSld>
+  <p:clrMapOvr>
+    <a:masterClrMapping/>
+  </p:clrMapOvr>
+</p:sld>
+</file>
+
+<file path=ppt/slides/slide93.xml><?xml version="1.0" encoding="utf-8"?>
+<p:sld xmlns:a="http://schemas.openxmlformats.org/drawingml/2006/main" xmlns:p="http://schemas.openxmlformats.org/presentationml/2006/main" xmlns:r="http://schemas.openxmlformats.org/officeDocument/2006/relationships">
+  <p:cSld>
+    <p:spTree>
+      <p:nvGrpSpPr>
+        <p:cNvPr id="1" name=""/>
+        <p:cNvGrpSpPr/>
+        <p:nvPr/>
+      </p:nvGrpSpPr>
+      <p:grpSpPr/>
+      <p:sp>
+        <p:nvSpPr>
+          <p:cNvPr id="2" name="Title 1"/>
+          <p:cNvSpPr>
+            <a:spLocks noGrp="1"/>
+          </p:cNvSpPr>
+          <p:nvPr>
+            <p:ph type="ctrTitle"/>
+          </p:nvPr>
+        </p:nvSpPr>
+        <p:spPr/>
+        <p:txBody>
+          <a:bodyPr/>
+          <a:lstStyle/>
+          <a:p>
+            <a:r>
+              <a:t> </a:t>
+            </a:r>
+          </a:p>
+        </p:txBody>
+      </p:sp>
+      <p:sp>
+        <p:nvSpPr>
+          <p:cNvPr id="3" name="Subtitle 2"/>
+          <p:cNvSpPr>
+            <a:spLocks noGrp="1"/>
+          </p:cNvSpPr>
+          <p:nvPr>
+            <p:ph type="subTitle" idx="1"/>
+          </p:nvPr>
+        </p:nvSpPr>
+        <p:spPr/>
+        <p:txBody>
+          <a:bodyPr/>
+          <a:lstStyle/>
+          <a:p>
+            <a:r>
+              <a:t>Her fourth album, Red (2012), yielded the successful singles "We Are Never Ever Getting Back Together" and "I Knew You Were Trouble".</a:t>
+            </a:r>
+          </a:p>
+        </p:txBody>
+      </p:sp>
+    </p:spTree>
+  </p:cSld>
+  <p:clrMapOvr>
+    <a:masterClrMapping/>
+  </p:clrMapOvr>
+</p:sld>
+</file>
+
+<file path=ppt/slides/slide94.xml><?xml version="1.0" encoding="utf-8"?>
+<p:sld xmlns:a="http://schemas.openxmlformats.org/drawingml/2006/main" xmlns:p="http://schemas.openxmlformats.org/presentationml/2006/main" xmlns:r="http://schemas.openxmlformats.org/officeDocument/2006/relationships">
+  <p:cSld>
+    <p:spTree>
+      <p:nvGrpSpPr>
+        <p:cNvPr id="1" name=""/>
+        <p:cNvGrpSpPr/>
+        <p:nvPr/>
+      </p:nvGrpSpPr>
+      <p:grpSpPr/>
+      <p:sp>
+        <p:nvSpPr>
+          <p:cNvPr id="2" name="Title 1"/>
+          <p:cNvSpPr>
+            <a:spLocks noGrp="1"/>
+          </p:cNvSpPr>
+          <p:nvPr>
+            <p:ph type="ctrTitle"/>
+          </p:nvPr>
+        </p:nvSpPr>
+        <p:spPr/>
+        <p:txBody>
+          <a:bodyPr/>
+          <a:lstStyle/>
+          <a:p>
+            <a:r>
+              <a:t> </a:t>
+            </a:r>
+          </a:p>
+        </p:txBody>
+      </p:sp>
+      <p:sp>
+        <p:nvSpPr>
+          <p:cNvPr id="3" name="Subtitle 2"/>
+          <p:cNvSpPr>
+            <a:spLocks noGrp="1"/>
+          </p:cNvSpPr>
+          <p:nvPr>
+            <p:ph type="subTitle" idx="1"/>
+          </p:nvPr>
+        </p:nvSpPr>
+        <p:spPr/>
+        <p:txBody>
+          <a:bodyPr/>
+          <a:lstStyle/>
+          <a:p>
+            <a:r>
+              <a:t>Taylor Swift peaked at number five on the Billboard 200 albums chart in the United States and spent 157 weeks on the ranking, marking the longest stay on the chart by any release in the country in the 2000s decade.</a:t>
+            </a:r>
+          </a:p>
+        </p:txBody>
+      </p:sp>
+    </p:spTree>
+  </p:cSld>
+  <p:clrMapOvr>
+    <a:masterClrMapping/>
+  </p:clrMapOvr>
+</p:sld>
+</file>
+
+<file path=ppt/slides/slide95.xml><?xml version="1.0" encoding="utf-8"?>
+<p:sld xmlns:a="http://schemas.openxmlformats.org/drawingml/2006/main" xmlns:p="http://schemas.openxmlformats.org/presentationml/2006/main" xmlns:r="http://schemas.openxmlformats.org/officeDocument/2006/relationships">
+  <p:cSld>
+    <p:spTree>
+      <p:nvGrpSpPr>
+        <p:cNvPr id="1" name=""/>
+        <p:cNvGrpSpPr/>
+        <p:nvPr/>
+      </p:nvGrpSpPr>
+      <p:grpSpPr/>
+      <p:sp>
+        <p:nvSpPr>
+          <p:cNvPr id="2" name="Title 1"/>
+          <p:cNvSpPr>
+            <a:spLocks noGrp="1"/>
+          </p:cNvSpPr>
+          <p:nvPr>
+            <p:ph type="ctrTitle"/>
+          </p:nvPr>
+        </p:nvSpPr>
+        <p:spPr/>
+        <p:txBody>
+          <a:bodyPr/>
+          <a:lstStyle/>
+          <a:p>
+            <a:r>
+              <a:t> </a:t>
+            </a:r>
+          </a:p>
+        </p:txBody>
+      </p:sp>
+      <p:sp>
+        <p:nvSpPr>
+          <p:cNvPr id="3" name="Subtitle 2"/>
+          <p:cNvSpPr>
+            <a:spLocks noGrp="1"/>
+          </p:cNvSpPr>
+          <p:nvPr>
+            <p:ph type="subTitle" idx="1"/>
+          </p:nvPr>
+        </p:nvSpPr>
+        <p:spPr/>
+        <p:txBody>
+          <a:bodyPr/>
+          <a:lstStyle/>
+          <a:p>
+            <a:r>
+              <a:t>All were highly successful on Billboard's Hot Country Songs chart in the United States, with "Our Song" and "Should've Said No" both reaching number one.</a:t>
+            </a:r>
+          </a:p>
+        </p:txBody>
+      </p:sp>
+    </p:spTree>
+  </p:cSld>
+  <p:clrMapOvr>
+    <a:masterClrMapping/>
+  </p:clrMapOvr>
+</p:sld>
+</file>
+
+<file path=ppt/slides/slide96.xml><?xml version="1.0" encoding="utf-8"?>
+<p:sld xmlns:a="http://schemas.openxmlformats.org/drawingml/2006/main" xmlns:p="http://schemas.openxmlformats.org/presentationml/2006/main" xmlns:r="http://schemas.openxmlformats.org/officeDocument/2006/relationships">
+  <p:cSld>
+    <p:spTree>
+      <p:nvGrpSpPr>
+        <p:cNvPr id="1" name=""/>
+        <p:cNvGrpSpPr/>
+        <p:nvPr/>
+      </p:nvGrpSpPr>
+      <p:grpSpPr/>
+      <p:sp>
+        <p:nvSpPr>
+          <p:cNvPr id="2" name="Title 1"/>
+          <p:cNvSpPr>
+            <a:spLocks noGrp="1"/>
+          </p:cNvSpPr>
+          <p:nvPr>
+            <p:ph type="ctrTitle"/>
+          </p:nvPr>
+        </p:nvSpPr>
+        <p:spPr/>
+        <p:txBody>
+          <a:bodyPr/>
+          <a:lstStyle/>
+          <a:p>
+            <a:r>
+              <a:t> </a:t>
+            </a:r>
+          </a:p>
+        </p:txBody>
+      </p:sp>
+      <p:sp>
+        <p:nvSpPr>
+          <p:cNvPr id="3" name="Subtitle 2"/>
+          <p:cNvSpPr>
+            <a:spLocks noGrp="1"/>
+          </p:cNvSpPr>
+          <p:nvPr>
+            <p:ph type="subTitle" idx="1"/>
+          </p:nvPr>
+        </p:nvSpPr>
+        <p:spPr/>
+        <p:txBody>
+          <a:bodyPr/>
+          <a:lstStyle/>
+          <a:p>
+            <a:r>
+              <a:t>"Teardrops on My Guitar" became a moderate commercial success, reaching number thirteen on the Billboard Hot 100 songs chart in the United States.</a:t>
+            </a:r>
+          </a:p>
+        </p:txBody>
+      </p:sp>
+    </p:spTree>
+  </p:cSld>
+  <p:clrMapOvr>
+    <a:masterClrMapping/>
+  </p:clrMapOvr>
+</p:sld>
+</file>
+
+<file path=ppt/slides/slide97.xml><?xml version="1.0" encoding="utf-8"?>
+<p:sld xmlns:a="http://schemas.openxmlformats.org/drawingml/2006/main" xmlns:p="http://schemas.openxmlformats.org/presentationml/2006/main" xmlns:r="http://schemas.openxmlformats.org/officeDocument/2006/relationships">
+  <p:cSld>
+    <p:spTree>
+      <p:nvGrpSpPr>
+        <p:cNvPr id="1" name=""/>
+        <p:cNvGrpSpPr/>
+        <p:nvPr/>
+      </p:nvGrpSpPr>
+      <p:grpSpPr/>
+      <p:sp>
+        <p:nvSpPr>
+          <p:cNvPr id="2" name="Title 1"/>
+          <p:cNvSpPr>
+            <a:spLocks noGrp="1"/>
+          </p:cNvSpPr>
+          <p:nvPr>
+            <p:ph type="ctrTitle"/>
+          </p:nvPr>
+        </p:nvSpPr>
+        <p:spPr/>
+        <p:txBody>
+          <a:bodyPr/>
+          <a:lstStyle/>
+          <a:p>
+            <a:r>
+              <a:t> </a:t>
+            </a:r>
+          </a:p>
+        </p:txBody>
+      </p:sp>
+      <p:sp>
+        <p:nvSpPr>
+          <p:cNvPr id="3" name="Subtitle 2"/>
+          <p:cNvSpPr>
+            <a:spLocks noGrp="1"/>
+          </p:cNvSpPr>
+          <p:nvPr>
+            <p:ph type="subTitle" idx="1"/>
+          </p:nvPr>
+        </p:nvSpPr>
+        <p:spPr/>
+        <p:txBody>
+          <a:bodyPr/>
+          <a:lstStyle/>
+          <a:p>
+            <a:r>
+              <a:t>Swift also released the holiday album Sounds of the Season: The Taylor Swift Holiday Collection in October 2007 and the EP Beautiful Eyes in July 2008.</a:t>
+            </a:r>
+          </a:p>
+        </p:txBody>
+      </p:sp>
+    </p:spTree>
+  </p:cSld>
+  <p:clrMapOvr>
+    <a:masterClrMapping/>
+  </p:clrMapOvr>
+</p:sld>
+</file>
+
+<file path=ppt/slides/slide98.xml><?xml version="1.0" encoding="utf-8"?>
+<p:sld xmlns:a="http://schemas.openxmlformats.org/drawingml/2006/main" xmlns:p="http://schemas.openxmlformats.org/presentationml/2006/main" xmlns:r="http://schemas.openxmlformats.org/officeDocument/2006/relationships">
+  <p:cSld>
+    <p:spTree>
+      <p:nvGrpSpPr>
+        <p:cNvPr id="1" name=""/>
+        <p:cNvGrpSpPr/>
+        <p:nvPr/>
+      </p:nvGrpSpPr>
+      <p:grpSpPr/>
+      <p:sp>
+        <p:nvSpPr>
+          <p:cNvPr id="2" name="Title 1"/>
+          <p:cNvSpPr>
+            <a:spLocks noGrp="1"/>
+          </p:cNvSpPr>
+          <p:nvPr>
+            <p:ph type="ctrTitle"/>
+          </p:nvPr>
+        </p:nvSpPr>
+        <p:spPr/>
+        <p:txBody>
+          <a:bodyPr/>
+          <a:lstStyle/>
+          <a:p>
+            <a:r>
+              <a:t> </a:t>
+            </a:r>
+          </a:p>
+        </p:txBody>
+      </p:sp>
+      <p:sp>
+        <p:nvSpPr>
+          <p:cNvPr id="3" name="Subtitle 2"/>
+          <p:cNvSpPr>
+            <a:spLocks noGrp="1"/>
+          </p:cNvSpPr>
+          <p:nvPr>
+            <p:ph type="subTitle" idx="1"/>
+          </p:nvPr>
+        </p:nvSpPr>
+        <p:spPr/>
+        <p:txBody>
+          <a:bodyPr/>
+          <a:lstStyle/>
+          <a:p>
+            <a:r>
+              <a:t>Swift's second studio album, Fearless, was released on November 11, 2008.</a:t>
+            </a:r>
+          </a:p>
+        </p:txBody>
+      </p:sp>
+    </p:spTree>
+  </p:cSld>
+  <p:clrMapOvr>
+    <a:masterClrMapping/>
+  </p:clrMapOvr>
+</p:sld>
+</file>
+
+<file path=ppt/slides/slide99.xml><?xml version="1.0" encoding="utf-8"?>
+<p:sld xmlns:a="http://schemas.openxmlformats.org/drawingml/2006/main" xmlns:p="http://schemas.openxmlformats.org/presentationml/2006/main" xmlns:r="http://schemas.openxmlformats.org/officeDocument/2006/relationships">
+  <p:cSld>
+    <p:spTree>
+      <p:nvGrpSpPr>
+        <p:cNvPr id="1" name=""/>
+        <p:cNvGrpSpPr/>
+        <p:nvPr/>
+      </p:nvGrpSpPr>
+      <p:grpSpPr/>
+      <p:sp>
+        <p:nvSpPr>
+          <p:cNvPr id="2" name="Title 1"/>
+          <p:cNvSpPr>
+            <a:spLocks noGrp="1"/>
+          </p:cNvSpPr>
+          <p:nvPr>
+            <p:ph type="ctrTitle"/>
+          </p:nvPr>
+        </p:nvSpPr>
+        <p:spPr/>
+        <p:txBody>
+          <a:bodyPr/>
+          <a:lstStyle/>
+          <a:p>
+            <a:r>
+              <a:t> </a:t>
+            </a:r>
+          </a:p>
+        </p:txBody>
+      </p:sp>
+      <p:sp>
+        <p:nvSpPr>
+          <p:cNvPr id="3" name="Subtitle 2"/>
+          <p:cNvSpPr>
+            <a:spLocks noGrp="1"/>
+          </p:cNvSpPr>
+          <p:nvPr>
+            <p:ph type="subTitle" idx="1"/>
+          </p:nvPr>
+        </p:nvSpPr>
+        <p:spPr/>
+        <p:txBody>
+          <a:bodyPr/>
+          <a:lstStyle/>
+          <a:p>
+            <a:r>
+              <a:t>The album debuted at number one on the Billboard 200 and was the top-selling album of 2009 in the United States.</a:t>
             </a:r>
           </a:p>
         </p:txBody>

</xml_diff>

<commit_message>
used a better sentiment analysis module
</commit_message>
<xml_diff>
--- a/output.pptx
+++ b/output.pptx
@@ -79,48 +79,6 @@
     <p:sldId id="327" r:id="rId77"/>
     <p:sldId id="328" r:id="rId78"/>
     <p:sldId id="329" r:id="rId79"/>
-    <p:sldId id="330" r:id="rId80"/>
-    <p:sldId id="331" r:id="rId81"/>
-    <p:sldId id="332" r:id="rId82"/>
-    <p:sldId id="333" r:id="rId83"/>
-    <p:sldId id="334" r:id="rId84"/>
-    <p:sldId id="335" r:id="rId85"/>
-    <p:sldId id="336" r:id="rId86"/>
-    <p:sldId id="337" r:id="rId87"/>
-    <p:sldId id="338" r:id="rId88"/>
-    <p:sldId id="339" r:id="rId89"/>
-    <p:sldId id="340" r:id="rId90"/>
-    <p:sldId id="341" r:id="rId91"/>
-    <p:sldId id="342" r:id="rId92"/>
-    <p:sldId id="343" r:id="rId93"/>
-    <p:sldId id="344" r:id="rId94"/>
-    <p:sldId id="345" r:id="rId95"/>
-    <p:sldId id="346" r:id="rId96"/>
-    <p:sldId id="347" r:id="rId97"/>
-    <p:sldId id="348" r:id="rId98"/>
-    <p:sldId id="349" r:id="rId99"/>
-    <p:sldId id="350" r:id="rId100"/>
-    <p:sldId id="351" r:id="rId101"/>
-    <p:sldId id="352" r:id="rId102"/>
-    <p:sldId id="353" r:id="rId103"/>
-    <p:sldId id="354" r:id="rId104"/>
-    <p:sldId id="355" r:id="rId105"/>
-    <p:sldId id="356" r:id="rId106"/>
-    <p:sldId id="357" r:id="rId107"/>
-    <p:sldId id="358" r:id="rId108"/>
-    <p:sldId id="359" r:id="rId109"/>
-    <p:sldId id="360" r:id="rId110"/>
-    <p:sldId id="361" r:id="rId111"/>
-    <p:sldId id="362" r:id="rId112"/>
-    <p:sldId id="363" r:id="rId113"/>
-    <p:sldId id="364" r:id="rId114"/>
-    <p:sldId id="365" r:id="rId115"/>
-    <p:sldId id="366" r:id="rId116"/>
-    <p:sldId id="367" r:id="rId117"/>
-    <p:sldId id="368" r:id="rId118"/>
-    <p:sldId id="369" r:id="rId119"/>
-    <p:sldId id="370" r:id="rId120"/>
-    <p:sldId id="371" r:id="rId121"/>
   </p:sldIdLst>
   <p:sldSz cx="9144000" cy="6858000" type="screen4x3"/>
   <p:notesSz cx="6858000" cy="9144000"/>
@@ -5161,7 +5119,7 @@
           <a:lstStyle/>
           <a:p>
             <a:r>
-              <a:t>Taylor_Swift</a:t>
+              <a:t>Java_(programming_language)</a:t>
             </a:r>
           </a:p>
         </p:txBody>
@@ -5182,7 +5140,7 @@
           <a:lstStyle/>
           <a:p>
             <a:r>
-              <a:t>Born and raised in Pennsylvania, Swift moved to Nashville, Tennessee, at the age of 14 to pursue a career in country music.</a:t>
+              <a:t>Java uses an automatic garbage collector to manage memory in the object lifecycle.</a:t>
             </a:r>
           </a:p>
         </p:txBody>
@@ -5242,607 +5200,7 @@
           <a:lstStyle/>
           <a:p>
             <a:r>
-              <a:t>In a June 2015 open letter, Swift criticized Apple Music for not offering royalties to artists during the streaming service's free three-month trial period and stated that she would pull 1989 from the catalog.</a:t>
-            </a:r>
-          </a:p>
-        </p:txBody>
-      </p:sp>
-    </p:spTree>
-  </p:cSld>
-  <p:clrMapOvr>
-    <a:masterClrMapping/>
-  </p:clrMapOvr>
-</p:sld>
-</file>
-
-<file path=ppt/slides/slide100.xml><?xml version="1.0" encoding="utf-8"?>
-<p:sld xmlns:a="http://schemas.openxmlformats.org/drawingml/2006/main" xmlns:p="http://schemas.openxmlformats.org/presentationml/2006/main" xmlns:r="http://schemas.openxmlformats.org/officeDocument/2006/relationships">
-  <p:cSld>
-    <p:spTree>
-      <p:nvGrpSpPr>
-        <p:cNvPr id="1" name=""/>
-        <p:cNvGrpSpPr/>
-        <p:nvPr/>
-      </p:nvGrpSpPr>
-      <p:grpSpPr/>
-      <p:sp>
-        <p:nvSpPr>
-          <p:cNvPr id="2" name="Title 1"/>
-          <p:cNvSpPr>
-            <a:spLocks noGrp="1"/>
-          </p:cNvSpPr>
-          <p:nvPr>
-            <p:ph type="ctrTitle"/>
-          </p:nvPr>
-        </p:nvSpPr>
-        <p:spPr/>
-        <p:txBody>
-          <a:bodyPr/>
-          <a:lstStyle/>
-          <a:p>
-            <a:r>
-              <a:t> </a:t>
-            </a:r>
-          </a:p>
-        </p:txBody>
-      </p:sp>
-      <p:sp>
-        <p:nvSpPr>
-          <p:cNvPr id="3" name="Subtitle 2"/>
-          <p:cNvSpPr>
-            <a:spLocks noGrp="1"/>
-          </p:cNvSpPr>
-          <p:nvPr>
-            <p:ph type="subTitle" idx="1"/>
-          </p:nvPr>
-        </p:nvSpPr>
-        <p:spPr/>
-        <p:txBody>
-          <a:bodyPr/>
-          <a:lstStyle/>
-          <a:p>
-            <a:r>
-              <a:t>It entered the United States at number three, making Swift the second female artist in the history of the Hot 100 (after Mariah Carey) to debut multiple tracks in the top five in one year; the other was "Today Was a Fairytale" at number two.</a:t>
-            </a:r>
-          </a:p>
-        </p:txBody>
-      </p:sp>
-    </p:spTree>
-  </p:cSld>
-  <p:clrMapOvr>
-    <a:masterClrMapping/>
-  </p:clrMapOvr>
-</p:sld>
-</file>
-
-<file path=ppt/slides/slide101.xml><?xml version="1.0" encoding="utf-8"?>
-<p:sld xmlns:a="http://schemas.openxmlformats.org/drawingml/2006/main" xmlns:p="http://schemas.openxmlformats.org/presentationml/2006/main" xmlns:r="http://schemas.openxmlformats.org/officeDocument/2006/relationships">
-  <p:cSld>
-    <p:spTree>
-      <p:nvGrpSpPr>
-        <p:cNvPr id="1" name=""/>
-        <p:cNvGrpSpPr/>
-        <p:nvPr/>
-      </p:nvGrpSpPr>
-      <p:grpSpPr/>
-      <p:sp>
-        <p:nvSpPr>
-          <p:cNvPr id="2" name="Title 1"/>
-          <p:cNvSpPr>
-            <a:spLocks noGrp="1"/>
-          </p:cNvSpPr>
-          <p:nvPr>
-            <p:ph type="ctrTitle"/>
-          </p:nvPr>
-        </p:nvSpPr>
-        <p:spPr/>
-        <p:txBody>
-          <a:bodyPr/>
-          <a:lstStyle/>
-          <a:p>
-            <a:r>
-              <a:t> </a:t>
-            </a:r>
-          </a:p>
-        </p:txBody>
-      </p:sp>
-      <p:sp>
-        <p:nvSpPr>
-          <p:cNvPr id="3" name="Subtitle 2"/>
-          <p:cNvSpPr>
-            <a:spLocks noGrp="1"/>
-          </p:cNvSpPr>
-          <p:nvPr>
-            <p:ph type="subTitle" idx="1"/>
-          </p:nvPr>
-        </p:nvSpPr>
-        <p:spPr/>
-        <p:txBody>
-          <a:bodyPr/>
-          <a:lstStyle/>
-          <a:p>
-            <a:r>
-              <a:t>Speak Now, released on October 25, 2010, was a commercial success, debuting at number one on the Billboard 200, and becoming the 16th album to achieve opening week sales of one million copies.</a:t>
-            </a:r>
-          </a:p>
-        </p:txBody>
-      </p:sp>
-    </p:spTree>
-  </p:cSld>
-  <p:clrMapOvr>
-    <a:masterClrMapping/>
-  </p:clrMapOvr>
-</p:sld>
-</file>
-
-<file path=ppt/slides/slide102.xml><?xml version="1.0" encoding="utf-8"?>
-<p:sld xmlns:a="http://schemas.openxmlformats.org/drawingml/2006/main" xmlns:p="http://schemas.openxmlformats.org/presentationml/2006/main" xmlns:r="http://schemas.openxmlformats.org/officeDocument/2006/relationships">
-  <p:cSld>
-    <p:spTree>
-      <p:nvGrpSpPr>
-        <p:cNvPr id="1" name=""/>
-        <p:cNvGrpSpPr/>
-        <p:nvPr/>
-      </p:nvGrpSpPr>
-      <p:grpSpPr/>
-      <p:sp>
-        <p:nvSpPr>
-          <p:cNvPr id="2" name="Title 1"/>
-          <p:cNvSpPr>
-            <a:spLocks noGrp="1"/>
-          </p:cNvSpPr>
-          <p:nvPr>
-            <p:ph type="ctrTitle"/>
-          </p:nvPr>
-        </p:nvSpPr>
-        <p:spPr/>
-        <p:txBody>
-          <a:bodyPr/>
-          <a:lstStyle/>
-          <a:p>
-            <a:r>
-              <a:t> </a:t>
-            </a:r>
-          </a:p>
-        </p:txBody>
-      </p:sp>
-      <p:sp>
-        <p:nvSpPr>
-          <p:cNvPr id="3" name="Subtitle 2"/>
-          <p:cNvSpPr>
-            <a:spLocks noGrp="1"/>
-          </p:cNvSpPr>
-          <p:nvPr>
-            <p:ph type="subTitle" idx="1"/>
-          </p:nvPr>
-        </p:nvSpPr>
-        <p:spPr/>
-        <p:txBody>
-          <a:bodyPr/>
-          <a:lstStyle/>
-          <a:p>
-            <a:r>
-              <a:t>"I Knew You Were Trouble" was a major commercial success, peaking at number two in the United States.</a:t>
-            </a:r>
-          </a:p>
-        </p:txBody>
-      </p:sp>
-    </p:spTree>
-  </p:cSld>
-  <p:clrMapOvr>
-    <a:masterClrMapping/>
-  </p:clrMapOvr>
-</p:sld>
-</file>
-
-<file path=ppt/slides/slide103.xml><?xml version="1.0" encoding="utf-8"?>
-<p:sld xmlns:a="http://schemas.openxmlformats.org/drawingml/2006/main" xmlns:p="http://schemas.openxmlformats.org/presentationml/2006/main" xmlns:r="http://schemas.openxmlformats.org/officeDocument/2006/relationships">
-  <p:cSld>
-    <p:spTree>
-      <p:nvGrpSpPr>
-        <p:cNvPr id="1" name=""/>
-        <p:cNvGrpSpPr/>
-        <p:nvPr/>
-      </p:nvGrpSpPr>
-      <p:grpSpPr/>
-      <p:sp>
-        <p:nvSpPr>
-          <p:cNvPr id="2" name="Title 1"/>
-          <p:cNvSpPr>
-            <a:spLocks noGrp="1"/>
-          </p:cNvSpPr>
-          <p:nvPr>
-            <p:ph type="ctrTitle"/>
-          </p:nvPr>
-        </p:nvSpPr>
-        <p:spPr/>
-        <p:txBody>
-          <a:bodyPr/>
-          <a:lstStyle/>
-          <a:p>
-            <a:r>
-              <a:t> </a:t>
-            </a:r>
-          </a:p>
-        </p:txBody>
-      </p:sp>
-      <p:sp>
-        <p:nvSpPr>
-          <p:cNvPr id="3" name="Subtitle 2"/>
-          <p:cNvSpPr>
-            <a:spLocks noGrp="1"/>
-          </p:cNvSpPr>
-          <p:nvPr>
-            <p:ph type="subTitle" idx="1"/>
-          </p:nvPr>
-        </p:nvSpPr>
-        <p:spPr/>
-        <p:txBody>
-          <a:bodyPr/>
-          <a:lstStyle/>
-          <a:p>
-            <a:r>
-              <a:t>The album was a critical and commercial success, and debuted at number one on the Billboard 200 with first-week sales of 1.21 million copies.</a:t>
-            </a:r>
-          </a:p>
-        </p:txBody>
-      </p:sp>
-    </p:spTree>
-  </p:cSld>
-  <p:clrMapOvr>
-    <a:masterClrMapping/>
-  </p:clrMapOvr>
-</p:sld>
-</file>
-
-<file path=ppt/slides/slide104.xml><?xml version="1.0" encoding="utf-8"?>
-<p:sld xmlns:a="http://schemas.openxmlformats.org/drawingml/2006/main" xmlns:p="http://schemas.openxmlformats.org/presentationml/2006/main" xmlns:r="http://schemas.openxmlformats.org/officeDocument/2006/relationships">
-  <p:cSld>
-    <p:spTree>
-      <p:nvGrpSpPr>
-        <p:cNvPr id="1" name=""/>
-        <p:cNvGrpSpPr/>
-        <p:nvPr/>
-      </p:nvGrpSpPr>
-      <p:grpSpPr/>
-      <p:sp>
-        <p:nvSpPr>
-          <p:cNvPr id="2" name="Title 1"/>
-          <p:cNvSpPr>
-            <a:spLocks noGrp="1"/>
-          </p:cNvSpPr>
-          <p:nvPr>
-            <p:ph type="ctrTitle"/>
-          </p:nvPr>
-        </p:nvSpPr>
-        <p:spPr/>
-        <p:txBody>
-          <a:bodyPr/>
-          <a:lstStyle/>
-          <a:p>
-            <a:r>
-              <a:t> </a:t>
-            </a:r>
-          </a:p>
-        </p:txBody>
-      </p:sp>
-      <p:sp>
-        <p:nvSpPr>
-          <p:cNvPr id="3" name="Subtitle 2"/>
-          <p:cNvSpPr>
-            <a:spLocks noGrp="1"/>
-          </p:cNvSpPr>
-          <p:nvPr>
-            <p:ph type="subTitle" idx="1"/>
-          </p:nvPr>
-        </p:nvSpPr>
-        <p:spPr/>
-        <p:txBody>
-          <a:bodyPr/>
-          <a:lstStyle/>
-          <a:p>
-            <a:r>
-              <a:t>This marked the highest opening sales in a decade in the United States, and made Swift the first female to have two million-selling album openings, a record recognized by the Guinness Book of World Records.</a:t>
-            </a:r>
-          </a:p>
-        </p:txBody>
-      </p:sp>
-    </p:spTree>
-  </p:cSld>
-  <p:clrMapOvr>
-    <a:masterClrMapping/>
-  </p:clrMapOvr>
-</p:sld>
-</file>
-
-<file path=ppt/slides/slide105.xml><?xml version="1.0" encoding="utf-8"?>
-<p:sld xmlns:a="http://schemas.openxmlformats.org/drawingml/2006/main" xmlns:p="http://schemas.openxmlformats.org/presentationml/2006/main" xmlns:r="http://schemas.openxmlformats.org/officeDocument/2006/relationships">
-  <p:cSld>
-    <p:spTree>
-      <p:nvGrpSpPr>
-        <p:cNvPr id="1" name=""/>
-        <p:cNvGrpSpPr/>
-        <p:nvPr/>
-      </p:nvGrpSpPr>
-      <p:grpSpPr/>
-      <p:sp>
-        <p:nvSpPr>
-          <p:cNvPr id="2" name="Title 1"/>
-          <p:cNvSpPr>
-            <a:spLocks noGrp="1"/>
-          </p:cNvSpPr>
-          <p:nvPr>
-            <p:ph type="ctrTitle"/>
-          </p:nvPr>
-        </p:nvSpPr>
-        <p:spPr/>
-        <p:txBody>
-          <a:bodyPr/>
-          <a:lstStyle/>
-          <a:p>
-            <a:r>
-              <a:t> </a:t>
-            </a:r>
-          </a:p>
-        </p:txBody>
-      </p:sp>
-      <p:sp>
-        <p:nvSpPr>
-          <p:cNvPr id="3" name="Subtitle 2"/>
-          <p:cNvSpPr>
-            <a:spLocks noGrp="1"/>
-          </p:cNvSpPr>
-          <p:nvPr>
-            <p:ph type="subTitle" idx="1"/>
-          </p:nvPr>
-        </p:nvSpPr>
-        <p:spPr/>
-        <p:txBody>
-          <a:bodyPr/>
-          <a:lstStyle/>
-          <a:p>
-            <a:r>
-              <a:t>The song reached number one in Sweden and peaked at number two in the United States.</a:t>
-            </a:r>
-          </a:p>
-        </p:txBody>
-      </p:sp>
-    </p:spTree>
-  </p:cSld>
-  <p:clrMapOvr>
-    <a:masterClrMapping/>
-  </p:clrMapOvr>
-</p:sld>
-</file>
-
-<file path=ppt/slides/slide106.xml><?xml version="1.0" encoding="utf-8"?>
-<p:sld xmlns:a="http://schemas.openxmlformats.org/drawingml/2006/main" xmlns:p="http://schemas.openxmlformats.org/presentationml/2006/main" xmlns:r="http://schemas.openxmlformats.org/officeDocument/2006/relationships">
-  <p:cSld>
-    <p:spTree>
-      <p:nvGrpSpPr>
-        <p:cNvPr id="1" name=""/>
-        <p:cNvGrpSpPr/>
-        <p:nvPr/>
-      </p:nvGrpSpPr>
-      <p:grpSpPr/>
-      <p:sp>
-        <p:nvSpPr>
-          <p:cNvPr id="2" name="Title 1"/>
-          <p:cNvSpPr>
-            <a:spLocks noGrp="1"/>
-          </p:cNvSpPr>
-          <p:nvPr>
-            <p:ph type="ctrTitle"/>
-          </p:nvPr>
-        </p:nvSpPr>
-        <p:spPr/>
-        <p:txBody>
-          <a:bodyPr/>
-          <a:lstStyle/>
-          <a:p>
-            <a:r>
-              <a:t> </a:t>
-            </a:r>
-          </a:p>
-        </p:txBody>
-      </p:sp>
-      <p:sp>
-        <p:nvSpPr>
-          <p:cNvPr id="3" name="Subtitle 2"/>
-          <p:cNvSpPr>
-            <a:spLocks noGrp="1"/>
-          </p:cNvSpPr>
-          <p:nvPr>
-            <p:ph type="subTitle" idx="1"/>
-          </p:nvPr>
-        </p:nvSpPr>
-        <p:spPr/>
-        <p:txBody>
-          <a:bodyPr/>
-          <a:lstStyle/>
-          <a:p>
-            <a:r>
-              <a:t>", which charted at number three in Australia and at number four in the United States.</a:t>
-            </a:r>
-          </a:p>
-        </p:txBody>
-      </p:sp>
-    </p:spTree>
-  </p:cSld>
-  <p:clrMapOvr>
-    <a:masterClrMapping/>
-  </p:clrMapOvr>
-</p:sld>
-</file>
-
-<file path=ppt/slides/slide107.xml><?xml version="1.0" encoding="utf-8"?>
-<p:sld xmlns:a="http://schemas.openxmlformats.org/drawingml/2006/main" xmlns:p="http://schemas.openxmlformats.org/presentationml/2006/main" xmlns:r="http://schemas.openxmlformats.org/officeDocument/2006/relationships">
-  <p:cSld>
-    <p:spTree>
-      <p:nvGrpSpPr>
-        <p:cNvPr id="1" name=""/>
-        <p:cNvGrpSpPr/>
-        <p:nvPr/>
-      </p:nvGrpSpPr>
-      <p:grpSpPr/>
-      <p:sp>
-        <p:nvSpPr>
-          <p:cNvPr id="2" name="Title 1"/>
-          <p:cNvSpPr>
-            <a:spLocks noGrp="1"/>
-          </p:cNvSpPr>
-          <p:nvPr>
-            <p:ph type="ctrTitle"/>
-          </p:nvPr>
-        </p:nvSpPr>
-        <p:spPr/>
-        <p:txBody>
-          <a:bodyPr/>
-          <a:lstStyle/>
-          <a:p>
-            <a:r>
-              <a:t> </a:t>
-            </a:r>
-          </a:p>
-        </p:txBody>
-      </p:sp>
-      <p:sp>
-        <p:nvSpPr>
-          <p:cNvPr id="3" name="Subtitle 2"/>
-          <p:cNvSpPr>
-            <a:spLocks noGrp="1"/>
-          </p:cNvSpPr>
-          <p:nvPr>
-            <p:ph type="subTitle" idx="1"/>
-          </p:nvPr>
-        </p:nvSpPr>
-        <p:spPr/>
-        <p:txBody>
-          <a:bodyPr/>
-          <a:lstStyle/>
-          <a:p>
-            <a:r>
-              <a:t>The album was released on November 10 and sold 1.216 million copies in the United States—becoming 2017's top-selling album (pure sales only) in the country—and 2 million copies worldwide during its first week.</a:t>
-            </a:r>
-          </a:p>
-        </p:txBody>
-      </p:sp>
-    </p:spTree>
-  </p:cSld>
-  <p:clrMapOvr>
-    <a:masterClrMapping/>
-  </p:clrMapOvr>
-</p:sld>
-</file>
-
-<file path=ppt/slides/slide108.xml><?xml version="1.0" encoding="utf-8"?>
-<p:sld xmlns:a="http://schemas.openxmlformats.org/drawingml/2006/main" xmlns:p="http://schemas.openxmlformats.org/presentationml/2006/main" xmlns:r="http://schemas.openxmlformats.org/officeDocument/2006/relationships">
-  <p:cSld>
-    <p:spTree>
-      <p:nvGrpSpPr>
-        <p:cNvPr id="1" name=""/>
-        <p:cNvGrpSpPr/>
-        <p:nvPr/>
-      </p:nvGrpSpPr>
-      <p:grpSpPr/>
-      <p:sp>
-        <p:nvSpPr>
-          <p:cNvPr id="2" name="Title 1"/>
-          <p:cNvSpPr>
-            <a:spLocks noGrp="1"/>
-          </p:cNvSpPr>
-          <p:nvPr>
-            <p:ph type="ctrTitle"/>
-          </p:nvPr>
-        </p:nvSpPr>
-        <p:spPr/>
-        <p:txBody>
-          <a:bodyPr/>
-          <a:lstStyle/>
-          <a:p>
-            <a:r>
-              <a:t> </a:t>
-            </a:r>
-          </a:p>
-        </p:txBody>
-      </p:sp>
-      <p:sp>
-        <p:nvSpPr>
-          <p:cNvPr id="3" name="Subtitle 2"/>
-          <p:cNvSpPr>
-            <a:spLocks noGrp="1"/>
-          </p:cNvSpPr>
-          <p:nvPr>
-            <p:ph type="subTitle" idx="1"/>
-          </p:nvPr>
-        </p:nvSpPr>
-        <p:spPr/>
-        <p:txBody>
-          <a:bodyPr/>
-          <a:lstStyle/>
-          <a:p>
-            <a:r>
-              <a:t>In early November, Swift released a compilation album titled reputation Stadium Tour Surprise Song Playlist for digital streaming only on all streaming platforms.</a:t>
-            </a:r>
-          </a:p>
-        </p:txBody>
-      </p:sp>
-    </p:spTree>
-  </p:cSld>
-  <p:clrMapOvr>
-    <a:masterClrMapping/>
-  </p:clrMapOvr>
-</p:sld>
-</file>
-
-<file path=ppt/slides/slide109.xml><?xml version="1.0" encoding="utf-8"?>
-<p:sld xmlns:a="http://schemas.openxmlformats.org/drawingml/2006/main" xmlns:p="http://schemas.openxmlformats.org/presentationml/2006/main" xmlns:r="http://schemas.openxmlformats.org/officeDocument/2006/relationships">
-  <p:cSld>
-    <p:spTree>
-      <p:nvGrpSpPr>
-        <p:cNvPr id="1" name=""/>
-        <p:cNvGrpSpPr/>
-        <p:nvPr/>
-      </p:nvGrpSpPr>
-      <p:grpSpPr/>
-      <p:sp>
-        <p:nvSpPr>
-          <p:cNvPr id="2" name="Title 1"/>
-          <p:cNvSpPr>
-            <a:spLocks noGrp="1"/>
-          </p:cNvSpPr>
-          <p:nvPr>
-            <p:ph type="ctrTitle"/>
-          </p:nvPr>
-        </p:nvSpPr>
-        <p:spPr/>
-        <p:txBody>
-          <a:bodyPr/>
-          <a:lstStyle/>
-          <a:p>
-            <a:r>
-              <a:t> </a:t>
-            </a:r>
-          </a:p>
-        </p:txBody>
-      </p:sp>
-      <p:sp>
-        <p:nvSpPr>
-          <p:cNvPr id="3" name="Subtitle 2"/>
-          <p:cNvSpPr>
-            <a:spLocks noGrp="1"/>
-          </p:cNvSpPr>
-          <p:nvPr>
-            <p:ph type="subTitle" idx="1"/>
-          </p:nvPr>
-        </p:nvSpPr>
-        <p:spPr/>
-        <p:txBody>
-          <a:bodyPr/>
-          <a:lstStyle/>
-          <a:p>
-            <a:r>
-              <a:t>In November 2018, Swift signed a new multi-album deal with Big Machine's distributor Universal Music Group; in the United States, her future releases will be promoted under the Republic Records imprint.</a:t>
+              <a:t>A class that is not declared public may be stored in any .java file.</a:t>
             </a:r>
           </a:p>
         </p:txBody>
@@ -5902,451 +5260,7 @@
           <a:lstStyle/>
           <a:p>
             <a:r>
-              <a:t>Other singles from the album include "New Year's Day" and "Delicate", the former of which was released exclusively to country radio.</a:t>
-            </a:r>
-          </a:p>
-        </p:txBody>
-      </p:sp>
-    </p:spTree>
-  </p:cSld>
-  <p:clrMapOvr>
-    <a:masterClrMapping/>
-  </p:clrMapOvr>
-</p:sld>
-</file>
-
-<file path=ppt/slides/slide110.xml><?xml version="1.0" encoding="utf-8"?>
-<p:sld xmlns:a="http://schemas.openxmlformats.org/drawingml/2006/main" xmlns:p="http://schemas.openxmlformats.org/presentationml/2006/main" xmlns:r="http://schemas.openxmlformats.org/officeDocument/2006/relationships">
-  <p:cSld>
-    <p:spTree>
-      <p:nvGrpSpPr>
-        <p:cNvPr id="1" name=""/>
-        <p:cNvGrpSpPr/>
-        <p:nvPr/>
-      </p:nvGrpSpPr>
-      <p:grpSpPr/>
-      <p:sp>
-        <p:nvSpPr>
-          <p:cNvPr id="2" name="Title 1"/>
-          <p:cNvSpPr>
-            <a:spLocks noGrp="1"/>
-          </p:cNvSpPr>
-          <p:nvPr>
-            <p:ph type="ctrTitle"/>
-          </p:nvPr>
-        </p:nvSpPr>
-        <p:spPr/>
-        <p:txBody>
-          <a:bodyPr/>
-          <a:lstStyle/>
-          <a:p>
-            <a:r>
-              <a:t> </a:t>
-            </a:r>
-          </a:p>
-        </p:txBody>
-      </p:sp>
-      <p:sp>
-        <p:nvSpPr>
-          <p:cNvPr id="3" name="Subtitle 2"/>
-          <p:cNvSpPr>
-            <a:spLocks noGrp="1"/>
-          </p:cNvSpPr>
-          <p:nvPr>
-            <p:ph type="subTitle" idx="1"/>
-          </p:nvPr>
-        </p:nvSpPr>
-        <p:spPr/>
-        <p:txBody>
-          <a:bodyPr/>
-          <a:lstStyle/>
-          <a:p>
-            <a:r>
-              <a:t>In 2011, Swift used a dress rehearsal of her Speak Now tour as a benefit concert for victims of recent tornadoes in the United States, raising more than $750,000.</a:t>
-            </a:r>
-          </a:p>
-        </p:txBody>
-      </p:sp>
-    </p:spTree>
-  </p:cSld>
-  <p:clrMapOvr>
-    <a:masterClrMapping/>
-  </p:clrMapOvr>
-</p:sld>
-</file>
-
-<file path=ppt/slides/slide111.xml><?xml version="1.0" encoding="utf-8"?>
-<p:sld xmlns:a="http://schemas.openxmlformats.org/drawingml/2006/main" xmlns:p="http://schemas.openxmlformats.org/presentationml/2006/main" xmlns:r="http://schemas.openxmlformats.org/officeDocument/2006/relationships">
-  <p:cSld>
-    <p:spTree>
-      <p:nvGrpSpPr>
-        <p:cNvPr id="1" name=""/>
-        <p:cNvGrpSpPr/>
-        <p:nvPr/>
-      </p:nvGrpSpPr>
-      <p:grpSpPr/>
-      <p:sp>
-        <p:nvSpPr>
-          <p:cNvPr id="2" name="Title 1"/>
-          <p:cNvSpPr>
-            <a:spLocks noGrp="1"/>
-          </p:cNvSpPr>
-          <p:nvPr>
-            <p:ph type="ctrTitle"/>
-          </p:nvPr>
-        </p:nvSpPr>
-        <p:spPr/>
-        <p:txBody>
-          <a:bodyPr/>
-          <a:lstStyle/>
-          <a:p>
-            <a:r>
-              <a:t> </a:t>
-            </a:r>
-          </a:p>
-        </p:txBody>
-      </p:sp>
-      <p:sp>
-        <p:nvSpPr>
-          <p:cNvPr id="3" name="Subtitle 2"/>
-          <p:cNvSpPr>
-            <a:spLocks noGrp="1"/>
-          </p:cNvSpPr>
-          <p:nvPr>
-            <p:ph type="subTitle" idx="1"/>
-          </p:nvPr>
-        </p:nvSpPr>
-        <p:spPr/>
-        <p:txBody>
-          <a:bodyPr/>
-          <a:lstStyle/>
-          <a:p>
-            <a:r>
-              <a:t>While promoting Reputation, Swift released a series of behind the scenes videos showing the album recording process through DirecTV.</a:t>
-            </a:r>
-          </a:p>
-        </p:txBody>
-      </p:sp>
-    </p:spTree>
-  </p:cSld>
-  <p:clrMapOvr>
-    <a:masterClrMapping/>
-  </p:clrMapOvr>
-</p:sld>
-</file>
-
-<file path=ppt/slides/slide112.xml><?xml version="1.0" encoding="utf-8"?>
-<p:sld xmlns:a="http://schemas.openxmlformats.org/drawingml/2006/main" xmlns:p="http://schemas.openxmlformats.org/presentationml/2006/main" xmlns:r="http://schemas.openxmlformats.org/officeDocument/2006/relationships">
-  <p:cSld>
-    <p:spTree>
-      <p:nvGrpSpPr>
-        <p:cNvPr id="1" name=""/>
-        <p:cNvGrpSpPr/>
-        <p:nvPr/>
-      </p:nvGrpSpPr>
-      <p:grpSpPr/>
-      <p:sp>
-        <p:nvSpPr>
-          <p:cNvPr id="2" name="Title 1"/>
-          <p:cNvSpPr>
-            <a:spLocks noGrp="1"/>
-          </p:cNvSpPr>
-          <p:nvPr>
-            <p:ph type="ctrTitle"/>
-          </p:nvPr>
-        </p:nvSpPr>
-        <p:spPr/>
-        <p:txBody>
-          <a:bodyPr/>
-          <a:lstStyle/>
-          <a:p>
-            <a:r>
-              <a:t> </a:t>
-            </a:r>
-          </a:p>
-        </p:txBody>
-      </p:sp>
-      <p:sp>
-        <p:nvSpPr>
-          <p:cNvPr id="3" name="Subtitle 2"/>
-          <p:cNvSpPr>
-            <a:spLocks noGrp="1"/>
-          </p:cNvSpPr>
-          <p:nvPr>
-            <p:ph type="subTitle" idx="1"/>
-          </p:nvPr>
-        </p:nvSpPr>
-        <p:spPr/>
-        <p:txBody>
-          <a:bodyPr/>
-          <a:lstStyle/>
-          <a:p>
-            <a:r>
-              <a:t>Swift's studio albums Taylor Swift, Fearless, Speak Now, Red, and 1989 have all sold over 4 million copies in the US.</a:t>
-            </a:r>
-          </a:p>
-        </p:txBody>
-      </p:sp>
-    </p:spTree>
-  </p:cSld>
-  <p:clrMapOvr>
-    <a:masterClrMapping/>
-  </p:clrMapOvr>
-</p:sld>
-</file>
-
-<file path=ppt/slides/slide113.xml><?xml version="1.0" encoding="utf-8"?>
-<p:sld xmlns:a="http://schemas.openxmlformats.org/drawingml/2006/main" xmlns:p="http://schemas.openxmlformats.org/presentationml/2006/main" xmlns:r="http://schemas.openxmlformats.org/officeDocument/2006/relationships">
-  <p:cSld>
-    <p:spTree>
-      <p:nvGrpSpPr>
-        <p:cNvPr id="1" name=""/>
-        <p:cNvGrpSpPr/>
-        <p:nvPr/>
-      </p:nvGrpSpPr>
-      <p:grpSpPr/>
-      <p:sp>
-        <p:nvSpPr>
-          <p:cNvPr id="2" name="Title 1"/>
-          <p:cNvSpPr>
-            <a:spLocks noGrp="1"/>
-          </p:cNvSpPr>
-          <p:nvPr>
-            <p:ph type="ctrTitle"/>
-          </p:nvPr>
-        </p:nvSpPr>
-        <p:spPr/>
-        <p:txBody>
-          <a:bodyPr/>
-          <a:lstStyle/>
-          <a:p>
-            <a:r>
-              <a:t> </a:t>
-            </a:r>
-          </a:p>
-        </p:txBody>
-      </p:sp>
-      <p:sp>
-        <p:nvSpPr>
-          <p:cNvPr id="3" name="Subtitle 2"/>
-          <p:cNvSpPr>
-            <a:spLocks noGrp="1"/>
-          </p:cNvSpPr>
-          <p:nvPr>
-            <p:ph type="subTitle" idx="1"/>
-          </p:nvPr>
-        </p:nvSpPr>
-        <p:spPr/>
-        <p:txBody>
-          <a:bodyPr/>
-          <a:lstStyle/>
-          <a:p>
-            <a:r>
-              <a:t> </a:t>
-            </a:r>
-          </a:p>
-        </p:txBody>
-      </p:sp>
-      <p:pic>
-        <p:nvPicPr>
-          <p:cNvPr id="4" name="Picture 3" descr="image2.jpg"/>
-          <p:cNvPicPr>
-            <a:picLocks noChangeAspect="1"/>
-          </p:cNvPicPr>
-          <p:nvPr/>
-        </p:nvPicPr>
-        <p:blipFill>
-          <a:blip r:embed="rId2"/>
-          <a:stretch>
-            <a:fillRect/>
-          </a:stretch>
-        </p:blipFill>
-        <p:spPr>
-          <a:xfrm>
-            <a:off x="914400" y="1828800"/>
-            <a:ext cx="3657600" cy="3657600"/>
-          </a:xfrm>
-          <a:prstGeom prst="rect">
-            <a:avLst/>
-          </a:prstGeom>
-        </p:spPr>
-      </p:pic>
-    </p:spTree>
-  </p:cSld>
-  <p:clrMapOvr>
-    <a:masterClrMapping/>
-  </p:clrMapOvr>
-</p:sld>
-</file>
-
-<file path=ppt/slides/slide114.xml><?xml version="1.0" encoding="utf-8"?>
-<p:sld xmlns:a="http://schemas.openxmlformats.org/drawingml/2006/main" xmlns:p="http://schemas.openxmlformats.org/presentationml/2006/main" xmlns:r="http://schemas.openxmlformats.org/officeDocument/2006/relationships">
-  <p:cSld>
-    <p:spTree>
-      <p:nvGrpSpPr>
-        <p:cNvPr id="1" name=""/>
-        <p:cNvGrpSpPr/>
-        <p:nvPr/>
-      </p:nvGrpSpPr>
-      <p:grpSpPr/>
-      <p:sp>
-        <p:nvSpPr>
-          <p:cNvPr id="2" name="Title 1"/>
-          <p:cNvSpPr>
-            <a:spLocks noGrp="1"/>
-          </p:cNvSpPr>
-          <p:nvPr>
-            <p:ph type="ctrTitle"/>
-          </p:nvPr>
-        </p:nvSpPr>
-        <p:spPr/>
-        <p:txBody>
-          <a:bodyPr/>
-          <a:lstStyle/>
-          <a:p>
-            <a:r>
-              <a:t>DISADVANTAGES</a:t>
-            </a:r>
-          </a:p>
-        </p:txBody>
-      </p:sp>
-      <p:sp>
-        <p:nvSpPr>
-          <p:cNvPr id="3" name="Subtitle 2"/>
-          <p:cNvSpPr>
-            <a:spLocks noGrp="1"/>
-          </p:cNvSpPr>
-          <p:nvPr>
-            <p:ph type="subTitle" idx="1"/>
-          </p:nvPr>
-        </p:nvSpPr>
-        <p:spPr/>
-        <p:txBody>
-          <a:bodyPr/>
-          <a:lstStyle/>
-          <a:p>
-            <a:r>
-              <a:t> </a:t>
-            </a:r>
-          </a:p>
-        </p:txBody>
-      </p:sp>
-    </p:spTree>
-  </p:cSld>
-  <p:clrMapOvr>
-    <a:masterClrMapping/>
-  </p:clrMapOvr>
-</p:sld>
-</file>
-
-<file path=ppt/slides/slide115.xml><?xml version="1.0" encoding="utf-8"?>
-<p:sld xmlns:a="http://schemas.openxmlformats.org/drawingml/2006/main" xmlns:p="http://schemas.openxmlformats.org/presentationml/2006/main" xmlns:r="http://schemas.openxmlformats.org/officeDocument/2006/relationships">
-  <p:cSld>
-    <p:spTree>
-      <p:nvGrpSpPr>
-        <p:cNvPr id="1" name=""/>
-        <p:cNvGrpSpPr/>
-        <p:nvPr/>
-      </p:nvGrpSpPr>
-      <p:grpSpPr/>
-      <p:sp>
-        <p:nvSpPr>
-          <p:cNvPr id="2" name="Title 1"/>
-          <p:cNvSpPr>
-            <a:spLocks noGrp="1"/>
-          </p:cNvSpPr>
-          <p:nvPr>
-            <p:ph type="ctrTitle"/>
-          </p:nvPr>
-        </p:nvSpPr>
-        <p:spPr/>
-        <p:txBody>
-          <a:bodyPr/>
-          <a:lstStyle/>
-          <a:p>
-            <a:r>
-              <a:t> </a:t>
-            </a:r>
-          </a:p>
-        </p:txBody>
-      </p:sp>
-      <p:sp>
-        <p:nvSpPr>
-          <p:cNvPr id="3" name="Subtitle 2"/>
-          <p:cNvSpPr>
-            <a:spLocks noGrp="1"/>
-          </p:cNvSpPr>
-          <p:nvPr>
-            <p:ph type="subTitle" idx="1"/>
-          </p:nvPr>
-        </p:nvSpPr>
-        <p:spPr/>
-        <p:txBody>
-          <a:bodyPr/>
-          <a:lstStyle/>
-          <a:p>
-            <a:r>
-              <a:t>Swift's music to indicate country—a few banjo strums, a pair of cowboy boots worn onstage, a bedazzled guitar—but there's something in her winsome, vulnerable delivery that's unique to Nashville".</a:t>
-            </a:r>
-          </a:p>
-        </p:txBody>
-      </p:sp>
-    </p:spTree>
-  </p:cSld>
-  <p:clrMapOvr>
-    <a:masterClrMapping/>
-  </p:clrMapOvr>
-</p:sld>
-</file>
-
-<file path=ppt/slides/slide116.xml><?xml version="1.0" encoding="utf-8"?>
-<p:sld xmlns:a="http://schemas.openxmlformats.org/drawingml/2006/main" xmlns:p="http://schemas.openxmlformats.org/presentationml/2006/main" xmlns:r="http://schemas.openxmlformats.org/officeDocument/2006/relationships">
-  <p:cSld>
-    <p:spTree>
-      <p:nvGrpSpPr>
-        <p:cNvPr id="1" name=""/>
-        <p:cNvGrpSpPr/>
-        <p:nvPr/>
-      </p:nvGrpSpPr>
-      <p:grpSpPr/>
-      <p:sp>
-        <p:nvSpPr>
-          <p:cNvPr id="2" name="Title 1"/>
-          <p:cNvSpPr>
-            <a:spLocks noGrp="1"/>
-          </p:cNvSpPr>
-          <p:nvPr>
-            <p:ph type="ctrTitle"/>
-          </p:nvPr>
-        </p:nvSpPr>
-        <p:spPr/>
-        <p:txBody>
-          <a:bodyPr/>
-          <a:lstStyle/>
-          <a:p>
-            <a:r>
-              <a:t> </a:t>
-            </a:r>
-          </a:p>
-        </p:txBody>
-      </p:sp>
-      <p:sp>
-        <p:nvSpPr>
-          <p:cNvPr id="3" name="Subtitle 2"/>
-          <p:cNvSpPr>
-            <a:spLocks noGrp="1"/>
-          </p:cNvSpPr>
-          <p:nvPr>
-            <p:ph type="subTitle" idx="1"/>
-          </p:nvPr>
-        </p:nvSpPr>
-        <p:spPr/>
-        <p:txBody>
-          <a:bodyPr/>
-          <a:lstStyle/>
-          <a:p>
-            <a:r>
-              <a:t>Its singles "Shake It Off", "Blank Space", and "Bad Blood" reached number one in the US, Australia, and Canada.</a:t>
+              <a:t>The effect of this alternate declaration is semantically identical (to the args parameter which is still an array of String objects), but it allows an alternative syntax for creating and passing the array.</a:t>
             </a:r>
           </a:p>
         </p:txBody>
@@ -6406,7 +5320,7 @@
           <a:lstStyle/>
           <a:p>
             <a:r>
-              <a:t>Swift also explored the music of older country stars, including Patsy Cline, Loretta Lynn, Dolly Parton, and Tammy Wynette.</a:t>
+              <a:t>The String args parameter is an array of String objects containing any arguments passed to the class.</a:t>
             </a:r>
           </a:p>
         </p:txBody>
@@ -6466,7 +5380,7 @@
           <a:lstStyle/>
           <a:p>
             <a:r>
-              <a:t>Swift has also been influenced by many artists outside the country genre.</a:t>
+              <a:t>It is intended to let application developers "write once, run anywhere" (WORA), meaning that compiled Java code can run on all platforms that support Java without the need for recompilation.</a:t>
             </a:r>
           </a:p>
         </p:txBody>
@@ -6526,7 +5440,7 @@
           <a:lstStyle/>
           <a:p>
             <a:r>
-              <a:t>Swift's music contains elements of pop, pop rock, and country.</a:t>
+              <a:t>Following Oracle Corporation's acquisition of Sun Micro-systems in 2009–10, Oracle has described itself as the "steward of Java technology with a relentless commitment to fostering a community of participation and transparency".</a:t>
             </a:r>
           </a:p>
         </p:txBody>
@@ -6586,7 +5500,7 @@
           <a:lstStyle/>
           <a:p>
             <a:r>
-              <a:t>While presenting Swift an award for her humanitarian endeavors in 2012, Michelle Obama described her as a singer who "has rocketed to the top of the music industry but still keeps her feet on the ground, someone who has shattered every expectation of what a 22-year-old can accomplish".</a:t>
+              <a:t>This did not prevent Oracle from filing a lawsuit against Google shortly after that for using Java inside the Android SDK (see Google section below).</a:t>
             </a:r>
           </a:p>
         </p:txBody>
@@ -6646,7 +5560,7 @@
           <a:lstStyle/>
           <a:p>
             <a:r>
-              <a:t>Swift's philanthropic efforts have been recognized by the Do Something Awards and the Tennessee Disaster Services.</a:t>
+              <a:t>In January 2016, Oracle announced that Java run-time environments based on JDK 9 will discontinue the browser plugin.</a:t>
             </a:r>
           </a:p>
         </p:txBody>
@@ -6706,7 +5620,7 @@
           <a:lstStyle/>
           <a:p>
             <a:r>
-              <a:t>Swift has sold more than 50 million albums, 150 million single downloads, and was one of the top five music artists with the highest worldwide digital sales.</a:t>
+              <a:t>Java bytecode instructions are analogous to machine code, but they are intended to be executed by a virtual machine (VM) written specifically for the host hardware.</a:t>
             </a:r>
           </a:p>
         </p:txBody>
@@ -6766,7 +5680,7 @@
           <a:lstStyle/>
           <a:p>
             <a:r>
-              <a:t>Her 2006 self-titled debut album peaked at number five on the Billboard 200 and spent the most weeks on the chart in the 2000s.</a:t>
+              <a:t>Oracle Corporation is the current owner of the official implementation of the Java SE platform, following their acquisition of Sun Microsystems on January 27, 2010.</a:t>
             </a:r>
           </a:p>
         </p:txBody>
@@ -6826,7 +5740,7 @@
           <a:lstStyle/>
           <a:p>
             <a:r>
-              <a:t>The album's third single, "Our Song", made her the youngest person to single-handedly write and perform a number-one song on the Hot Country Songs chart.</a:t>
+              <a:t>The Oracle implementation is packaged into two different distributions: The Java Runtime Environment (JRE) which contains the parts of the Java SE platform required to run Java programs and is intended for end users, and the Java Development Kit (JDK), which is intended for software developers and includes development tools such as the Java compiler, Javadoc, Jar, and a debugger.</a:t>
             </a:r>
           </a:p>
         </p:txBody>
@@ -6908,7 +5822,7 @@
         <p:spPr>
           <a:xfrm>
             <a:off x="914400" y="1828800"/>
-            <a:ext cx="2057400" cy="3657600"/>
+            <a:ext cx="7300570" cy="3657600"/>
           </a:xfrm>
           <a:prstGeom prst="rect">
             <a:avLst/>
@@ -6970,7 +5884,7 @@
           <a:lstStyle/>
           <a:p>
             <a:r>
-              <a:t>Swift's sixth album, Reputation (2017) and its lead single "Look What You Made Me Do" topped the UK and US charts; with the former, she became the first act to have four albums sell one million copies within one week in the US.</a:t>
+              <a:t>The implementation started when Sun began releasing the Java source code under the GPL.</a:t>
             </a:r>
           </a:p>
         </p:txBody>
@@ -7030,7 +5944,7 @@
           <a:lstStyle/>
           <a:p>
             <a:r>
-              <a:t>Swift is one of the best-selling music artists of all time, having sold more than 50 million albums—including 27.8 million in the US—and 150 million single downloads.</a:t>
+              <a:t>Historically, Sun's trademark license for usage of the Java brand insists that all implementations be "compatible".</a:t>
             </a:r>
           </a:p>
         </p:txBody>
@@ -7090,7 +6004,7 @@
           <a:lstStyle/>
           <a:p>
             <a:r>
-              <a:t>Big Machine Records was still in its infancy during the June 2006 release of the lead single, "Tim McGraw", and Swift and her mother helped "stuff the CD singles into envelopes to send to radio".</a:t>
+              <a:t>The Java programming language requires the presence of a software platform in order for compiled programs to be executed.</a:t>
             </a:r>
           </a:p>
         </p:txBody>
@@ -7150,7 +6064,7 @@
           <a:lstStyle/>
           <a:p>
             <a:r>
-              <a:t>Following "Tim McGraw", four more singles were released throughout 2007 and 2008: "Teardrops on My Guitar", "Our Song", "Picture to Burn" and "Should've Said No".</a:t>
+              <a:t>Oracle supplies the Java platform for use with Java.</a:t>
             </a:r>
           </a:p>
         </p:txBody>
@@ -7210,7 +6124,7 @@
           <a:lstStyle/>
           <a:p>
             <a:r>
-              <a:t>For the former, Swift became the youngest person to single-handedly write and perform a number-one song on the chart.</a:t>
+              <a:t>The Java language is a key pillar in Android, an open source mobile operating system.</a:t>
             </a:r>
           </a:p>
         </p:txBody>
@@ -7270,7 +6184,7 @@
           <a:lstStyle/>
           <a:p>
             <a:r>
-              <a:t>Four more singles were released throughout 2008 and 2009: "White Horse", "You Belong with Me", "Fifteen" and "Fearless".</a:t>
+              <a:t>Depending on the Android version, the bytecode is either interpreted by the Dalvik virtual machine or compiled into native code by the Android Runtime.</a:t>
             </a:r>
           </a:p>
         </p:txBody>
@@ -7330,7 +6244,7 @@
           <a:lstStyle/>
           <a:p>
             <a:r>
-              <a:t>"You Belong with Me" was the album's highest-charting single on the Billboard Hot 100, peaking at number two.</a:t>
+              <a:t>On 7 May  2012, a San Francisco jury found that if APIs could be copyrighted, then Google had infringed Oracle's copyrights by the use of Java in Android devices.</a:t>
             </a:r>
           </a:p>
         </p:txBody>
@@ -7390,11 +6304,35 @@
           <a:lstStyle/>
           <a:p>
             <a:r>
-              <a:t>The album received promotion from Swift's first concert tour, the Fearless Tour, which grossed over $63 million.</a:t>
-            </a:r>
-          </a:p>
-        </p:txBody>
-      </p:sp>
+              <a:t> </a:t>
+            </a:r>
+          </a:p>
+        </p:txBody>
+      </p:sp>
+      <p:pic>
+        <p:nvPicPr>
+          <p:cNvPr id="4" name="Picture 3" descr="image1.jpg"/>
+          <p:cNvPicPr>
+            <a:picLocks noChangeAspect="1"/>
+          </p:cNvPicPr>
+          <p:nvPr/>
+        </p:nvPicPr>
+        <p:blipFill>
+          <a:blip r:embed="rId2"/>
+          <a:stretch>
+            <a:fillRect/>
+          </a:stretch>
+        </p:blipFill>
+        <p:spPr>
+          <a:xfrm>
+            <a:off x="914400" y="1828800"/>
+            <a:ext cx="5621738" cy="3657600"/>
+          </a:xfrm>
+          <a:prstGeom prst="rect">
+            <a:avLst/>
+          </a:prstGeom>
+        </p:spPr>
+      </p:pic>
     </p:spTree>
   </p:cSld>
   <p:clrMapOvr>
@@ -7429,28 +6367,28 @@
           <a:lstStyle/>
           <a:p>
             <a:r>
+              <a:t>ADVANTAGES</a:t>
+            </a:r>
+          </a:p>
+        </p:txBody>
+      </p:sp>
+      <p:sp>
+        <p:nvSpPr>
+          <p:cNvPr id="3" name="Subtitle 2"/>
+          <p:cNvSpPr>
+            <a:spLocks noGrp="1"/>
+          </p:cNvSpPr>
+          <p:nvPr>
+            <p:ph type="subTitle" idx="1"/>
+          </p:nvPr>
+        </p:nvSpPr>
+        <p:spPr/>
+        <p:txBody>
+          <a:bodyPr/>
+          <a:lstStyle/>
+          <a:p>
+            <a:r>
               <a:t> </a:t>
-            </a:r>
-          </a:p>
-        </p:txBody>
-      </p:sp>
-      <p:sp>
-        <p:nvSpPr>
-          <p:cNvPr id="3" name="Subtitle 2"/>
-          <p:cNvSpPr>
-            <a:spLocks noGrp="1"/>
-          </p:cNvSpPr>
-          <p:nvPr>
-            <p:ph type="subTitle" idx="1"/>
-          </p:nvPr>
-        </p:nvSpPr>
-        <p:spPr/>
-        <p:txBody>
-          <a:bodyPr/>
-          <a:lstStyle/>
-          <a:p>
-            <a:r>
-              <a:t>Swift contributed backing vocals to John Mayer's "Half of My Heart", a single featured on his fourth album, Battle Studies (2009).</a:t>
             </a:r>
           </a:p>
         </p:txBody>
@@ -7510,7 +6448,7 @@
           <a:lstStyle/>
           <a:p>
             <a:r>
-              <a:t>In August 2010, Swift released "Mine", the lead single from her third studio album, Speak Now.</a:t>
+              <a:t>The programmer determines when objects are created, and the Java runtime is responsible for recovering the memory once objects are no longer in use.</a:t>
             </a:r>
           </a:p>
         </p:txBody>
@@ -7630,7 +6568,7 @@
           <a:lstStyle/>
           <a:p>
             <a:r>
-              <a:t>Three of the album's singles, "Mine", "Back to December", and "Mean", peaked in the top ten in Canada.</a:t>
+              <a:t>As in C++ and some other object-oriented languages, variables of Java's primitive data types are either stored directly in fields (for objects) or on the stack (for methods) rather than on the heap, as is commonly true for non-primitive data types (but see escape analysis).</a:t>
             </a:r>
           </a:p>
         </p:txBody>
@@ -7690,7 +6628,7 @@
           <a:lstStyle/>
           <a:p>
             <a:r>
-              <a:t>In November 2011, Swift released her first live album, Speak Now World Tour: Live.</a:t>
+              <a:t>The keyword static in front of a method indicates a static method, which is associated only with the class and not with any specific instance of that class.</a:t>
             </a:r>
           </a:p>
         </p:txBody>
@@ -7750,7 +6688,7 @@
           <a:lstStyle/>
           <a:p>
             <a:r>
-              <a:t>In August, Swift released "We Are Never Ever Getting Back Together", the lead single from her fourth studio album, Red.</a:t>
+              <a:t>Only static methods can be invoked without a reference to an object.</a:t>
             </a:r>
           </a:p>
         </p:txBody>
@@ -7810,7 +6748,7 @@
           <a:lstStyle/>
           <a:p>
             <a:r>
-              <a:t>Swift released the album's second single, "Begin Again", in October.</a:t>
+              <a:t>Static methods cannot access any class members that are not also static.</a:t>
             </a:r>
           </a:p>
         </p:txBody>
@@ -7870,7 +6808,7 @@
           <a:lstStyle/>
           <a:p>
             <a:r>
-              <a:t>Other singles released from the album include "I Knew You Were Trouble", "22", "Everything Has Changed", "The Last Time", and "Red".</a:t>
+              <a:t>Methods that are not designated static are instance methods and require a specific instance of a class to operate.</a:t>
             </a:r>
           </a:p>
         </p:txBody>
@@ -7930,7 +6868,7 @@
           <a:lstStyle/>
           <a:p>
             <a:r>
-              <a:t>1989 sold 1.28 million copies in the US during the first week of release and debuted atop the Billboard 200—this made Swift the first act to have three albums sell more than one million copies in their opening release week, for which she earned a Guinness World Record.</a:t>
+              <a:t>The main method must accept an array of String objects.</a:t>
             </a:r>
           </a:p>
         </p:txBody>
@@ -7990,7 +6928,7 @@
           <a:lstStyle/>
           <a:p>
             <a:r>
-              <a:t>The album's lead single, "Shake It Off", was released in August 2014 and debuted at number one on the Billboard Hot 100.</a:t>
+              <a:t>Since Java 5, the main method can also use variable arguments, in the form of public static void main(String... args), allowing the main method to be invoked with an arbitrary number of String arguments.</a:t>
             </a:r>
           </a:p>
         </p:txBody>
@@ -8050,7 +6988,7 @@
           <a:lstStyle/>
           <a:p>
             <a:r>
-              <a:t>The album also generated two additional number-one singles—"Blank Space" and "Bad Blood" (featuring Kendrick Lamar)—as well as the top-ten entries "Style" and "Wildest Dreams", and other singles "Out of the Woods" and "New Romantics".</a:t>
+              <a:t>The Java launcher launches Java by loading a given class (specified on the command line or as an attribute in a JAR) and starting its public static void main(String) method.</a:t>
             </a:r>
           </a:p>
         </p:txBody>
@@ -8110,7 +7048,7 @@
           <a:lstStyle/>
           <a:p>
             <a:r>
-              <a:t>Two months later, Swift and British singer Zayn Malik released a single together called "I Don't Wanna Live Forever", for the soundtrack of the film Fifty Shades Darker (2017).</a:t>
+              <a:t>Printing is part of a Java standard library: The System class defines a public static field called out.</a:t>
             </a:r>
           </a:p>
         </p:txBody>
@@ -8170,7 +7108,7 @@
           <a:lstStyle/>
           <a:p>
             <a:r>
-              <a:t>Swift thereafter cleared her social media accounts and released "Look What You Made Me Do" as the lead single from her sixth album, Reputation (stylized as reputation).</a:t>
+              <a:t>The out object is an instance of the PrintStream class and provides many methods for printing data to standard out, including println(String) which also appends a new line to the passed string.</a:t>
             </a:r>
           </a:p>
         </p:txBody>
@@ -8230,7 +7168,7 @@
           <a:lstStyle/>
           <a:p>
             <a:r>
-              <a:t>Born and raised in Pennsylvania, Swift moved to Nashville, Tennessee, at the age of 14 to pursue a career in country music.</a:t>
+              <a:t>Java uses an automatic garbage collector to manage memory in the object lifecycle.</a:t>
             </a:r>
           </a:p>
         </p:txBody>
@@ -8290,7 +7228,7 @@
           <a:lstStyle/>
           <a:p>
             <a:r>
-              <a:t>In October, Swift released the album's second single, "...Ready for It?</a:t>
+              <a:t>Java was originally developed by James Gosling at Sun Microsystems (which has since been acquired by Oracle) and released in 1995 as a core component of Sun Microsystems' Java platform.</a:t>
             </a:r>
           </a:p>
         </p:txBody>
@@ -8350,7 +7288,7 @@
           <a:lstStyle/>
           <a:p>
             <a:r>
-              <a:t>Two promotional singles were released from Reputation, "Gorgeous" and "Call It What You Want"; the former later became the album's fifth single, however only being released as such in Europe.</a:t>
+              <a:t>The original and reference implementation Java compilers, virtual machines, and class libraries were originally released by Sun under proprietary licenses.</a:t>
             </a:r>
           </a:p>
         </p:txBody>
@@ -8410,7 +7348,7 @@
           <a:lstStyle/>
           <a:p>
             <a:r>
-              <a:t>Other singles from the album include "New Year's Day" and "Delicate", the former of which was released exclusively to country radio.</a:t>
+              <a:t>Meanwhile, others have developed alternative implementations of these Sun technologies, such as the GNU Compiler for Java (bytecode compiler), GNU Classpath (standard libraries), and IcedTea-Web (browser plugin for applets).</a:t>
             </a:r>
           </a:p>
         </p:txBody>
@@ -8470,7 +7408,7 @@
           <a:lstStyle/>
           <a:p>
             <a:r>
-              <a:t>The tour broke multiple venue attendance and grossing records in the United States, earning $266.1 million and selling more than two million tickets.</a:t>
+              <a:t>Sun Microsystems released the first public implementation as Java 1.0 in 1996.</a:t>
             </a:r>
           </a:p>
         </p:txBody>
@@ -8530,7 +7468,7 @@
           <a:lstStyle/>
           <a:p>
             <a:r>
-              <a:t>The lead single from Swift's seventh studio album, "Me!"</a:t>
+              <a:t>At one time, Sun made most of its Java implementations available without charge, despite their proprietary software status.</a:t>
             </a:r>
           </a:p>
         </p:txBody>
@@ -8590,7 +7528,7 @@
           <a:lstStyle/>
           <a:p>
             <a:r>
-              <a:t>Swift has sold more than 50 million albums, 150 million single downloads, and was one of the top five music artists with the highest worldwide digital sales.</a:t>
+              <a:t>On November 13, 2006, Sun released much of its Java virtual machine (JVM) as free and open-source software, (FOSS), under the terms of the GNU General Public License (GPL).</a:t>
             </a:r>
           </a:p>
         </p:txBody>
@@ -8650,7 +7588,11 @@
           <a:lstStyle/>
           <a:p>
             <a:r>
-              <a:t>She is the third best-selling digital singles artist in the US with a total of 106.5 million equivalent units certified according to Recording Industry Association of America.</a:t>
+              <a:t>Major release versions of Java, along with their release dates:</a:t>
+            </a:r>
+            <a:br/>
+            <a:r>
+              <a:t>Sun has defined and supports four editions of Java targeting different application environments and segmented many of its APIs so that they belong to one of the platforms.</a:t>
             </a:r>
           </a:p>
         </p:txBody>
@@ -8710,35 +7652,11 @@
           <a:lstStyle/>
           <a:p>
             <a:r>
-              <a:t> </a:t>
-            </a:r>
-          </a:p>
-        </p:txBody>
-      </p:sp>
-      <p:pic>
-        <p:nvPicPr>
-          <p:cNvPr id="4" name="Picture 3" descr="image1.jpg"/>
-          <p:cNvPicPr>
-            <a:picLocks noChangeAspect="1"/>
-          </p:cNvPicPr>
-          <p:nvPr/>
-        </p:nvPicPr>
-        <p:blipFill>
-          <a:blip r:embed="rId2"/>
-          <a:stretch>
-            <a:fillRect/>
-          </a:stretch>
-        </p:blipFill>
-        <p:spPr>
-          <a:xfrm>
-            <a:off x="914400" y="1828800"/>
-            <a:ext cx="3657600" cy="3657600"/>
-          </a:xfrm>
-          <a:prstGeom prst="rect">
-            <a:avLst/>
-          </a:prstGeom>
-        </p:spPr>
-      </p:pic>
+              <a:t>One design goal of Java is portability, which means that programs written for the Java platform must run similarly on any combination of hardware and operating system with adequate run time support.</a:t>
+            </a:r>
+          </a:p>
+        </p:txBody>
+      </p:sp>
     </p:spTree>
   </p:cSld>
   <p:clrMapOvr>
@@ -8773,7 +7691,7 @@
           <a:lstStyle/>
           <a:p>
             <a:r>
-              <a:t>ADVANTAGES</a:t>
+              <a:t> </a:t>
             </a:r>
           </a:p>
         </p:txBody>
@@ -8794,7 +7712,7 @@
           <a:lstStyle/>
           <a:p>
             <a:r>
-              <a:t> </a:t>
+              <a:t>This is achieved by compiling the Java language code to an intermediate representation called Java bytecode, instead of directly to architecture-specific machine code.</a:t>
             </a:r>
           </a:p>
         </p:txBody>
@@ -8854,7 +7772,7 @@
           <a:lstStyle/>
           <a:p>
             <a:r>
-              <a:t>The album won four Grammy Awards, with Swift becoming the youngest Album of the Year winner.</a:t>
+              <a:t>End users commonly use a Java Runtime Environment (JRE) installed on their own machine for standalone Java applications, or in a web browser for Java applets.</a:t>
             </a:r>
           </a:p>
         </p:txBody>
@@ -8914,7 +7832,7 @@
           <a:lstStyle/>
           <a:p>
             <a:r>
-              <a:t>Swift is one of the best-selling music artists of all time, having sold more than 50 million albums—including 27.8 million in the US—and 150 million single downloads.</a:t>
+              <a:t>Once no references to an object remain, the unreachable memory becomes eligible to be freed automatically by the garbage collector.</a:t>
             </a:r>
           </a:p>
         </p:txBody>
@@ -8974,7 +7892,7 @@
           <a:lstStyle/>
           <a:p>
             <a:r>
-              <a:t>She is also the recipient of 10 Grammys, one Emmy, 23 Billboard Music Awards, and 12 Country Music Association Awards, and she holds six Guinness World Records.</a:t>
+              <a:t>However, the overhead of interpreting bytecode into machine instructions made interpreted programs almost always run more slowly than native executables.</a:t>
             </a:r>
           </a:p>
         </p:txBody>
@@ -9034,7 +7952,7 @@
           <a:lstStyle/>
           <a:p>
             <a:r>
-              <a:t>When Swift was about 12 years old, computer repairman and local musician Ronnie Cremer taught her how to play guitar and helped with her first efforts as a songwriter, leading to her writing "Lucky You".</a:t>
+              <a:t>Just-in-time (JIT) compilers that compile byte-codes to machine code during runtime were introduced from an early stage.</a:t>
             </a:r>
           </a:p>
         </p:txBody>
@@ -9094,7 +8012,7 @@
           <a:lstStyle/>
           <a:p>
             <a:r>
-              <a:t>To help Swift break into country music, her father transferred to the Nashville office of Merrill Lynch when she was 14, and the family relocated to a lakefront house in Hendersonville, Tennessee.</a:t>
+              <a:t>Java itself is platform-independent and is adapted to the particular platform it is to run on by a Java virtual machine for it, which translates the Java bytecode into the platform's machine language.</a:t>
             </a:r>
           </a:p>
         </p:txBody>
@@ -9154,7 +8072,7 @@
           <a:lstStyle/>
           <a:p>
             <a:r>
-              <a:t>She also won the Country Music Association's Horizon Award for Best New Artist, the Academy of Country Music Awards' Top New Female Vocalist, and the American Music Awards' Favorite Country Female Artist honor.</a:t>
+              <a:t>However, Java programs' execution speed improved significantly with the introduction of just-in-time compilation in 1997/1998 for Java 1.1, the addition of language features supporting better code analysis (such as inner classes, the StringBuilder class, optional assertions, etc.</a:t>
             </a:r>
           </a:p>
         </p:txBody>
@@ -9214,7 +8132,7 @@
           <a:lstStyle/>
           <a:p>
             <a:r>
-              <a:t>She was also nominated for Best New Artist at the 2008 Grammy Awards.</a:t>
+              <a:t>), and optimizations in the Java virtual machine, such as HotSpot becoming the default for Sun's JVM in 2000.</a:t>
             </a:r>
           </a:p>
         </p:txBody>
@@ -9274,7 +8192,7 @@
           <a:lstStyle/>
           <a:p>
             <a:r>
-              <a:t>In 2009, the music video for "You Belong with Me" was named MTV Video Music Award for Best Female Video.</a:t>
+              <a:t>Some platforms offer direct hardware support for Java; there are micro controllers that can run Java bytecode in hardware instead of a software Java virtual machine, and some ARM-based processors could have hardware support for executing Java bytecode through their Jazelle option, though support has mostly been dropped in current implementations of ARM.</a:t>
             </a:r>
           </a:p>
         </p:txBody>
@@ -9334,7 +8252,7 @@
           <a:lstStyle/>
           <a:p>
             <a:r>
-              <a:t>Also that year, she won five American Music Awards, including Artist of the Year and Favorite Country Album.</a:t>
+              <a:t>Where prior implementations of these looks and feels may have been considered lacking, Swing in Java SE 6 addresses this problem by using more native GUI widget drawing routines of the underlying platforms.</a:t>
             </a:r>
           </a:p>
         </p:txBody>
@@ -9394,7 +8312,7 @@
           <a:lstStyle/>
           <a:p>
             <a:r>
-              <a:t>At the 52nd Grammy Awards, Fearless was named Album of the Year and Best Country Album, and "White Horse" was named Best Country Song and Best Female Country Vocal Performance.</a:t>
+              <a:t>JavaFX is a software platform for creating and delivering desktop applications, as well as rich Internet applications (RIAs) that can run across a wide variety of devices.</a:t>
             </a:r>
           </a:p>
         </p:txBody>
@@ -9454,7 +8372,7 @@
           <a:lstStyle/>
           <a:p>
             <a:r>
-              <a:t>Swift was the youngest artist ever to win Album of the Year.</a:t>
+              <a:t>This implementation is based on the original implementation of Java by Sun.</a:t>
             </a:r>
           </a:p>
         </p:txBody>
@@ -9514,7 +8432,7 @@
           <a:lstStyle/>
           <a:p>
             <a:r>
-              <a:t>Jon Caramanica of The New York Times found it "refreshing to see someone so gifted make the occasional flub" and described Swift as "the most important new pop star of the past few years".</a:t>
+              <a:t>This resulted in a legal dispute with Microsoft after Sun claimed that the Microsoft implementation did not support RMI or JNI and had added platform-specific features of their own.</a:t>
             </a:r>
           </a:p>
         </p:txBody>
@@ -9574,7 +8492,7 @@
           <a:lstStyle/>
           <a:p>
             <a:r>
-              <a:t>Swift later shifted her focus toward country music inspired by Shania Twain's songs, which made her "want to just run around the block four times and daydream about everything".</a:t>
+              <a:t>In some languages, memory for the creation of objects is implicitly allocated on the stack or explicitly allocated and deallocated from the heap.</a:t>
             </a:r>
           </a:p>
         </p:txBody>
@@ -9634,7 +8552,7 @@
           <a:lstStyle/>
           <a:p>
             <a:r>
-              <a:t>Swift became the youngest ever artist to be named Entertainer of the Year by the Country Music Association.</a:t>
+              <a:t>Platform-independent Java is essential to Java EE, and an even more rigorous validation is required to certify an implementation.</a:t>
             </a:r>
           </a:p>
         </p:txBody>
@@ -9694,7 +8612,7 @@
           <a:lstStyle/>
           <a:p>
             <a:r>
-              <a:t>It entered the United States at number three, making Swift the second female artist in the history of the Hot 100 (after Mariah Carey) to debut multiple tracks in the top five in one year; the other was "Today Was a Fairytale" at number two.</a:t>
+              <a:t>Although Android, built on the Linux kernel, is written largely in C, the Android SDK uses the Java language as the basis for Android applications.</a:t>
             </a:r>
           </a:p>
         </p:txBody>
@@ -9754,7 +8672,7 @@
           <a:lstStyle/>
           <a:p>
             <a:r>
-              <a:t>"Mean" won Best Country Song and Best Country Solo Performance at the 54th Annual Grammy Awards.</a:t>
+              <a:t>The bytecode language supported by the Android SDK is incompatible with Java bytecode and runs on its own virtual machine, optimized for low-memory devices such as smartphones and tablet computers.</a:t>
             </a:r>
           </a:p>
         </p:txBody>
@@ -9814,7 +8732,7 @@
           <a:lstStyle/>
           <a:p>
             <a:r>
-              <a:t>Swift won various other awards for Speak Now, including Songwriter/Artist of the Year by the Nashville Songwriters Association (2010 and 2011), Woman of the Year by Billboard (2011), and Entertainer of the Year by the Academy of Country Music (2011 and 2012) and the Country Music Association in 2011.</a:t>
+              <a:t>Android does not provide the full Java SE standard library, although the Android SDK does include an independent implementation of a large subset of it.</a:t>
             </a:r>
           </a:p>
         </p:txBody>
@@ -9874,7 +8792,7 @@
           <a:lstStyle/>
           <a:p>
             <a:r>
-              <a:t>At the American Music Awards of 2011, Swift won Artist of the Year and Favorite Country Album.</a:t>
+              <a:t>The use of Java-related technology in Android led to a legal dispute between Oracle and Google.</a:t>
             </a:r>
           </a:p>
         </p:txBody>
@@ -9934,11 +8852,35 @@
           <a:lstStyle/>
           <a:p>
             <a:r>
-              <a:t>Its single "I Knew You Were Trouble" won Best Female Video at the 2013 MTV Video Music Awards.</a:t>
-            </a:r>
-          </a:p>
-        </p:txBody>
-      </p:sp>
+              <a:t> </a:t>
+            </a:r>
+          </a:p>
+        </p:txBody>
+      </p:sp>
+      <p:pic>
+        <p:nvPicPr>
+          <p:cNvPr id="4" name="Picture 3" descr="image2.jpg"/>
+          <p:cNvPicPr>
+            <a:picLocks noChangeAspect="1"/>
+          </p:cNvPicPr>
+          <p:nvPr/>
+        </p:nvPicPr>
+        <p:blipFill>
+          <a:blip r:embed="rId2"/>
+          <a:stretch>
+            <a:fillRect/>
+          </a:stretch>
+        </p:blipFill>
+        <p:spPr>
+          <a:xfrm>
+            <a:off x="914400" y="1828800"/>
+            <a:ext cx="3856872" cy="3657600"/>
+          </a:xfrm>
+          <a:prstGeom prst="rect">
+            <a:avLst/>
+          </a:prstGeom>
+        </p:spPr>
+      </p:pic>
     </p:spTree>
   </p:cSld>
   <p:clrMapOvr>
@@ -9973,28 +8915,28 @@
           <a:lstStyle/>
           <a:p>
             <a:r>
+              <a:t>DISADVANTAGES</a:t>
+            </a:r>
+          </a:p>
+        </p:txBody>
+      </p:sp>
+      <p:sp>
+        <p:nvSpPr>
+          <p:cNvPr id="3" name="Subtitle 2"/>
+          <p:cNvSpPr>
+            <a:spLocks noGrp="1"/>
+          </p:cNvSpPr>
+          <p:nvPr>
+            <p:ph type="subTitle" idx="1"/>
+          </p:nvPr>
+        </p:nvSpPr>
+        <p:spPr/>
+        <p:txBody>
+          <a:bodyPr/>
+          <a:lstStyle/>
+          <a:p>
+            <a:r>
               <a:t> </a:t>
-            </a:r>
-          </a:p>
-        </p:txBody>
-      </p:sp>
-      <p:sp>
-        <p:nvSpPr>
-          <p:cNvPr id="3" name="Subtitle 2"/>
-          <p:cNvSpPr>
-            <a:spLocks noGrp="1"/>
-          </p:cNvSpPr>
-          <p:nvPr>
-            <p:ph type="subTitle" idx="1"/>
-          </p:nvPr>
-        </p:nvSpPr>
-        <p:spPr/>
-        <p:txBody>
-          <a:bodyPr/>
-          <a:lstStyle/>
-          <a:p>
-            <a:r>
-              <a:t>Swift was named Best Female Country Artist at the 2012 American Music Awards and Artist of the Year at the 2013 ceremony.</a:t>
             </a:r>
           </a:p>
         </p:txBody>
@@ -10054,7 +8996,7 @@
           <a:lstStyle/>
           <a:p>
             <a:r>
-              <a:t>She received the Nashville Songwriters Association's Songwriter/Artist Award for the fifth and sixth consecutive years in 2012 and 2013 respectively.</a:t>
+              <a:t>Something similar to a memory leak may still occur if a programmer's code holds a reference to an object that is no longer needed, typically when objects that are no longer needed are stored in containers that are still in use.</a:t>
             </a:r>
           </a:p>
         </p:txBody>
@@ -10114,7 +9056,7 @@
           <a:lstStyle/>
           <a:p>
             <a:r>
-              <a:t>In 2013, Swift co-wrote and co-produced "Sweeter than Fiction" with Jack Antonoff for the One Chance soundtrack, and received a Best Original Song nomination at the 71st Golden Globe Awards.</a:t>
+              <a:t>Paradoxically, the presence of a garbage collector has faded the necessity of having an explicit destructor method in the classes, thus rendering the management of these other resources more difficult.</a:t>
             </a:r>
           </a:p>
         </p:txBody>
@@ -10174,7 +9116,7 @@
           <a:lstStyle/>
           <a:p>
             <a:r>
-              <a:t>Outside music, Swift voiced Audrey, a tree lover, in the animated film The Lorax (2012), made a cameo in the sitcom New Girl (2013), and had a supporting role in the film adaptation of The Giver (2014).</a:t>
+              <a:t>The Java source file may only contain one public class, but it can contain multiple classes with other than public access modifier and any number of public inner classes.</a:t>
             </a:r>
           </a:p>
         </p:txBody>
@@ -10234,7 +9176,7 @@
           <a:lstStyle/>
           <a:p>
             <a:r>
-              <a:t>In 2003, Swift and her parents started working with New York-based music manager Dan Dymtrow.</a:t>
+              <a:t>This allows the garbage collector to relocate referenced objects and ensures type safety and security.</a:t>
             </a:r>
           </a:p>
         </p:txBody>
@@ -10294,7 +9236,7 @@
           <a:lstStyle/>
           <a:p>
             <a:r>
-              <a:t>The videos for "Blank Space" and "Bad Blood" won four accolades at the 2015 MTV Video Music Awards, with the latter winning for Video of the Year and Best Collaboration.</a:t>
+              <a:t>The keyword public denotes that a method can be called from code in other classes, or that a class may be used by classes outside the class hierarchy.</a:t>
             </a:r>
           </a:p>
         </p:txBody>
@@ -10354,7 +9296,7 @@
           <a:lstStyle/>
           <a:p>
             <a:r>
-              <a:t>Swift was named Billboard's Woman of the Year in 2014, becoming the first artist to win the award twice.</a:t>
+              <a:t>For container classes, for example, this is a problem because there is no easy way to create a container that accepts only specific types of objects.</a:t>
             </a:r>
           </a:p>
         </p:txBody>
@@ -10414,7 +9356,7 @@
           <a:lstStyle/>
           <a:p>
             <a:r>
-              <a:t>Also that year, she received the Dick Clark Award for Excellence at the American Music Awards.</a:t>
+              <a:t>Java is a general-purpose programming language that is class-based, object-oriented, and designed to have as few implementation dependencies as possible.</a:t>
             </a:r>
           </a:p>
         </p:txBody>
@@ -10474,7 +9416,7 @@
           <a:lstStyle/>
           <a:p>
             <a:r>
-              <a:t>In 2015, "Shake It Off" was nominated for three Grammy Awards, including Record of the Year and Song of the Year and Swift won the Brit Award for International Female Solo Artist.</a:t>
+              <a:t>Java applications are typically compiled to "bytecode" that can run on any Java virtual machine (JVM) regardless of the underlying computer architecture.</a:t>
             </a:r>
           </a:p>
         </p:txBody>
@@ -10534,307 +9476,7 @@
           <a:lstStyle/>
           <a:p>
             <a:r>
-              <a:t>Swift was one of eight artists to receive a 50th Anniversary Milestone Award at the 2015 Academy of Country Music Awards.</a:t>
-            </a:r>
-          </a:p>
-        </p:txBody>
-      </p:sp>
-    </p:spTree>
-  </p:cSld>
-  <p:clrMapOvr>
-    <a:masterClrMapping/>
-  </p:clrMapOvr>
-</p:sld>
-</file>
-
-<file path=ppt/slides/slide75.xml><?xml version="1.0" encoding="utf-8"?>
-<p:sld xmlns:a="http://schemas.openxmlformats.org/drawingml/2006/main" xmlns:p="http://schemas.openxmlformats.org/presentationml/2006/main" xmlns:r="http://schemas.openxmlformats.org/officeDocument/2006/relationships">
-  <p:cSld>
-    <p:spTree>
-      <p:nvGrpSpPr>
-        <p:cNvPr id="1" name=""/>
-        <p:cNvGrpSpPr/>
-        <p:nvPr/>
-      </p:nvGrpSpPr>
-      <p:grpSpPr/>
-      <p:sp>
-        <p:nvSpPr>
-          <p:cNvPr id="2" name="Title 1"/>
-          <p:cNvSpPr>
-            <a:spLocks noGrp="1"/>
-          </p:cNvSpPr>
-          <p:nvPr>
-            <p:ph type="ctrTitle"/>
-          </p:nvPr>
-        </p:nvSpPr>
-        <p:spPr/>
-        <p:txBody>
-          <a:bodyPr/>
-          <a:lstStyle/>
-          <a:p>
-            <a:r>
-              <a:t> </a:t>
-            </a:r>
-          </a:p>
-        </p:txBody>
-      </p:sp>
-      <p:sp>
-        <p:nvSpPr>
-          <p:cNvPr id="3" name="Subtitle 2"/>
-          <p:cNvSpPr>
-            <a:spLocks noGrp="1"/>
-          </p:cNvSpPr>
-          <p:nvPr>
-            <p:ph type="subTitle" idx="1"/>
-          </p:nvPr>
-        </p:nvSpPr>
-        <p:spPr/>
-        <p:txBody>
-          <a:bodyPr/>
-          <a:lstStyle/>
-          <a:p>
-            <a:r>
-              <a:t>In 2016, Swift won three Grammy Awards for 1989—Album of the Year, Best Pop Vocal Album, and Best Music Video for "Bad Blood".</a:t>
-            </a:r>
-          </a:p>
-        </p:txBody>
-      </p:sp>
-    </p:spTree>
-  </p:cSld>
-  <p:clrMapOvr>
-    <a:masterClrMapping/>
-  </p:clrMapOvr>
-</p:sld>
-</file>
-
-<file path=ppt/slides/slide76.xml><?xml version="1.0" encoding="utf-8"?>
-<p:sld xmlns:a="http://schemas.openxmlformats.org/drawingml/2006/main" xmlns:p="http://schemas.openxmlformats.org/presentationml/2006/main" xmlns:r="http://schemas.openxmlformats.org/officeDocument/2006/relationships">
-  <p:cSld>
-    <p:spTree>
-      <p:nvGrpSpPr>
-        <p:cNvPr id="1" name=""/>
-        <p:cNvGrpSpPr/>
-        <p:nvPr/>
-      </p:nvGrpSpPr>
-      <p:grpSpPr/>
-      <p:sp>
-        <p:nvSpPr>
-          <p:cNvPr id="2" name="Title 1"/>
-          <p:cNvSpPr>
-            <a:spLocks noGrp="1"/>
-          </p:cNvSpPr>
-          <p:nvPr>
-            <p:ph type="ctrTitle"/>
-          </p:nvPr>
-        </p:nvSpPr>
-        <p:spPr/>
-        <p:txBody>
-          <a:bodyPr/>
-          <a:lstStyle/>
-          <a:p>
-            <a:r>
-              <a:t> </a:t>
-            </a:r>
-          </a:p>
-        </p:txBody>
-      </p:sp>
-      <p:sp>
-        <p:nvSpPr>
-          <p:cNvPr id="3" name="Subtitle 2"/>
-          <p:cNvSpPr>
-            <a:spLocks noGrp="1"/>
-          </p:cNvSpPr>
-          <p:nvPr>
-            <p:ph type="subTitle" idx="1"/>
-          </p:nvPr>
-        </p:nvSpPr>
-        <p:spPr/>
-        <p:txBody>
-          <a:bodyPr/>
-          <a:lstStyle/>
-          <a:p>
-            <a:r>
-              <a:t>The song earned Swift an award for Song of the Year at the 51st CMA Awards.</a:t>
-            </a:r>
-          </a:p>
-        </p:txBody>
-      </p:sp>
-    </p:spTree>
-  </p:cSld>
-  <p:clrMapOvr>
-    <a:masterClrMapping/>
-  </p:clrMapOvr>
-</p:sld>
-</file>
-
-<file path=ppt/slides/slide77.xml><?xml version="1.0" encoding="utf-8"?>
-<p:sld xmlns:a="http://schemas.openxmlformats.org/drawingml/2006/main" xmlns:p="http://schemas.openxmlformats.org/presentationml/2006/main" xmlns:r="http://schemas.openxmlformats.org/officeDocument/2006/relationships">
-  <p:cSld>
-    <p:spTree>
-      <p:nvGrpSpPr>
-        <p:cNvPr id="1" name=""/>
-        <p:cNvGrpSpPr/>
-        <p:nvPr/>
-      </p:nvGrpSpPr>
-      <p:grpSpPr/>
-      <p:sp>
-        <p:nvSpPr>
-          <p:cNvPr id="2" name="Title 1"/>
-          <p:cNvSpPr>
-            <a:spLocks noGrp="1"/>
-          </p:cNvSpPr>
-          <p:nvPr>
-            <p:ph type="ctrTitle"/>
-          </p:nvPr>
-        </p:nvSpPr>
-        <p:spPr/>
-        <p:txBody>
-          <a:bodyPr/>
-          <a:lstStyle/>
-          <a:p>
-            <a:r>
-              <a:t> </a:t>
-            </a:r>
-          </a:p>
-        </p:txBody>
-      </p:sp>
-      <p:sp>
-        <p:nvSpPr>
-          <p:cNvPr id="3" name="Subtitle 2"/>
-          <p:cNvSpPr>
-            <a:spLocks noGrp="1"/>
-          </p:cNvSpPr>
-          <p:nvPr>
-            <p:ph type="subTitle" idx="1"/>
-          </p:nvPr>
-        </p:nvSpPr>
-        <p:spPr/>
-        <p:txBody>
-          <a:bodyPr/>
-          <a:lstStyle/>
-          <a:p>
-            <a:r>
-              <a:t>At the 2017 MTV Video Music Awards, the duo won the award for Best Collaboration for the song's music video.</a:t>
-            </a:r>
-          </a:p>
-        </p:txBody>
-      </p:sp>
-    </p:spTree>
-  </p:cSld>
-  <p:clrMapOvr>
-    <a:masterClrMapping/>
-  </p:clrMapOvr>
-</p:sld>
-</file>
-
-<file path=ppt/slides/slide78.xml><?xml version="1.0" encoding="utf-8"?>
-<p:sld xmlns:a="http://schemas.openxmlformats.org/drawingml/2006/main" xmlns:p="http://schemas.openxmlformats.org/presentationml/2006/main" xmlns:r="http://schemas.openxmlformats.org/officeDocument/2006/relationships">
-  <p:cSld>
-    <p:spTree>
-      <p:nvGrpSpPr>
-        <p:cNvPr id="1" name=""/>
-        <p:cNvGrpSpPr/>
-        <p:nvPr/>
-      </p:nvGrpSpPr>
-      <p:grpSpPr/>
-      <p:sp>
-        <p:nvSpPr>
-          <p:cNvPr id="2" name="Title 1"/>
-          <p:cNvSpPr>
-            <a:spLocks noGrp="1"/>
-          </p:cNvSpPr>
-          <p:nvPr>
-            <p:ph type="ctrTitle"/>
-          </p:nvPr>
-        </p:nvSpPr>
-        <p:spPr/>
-        <p:txBody>
-          <a:bodyPr/>
-          <a:lstStyle/>
-          <a:p>
-            <a:r>
-              <a:t> </a:t>
-            </a:r>
-          </a:p>
-        </p:txBody>
-      </p:sp>
-      <p:sp>
-        <p:nvSpPr>
-          <p:cNvPr id="3" name="Subtitle 2"/>
-          <p:cNvSpPr>
-            <a:spLocks noGrp="1"/>
-          </p:cNvSpPr>
-          <p:nvPr>
-            <p:ph type="subTitle" idx="1"/>
-          </p:nvPr>
-        </p:nvSpPr>
-        <p:spPr/>
-        <p:txBody>
-          <a:bodyPr/>
-          <a:lstStyle/>
-          <a:p>
-            <a:r>
-              <a:t>At the American Music Awards of 2018, Swift won Tour of the Year for the tour, Artist of the Year, Favorite Pop/Rock Female Artist, and Favorite Pop/Rock Album for Reputation.</a:t>
-            </a:r>
-          </a:p>
-        </p:txBody>
-      </p:sp>
-    </p:spTree>
-  </p:cSld>
-  <p:clrMapOvr>
-    <a:masterClrMapping/>
-  </p:clrMapOvr>
-</p:sld>
-</file>
-
-<file path=ppt/slides/slide79.xml><?xml version="1.0" encoding="utf-8"?>
-<p:sld xmlns:a="http://schemas.openxmlformats.org/drawingml/2006/main" xmlns:p="http://schemas.openxmlformats.org/presentationml/2006/main" xmlns:r="http://schemas.openxmlformats.org/officeDocument/2006/relationships">
-  <p:cSld>
-    <p:spTree>
-      <p:nvGrpSpPr>
-        <p:cNvPr id="1" name=""/>
-        <p:cNvGrpSpPr/>
-        <p:nvPr/>
-      </p:nvGrpSpPr>
-      <p:grpSpPr/>
-      <p:sp>
-        <p:nvSpPr>
-          <p:cNvPr id="2" name="Title 1"/>
-          <p:cNvSpPr>
-            <a:spLocks noGrp="1"/>
-          </p:cNvSpPr>
-          <p:nvPr>
-            <p:ph type="ctrTitle"/>
-          </p:nvPr>
-        </p:nvSpPr>
-        <p:spPr/>
-        <p:txBody>
-          <a:bodyPr/>
-          <a:lstStyle/>
-          <a:p>
-            <a:r>
-              <a:t> </a:t>
-            </a:r>
-          </a:p>
-        </p:txBody>
-      </p:sp>
-      <p:sp>
-        <p:nvSpPr>
-          <p:cNvPr id="3" name="Subtitle 2"/>
-          <p:cNvSpPr>
-            <a:spLocks noGrp="1"/>
-          </p:cNvSpPr>
-          <p:nvPr>
-            <p:ph type="subTitle" idx="1"/>
-          </p:nvPr>
-        </p:nvSpPr>
-        <p:spPr/>
-        <p:txBody>
-          <a:bodyPr/>
-          <a:lstStyle/>
-          <a:p>
-            <a:r>
-              <a:t>In November 2018, Swift signed a new multi-album deal with Big Machine's distributor Universal Music Group; in the United States, her future releases will be promoted under the Republic Records imprint.</a:t>
+              <a:t>Because Java lacks any formal standardization recognized by Ecma International, ISO/IEC, ANSI, or other third-party standards organization, the Oracle implementation is the de facto standard.</a:t>
             </a:r>
           </a:p>
         </p:txBody>
@@ -10894,607 +9536,11 @@
           <a:lstStyle/>
           <a:p>
             <a:r>
-              <a:t>Borchetta has said that record industry peers disliked his signing of a 16-year-old singer-songwriter at first, but that Swift tapped into a previously unknown market—teenage girls who listen to country music.</a:t>
-            </a:r>
-          </a:p>
-        </p:txBody>
-      </p:sp>
-    </p:spTree>
-  </p:cSld>
-  <p:clrMapOvr>
-    <a:masterClrMapping/>
-  </p:clrMapOvr>
-</p:sld>
-</file>
-
-<file path=ppt/slides/slide80.xml><?xml version="1.0" encoding="utf-8"?>
-<p:sld xmlns:a="http://schemas.openxmlformats.org/drawingml/2006/main" xmlns:p="http://schemas.openxmlformats.org/presentationml/2006/main" xmlns:r="http://schemas.openxmlformats.org/officeDocument/2006/relationships">
-  <p:cSld>
-    <p:spTree>
-      <p:nvGrpSpPr>
-        <p:cNvPr id="1" name=""/>
-        <p:cNvGrpSpPr/>
-        <p:nvPr/>
-      </p:nvGrpSpPr>
-      <p:grpSpPr/>
-      <p:sp>
-        <p:nvSpPr>
-          <p:cNvPr id="2" name="Title 1"/>
-          <p:cNvSpPr>
-            <a:spLocks noGrp="1"/>
-          </p:cNvSpPr>
-          <p:nvPr>
-            <p:ph type="ctrTitle"/>
-          </p:nvPr>
-        </p:nvSpPr>
-        <p:spPr/>
-        <p:txBody>
-          <a:bodyPr/>
-          <a:lstStyle/>
-          <a:p>
-            <a:r>
-              <a:t> </a:t>
-            </a:r>
-          </a:p>
-        </p:txBody>
-      </p:sp>
-      <p:sp>
-        <p:nvSpPr>
-          <p:cNvPr id="3" name="Subtitle 2"/>
-          <p:cNvSpPr>
-            <a:spLocks noGrp="1"/>
-          </p:cNvSpPr>
-          <p:nvPr>
-            <p:ph type="subTitle" idx="1"/>
-          </p:nvPr>
-        </p:nvSpPr>
-        <p:spPr/>
-        <p:txBody>
-          <a:bodyPr/>
-          <a:lstStyle/>
-          <a:p>
-            <a:r>
-              <a:t>Swift was drawn to the storytelling of country music, and was introduced to the genre by "the great female country artists of the '90s"—Shania Twain, Faith Hill, and the Dixie Chicks.</a:t>
-            </a:r>
-          </a:p>
-        </p:txBody>
-      </p:sp>
-    </p:spTree>
-  </p:cSld>
-  <p:clrMapOvr>
-    <a:masterClrMapping/>
-  </p:clrMapOvr>
-</p:sld>
-</file>
-
-<file path=ppt/slides/slide81.xml><?xml version="1.0" encoding="utf-8"?>
-<p:sld xmlns:a="http://schemas.openxmlformats.org/drawingml/2006/main" xmlns:p="http://schemas.openxmlformats.org/presentationml/2006/main" xmlns:r="http://schemas.openxmlformats.org/officeDocument/2006/relationships">
-  <p:cSld>
-    <p:spTree>
-      <p:nvGrpSpPr>
-        <p:cNvPr id="1" name=""/>
-        <p:cNvGrpSpPr/>
-        <p:nvPr/>
-      </p:nvGrpSpPr>
-      <p:grpSpPr/>
-      <p:sp>
-        <p:nvSpPr>
-          <p:cNvPr id="2" name="Title 1"/>
-          <p:cNvSpPr>
-            <a:spLocks noGrp="1"/>
-          </p:cNvSpPr>
-          <p:nvPr>
-            <p:ph type="ctrTitle"/>
-          </p:nvPr>
-        </p:nvSpPr>
-        <p:spPr/>
-        <p:txBody>
-          <a:bodyPr/>
-          <a:lstStyle/>
-          <a:p>
-            <a:r>
-              <a:t> </a:t>
-            </a:r>
-          </a:p>
-        </p:txBody>
-      </p:sp>
-      <p:sp>
-        <p:nvSpPr>
-          <p:cNvPr id="3" name="Subtitle 2"/>
-          <p:cNvSpPr>
-            <a:spLocks noGrp="1"/>
-          </p:cNvSpPr>
-          <p:nvPr>
-            <p:ph type="subTitle" idx="1"/>
-          </p:nvPr>
-        </p:nvSpPr>
-        <p:spPr/>
-        <p:txBody>
-          <a:bodyPr/>
-          <a:lstStyle/>
-          <a:p>
-            <a:r>
-              <a:t>Alt-country artists such as Ryan Adams, Patty Griffin and Lori McKenna have inspired Swift.</a:t>
-            </a:r>
-          </a:p>
-        </p:txBody>
-      </p:sp>
-    </p:spTree>
-  </p:cSld>
-  <p:clrMapOvr>
-    <a:masterClrMapping/>
-  </p:clrMapOvr>
-</p:sld>
-</file>
-
-<file path=ppt/slides/slide82.xml><?xml version="1.0" encoding="utf-8"?>
-<p:sld xmlns:a="http://schemas.openxmlformats.org/drawingml/2006/main" xmlns:p="http://schemas.openxmlformats.org/presentationml/2006/main" xmlns:r="http://schemas.openxmlformats.org/officeDocument/2006/relationships">
-  <p:cSld>
-    <p:spTree>
-      <p:nvGrpSpPr>
-        <p:cNvPr id="1" name=""/>
-        <p:cNvGrpSpPr/>
-        <p:nvPr/>
-      </p:nvGrpSpPr>
-      <p:grpSpPr/>
-      <p:sp>
-        <p:nvSpPr>
-          <p:cNvPr id="2" name="Title 1"/>
-          <p:cNvSpPr>
-            <a:spLocks noGrp="1"/>
-          </p:cNvSpPr>
-          <p:nvPr>
-            <p:ph type="ctrTitle"/>
-          </p:nvPr>
-        </p:nvSpPr>
-        <p:spPr/>
-        <p:txBody>
-          <a:bodyPr/>
-          <a:lstStyle/>
-          <a:p>
-            <a:r>
-              <a:t> </a:t>
-            </a:r>
-          </a:p>
-        </p:txBody>
-      </p:sp>
-      <p:sp>
-        <p:nvSpPr>
-          <p:cNvPr id="3" name="Subtitle 2"/>
-          <p:cNvSpPr>
-            <a:spLocks noGrp="1"/>
-          </p:cNvSpPr>
-          <p:nvPr>
-            <p:ph type="subTitle" idx="1"/>
-          </p:nvPr>
-        </p:nvSpPr>
-        <p:spPr/>
-        <p:txBody>
-          <a:bodyPr/>
-          <a:lstStyle/>
-          <a:p>
-            <a:r>
-              <a:t>McCartney, both as a Beatle and a solo artist, makes Swift feel "as if I've been let into his heart and his mind ... Any musician could only dream of a legacy like that".</a:t>
-            </a:r>
-          </a:p>
-        </p:txBody>
-      </p:sp>
-    </p:spTree>
-  </p:cSld>
-  <p:clrMapOvr>
-    <a:masterClrMapping/>
-  </p:clrMapOvr>
-</p:sld>
-</file>
-
-<file path=ppt/slides/slide83.xml><?xml version="1.0" encoding="utf-8"?>
-<p:sld xmlns:a="http://schemas.openxmlformats.org/drawingml/2006/main" xmlns:p="http://schemas.openxmlformats.org/presentationml/2006/main" xmlns:r="http://schemas.openxmlformats.org/officeDocument/2006/relationships">
-  <p:cSld>
-    <p:spTree>
-      <p:nvGrpSpPr>
-        <p:cNvPr id="1" name=""/>
-        <p:cNvGrpSpPr/>
-        <p:nvPr/>
-      </p:nvGrpSpPr>
-      <p:grpSpPr/>
-      <p:sp>
-        <p:nvSpPr>
-          <p:cNvPr id="2" name="Title 1"/>
-          <p:cNvSpPr>
-            <a:spLocks noGrp="1"/>
-          </p:cNvSpPr>
-          <p:nvPr>
-            <p:ph type="ctrTitle"/>
-          </p:nvPr>
-        </p:nvSpPr>
-        <p:spPr/>
-        <p:txBody>
-          <a:bodyPr/>
-          <a:lstStyle/>
-          <a:p>
-            <a:r>
-              <a:t> </a:t>
-            </a:r>
-          </a:p>
-        </p:txBody>
-      </p:sp>
-      <p:sp>
-        <p:nvSpPr>
-          <p:cNvPr id="3" name="Subtitle 2"/>
-          <p:cNvSpPr>
-            <a:spLocks noGrp="1"/>
-          </p:cNvSpPr>
-          <p:nvPr>
-            <p:ph type="subTitle" idx="1"/>
-          </p:nvPr>
-        </p:nvSpPr>
-        <p:spPr/>
-        <p:txBody>
-          <a:bodyPr/>
-          <a:lstStyle/>
-          <a:p>
-            <a:r>
-              <a:t>In 2015, she was named Woman of the Year at the Elle Style Awards, and ranked first in Maxim's Hot 100 list.</a:t>
-            </a:r>
-          </a:p>
-        </p:txBody>
-      </p:sp>
-    </p:spTree>
-  </p:cSld>
-  <p:clrMapOvr>
-    <a:masterClrMapping/>
-  </p:clrMapOvr>
-</p:sld>
-</file>
-
-<file path=ppt/slides/slide84.xml><?xml version="1.0" encoding="utf-8"?>
-<p:sld xmlns:a="http://schemas.openxmlformats.org/drawingml/2006/main" xmlns:p="http://schemas.openxmlformats.org/presentationml/2006/main" xmlns:r="http://schemas.openxmlformats.org/officeDocument/2006/relationships">
-  <p:cSld>
-    <p:spTree>
-      <p:nvGrpSpPr>
-        <p:cNvPr id="1" name=""/>
-        <p:cNvGrpSpPr/>
-        <p:nvPr/>
-      </p:nvGrpSpPr>
-      <p:grpSpPr/>
-      <p:sp>
-        <p:nvSpPr>
-          <p:cNvPr id="2" name="Title 1"/>
-          <p:cNvSpPr>
-            <a:spLocks noGrp="1"/>
-          </p:cNvSpPr>
-          <p:nvPr>
-            <p:ph type="ctrTitle"/>
-          </p:nvPr>
-        </p:nvSpPr>
-        <p:spPr/>
-        <p:txBody>
-          <a:bodyPr/>
-          <a:lstStyle/>
-          <a:p>
-            <a:r>
-              <a:t> </a:t>
-            </a:r>
-          </a:p>
-        </p:txBody>
-      </p:sp>
-      <p:sp>
-        <p:nvSpPr>
-          <p:cNvPr id="3" name="Subtitle 2"/>
-          <p:cNvSpPr>
-            <a:spLocks noGrp="1"/>
-          </p:cNvSpPr>
-          <p:nvPr>
-            <p:ph type="subTitle" idx="1"/>
-          </p:nvPr>
-        </p:nvSpPr>
-        <p:spPr/>
-        <p:txBody>
-          <a:bodyPr/>
-          <a:lstStyle/>
-          <a:p>
-            <a:r>
-              <a:t>In 2012, she pledged $4 million to fund the building of a new education center at the Country Music Hall of Fame and Museum in Nashville.</a:t>
-            </a:r>
-          </a:p>
-        </p:txBody>
-      </p:sp>
-    </p:spTree>
-  </p:cSld>
-  <p:clrMapOvr>
-    <a:masterClrMapping/>
-  </p:clrMapOvr>
-</p:sld>
-</file>
-
-<file path=ppt/slides/slide85.xml><?xml version="1.0" encoding="utf-8"?>
-<p:sld xmlns:a="http://schemas.openxmlformats.org/drawingml/2006/main" xmlns:p="http://schemas.openxmlformats.org/presentationml/2006/main" xmlns:r="http://schemas.openxmlformats.org/officeDocument/2006/relationships">
-  <p:cSld>
-    <p:spTree>
-      <p:nvGrpSpPr>
-        <p:cNvPr id="1" name=""/>
-        <p:cNvGrpSpPr/>
-        <p:nvPr/>
-      </p:nvGrpSpPr>
-      <p:grpSpPr/>
-      <p:sp>
-        <p:nvSpPr>
-          <p:cNvPr id="2" name="Title 1"/>
-          <p:cNvSpPr>
-            <a:spLocks noGrp="1"/>
-          </p:cNvSpPr>
-          <p:nvPr>
-            <p:ph type="ctrTitle"/>
-          </p:nvPr>
-        </p:nvSpPr>
-        <p:spPr/>
-        <p:txBody>
-          <a:bodyPr/>
-          <a:lstStyle/>
-          <a:p>
-            <a:r>
-              <a:t> </a:t>
-            </a:r>
-          </a:p>
-        </p:txBody>
-      </p:sp>
-      <p:sp>
-        <p:nvSpPr>
-          <p:cNvPr id="3" name="Subtitle 2"/>
-          <p:cNvSpPr>
-            <a:spLocks noGrp="1"/>
-          </p:cNvSpPr>
-          <p:nvPr>
-            <p:ph type="subTitle" idx="1"/>
-          </p:nvPr>
-        </p:nvSpPr>
-        <p:spPr/>
-        <p:txBody>
-          <a:bodyPr/>
-          <a:lstStyle/>
-          <a:p>
-            <a:r>
-              <a:t>As a recipient of the Academy of Country Music's Entertainer of the Year in 2011, Swift donated $25,000 to St. Jude Children's Research Hospital, Tennessee.</a:t>
-            </a:r>
-          </a:p>
-        </p:txBody>
-      </p:sp>
-    </p:spTree>
-  </p:cSld>
-  <p:clrMapOvr>
-    <a:masterClrMapping/>
-  </p:clrMapOvr>
-</p:sld>
-</file>
-
-<file path=ppt/slides/slide86.xml><?xml version="1.0" encoding="utf-8"?>
-<p:sld xmlns:a="http://schemas.openxmlformats.org/drawingml/2006/main" xmlns:p="http://schemas.openxmlformats.org/presentationml/2006/main" xmlns:r="http://schemas.openxmlformats.org/officeDocument/2006/relationships">
-  <p:cSld>
-    <p:spTree>
-      <p:nvGrpSpPr>
-        <p:cNvPr id="1" name=""/>
-        <p:cNvGrpSpPr/>
-        <p:nvPr/>
-      </p:nvGrpSpPr>
-      <p:grpSpPr/>
-      <p:sp>
-        <p:nvSpPr>
-          <p:cNvPr id="2" name="Title 1"/>
-          <p:cNvSpPr>
-            <a:spLocks noGrp="1"/>
-          </p:cNvSpPr>
-          <p:nvPr>
-            <p:ph type="ctrTitle"/>
-          </p:nvPr>
-        </p:nvSpPr>
-        <p:spPr/>
-        <p:txBody>
-          <a:bodyPr/>
-          <a:lstStyle/>
-          <a:p>
-            <a:r>
-              <a:t> </a:t>
-            </a:r>
-          </a:p>
-        </p:txBody>
-      </p:sp>
-      <p:sp>
-        <p:nvSpPr>
-          <p:cNvPr id="3" name="Subtitle 2"/>
-          <p:cNvSpPr>
-            <a:spLocks noGrp="1"/>
-          </p:cNvSpPr>
-          <p:nvPr>
-            <p:ph type="subTitle" idx="1"/>
-          </p:nvPr>
-        </p:nvSpPr>
-        <p:spPr/>
-        <p:txBody>
-          <a:bodyPr/>
-          <a:lstStyle/>
-          <a:p>
-            <a:r>
-              <a:t>Later that year, Swift made a surprise appearance at a benefit concert in New York City raising money for LGBT equality.</a:t>
-            </a:r>
-          </a:p>
-        </p:txBody>
-      </p:sp>
-    </p:spTree>
-  </p:cSld>
-  <p:clrMapOvr>
-    <a:masterClrMapping/>
-  </p:clrMapOvr>
-</p:sld>
-</file>
-
-<file path=ppt/slides/slide87.xml><?xml version="1.0" encoding="utf-8"?>
-<p:sld xmlns:a="http://schemas.openxmlformats.org/drawingml/2006/main" xmlns:p="http://schemas.openxmlformats.org/presentationml/2006/main" xmlns:r="http://schemas.openxmlformats.org/officeDocument/2006/relationships">
-  <p:cSld>
-    <p:spTree>
-      <p:nvGrpSpPr>
-        <p:cNvPr id="1" name=""/>
-        <p:cNvGrpSpPr/>
-        <p:nvPr/>
-      </p:nvGrpSpPr>
-      <p:grpSpPr/>
-      <p:sp>
-        <p:nvSpPr>
-          <p:cNvPr id="2" name="Title 1"/>
-          <p:cNvSpPr>
-            <a:spLocks noGrp="1"/>
-          </p:cNvSpPr>
-          <p:nvPr>
-            <p:ph type="ctrTitle"/>
-          </p:nvPr>
-        </p:nvSpPr>
-        <p:spPr/>
-        <p:txBody>
-          <a:bodyPr/>
-          <a:lstStyle/>
-          <a:p>
-            <a:r>
-              <a:t> </a:t>
-            </a:r>
-          </a:p>
-        </p:txBody>
-      </p:sp>
-      <p:sp>
-        <p:nvSpPr>
-          <p:cNvPr id="3" name="Subtitle 2"/>
-          <p:cNvSpPr>
-            <a:spLocks noGrp="1"/>
-          </p:cNvSpPr>
-          <p:nvPr>
-            <p:ph type="subTitle" idx="1"/>
-          </p:nvPr>
-        </p:nvSpPr>
-        <p:spPr/>
-        <p:txBody>
-          <a:bodyPr/>
-          <a:lstStyle/>
-          <a:p>
-            <a:r>
-              <a:t>The music video for Swift's anti-bullying song "Mean" deals in part with homophobia in high schools; the video was nominated for an MTV VMA social activism award in 2011.</a:t>
-            </a:r>
-          </a:p>
-        </p:txBody>
-      </p:sp>
-    </p:spTree>
-  </p:cSld>
-  <p:clrMapOvr>
-    <a:masterClrMapping/>
-  </p:clrMapOvr>
-</p:sld>
-</file>
-
-<file path=ppt/slides/slide88.xml><?xml version="1.0" encoding="utf-8"?>
-<p:sld xmlns:a="http://schemas.openxmlformats.org/drawingml/2006/main" xmlns:p="http://schemas.openxmlformats.org/presentationml/2006/main" xmlns:r="http://schemas.openxmlformats.org/officeDocument/2006/relationships">
-  <p:cSld>
-    <p:spTree>
-      <p:nvGrpSpPr>
-        <p:cNvPr id="1" name=""/>
-        <p:cNvGrpSpPr/>
-        <p:nvPr/>
-      </p:nvGrpSpPr>
-      <p:grpSpPr/>
-      <p:sp>
-        <p:nvSpPr>
-          <p:cNvPr id="2" name="Title 1"/>
-          <p:cNvSpPr>
-            <a:spLocks noGrp="1"/>
-          </p:cNvSpPr>
-          <p:nvPr>
-            <p:ph type="ctrTitle"/>
-          </p:nvPr>
-        </p:nvSpPr>
-        <p:spPr/>
-        <p:txBody>
-          <a:bodyPr/>
-          <a:lstStyle/>
-          <a:p>
-            <a:r>
-              <a:t> </a:t>
-            </a:r>
-          </a:p>
-        </p:txBody>
-      </p:sp>
-      <p:sp>
-        <p:nvSpPr>
-          <p:cNvPr id="3" name="Subtitle 2"/>
-          <p:cNvSpPr>
-            <a:spLocks noGrp="1"/>
-          </p:cNvSpPr>
-          <p:nvPr>
-            <p:ph type="subTitle" idx="1"/>
-          </p:nvPr>
-        </p:nvSpPr>
-        <p:spPr/>
-        <p:txBody>
-          <a:bodyPr/>
-          <a:lstStyle/>
-          <a:p>
-            <a:r>
-              <a:t>During Swift's acceptance speech for Artist of the Year at the American Music Awards of 2018, she encouraged her fans to vote in the 2018 midterm elections.</a:t>
-            </a:r>
-          </a:p>
-        </p:txBody>
-      </p:sp>
-    </p:spTree>
-  </p:cSld>
-  <p:clrMapOvr>
-    <a:masterClrMapping/>
-  </p:clrMapOvr>
-</p:sld>
-</file>
-
-<file path=ppt/slides/slide89.xml><?xml version="1.0" encoding="utf-8"?>
-<p:sld xmlns:a="http://schemas.openxmlformats.org/drawingml/2006/main" xmlns:p="http://schemas.openxmlformats.org/presentationml/2006/main" xmlns:r="http://schemas.openxmlformats.org/officeDocument/2006/relationships">
-  <p:cSld>
-    <p:spTree>
-      <p:nvGrpSpPr>
-        <p:cNvPr id="1" name=""/>
-        <p:cNvGrpSpPr/>
-        <p:nvPr/>
-      </p:nvGrpSpPr>
-      <p:grpSpPr/>
-      <p:sp>
-        <p:nvSpPr>
-          <p:cNvPr id="2" name="Title 1"/>
-          <p:cNvSpPr>
-            <a:spLocks noGrp="1"/>
-          </p:cNvSpPr>
-          <p:nvPr>
-            <p:ph type="ctrTitle"/>
-          </p:nvPr>
-        </p:nvSpPr>
-        <p:spPr/>
-        <p:txBody>
-          <a:bodyPr/>
-          <a:lstStyle/>
-          <a:p>
-            <a:r>
-              <a:t> </a:t>
-            </a:r>
-          </a:p>
-        </p:txBody>
-      </p:sp>
-      <p:sp>
-        <p:nvSpPr>
-          <p:cNvPr id="3" name="Subtitle 2"/>
-          <p:cNvSpPr>
-            <a:spLocks noGrp="1"/>
-          </p:cNvSpPr>
-          <p:nvPr>
-            <p:ph type="subTitle" idx="1"/>
-          </p:nvPr>
-        </p:nvSpPr>
-        <p:spPr/>
-        <p:txBody>
-          <a:bodyPr/>
-          <a:lstStyle/>
-          <a:p>
-            <a:r>
-              <a:t>Swift has received many awards and honors, including 10 Grammy Awards, 23 American Music Awards (most wins by a female artist), 23 Billboard Music Awards (the most wins by an act), 12 Country Music Association Awards, 8 Academy of Country Music Awards, one Brit Award, and one Emmy Award.</a:t>
+              <a:t>program can be written in Java as:</a:t>
+            </a:r>
+            <a:br/>
+            <a:r>
+              <a:t>Source files must be named after the public class they contain, appending the suffix .java, for example, HelloWorldApp.java.</a:t>
             </a:r>
           </a:p>
         </p:txBody>
@@ -11554,607 +9600,7 @@
           <a:lstStyle/>
           <a:p>
             <a:r>
-              <a:t>Later that year, Swift both hosted and performed as the musical guest for an episode of Saturday Night Live.</a:t>
-            </a:r>
-          </a:p>
-        </p:txBody>
-      </p:sp>
-    </p:spTree>
-  </p:cSld>
-  <p:clrMapOvr>
-    <a:masterClrMapping/>
-  </p:clrMapOvr>
-</p:sld>
-</file>
-
-<file path=ppt/slides/slide90.xml><?xml version="1.0" encoding="utf-8"?>
-<p:sld xmlns:a="http://schemas.openxmlformats.org/drawingml/2006/main" xmlns:p="http://schemas.openxmlformats.org/presentationml/2006/main" xmlns:r="http://schemas.openxmlformats.org/officeDocument/2006/relationships">
-  <p:cSld>
-    <p:spTree>
-      <p:nvGrpSpPr>
-        <p:cNvPr id="1" name=""/>
-        <p:cNvGrpSpPr/>
-        <p:nvPr/>
-      </p:nvGrpSpPr>
-      <p:grpSpPr/>
-      <p:sp>
-        <p:nvSpPr>
-          <p:cNvPr id="2" name="Title 1"/>
-          <p:cNvSpPr>
-            <a:spLocks noGrp="1"/>
-          </p:cNvSpPr>
-          <p:nvPr>
-            <p:ph type="ctrTitle"/>
-          </p:nvPr>
-        </p:nvSpPr>
-        <p:spPr/>
-        <p:txBody>
-          <a:bodyPr/>
-          <a:lstStyle/>
-          <a:p>
-            <a:r>
-              <a:t> </a:t>
-            </a:r>
-          </a:p>
-        </p:txBody>
-      </p:sp>
-      <p:sp>
-        <p:nvSpPr>
-          <p:cNvPr id="3" name="Subtitle 2"/>
-          <p:cNvSpPr>
-            <a:spLocks noGrp="1"/>
-          </p:cNvSpPr>
-          <p:nvPr>
-            <p:ph type="subTitle" idx="1"/>
-          </p:nvPr>
-        </p:nvSpPr>
-        <p:spPr/>
-        <p:txBody>
-          <a:bodyPr/>
-          <a:lstStyle/>
-          <a:p>
-            <a:r>
-              <a:t>Swift's second album, Fearless, was released in 2008.</a:t>
-            </a:r>
-          </a:p>
-        </p:txBody>
-      </p:sp>
-    </p:spTree>
-  </p:cSld>
-  <p:clrMapOvr>
-    <a:masterClrMapping/>
-  </p:clrMapOvr>
-</p:sld>
-</file>
-
-<file path=ppt/slides/slide91.xml><?xml version="1.0" encoding="utf-8"?>
-<p:sld xmlns:a="http://schemas.openxmlformats.org/drawingml/2006/main" xmlns:p="http://schemas.openxmlformats.org/presentationml/2006/main" xmlns:r="http://schemas.openxmlformats.org/officeDocument/2006/relationships">
-  <p:cSld>
-    <p:spTree>
-      <p:nvGrpSpPr>
-        <p:cNvPr id="1" name=""/>
-        <p:cNvGrpSpPr/>
-        <p:nvPr/>
-      </p:nvGrpSpPr>
-      <p:grpSpPr/>
-      <p:sp>
-        <p:nvSpPr>
-          <p:cNvPr id="2" name="Title 1"/>
-          <p:cNvSpPr>
-            <a:spLocks noGrp="1"/>
-          </p:cNvSpPr>
-          <p:nvPr>
-            <p:ph type="ctrTitle"/>
-          </p:nvPr>
-        </p:nvSpPr>
-        <p:spPr/>
-        <p:txBody>
-          <a:bodyPr/>
-          <a:lstStyle/>
-          <a:p>
-            <a:r>
-              <a:t> </a:t>
-            </a:r>
-          </a:p>
-        </p:txBody>
-      </p:sp>
-      <p:sp>
-        <p:nvSpPr>
-          <p:cNvPr id="3" name="Subtitle 2"/>
-          <p:cNvSpPr>
-            <a:spLocks noGrp="1"/>
-          </p:cNvSpPr>
-          <p:nvPr>
-            <p:ph type="subTitle" idx="1"/>
-          </p:nvPr>
-        </p:nvSpPr>
-        <p:spPr/>
-        <p:txBody>
-          <a:bodyPr/>
-          <a:lstStyle/>
-          <a:p>
-            <a:r>
-              <a:t>Buoyed by the success of pop crossover singles "Love Story" and "You Belong with Me", Fearless became the best-selling album of 2009 in the US.</a:t>
-            </a:r>
-          </a:p>
-        </p:txBody>
-      </p:sp>
-    </p:spTree>
-  </p:cSld>
-  <p:clrMapOvr>
-    <a:masterClrMapping/>
-  </p:clrMapOvr>
-</p:sld>
-</file>
-
-<file path=ppt/slides/slide92.xml><?xml version="1.0" encoding="utf-8"?>
-<p:sld xmlns:a="http://schemas.openxmlformats.org/drawingml/2006/main" xmlns:p="http://schemas.openxmlformats.org/presentationml/2006/main" xmlns:r="http://schemas.openxmlformats.org/officeDocument/2006/relationships">
-  <p:cSld>
-    <p:spTree>
-      <p:nvGrpSpPr>
-        <p:cNvPr id="1" name=""/>
-        <p:cNvGrpSpPr/>
-        <p:nvPr/>
-      </p:nvGrpSpPr>
-      <p:grpSpPr/>
-      <p:sp>
-        <p:nvSpPr>
-          <p:cNvPr id="2" name="Title 1"/>
-          <p:cNvSpPr>
-            <a:spLocks noGrp="1"/>
-          </p:cNvSpPr>
-          <p:nvPr>
-            <p:ph type="ctrTitle"/>
-          </p:nvPr>
-        </p:nvSpPr>
-        <p:spPr/>
-        <p:txBody>
-          <a:bodyPr/>
-          <a:lstStyle/>
-          <a:p>
-            <a:r>
-              <a:t> </a:t>
-            </a:r>
-          </a:p>
-        </p:txBody>
-      </p:sp>
-      <p:sp>
-        <p:nvSpPr>
-          <p:cNvPr id="3" name="Subtitle 2"/>
-          <p:cNvSpPr>
-            <a:spLocks noGrp="1"/>
-          </p:cNvSpPr>
-          <p:nvPr>
-            <p:ph type="subTitle" idx="1"/>
-          </p:nvPr>
-        </p:nvSpPr>
-        <p:spPr/>
-        <p:txBody>
-          <a:bodyPr/>
-          <a:lstStyle/>
-          <a:p>
-            <a:r>
-              <a:t>It debuted at number one in the United States and the single "Mean" won two Grammy Awards.</a:t>
-            </a:r>
-          </a:p>
-        </p:txBody>
-      </p:sp>
-    </p:spTree>
-  </p:cSld>
-  <p:clrMapOvr>
-    <a:masterClrMapping/>
-  </p:clrMapOvr>
-</p:sld>
-</file>
-
-<file path=ppt/slides/slide93.xml><?xml version="1.0" encoding="utf-8"?>
-<p:sld xmlns:a="http://schemas.openxmlformats.org/drawingml/2006/main" xmlns:p="http://schemas.openxmlformats.org/presentationml/2006/main" xmlns:r="http://schemas.openxmlformats.org/officeDocument/2006/relationships">
-  <p:cSld>
-    <p:spTree>
-      <p:nvGrpSpPr>
-        <p:cNvPr id="1" name=""/>
-        <p:cNvGrpSpPr/>
-        <p:nvPr/>
-      </p:nvGrpSpPr>
-      <p:grpSpPr/>
-      <p:sp>
-        <p:nvSpPr>
-          <p:cNvPr id="2" name="Title 1"/>
-          <p:cNvSpPr>
-            <a:spLocks noGrp="1"/>
-          </p:cNvSpPr>
-          <p:nvPr>
-            <p:ph type="ctrTitle"/>
-          </p:nvPr>
-        </p:nvSpPr>
-        <p:spPr/>
-        <p:txBody>
-          <a:bodyPr/>
-          <a:lstStyle/>
-          <a:p>
-            <a:r>
-              <a:t> </a:t>
-            </a:r>
-          </a:p>
-        </p:txBody>
-      </p:sp>
-      <p:sp>
-        <p:nvSpPr>
-          <p:cNvPr id="3" name="Subtitle 2"/>
-          <p:cNvSpPr>
-            <a:spLocks noGrp="1"/>
-          </p:cNvSpPr>
-          <p:nvPr>
-            <p:ph type="subTitle" idx="1"/>
-          </p:nvPr>
-        </p:nvSpPr>
-        <p:spPr/>
-        <p:txBody>
-          <a:bodyPr/>
-          <a:lstStyle/>
-          <a:p>
-            <a:r>
-              <a:t>Her fourth album, Red (2012), yielded the successful singles "We Are Never Ever Getting Back Together" and "I Knew You Were Trouble".</a:t>
-            </a:r>
-          </a:p>
-        </p:txBody>
-      </p:sp>
-    </p:spTree>
-  </p:cSld>
-  <p:clrMapOvr>
-    <a:masterClrMapping/>
-  </p:clrMapOvr>
-</p:sld>
-</file>
-
-<file path=ppt/slides/slide94.xml><?xml version="1.0" encoding="utf-8"?>
-<p:sld xmlns:a="http://schemas.openxmlformats.org/drawingml/2006/main" xmlns:p="http://schemas.openxmlformats.org/presentationml/2006/main" xmlns:r="http://schemas.openxmlformats.org/officeDocument/2006/relationships">
-  <p:cSld>
-    <p:spTree>
-      <p:nvGrpSpPr>
-        <p:cNvPr id="1" name=""/>
-        <p:cNvGrpSpPr/>
-        <p:nvPr/>
-      </p:nvGrpSpPr>
-      <p:grpSpPr/>
-      <p:sp>
-        <p:nvSpPr>
-          <p:cNvPr id="2" name="Title 1"/>
-          <p:cNvSpPr>
-            <a:spLocks noGrp="1"/>
-          </p:cNvSpPr>
-          <p:nvPr>
-            <p:ph type="ctrTitle"/>
-          </p:nvPr>
-        </p:nvSpPr>
-        <p:spPr/>
-        <p:txBody>
-          <a:bodyPr/>
-          <a:lstStyle/>
-          <a:p>
-            <a:r>
-              <a:t> </a:t>
-            </a:r>
-          </a:p>
-        </p:txBody>
-      </p:sp>
-      <p:sp>
-        <p:nvSpPr>
-          <p:cNvPr id="3" name="Subtitle 2"/>
-          <p:cNvSpPr>
-            <a:spLocks noGrp="1"/>
-          </p:cNvSpPr>
-          <p:nvPr>
-            <p:ph type="subTitle" idx="1"/>
-          </p:nvPr>
-        </p:nvSpPr>
-        <p:spPr/>
-        <p:txBody>
-          <a:bodyPr/>
-          <a:lstStyle/>
-          <a:p>
-            <a:r>
-              <a:t>Taylor Swift peaked at number five on the Billboard 200 albums chart in the United States and spent 157 weeks on the ranking, marking the longest stay on the chart by any release in the country in the 2000s decade.</a:t>
-            </a:r>
-          </a:p>
-        </p:txBody>
-      </p:sp>
-    </p:spTree>
-  </p:cSld>
-  <p:clrMapOvr>
-    <a:masterClrMapping/>
-  </p:clrMapOvr>
-</p:sld>
-</file>
-
-<file path=ppt/slides/slide95.xml><?xml version="1.0" encoding="utf-8"?>
-<p:sld xmlns:a="http://schemas.openxmlformats.org/drawingml/2006/main" xmlns:p="http://schemas.openxmlformats.org/presentationml/2006/main" xmlns:r="http://schemas.openxmlformats.org/officeDocument/2006/relationships">
-  <p:cSld>
-    <p:spTree>
-      <p:nvGrpSpPr>
-        <p:cNvPr id="1" name=""/>
-        <p:cNvGrpSpPr/>
-        <p:nvPr/>
-      </p:nvGrpSpPr>
-      <p:grpSpPr/>
-      <p:sp>
-        <p:nvSpPr>
-          <p:cNvPr id="2" name="Title 1"/>
-          <p:cNvSpPr>
-            <a:spLocks noGrp="1"/>
-          </p:cNvSpPr>
-          <p:nvPr>
-            <p:ph type="ctrTitle"/>
-          </p:nvPr>
-        </p:nvSpPr>
-        <p:spPr/>
-        <p:txBody>
-          <a:bodyPr/>
-          <a:lstStyle/>
-          <a:p>
-            <a:r>
-              <a:t> </a:t>
-            </a:r>
-          </a:p>
-        </p:txBody>
-      </p:sp>
-      <p:sp>
-        <p:nvSpPr>
-          <p:cNvPr id="3" name="Subtitle 2"/>
-          <p:cNvSpPr>
-            <a:spLocks noGrp="1"/>
-          </p:cNvSpPr>
-          <p:nvPr>
-            <p:ph type="subTitle" idx="1"/>
-          </p:nvPr>
-        </p:nvSpPr>
-        <p:spPr/>
-        <p:txBody>
-          <a:bodyPr/>
-          <a:lstStyle/>
-          <a:p>
-            <a:r>
-              <a:t>All were highly successful on Billboard's Hot Country Songs chart in the United States, with "Our Song" and "Should've Said No" both reaching number one.</a:t>
-            </a:r>
-          </a:p>
-        </p:txBody>
-      </p:sp>
-    </p:spTree>
-  </p:cSld>
-  <p:clrMapOvr>
-    <a:masterClrMapping/>
-  </p:clrMapOvr>
-</p:sld>
-</file>
-
-<file path=ppt/slides/slide96.xml><?xml version="1.0" encoding="utf-8"?>
-<p:sld xmlns:a="http://schemas.openxmlformats.org/drawingml/2006/main" xmlns:p="http://schemas.openxmlformats.org/presentationml/2006/main" xmlns:r="http://schemas.openxmlformats.org/officeDocument/2006/relationships">
-  <p:cSld>
-    <p:spTree>
-      <p:nvGrpSpPr>
-        <p:cNvPr id="1" name=""/>
-        <p:cNvGrpSpPr/>
-        <p:nvPr/>
-      </p:nvGrpSpPr>
-      <p:grpSpPr/>
-      <p:sp>
-        <p:nvSpPr>
-          <p:cNvPr id="2" name="Title 1"/>
-          <p:cNvSpPr>
-            <a:spLocks noGrp="1"/>
-          </p:cNvSpPr>
-          <p:nvPr>
-            <p:ph type="ctrTitle"/>
-          </p:nvPr>
-        </p:nvSpPr>
-        <p:spPr/>
-        <p:txBody>
-          <a:bodyPr/>
-          <a:lstStyle/>
-          <a:p>
-            <a:r>
-              <a:t> </a:t>
-            </a:r>
-          </a:p>
-        </p:txBody>
-      </p:sp>
-      <p:sp>
-        <p:nvSpPr>
-          <p:cNvPr id="3" name="Subtitle 2"/>
-          <p:cNvSpPr>
-            <a:spLocks noGrp="1"/>
-          </p:cNvSpPr>
-          <p:nvPr>
-            <p:ph type="subTitle" idx="1"/>
-          </p:nvPr>
-        </p:nvSpPr>
-        <p:spPr/>
-        <p:txBody>
-          <a:bodyPr/>
-          <a:lstStyle/>
-          <a:p>
-            <a:r>
-              <a:t>"Teardrops on My Guitar" became a moderate commercial success, reaching number thirteen on the Billboard Hot 100 songs chart in the United States.</a:t>
-            </a:r>
-          </a:p>
-        </p:txBody>
-      </p:sp>
-    </p:spTree>
-  </p:cSld>
-  <p:clrMapOvr>
-    <a:masterClrMapping/>
-  </p:clrMapOvr>
-</p:sld>
-</file>
-
-<file path=ppt/slides/slide97.xml><?xml version="1.0" encoding="utf-8"?>
-<p:sld xmlns:a="http://schemas.openxmlformats.org/drawingml/2006/main" xmlns:p="http://schemas.openxmlformats.org/presentationml/2006/main" xmlns:r="http://schemas.openxmlformats.org/officeDocument/2006/relationships">
-  <p:cSld>
-    <p:spTree>
-      <p:nvGrpSpPr>
-        <p:cNvPr id="1" name=""/>
-        <p:cNvGrpSpPr/>
-        <p:nvPr/>
-      </p:nvGrpSpPr>
-      <p:grpSpPr/>
-      <p:sp>
-        <p:nvSpPr>
-          <p:cNvPr id="2" name="Title 1"/>
-          <p:cNvSpPr>
-            <a:spLocks noGrp="1"/>
-          </p:cNvSpPr>
-          <p:nvPr>
-            <p:ph type="ctrTitle"/>
-          </p:nvPr>
-        </p:nvSpPr>
-        <p:spPr/>
-        <p:txBody>
-          <a:bodyPr/>
-          <a:lstStyle/>
-          <a:p>
-            <a:r>
-              <a:t> </a:t>
-            </a:r>
-          </a:p>
-        </p:txBody>
-      </p:sp>
-      <p:sp>
-        <p:nvSpPr>
-          <p:cNvPr id="3" name="Subtitle 2"/>
-          <p:cNvSpPr>
-            <a:spLocks noGrp="1"/>
-          </p:cNvSpPr>
-          <p:nvPr>
-            <p:ph type="subTitle" idx="1"/>
-          </p:nvPr>
-        </p:nvSpPr>
-        <p:spPr/>
-        <p:txBody>
-          <a:bodyPr/>
-          <a:lstStyle/>
-          <a:p>
-            <a:r>
-              <a:t>Swift also released the holiday album Sounds of the Season: The Taylor Swift Holiday Collection in October 2007 and the EP Beautiful Eyes in July 2008.</a:t>
-            </a:r>
-          </a:p>
-        </p:txBody>
-      </p:sp>
-    </p:spTree>
-  </p:cSld>
-  <p:clrMapOvr>
-    <a:masterClrMapping/>
-  </p:clrMapOvr>
-</p:sld>
-</file>
-
-<file path=ppt/slides/slide98.xml><?xml version="1.0" encoding="utf-8"?>
-<p:sld xmlns:a="http://schemas.openxmlformats.org/drawingml/2006/main" xmlns:p="http://schemas.openxmlformats.org/presentationml/2006/main" xmlns:r="http://schemas.openxmlformats.org/officeDocument/2006/relationships">
-  <p:cSld>
-    <p:spTree>
-      <p:nvGrpSpPr>
-        <p:cNvPr id="1" name=""/>
-        <p:cNvGrpSpPr/>
-        <p:nvPr/>
-      </p:nvGrpSpPr>
-      <p:grpSpPr/>
-      <p:sp>
-        <p:nvSpPr>
-          <p:cNvPr id="2" name="Title 1"/>
-          <p:cNvSpPr>
-            <a:spLocks noGrp="1"/>
-          </p:cNvSpPr>
-          <p:nvPr>
-            <p:ph type="ctrTitle"/>
-          </p:nvPr>
-        </p:nvSpPr>
-        <p:spPr/>
-        <p:txBody>
-          <a:bodyPr/>
-          <a:lstStyle/>
-          <a:p>
-            <a:r>
-              <a:t> </a:t>
-            </a:r>
-          </a:p>
-        </p:txBody>
-      </p:sp>
-      <p:sp>
-        <p:nvSpPr>
-          <p:cNvPr id="3" name="Subtitle 2"/>
-          <p:cNvSpPr>
-            <a:spLocks noGrp="1"/>
-          </p:cNvSpPr>
-          <p:nvPr>
-            <p:ph type="subTitle" idx="1"/>
-          </p:nvPr>
-        </p:nvSpPr>
-        <p:spPr/>
-        <p:txBody>
-          <a:bodyPr/>
-          <a:lstStyle/>
-          <a:p>
-            <a:r>
-              <a:t>Swift's second studio album, Fearless, was released on November 11, 2008.</a:t>
-            </a:r>
-          </a:p>
-        </p:txBody>
-      </p:sp>
-    </p:spTree>
-  </p:cSld>
-  <p:clrMapOvr>
-    <a:masterClrMapping/>
-  </p:clrMapOvr>
-</p:sld>
-</file>
-
-<file path=ppt/slides/slide99.xml><?xml version="1.0" encoding="utf-8"?>
-<p:sld xmlns:a="http://schemas.openxmlformats.org/drawingml/2006/main" xmlns:p="http://schemas.openxmlformats.org/presentationml/2006/main" xmlns:r="http://schemas.openxmlformats.org/officeDocument/2006/relationships">
-  <p:cSld>
-    <p:spTree>
-      <p:nvGrpSpPr>
-        <p:cNvPr id="1" name=""/>
-        <p:cNvGrpSpPr/>
-        <p:nvPr/>
-      </p:nvGrpSpPr>
-      <p:grpSpPr/>
-      <p:sp>
-        <p:nvSpPr>
-          <p:cNvPr id="2" name="Title 1"/>
-          <p:cNvSpPr>
-            <a:spLocks noGrp="1"/>
-          </p:cNvSpPr>
-          <p:nvPr>
-            <p:ph type="ctrTitle"/>
-          </p:nvPr>
-        </p:nvSpPr>
-        <p:spPr/>
-        <p:txBody>
-          <a:bodyPr/>
-          <a:lstStyle/>
-          <a:p>
-            <a:r>
-              <a:t> </a:t>
-            </a:r>
-          </a:p>
-        </p:txBody>
-      </p:sp>
-      <p:sp>
-        <p:nvSpPr>
-          <p:cNvPr id="3" name="Subtitle 2"/>
-          <p:cNvSpPr>
-            <a:spLocks noGrp="1"/>
-          </p:cNvSpPr>
-          <p:nvPr>
-            <p:ph type="subTitle" idx="1"/>
-          </p:nvPr>
-        </p:nvSpPr>
-        <p:spPr/>
-        <p:txBody>
-          <a:bodyPr/>
-          <a:lstStyle/>
-          <a:p>
-            <a:r>
-              <a:t>The album debuted at number one on the Billboard 200 and was the top-selling album of 2009 in the United States.</a:t>
+              <a:t>When the source file contains multiple classes, make one class "public" and name the source file with that public class name.</a:t>
             </a:r>
           </a:p>
         </p:txBody>

</xml_diff>